<commit_message>
add 2state, 4state, string, enum, array
</commit_message>
<xml_diff>
--- a/systemverilog/SystemVerilog_語法學習.pptx
+++ b/systemverilog/SystemVerilog_語法學習.pptx
@@ -7,8 +7,21 @@
   <p:sldIdLst>
     <p:sldId id="256" r:id="rId2"/>
     <p:sldId id="257" r:id="rId3"/>
-    <p:sldId id="258" r:id="rId4"/>
-    <p:sldId id="265" r:id="rId5"/>
+    <p:sldId id="268" r:id="rId4"/>
+    <p:sldId id="258" r:id="rId5"/>
+    <p:sldId id="265" r:id="rId6"/>
+    <p:sldId id="266" r:id="rId7"/>
+    <p:sldId id="269" r:id="rId8"/>
+    <p:sldId id="270" r:id="rId9"/>
+    <p:sldId id="271" r:id="rId10"/>
+    <p:sldId id="272" r:id="rId11"/>
+    <p:sldId id="273" r:id="rId12"/>
+    <p:sldId id="276" r:id="rId13"/>
+    <p:sldId id="275" r:id="rId14"/>
+    <p:sldId id="278" r:id="rId15"/>
+    <p:sldId id="279" r:id="rId16"/>
+    <p:sldId id="280" r:id="rId17"/>
+    <p:sldId id="281" r:id="rId18"/>
   </p:sldIdLst>
   <p:sldSz cx="12192000" cy="6858000"/>
   <p:notesSz cx="6858000" cy="9144000"/>
@@ -262,7 +275,7 @@
           <a:p>
             <a:fld id="{2365240E-6CA3-4772-8803-719FF1315E51}" type="datetimeFigureOut">
               <a:rPr lang="zh-TW" altLang="en-US" smtClean="0"/>
-              <a:t>2025/3/13</a:t>
+              <a:t>2025/3/16</a:t>
             </a:fld>
             <a:endParaRPr lang="zh-TW" altLang="en-US"/>
           </a:p>
@@ -460,7 +473,7 @@
           <a:p>
             <a:fld id="{2365240E-6CA3-4772-8803-719FF1315E51}" type="datetimeFigureOut">
               <a:rPr lang="zh-TW" altLang="en-US" smtClean="0"/>
-              <a:t>2025/3/13</a:t>
+              <a:t>2025/3/16</a:t>
             </a:fld>
             <a:endParaRPr lang="zh-TW" altLang="en-US"/>
           </a:p>
@@ -668,7 +681,7 @@
           <a:p>
             <a:fld id="{2365240E-6CA3-4772-8803-719FF1315E51}" type="datetimeFigureOut">
               <a:rPr lang="zh-TW" altLang="en-US" smtClean="0"/>
-              <a:t>2025/3/13</a:t>
+              <a:t>2025/3/16</a:t>
             </a:fld>
             <a:endParaRPr lang="zh-TW" altLang="en-US"/>
           </a:p>
@@ -866,7 +879,7 @@
           <a:p>
             <a:fld id="{2365240E-6CA3-4772-8803-719FF1315E51}" type="datetimeFigureOut">
               <a:rPr lang="zh-TW" altLang="en-US" smtClean="0"/>
-              <a:t>2025/3/13</a:t>
+              <a:t>2025/3/16</a:t>
             </a:fld>
             <a:endParaRPr lang="zh-TW" altLang="en-US"/>
           </a:p>
@@ -1141,7 +1154,7 @@
           <a:p>
             <a:fld id="{2365240E-6CA3-4772-8803-719FF1315E51}" type="datetimeFigureOut">
               <a:rPr lang="zh-TW" altLang="en-US" smtClean="0"/>
-              <a:t>2025/3/13</a:t>
+              <a:t>2025/3/16</a:t>
             </a:fld>
             <a:endParaRPr lang="zh-TW" altLang="en-US"/>
           </a:p>
@@ -1406,7 +1419,7 @@
           <a:p>
             <a:fld id="{2365240E-6CA3-4772-8803-719FF1315E51}" type="datetimeFigureOut">
               <a:rPr lang="zh-TW" altLang="en-US" smtClean="0"/>
-              <a:t>2025/3/13</a:t>
+              <a:t>2025/3/16</a:t>
             </a:fld>
             <a:endParaRPr lang="zh-TW" altLang="en-US"/>
           </a:p>
@@ -1818,7 +1831,7 @@
           <a:p>
             <a:fld id="{2365240E-6CA3-4772-8803-719FF1315E51}" type="datetimeFigureOut">
               <a:rPr lang="zh-TW" altLang="en-US" smtClean="0"/>
-              <a:t>2025/3/13</a:t>
+              <a:t>2025/3/16</a:t>
             </a:fld>
             <a:endParaRPr lang="zh-TW" altLang="en-US"/>
           </a:p>
@@ -1959,7 +1972,7 @@
           <a:p>
             <a:fld id="{2365240E-6CA3-4772-8803-719FF1315E51}" type="datetimeFigureOut">
               <a:rPr lang="zh-TW" altLang="en-US" smtClean="0"/>
-              <a:t>2025/3/13</a:t>
+              <a:t>2025/3/16</a:t>
             </a:fld>
             <a:endParaRPr lang="zh-TW" altLang="en-US"/>
           </a:p>
@@ -2072,7 +2085,7 @@
           <a:p>
             <a:fld id="{2365240E-6CA3-4772-8803-719FF1315E51}" type="datetimeFigureOut">
               <a:rPr lang="zh-TW" altLang="en-US" smtClean="0"/>
-              <a:t>2025/3/13</a:t>
+              <a:t>2025/3/16</a:t>
             </a:fld>
             <a:endParaRPr lang="zh-TW" altLang="en-US"/>
           </a:p>
@@ -2383,7 +2396,7 @@
           <a:p>
             <a:fld id="{2365240E-6CA3-4772-8803-719FF1315E51}" type="datetimeFigureOut">
               <a:rPr lang="zh-TW" altLang="en-US" smtClean="0"/>
-              <a:t>2025/3/13</a:t>
+              <a:t>2025/3/16</a:t>
             </a:fld>
             <a:endParaRPr lang="zh-TW" altLang="en-US"/>
           </a:p>
@@ -2671,7 +2684,7 @@
           <a:p>
             <a:fld id="{2365240E-6CA3-4772-8803-719FF1315E51}" type="datetimeFigureOut">
               <a:rPr lang="zh-TW" altLang="en-US" smtClean="0"/>
-              <a:t>2025/3/13</a:t>
+              <a:t>2025/3/16</a:t>
             </a:fld>
             <a:endParaRPr lang="zh-TW" altLang="en-US"/>
           </a:p>
@@ -2912,7 +2925,7 @@
           <a:p>
             <a:fld id="{2365240E-6CA3-4772-8803-719FF1315E51}" type="datetimeFigureOut">
               <a:rPr lang="zh-TW" altLang="en-US" smtClean="0"/>
-              <a:t>2025/3/13</a:t>
+              <a:t>2025/3/16</a:t>
             </a:fld>
             <a:endParaRPr lang="zh-TW" altLang="en-US"/>
           </a:p>
@@ -3404,6 +3417,2435 @@
 </p:sld>
 </file>
 
+<file path=ppt/slides/slide10.xml><?xml version="1.0" encoding="utf-8"?>
+<p:sld xmlns:a="http://schemas.openxmlformats.org/drawingml/2006/main" xmlns:r="http://schemas.openxmlformats.org/officeDocument/2006/relationships" xmlns:p="http://schemas.openxmlformats.org/presentationml/2006/main">
+  <p:cSld>
+    <p:spTree>
+      <p:nvGrpSpPr>
+        <p:cNvPr id="1" name="">
+          <a:extLst>
+            <a:ext uri="{FF2B5EF4-FFF2-40B4-BE49-F238E27FC236}">
+              <a16:creationId xmlns:a16="http://schemas.microsoft.com/office/drawing/2014/main" id="{A33122D7-9E7E-A56B-0F4B-87FFE92A4B27}"/>
+            </a:ext>
+          </a:extLst>
+        </p:cNvPr>
+        <p:cNvGrpSpPr/>
+        <p:nvPr/>
+      </p:nvGrpSpPr>
+      <p:grpSpPr>
+        <a:xfrm>
+          <a:off x="0" y="0"/>
+          <a:ext cx="0" cy="0"/>
+          <a:chOff x="0" y="0"/>
+          <a:chExt cx="0" cy="0"/>
+        </a:xfrm>
+      </p:grpSpPr>
+      <p:sp>
+        <p:nvSpPr>
+          <p:cNvPr id="2" name="標題 1">
+            <a:extLst>
+              <a:ext uri="{FF2B5EF4-FFF2-40B4-BE49-F238E27FC236}">
+                <a16:creationId xmlns:a16="http://schemas.microsoft.com/office/drawing/2014/main" id="{13FA0376-21A9-C903-111F-7A41AD2BCF61}"/>
+              </a:ext>
+            </a:extLst>
+          </p:cNvPr>
+          <p:cNvSpPr>
+            <a:spLocks noGrp="1"/>
+          </p:cNvSpPr>
+          <p:nvPr>
+            <p:ph type="title"/>
+          </p:nvPr>
+        </p:nvSpPr>
+        <p:spPr/>
+        <p:txBody>
+          <a:bodyPr/>
+          <a:lstStyle/>
+          <a:p>
+            <a:r>
+              <a:rPr lang="en-US" altLang="zh-TW" dirty="0"/>
+              <a:t>Bit, Byte, Int (2-State) (2/2)</a:t>
+            </a:r>
+            <a:endParaRPr lang="zh-TW" altLang="en-US" dirty="0"/>
+          </a:p>
+        </p:txBody>
+      </p:sp>
+      <p:sp>
+        <p:nvSpPr>
+          <p:cNvPr id="5" name="內容版面配置區 4">
+            <a:extLst>
+              <a:ext uri="{FF2B5EF4-FFF2-40B4-BE49-F238E27FC236}">
+                <a16:creationId xmlns:a16="http://schemas.microsoft.com/office/drawing/2014/main" id="{566EF00C-3751-241D-ED05-83D5D798D4EF}"/>
+              </a:ext>
+            </a:extLst>
+          </p:cNvPr>
+          <p:cNvSpPr>
+            <a:spLocks noGrp="1"/>
+          </p:cNvSpPr>
+          <p:nvPr>
+            <p:ph idx="1"/>
+          </p:nvPr>
+        </p:nvSpPr>
+        <p:spPr/>
+        <p:txBody>
+          <a:bodyPr/>
+          <a:lstStyle/>
+          <a:p>
+            <a:r>
+              <a:rPr lang="zh-TW" altLang="en-US" dirty="0">
+                <a:latin typeface="標楷體" panose="03000509000000000000" pitchFamily="65" charset="-120"/>
+                <a:ea typeface="標楷體" panose="03000509000000000000" pitchFamily="65" charset="-120"/>
+              </a:rPr>
+              <a:t>宣告方式 示範</a:t>
+            </a:r>
+          </a:p>
+          <a:p>
+            <a:endParaRPr lang="zh-TW" altLang="en-US" dirty="0">
+              <a:latin typeface="標楷體" panose="03000509000000000000" pitchFamily="65" charset="-120"/>
+              <a:ea typeface="標楷體" panose="03000509000000000000" pitchFamily="65" charset="-120"/>
+            </a:endParaRPr>
+          </a:p>
+        </p:txBody>
+      </p:sp>
+      <p:sp>
+        <p:nvSpPr>
+          <p:cNvPr id="3" name="文字方塊 2">
+            <a:extLst>
+              <a:ext uri="{FF2B5EF4-FFF2-40B4-BE49-F238E27FC236}">
+                <a16:creationId xmlns:a16="http://schemas.microsoft.com/office/drawing/2014/main" id="{5DA26FFC-B260-06FE-0E72-F5D5137097B3}"/>
+              </a:ext>
+            </a:extLst>
+          </p:cNvPr>
+          <p:cNvSpPr txBox="1"/>
+          <p:nvPr/>
+        </p:nvSpPr>
+        <p:spPr>
+          <a:xfrm>
+            <a:off x="1417607" y="2324970"/>
+            <a:ext cx="9356786" cy="4524315"/>
+          </a:xfrm>
+          <a:prstGeom prst="rect">
+            <a:avLst/>
+          </a:prstGeom>
+          <a:noFill/>
+          <a:ln>
+            <a:solidFill>
+              <a:schemeClr val="tx1"/>
+            </a:solidFill>
+          </a:ln>
+        </p:spPr>
+        <p:txBody>
+          <a:bodyPr wrap="square" rtlCol="0">
+            <a:spAutoFit/>
+          </a:bodyPr>
+          <a:lstStyle/>
+          <a:p>
+            <a:r>
+              <a:rPr lang="en-US" altLang="zh-TW" dirty="0"/>
+              <a:t>module tb;</a:t>
+            </a:r>
+          </a:p>
+          <a:p>
+            <a:r>
+              <a:rPr lang="zh-TW" altLang="en-US" dirty="0"/>
+              <a:t>  </a:t>
+            </a:r>
+            <a:r>
+              <a:rPr lang="en-US" altLang="zh-TW" dirty="0"/>
+              <a:t>bit       </a:t>
+            </a:r>
+            <a:r>
+              <a:rPr lang="zh-TW" altLang="en-US" dirty="0"/>
+              <a:t>             </a:t>
+            </a:r>
+            <a:r>
+              <a:rPr lang="en-US" altLang="zh-TW" dirty="0" err="1"/>
+              <a:t>var_a</a:t>
+            </a:r>
+            <a:r>
+              <a:rPr lang="en-US" altLang="zh-TW" dirty="0"/>
+              <a:t>;       // Declare a 1 bit variable of type "bit"</a:t>
+            </a:r>
+          </a:p>
+          <a:p>
+            <a:r>
+              <a:rPr lang="en-US" altLang="zh-TW" dirty="0"/>
+              <a:t>  bit [3:0] </a:t>
+            </a:r>
+            <a:r>
+              <a:rPr lang="zh-TW" altLang="en-US" dirty="0"/>
+              <a:t>        </a:t>
+            </a:r>
+            <a:r>
+              <a:rPr lang="en-US" altLang="zh-TW" dirty="0" err="1"/>
+              <a:t>var_b</a:t>
+            </a:r>
+            <a:r>
+              <a:rPr lang="en-US" altLang="zh-TW" dirty="0"/>
+              <a:t>;       // Declare a 4 bit variable of type "bit“</a:t>
+            </a:r>
+          </a:p>
+          <a:p>
+            <a:r>
+              <a:rPr lang="zh-TW" altLang="en-US" dirty="0"/>
+              <a:t>  </a:t>
+            </a:r>
+            <a:r>
+              <a:rPr lang="en-US" altLang="zh-TW" dirty="0"/>
+              <a:t>byte         </a:t>
+            </a:r>
+            <a:r>
+              <a:rPr lang="zh-TW" altLang="en-US" dirty="0"/>
+              <a:t>     </a:t>
+            </a:r>
+            <a:r>
+              <a:rPr lang="en-US" altLang="zh-TW" dirty="0"/>
+              <a:t> </a:t>
+            </a:r>
+            <a:r>
+              <a:rPr lang="en-US" altLang="zh-TW" dirty="0" err="1"/>
+              <a:t>m_var_byte</a:t>
+            </a:r>
+            <a:r>
+              <a:rPr lang="en-US" altLang="zh-TW" dirty="0"/>
+              <a:t>;</a:t>
+            </a:r>
+          </a:p>
+          <a:p>
+            <a:r>
+              <a:rPr lang="zh-TW" altLang="en-US" dirty="0"/>
+              <a:t>  </a:t>
+            </a:r>
+            <a:r>
+              <a:rPr lang="en-US" altLang="zh-TW" dirty="0" err="1"/>
+              <a:t>shortint</a:t>
+            </a:r>
+            <a:r>
+              <a:rPr lang="en-US" altLang="zh-TW" dirty="0"/>
+              <a:t>       </a:t>
+            </a:r>
+            <a:r>
+              <a:rPr lang="en-US" altLang="zh-TW" dirty="0" err="1"/>
+              <a:t>m_var_shortint</a:t>
+            </a:r>
+            <a:r>
+              <a:rPr lang="en-US" altLang="zh-TW" dirty="0"/>
+              <a:t>;</a:t>
+            </a:r>
+          </a:p>
+          <a:p>
+            <a:r>
+              <a:rPr lang="zh-TW" altLang="en-US" dirty="0"/>
+              <a:t>  </a:t>
+            </a:r>
+            <a:r>
+              <a:rPr lang="en-US" altLang="zh-TW" dirty="0"/>
+              <a:t>int         </a:t>
+            </a:r>
+            <a:r>
+              <a:rPr lang="zh-TW" altLang="en-US" dirty="0"/>
+              <a:t>      </a:t>
+            </a:r>
+            <a:r>
+              <a:rPr lang="en-US" altLang="zh-TW" dirty="0"/>
+              <a:t>   </a:t>
+            </a:r>
+            <a:r>
+              <a:rPr lang="en-US" altLang="zh-TW" dirty="0" err="1"/>
+              <a:t>m_var_int</a:t>
+            </a:r>
+            <a:r>
+              <a:rPr lang="en-US" altLang="zh-TW" dirty="0"/>
+              <a:t>;</a:t>
+            </a:r>
+          </a:p>
+          <a:p>
+            <a:r>
+              <a:rPr lang="zh-TW" altLang="en-US" dirty="0"/>
+              <a:t>  </a:t>
+            </a:r>
+            <a:r>
+              <a:rPr lang="en-US" altLang="zh-TW" dirty="0" err="1"/>
+              <a:t>longint</a:t>
+            </a:r>
+            <a:r>
+              <a:rPr lang="en-US" altLang="zh-TW" dirty="0"/>
+              <a:t>        </a:t>
+            </a:r>
+            <a:r>
+              <a:rPr lang="zh-TW" altLang="en-US" dirty="0"/>
+              <a:t> </a:t>
+            </a:r>
+            <a:r>
+              <a:rPr lang="en-US" altLang="zh-TW" dirty="0" err="1"/>
+              <a:t>m_var_longint</a:t>
+            </a:r>
+            <a:r>
+              <a:rPr lang="en-US" altLang="zh-TW" dirty="0"/>
+              <a:t>;</a:t>
+            </a:r>
+          </a:p>
+          <a:p>
+            <a:endParaRPr lang="en-US" altLang="zh-TW" dirty="0"/>
+          </a:p>
+          <a:p>
+            <a:r>
+              <a:rPr lang="zh-TW" altLang="en-US" dirty="0"/>
+              <a:t>  </a:t>
+            </a:r>
+            <a:r>
+              <a:rPr lang="en-US" altLang="zh-TW" dirty="0"/>
+              <a:t>byte unsigned  	   </a:t>
+            </a:r>
+            <a:r>
+              <a:rPr lang="en-US" altLang="zh-TW" dirty="0" err="1"/>
+              <a:t>u_byte</a:t>
+            </a:r>
+            <a:r>
+              <a:rPr lang="en-US" altLang="zh-TW" dirty="0"/>
+              <a:t>;   // Byte is set to unsigned</a:t>
+            </a:r>
+          </a:p>
+          <a:p>
+            <a:r>
+              <a:rPr lang="zh-TW" altLang="en-US" dirty="0"/>
+              <a:t>  </a:t>
+            </a:r>
+            <a:r>
+              <a:rPr lang="en-US" altLang="zh-TW" dirty="0" err="1"/>
+              <a:t>shortint</a:t>
+            </a:r>
+            <a:r>
+              <a:rPr lang="en-US" altLang="zh-TW" dirty="0"/>
+              <a:t> unsigned   </a:t>
+            </a:r>
+            <a:r>
+              <a:rPr lang="en-US" altLang="zh-TW" dirty="0" err="1"/>
+              <a:t>u_var_shortint</a:t>
+            </a:r>
+            <a:r>
+              <a:rPr lang="en-US" altLang="zh-TW" dirty="0"/>
+              <a:t>;</a:t>
+            </a:r>
+            <a:endParaRPr lang="zh-TW" altLang="en-US" dirty="0"/>
+          </a:p>
+          <a:p>
+            <a:r>
+              <a:rPr lang="zh-TW" altLang="en-US" dirty="0"/>
+              <a:t>  </a:t>
+            </a:r>
+            <a:endParaRPr lang="en-US" altLang="zh-TW" dirty="0"/>
+          </a:p>
+          <a:p>
+            <a:r>
+              <a:rPr lang="zh-TW" altLang="en-US" dirty="0"/>
+              <a:t>  </a:t>
+            </a:r>
+            <a:r>
+              <a:rPr lang="en-US" altLang="zh-TW" dirty="0"/>
+              <a:t>initial begin</a:t>
+            </a:r>
+          </a:p>
+          <a:p>
+            <a:r>
+              <a:rPr lang="en-US" altLang="zh-TW" dirty="0"/>
+              <a:t>     </a:t>
+            </a:r>
+            <a:r>
+              <a:rPr lang="en-US" altLang="zh-TW" dirty="0" err="1"/>
+              <a:t>var_b</a:t>
+            </a:r>
+            <a:r>
+              <a:rPr lang="en-US" altLang="zh-TW" dirty="0"/>
+              <a:t> = 4'h3;  // </a:t>
+            </a:r>
+            <a:r>
+              <a:rPr lang="zh-TW" altLang="en-US" dirty="0"/>
+              <a:t>二進位 </a:t>
+            </a:r>
+            <a:r>
+              <a:rPr lang="en-US" altLang="zh-TW" dirty="0"/>
+              <a:t>0011</a:t>
+            </a:r>
+          </a:p>
+          <a:p>
+            <a:r>
+              <a:rPr lang="en-US" altLang="zh-TW" dirty="0"/>
+              <a:t>    $display("</a:t>
+            </a:r>
+            <a:r>
+              <a:rPr lang="en-US" altLang="zh-TW" dirty="0" err="1"/>
+              <a:t>var_b</a:t>
+            </a:r>
+            <a:r>
+              <a:rPr lang="en-US" altLang="zh-TW" dirty="0"/>
+              <a:t>=0x%0h ", </a:t>
+            </a:r>
+            <a:r>
+              <a:rPr lang="en-US" altLang="zh-TW" dirty="0" err="1"/>
+              <a:t>var_b</a:t>
+            </a:r>
+            <a:r>
+              <a:rPr lang="en-US" altLang="zh-TW" dirty="0"/>
+              <a:t>);</a:t>
+            </a:r>
+          </a:p>
+          <a:p>
+            <a:r>
+              <a:rPr lang="en-US" altLang="zh-TW" dirty="0"/>
+              <a:t>  end</a:t>
+            </a:r>
+          </a:p>
+          <a:p>
+            <a:r>
+              <a:rPr lang="en-US" altLang="zh-TW" dirty="0" err="1"/>
+              <a:t>endmodule</a:t>
+            </a:r>
+            <a:endParaRPr lang="zh-TW" altLang="en-US" dirty="0"/>
+          </a:p>
+        </p:txBody>
+      </p:sp>
+    </p:spTree>
+    <p:extLst>
+      <p:ext uri="{BB962C8B-B14F-4D97-AF65-F5344CB8AC3E}">
+        <p14:creationId xmlns:p14="http://schemas.microsoft.com/office/powerpoint/2010/main" val="4095512907"/>
+      </p:ext>
+    </p:extLst>
+  </p:cSld>
+  <p:clrMapOvr>
+    <a:masterClrMapping/>
+  </p:clrMapOvr>
+</p:sld>
+</file>
+
+<file path=ppt/slides/slide11.xml><?xml version="1.0" encoding="utf-8"?>
+<p:sld xmlns:a="http://schemas.openxmlformats.org/drawingml/2006/main" xmlns:r="http://schemas.openxmlformats.org/officeDocument/2006/relationships" xmlns:p="http://schemas.openxmlformats.org/presentationml/2006/main">
+  <p:cSld>
+    <p:spTree>
+      <p:nvGrpSpPr>
+        <p:cNvPr id="1" name="">
+          <a:extLst>
+            <a:ext uri="{FF2B5EF4-FFF2-40B4-BE49-F238E27FC236}">
+              <a16:creationId xmlns:a16="http://schemas.microsoft.com/office/drawing/2014/main" id="{19B23F09-3CD0-3E5A-C53E-1B439B5D3A5E}"/>
+            </a:ext>
+          </a:extLst>
+        </p:cNvPr>
+        <p:cNvGrpSpPr/>
+        <p:nvPr/>
+      </p:nvGrpSpPr>
+      <p:grpSpPr>
+        <a:xfrm>
+          <a:off x="0" y="0"/>
+          <a:ext cx="0" cy="0"/>
+          <a:chOff x="0" y="0"/>
+          <a:chExt cx="0" cy="0"/>
+        </a:xfrm>
+      </p:grpSpPr>
+      <p:sp>
+        <p:nvSpPr>
+          <p:cNvPr id="2" name="標題 1">
+            <a:extLst>
+              <a:ext uri="{FF2B5EF4-FFF2-40B4-BE49-F238E27FC236}">
+                <a16:creationId xmlns:a16="http://schemas.microsoft.com/office/drawing/2014/main" id="{EC196DC7-D9F9-19FD-7D45-9AED1395CC4C}"/>
+              </a:ext>
+            </a:extLst>
+          </p:cNvPr>
+          <p:cNvSpPr>
+            <a:spLocks noGrp="1"/>
+          </p:cNvSpPr>
+          <p:nvPr>
+            <p:ph type="title"/>
+          </p:nvPr>
+        </p:nvSpPr>
+        <p:spPr/>
+        <p:txBody>
+          <a:bodyPr/>
+          <a:lstStyle/>
+          <a:p>
+            <a:r>
+              <a:rPr lang="en-US" altLang="zh-TW" dirty="0"/>
+              <a:t>String (1/3)</a:t>
+            </a:r>
+            <a:endParaRPr lang="zh-TW" altLang="en-US" dirty="0"/>
+          </a:p>
+        </p:txBody>
+      </p:sp>
+      <p:sp>
+        <p:nvSpPr>
+          <p:cNvPr id="5" name="內容版面配置區 4">
+            <a:extLst>
+              <a:ext uri="{FF2B5EF4-FFF2-40B4-BE49-F238E27FC236}">
+                <a16:creationId xmlns:a16="http://schemas.microsoft.com/office/drawing/2014/main" id="{27AEEC20-6807-A778-2C3A-B209D26C2BA3}"/>
+              </a:ext>
+            </a:extLst>
+          </p:cNvPr>
+          <p:cNvSpPr>
+            <a:spLocks noGrp="1"/>
+          </p:cNvSpPr>
+          <p:nvPr>
+            <p:ph idx="1"/>
+          </p:nvPr>
+        </p:nvSpPr>
+        <p:spPr/>
+        <p:txBody>
+          <a:bodyPr/>
+          <a:lstStyle/>
+          <a:p>
+            <a:r>
+              <a:rPr lang="zh-TW" altLang="en-US" dirty="0">
+                <a:latin typeface="標楷體" panose="03000509000000000000" pitchFamily="65" charset="-120"/>
+                <a:ea typeface="標楷體" panose="03000509000000000000" pitchFamily="65" charset="-120"/>
+              </a:rPr>
+              <a:t>宣告方式 示範</a:t>
+            </a:r>
+          </a:p>
+          <a:p>
+            <a:endParaRPr lang="zh-TW" altLang="en-US" dirty="0">
+              <a:latin typeface="標楷體" panose="03000509000000000000" pitchFamily="65" charset="-120"/>
+              <a:ea typeface="標楷體" panose="03000509000000000000" pitchFamily="65" charset="-120"/>
+            </a:endParaRPr>
+          </a:p>
+        </p:txBody>
+      </p:sp>
+      <p:sp>
+        <p:nvSpPr>
+          <p:cNvPr id="4" name="文字方塊 3">
+            <a:extLst>
+              <a:ext uri="{FF2B5EF4-FFF2-40B4-BE49-F238E27FC236}">
+                <a16:creationId xmlns:a16="http://schemas.microsoft.com/office/drawing/2014/main" id="{AD3A5944-8FFC-3544-6562-FE0F7E2166B0}"/>
+              </a:ext>
+            </a:extLst>
+          </p:cNvPr>
+          <p:cNvSpPr txBox="1"/>
+          <p:nvPr/>
+        </p:nvSpPr>
+        <p:spPr>
+          <a:xfrm>
+            <a:off x="838200" y="2405484"/>
+            <a:ext cx="8088702" cy="4247317"/>
+          </a:xfrm>
+          <a:prstGeom prst="rect">
+            <a:avLst/>
+          </a:prstGeom>
+          <a:noFill/>
+          <a:ln>
+            <a:solidFill>
+              <a:schemeClr val="tx1"/>
+            </a:solidFill>
+          </a:ln>
+        </p:spPr>
+        <p:txBody>
+          <a:bodyPr wrap="square" rtlCol="0">
+            <a:spAutoFit/>
+          </a:bodyPr>
+          <a:lstStyle/>
+          <a:p>
+            <a:r>
+              <a:rPr lang="en-US" altLang="zh-TW" dirty="0"/>
+              <a:t>module tb;</a:t>
+            </a:r>
+          </a:p>
+          <a:p>
+            <a:r>
+              <a:rPr lang="en-US" altLang="zh-TW" dirty="0"/>
+              <a:t>  // Declare a string variable called "dialog" to store string literals</a:t>
+            </a:r>
+          </a:p>
+          <a:p>
+            <a:r>
+              <a:rPr lang="en-US" altLang="zh-TW" dirty="0"/>
+              <a:t>  // Initialize the variable to "Hello!"</a:t>
+            </a:r>
+          </a:p>
+          <a:p>
+            <a:r>
+              <a:rPr lang="en-US" altLang="zh-TW" dirty="0"/>
+              <a:t>  string   dialog = "Hello!";</a:t>
+            </a:r>
+          </a:p>
+          <a:p>
+            <a:endParaRPr lang="en-US" altLang="zh-TW" dirty="0"/>
+          </a:p>
+          <a:p>
+            <a:r>
+              <a:rPr lang="en-US" altLang="zh-TW" dirty="0"/>
+              <a:t>  initial begin</a:t>
+            </a:r>
+          </a:p>
+          <a:p>
+            <a:r>
+              <a:rPr lang="en-US" altLang="zh-TW" dirty="0"/>
+              <a:t>    // Display the string using %s string format</a:t>
+            </a:r>
+          </a:p>
+          <a:p>
+            <a:r>
+              <a:rPr lang="en-US" altLang="zh-TW" dirty="0"/>
+              <a:t>    $display ("%s", dialog);</a:t>
+            </a:r>
+          </a:p>
+          <a:p>
+            <a:endParaRPr lang="en-US" altLang="zh-TW" dirty="0"/>
+          </a:p>
+          <a:p>
+            <a:r>
+              <a:rPr lang="en-US" altLang="zh-TW" dirty="0"/>
+              <a:t>    // Iterate through the string variable to identify individual characters and print</a:t>
+            </a:r>
+          </a:p>
+          <a:p>
+            <a:r>
+              <a:rPr lang="en-US" altLang="zh-TW" dirty="0"/>
+              <a:t>    foreach (dialog[</a:t>
+            </a:r>
+            <a:r>
+              <a:rPr lang="en-US" altLang="zh-TW" dirty="0" err="1"/>
+              <a:t>i</a:t>
+            </a:r>
+            <a:r>
+              <a:rPr lang="en-US" altLang="zh-TW" dirty="0"/>
+              <a:t>]) begin</a:t>
+            </a:r>
+          </a:p>
+          <a:p>
+            <a:r>
+              <a:rPr lang="en-US" altLang="zh-TW" dirty="0"/>
+              <a:t>      $display ("%s", dialog[</a:t>
+            </a:r>
+            <a:r>
+              <a:rPr lang="en-US" altLang="zh-TW" dirty="0" err="1"/>
+              <a:t>i</a:t>
+            </a:r>
+            <a:r>
+              <a:rPr lang="en-US" altLang="zh-TW" dirty="0"/>
+              <a:t>]);</a:t>
+            </a:r>
+          </a:p>
+          <a:p>
+            <a:r>
+              <a:rPr lang="en-US" altLang="zh-TW" dirty="0"/>
+              <a:t>    end</a:t>
+            </a:r>
+          </a:p>
+          <a:p>
+            <a:r>
+              <a:rPr lang="en-US" altLang="zh-TW" dirty="0"/>
+              <a:t>  end</a:t>
+            </a:r>
+          </a:p>
+          <a:p>
+            <a:r>
+              <a:rPr lang="en-US" altLang="zh-TW" dirty="0" err="1"/>
+              <a:t>endmodule</a:t>
+            </a:r>
+            <a:endParaRPr lang="zh-TW" altLang="en-US" dirty="0"/>
+          </a:p>
+        </p:txBody>
+      </p:sp>
+      <p:sp>
+        <p:nvSpPr>
+          <p:cNvPr id="6" name="文字方塊 5">
+            <a:extLst>
+              <a:ext uri="{FF2B5EF4-FFF2-40B4-BE49-F238E27FC236}">
+                <a16:creationId xmlns:a16="http://schemas.microsoft.com/office/drawing/2014/main" id="{8623C9E7-1BA2-85EA-2E8C-FF4926BEE290}"/>
+              </a:ext>
+            </a:extLst>
+          </p:cNvPr>
+          <p:cNvSpPr txBox="1"/>
+          <p:nvPr/>
+        </p:nvSpPr>
+        <p:spPr>
+          <a:xfrm>
+            <a:off x="9167004" y="2405484"/>
+            <a:ext cx="2553419" cy="4247317"/>
+          </a:xfrm>
+          <a:prstGeom prst="rect">
+            <a:avLst/>
+          </a:prstGeom>
+          <a:noFill/>
+          <a:ln>
+            <a:solidFill>
+              <a:schemeClr val="tx1"/>
+            </a:solidFill>
+          </a:ln>
+        </p:spPr>
+        <p:txBody>
+          <a:bodyPr wrap="square" rtlCol="0">
+            <a:spAutoFit/>
+          </a:bodyPr>
+          <a:lstStyle/>
+          <a:p>
+            <a:r>
+              <a:rPr lang="zh-TW" altLang="en-US" dirty="0"/>
+              <a:t>模擬結果</a:t>
+            </a:r>
+            <a:r>
+              <a:rPr lang="en-US" altLang="zh-TW" dirty="0"/>
+              <a:t>:</a:t>
+            </a:r>
+          </a:p>
+          <a:p>
+            <a:r>
+              <a:rPr lang="en-US" altLang="zh-TW" dirty="0"/>
+              <a:t>Hello!</a:t>
+            </a:r>
+          </a:p>
+          <a:p>
+            <a:r>
+              <a:rPr lang="en-US" altLang="zh-TW" dirty="0"/>
+              <a:t>H</a:t>
+            </a:r>
+          </a:p>
+          <a:p>
+            <a:r>
+              <a:rPr lang="en-US" altLang="zh-TW" dirty="0"/>
+              <a:t>e</a:t>
+            </a:r>
+          </a:p>
+          <a:p>
+            <a:r>
+              <a:rPr lang="en-US" altLang="zh-TW" dirty="0"/>
+              <a:t>l</a:t>
+            </a:r>
+          </a:p>
+          <a:p>
+            <a:r>
+              <a:rPr lang="en-US" altLang="zh-TW" dirty="0"/>
+              <a:t>l</a:t>
+            </a:r>
+          </a:p>
+          <a:p>
+            <a:r>
+              <a:rPr lang="en-US" altLang="zh-TW" dirty="0"/>
+              <a:t>o</a:t>
+            </a:r>
+          </a:p>
+          <a:p>
+            <a:r>
+              <a:rPr lang="en-US" altLang="zh-TW" dirty="0"/>
+              <a:t>!</a:t>
+            </a:r>
+          </a:p>
+          <a:p>
+            <a:endParaRPr lang="en-US" altLang="zh-TW" dirty="0"/>
+          </a:p>
+          <a:p>
+            <a:endParaRPr lang="en-US" altLang="zh-TW" dirty="0"/>
+          </a:p>
+          <a:p>
+            <a:endParaRPr lang="en-US" altLang="zh-TW" dirty="0"/>
+          </a:p>
+          <a:p>
+            <a:endParaRPr lang="en-US" altLang="zh-TW" dirty="0"/>
+          </a:p>
+          <a:p>
+            <a:endParaRPr lang="en-US" altLang="zh-TW" dirty="0"/>
+          </a:p>
+          <a:p>
+            <a:endParaRPr lang="en-US" altLang="zh-TW" dirty="0"/>
+          </a:p>
+          <a:p>
+            <a:endParaRPr lang="zh-TW" altLang="en-US" dirty="0"/>
+          </a:p>
+        </p:txBody>
+      </p:sp>
+    </p:spTree>
+    <p:extLst>
+      <p:ext uri="{BB962C8B-B14F-4D97-AF65-F5344CB8AC3E}">
+        <p14:creationId xmlns:p14="http://schemas.microsoft.com/office/powerpoint/2010/main" val="2194726276"/>
+      </p:ext>
+    </p:extLst>
+  </p:cSld>
+  <p:clrMapOvr>
+    <a:masterClrMapping/>
+  </p:clrMapOvr>
+</p:sld>
+</file>
+
+<file path=ppt/slides/slide12.xml><?xml version="1.0" encoding="utf-8"?>
+<p:sld xmlns:a="http://schemas.openxmlformats.org/drawingml/2006/main" xmlns:r="http://schemas.openxmlformats.org/officeDocument/2006/relationships" xmlns:p="http://schemas.openxmlformats.org/presentationml/2006/main">
+  <p:cSld>
+    <p:spTree>
+      <p:nvGrpSpPr>
+        <p:cNvPr id="1" name="">
+          <a:extLst>
+            <a:ext uri="{FF2B5EF4-FFF2-40B4-BE49-F238E27FC236}">
+              <a16:creationId xmlns:a16="http://schemas.microsoft.com/office/drawing/2014/main" id="{39A128C0-7773-014F-7C6D-62DAD2104B7A}"/>
+            </a:ext>
+          </a:extLst>
+        </p:cNvPr>
+        <p:cNvGrpSpPr/>
+        <p:nvPr/>
+      </p:nvGrpSpPr>
+      <p:grpSpPr>
+        <a:xfrm>
+          <a:off x="0" y="0"/>
+          <a:ext cx="0" cy="0"/>
+          <a:chOff x="0" y="0"/>
+          <a:chExt cx="0" cy="0"/>
+        </a:xfrm>
+      </p:grpSpPr>
+      <p:sp>
+        <p:nvSpPr>
+          <p:cNvPr id="2" name="標題 1">
+            <a:extLst>
+              <a:ext uri="{FF2B5EF4-FFF2-40B4-BE49-F238E27FC236}">
+                <a16:creationId xmlns:a16="http://schemas.microsoft.com/office/drawing/2014/main" id="{2460D45F-CC7C-734E-DA4A-9B1F2C3586D5}"/>
+              </a:ext>
+            </a:extLst>
+          </p:cNvPr>
+          <p:cNvSpPr>
+            <a:spLocks noGrp="1"/>
+          </p:cNvSpPr>
+          <p:nvPr>
+            <p:ph type="title"/>
+          </p:nvPr>
+        </p:nvSpPr>
+        <p:spPr/>
+        <p:txBody>
+          <a:bodyPr/>
+          <a:lstStyle/>
+          <a:p>
+            <a:r>
+              <a:rPr lang="en-US" altLang="zh-TW" dirty="0"/>
+              <a:t>String</a:t>
+            </a:r>
+            <a:r>
+              <a:rPr lang="zh-TW" altLang="en-US" dirty="0"/>
+              <a:t> </a:t>
+            </a:r>
+            <a:r>
+              <a:rPr lang="en-US" altLang="zh-TW" dirty="0"/>
+              <a:t>Operators (2/3)</a:t>
+            </a:r>
+            <a:endParaRPr lang="zh-TW" altLang="en-US" dirty="0"/>
+          </a:p>
+        </p:txBody>
+      </p:sp>
+      <p:pic>
+        <p:nvPicPr>
+          <p:cNvPr id="9" name="內容版面配置區 8">
+            <a:extLst>
+              <a:ext uri="{FF2B5EF4-FFF2-40B4-BE49-F238E27FC236}">
+                <a16:creationId xmlns:a16="http://schemas.microsoft.com/office/drawing/2014/main" id="{DA74415A-C5C6-2CED-3D78-7064B6BA792F}"/>
+              </a:ext>
+            </a:extLst>
+          </p:cNvPr>
+          <p:cNvPicPr>
+            <a:picLocks noGrp="1" noChangeAspect="1"/>
+          </p:cNvPicPr>
+          <p:nvPr>
+            <p:ph sz="half" idx="1"/>
+          </p:nvPr>
+        </p:nvPicPr>
+        <p:blipFill>
+          <a:blip r:embed="rId2"/>
+          <a:stretch>
+            <a:fillRect/>
+          </a:stretch>
+        </p:blipFill>
+        <p:spPr>
+          <a:xfrm>
+            <a:off x="2944130" y="1386670"/>
+            <a:ext cx="6303741" cy="5361383"/>
+          </a:xfrm>
+        </p:spPr>
+      </p:pic>
+    </p:spTree>
+    <p:extLst>
+      <p:ext uri="{BB962C8B-B14F-4D97-AF65-F5344CB8AC3E}">
+        <p14:creationId xmlns:p14="http://schemas.microsoft.com/office/powerpoint/2010/main" val="359176200"/>
+      </p:ext>
+    </p:extLst>
+  </p:cSld>
+  <p:clrMapOvr>
+    <a:masterClrMapping/>
+  </p:clrMapOvr>
+</p:sld>
+</file>
+
+<file path=ppt/slides/slide13.xml><?xml version="1.0" encoding="utf-8"?>
+<p:sld xmlns:a="http://schemas.openxmlformats.org/drawingml/2006/main" xmlns:r="http://schemas.openxmlformats.org/officeDocument/2006/relationships" xmlns:p="http://schemas.openxmlformats.org/presentationml/2006/main">
+  <p:cSld>
+    <p:spTree>
+      <p:nvGrpSpPr>
+        <p:cNvPr id="1" name=""/>
+        <p:cNvGrpSpPr/>
+        <p:nvPr/>
+      </p:nvGrpSpPr>
+      <p:grpSpPr>
+        <a:xfrm>
+          <a:off x="0" y="0"/>
+          <a:ext cx="0" cy="0"/>
+          <a:chOff x="0" y="0"/>
+          <a:chExt cx="0" cy="0"/>
+        </a:xfrm>
+      </p:grpSpPr>
+      <p:sp>
+        <p:nvSpPr>
+          <p:cNvPr id="2" name="標題 1">
+            <a:extLst>
+              <a:ext uri="{FF2B5EF4-FFF2-40B4-BE49-F238E27FC236}">
+                <a16:creationId xmlns:a16="http://schemas.microsoft.com/office/drawing/2014/main" id="{FFB53A1B-4903-8C82-2A70-6D8158D2792A}"/>
+              </a:ext>
+            </a:extLst>
+          </p:cNvPr>
+          <p:cNvSpPr>
+            <a:spLocks noGrp="1"/>
+          </p:cNvSpPr>
+          <p:nvPr>
+            <p:ph type="title"/>
+          </p:nvPr>
+        </p:nvSpPr>
+        <p:spPr/>
+        <p:txBody>
+          <a:bodyPr/>
+          <a:lstStyle/>
+          <a:p>
+            <a:r>
+              <a:rPr lang="en-US" altLang="zh-TW" dirty="0"/>
+              <a:t>String</a:t>
+            </a:r>
+            <a:r>
+              <a:rPr lang="zh-TW" altLang="en-US" dirty="0"/>
+              <a:t> </a:t>
+            </a:r>
+            <a:r>
+              <a:rPr lang="en-US" altLang="zh-TW" dirty="0"/>
+              <a:t>Methods (3/3)</a:t>
+            </a:r>
+            <a:endParaRPr lang="zh-TW" altLang="en-US" dirty="0"/>
+          </a:p>
+        </p:txBody>
+      </p:sp>
+      <p:pic>
+        <p:nvPicPr>
+          <p:cNvPr id="12" name="內容版面配置區 11">
+            <a:extLst>
+              <a:ext uri="{FF2B5EF4-FFF2-40B4-BE49-F238E27FC236}">
+                <a16:creationId xmlns:a16="http://schemas.microsoft.com/office/drawing/2014/main" id="{29B3190F-363A-C74B-0A10-528EC568D871}"/>
+              </a:ext>
+            </a:extLst>
+          </p:cNvPr>
+          <p:cNvPicPr>
+            <a:picLocks noGrp="1" noChangeAspect="1"/>
+          </p:cNvPicPr>
+          <p:nvPr>
+            <p:ph sz="half" idx="1"/>
+          </p:nvPr>
+        </p:nvPicPr>
+        <p:blipFill>
+          <a:blip r:embed="rId2"/>
+          <a:stretch>
+            <a:fillRect/>
+          </a:stretch>
+        </p:blipFill>
+        <p:spPr>
+          <a:xfrm>
+            <a:off x="199847" y="1498155"/>
+            <a:ext cx="6994434" cy="3861690"/>
+          </a:xfrm>
+          <a:ln>
+            <a:solidFill>
+              <a:schemeClr val="tx1"/>
+            </a:solidFill>
+          </a:ln>
+        </p:spPr>
+      </p:pic>
+      <p:pic>
+        <p:nvPicPr>
+          <p:cNvPr id="8" name="內容版面配置區 7">
+            <a:extLst>
+              <a:ext uri="{FF2B5EF4-FFF2-40B4-BE49-F238E27FC236}">
+                <a16:creationId xmlns:a16="http://schemas.microsoft.com/office/drawing/2014/main" id="{6D627C6C-8ED2-B649-C27C-D233CA673A0D}"/>
+              </a:ext>
+            </a:extLst>
+          </p:cNvPr>
+          <p:cNvPicPr>
+            <a:picLocks noGrp="1" noChangeAspect="1"/>
+          </p:cNvPicPr>
+          <p:nvPr>
+            <p:ph sz="half" idx="2"/>
+          </p:nvPr>
+        </p:nvPicPr>
+        <p:blipFill>
+          <a:blip r:embed="rId3"/>
+          <a:stretch>
+            <a:fillRect/>
+          </a:stretch>
+        </p:blipFill>
+        <p:spPr>
+          <a:xfrm>
+            <a:off x="6872378" y="2688536"/>
+            <a:ext cx="5181600" cy="3957956"/>
+          </a:xfrm>
+          <a:ln>
+            <a:solidFill>
+              <a:schemeClr val="tx1"/>
+            </a:solidFill>
+          </a:ln>
+        </p:spPr>
+      </p:pic>
+    </p:spTree>
+    <p:extLst>
+      <p:ext uri="{BB962C8B-B14F-4D97-AF65-F5344CB8AC3E}">
+        <p14:creationId xmlns:p14="http://schemas.microsoft.com/office/powerpoint/2010/main" val="3552483447"/>
+      </p:ext>
+    </p:extLst>
+  </p:cSld>
+  <p:clrMapOvr>
+    <a:masterClrMapping/>
+  </p:clrMapOvr>
+</p:sld>
+</file>
+
+<file path=ppt/slides/slide14.xml><?xml version="1.0" encoding="utf-8"?>
+<p:sld xmlns:a="http://schemas.openxmlformats.org/drawingml/2006/main" xmlns:r="http://schemas.openxmlformats.org/officeDocument/2006/relationships" xmlns:p="http://schemas.openxmlformats.org/presentationml/2006/main">
+  <p:cSld>
+    <p:spTree>
+      <p:nvGrpSpPr>
+        <p:cNvPr id="1" name=""/>
+        <p:cNvGrpSpPr/>
+        <p:nvPr/>
+      </p:nvGrpSpPr>
+      <p:grpSpPr>
+        <a:xfrm>
+          <a:off x="0" y="0"/>
+          <a:ext cx="0" cy="0"/>
+          <a:chOff x="0" y="0"/>
+          <a:chExt cx="0" cy="0"/>
+        </a:xfrm>
+      </p:grpSpPr>
+      <p:sp>
+        <p:nvSpPr>
+          <p:cNvPr id="2" name="標題 1">
+            <a:extLst>
+              <a:ext uri="{FF2B5EF4-FFF2-40B4-BE49-F238E27FC236}">
+                <a16:creationId xmlns:a16="http://schemas.microsoft.com/office/drawing/2014/main" id="{DBE6EE4D-680C-80BA-FC65-D72255E2AB24}"/>
+              </a:ext>
+            </a:extLst>
+          </p:cNvPr>
+          <p:cNvSpPr>
+            <a:spLocks noGrp="1"/>
+          </p:cNvSpPr>
+          <p:nvPr>
+            <p:ph type="title"/>
+          </p:nvPr>
+        </p:nvSpPr>
+        <p:spPr/>
+        <p:txBody>
+          <a:bodyPr/>
+          <a:lstStyle/>
+          <a:p>
+            <a:r>
+              <a:rPr lang="en-US" altLang="zh-TW" dirty="0"/>
+              <a:t>Enumeration (1/1)</a:t>
+            </a:r>
+            <a:endParaRPr lang="zh-TW" altLang="en-US" dirty="0"/>
+          </a:p>
+        </p:txBody>
+      </p:sp>
+      <p:sp>
+        <p:nvSpPr>
+          <p:cNvPr id="3" name="內容版面配置區 2">
+            <a:extLst>
+              <a:ext uri="{FF2B5EF4-FFF2-40B4-BE49-F238E27FC236}">
+                <a16:creationId xmlns:a16="http://schemas.microsoft.com/office/drawing/2014/main" id="{89C1FD75-DE32-B403-DDA4-09582B5E6730}"/>
+              </a:ext>
+            </a:extLst>
+          </p:cNvPr>
+          <p:cNvSpPr>
+            <a:spLocks noGrp="1"/>
+          </p:cNvSpPr>
+          <p:nvPr>
+            <p:ph idx="1"/>
+          </p:nvPr>
+        </p:nvSpPr>
+        <p:spPr/>
+        <p:txBody>
+          <a:bodyPr>
+            <a:normAutofit/>
+          </a:bodyPr>
+          <a:lstStyle/>
+          <a:p>
+            <a:r>
+              <a:rPr lang="en-US" altLang="zh-TW" dirty="0"/>
+              <a:t>Enum </a:t>
+            </a:r>
+            <a:r>
+              <a:rPr lang="zh-TW" altLang="en-US" dirty="0"/>
+              <a:t>範例</a:t>
+            </a:r>
+            <a:endParaRPr lang="en-US" altLang="zh-TW" dirty="0"/>
+          </a:p>
+        </p:txBody>
+      </p:sp>
+      <p:sp>
+        <p:nvSpPr>
+          <p:cNvPr id="4" name="文字方塊 3">
+            <a:extLst>
+              <a:ext uri="{FF2B5EF4-FFF2-40B4-BE49-F238E27FC236}">
+                <a16:creationId xmlns:a16="http://schemas.microsoft.com/office/drawing/2014/main" id="{B8E1A106-E83D-90FC-3E31-24BA6B943CBE}"/>
+              </a:ext>
+            </a:extLst>
+          </p:cNvPr>
+          <p:cNvSpPr txBox="1"/>
+          <p:nvPr/>
+        </p:nvSpPr>
+        <p:spPr>
+          <a:xfrm>
+            <a:off x="9473240" y="6169709"/>
+            <a:ext cx="1500997" cy="646331"/>
+          </a:xfrm>
+          <a:prstGeom prst="rect">
+            <a:avLst/>
+          </a:prstGeom>
+          <a:noFill/>
+        </p:spPr>
+        <p:txBody>
+          <a:bodyPr wrap="square" rtlCol="0">
+            <a:spAutoFit/>
+          </a:bodyPr>
+          <a:lstStyle/>
+          <a:p>
+            <a:r>
+              <a:rPr lang="en-US" altLang="zh-TW" sz="1800" dirty="0">
+                <a:hlinkClick r:id="rId2"/>
+              </a:rPr>
+              <a:t>Enum </a:t>
+            </a:r>
+            <a:r>
+              <a:rPr lang="zh-TW" altLang="en-US" sz="1800" dirty="0">
+                <a:hlinkClick r:id="rId2"/>
+              </a:rPr>
+              <a:t>參考</a:t>
+            </a:r>
+            <a:endParaRPr lang="zh-TW" altLang="en-US" sz="1800" dirty="0"/>
+          </a:p>
+          <a:p>
+            <a:endParaRPr lang="zh-TW" altLang="en-US" dirty="0"/>
+          </a:p>
+        </p:txBody>
+      </p:sp>
+      <p:sp>
+        <p:nvSpPr>
+          <p:cNvPr id="5" name="文字方塊 4">
+            <a:extLst>
+              <a:ext uri="{FF2B5EF4-FFF2-40B4-BE49-F238E27FC236}">
+                <a16:creationId xmlns:a16="http://schemas.microsoft.com/office/drawing/2014/main" id="{5503E45A-45DF-EE54-4754-ED22D622CFC3}"/>
+              </a:ext>
+            </a:extLst>
+          </p:cNvPr>
+          <p:cNvSpPr txBox="1"/>
+          <p:nvPr/>
+        </p:nvSpPr>
+        <p:spPr>
+          <a:xfrm>
+            <a:off x="1417607" y="2324970"/>
+            <a:ext cx="9356786" cy="4247317"/>
+          </a:xfrm>
+          <a:prstGeom prst="rect">
+            <a:avLst/>
+          </a:prstGeom>
+          <a:noFill/>
+          <a:ln>
+            <a:solidFill>
+              <a:schemeClr val="tx1"/>
+            </a:solidFill>
+          </a:ln>
+        </p:spPr>
+        <p:txBody>
+          <a:bodyPr wrap="square" rtlCol="0">
+            <a:spAutoFit/>
+          </a:bodyPr>
+          <a:lstStyle/>
+          <a:p>
+            <a:r>
+              <a:rPr lang="en-US" altLang="zh-TW" dirty="0"/>
+              <a:t>module tb;</a:t>
+            </a:r>
+          </a:p>
+          <a:p>
+            <a:r>
+              <a:rPr lang="en-US" altLang="zh-TW" dirty="0"/>
+              <a:t>	// "</a:t>
+            </a:r>
+            <a:r>
+              <a:rPr lang="en-US" altLang="zh-TW" dirty="0" err="1"/>
+              <a:t>e_true_false</a:t>
+            </a:r>
+            <a:r>
+              <a:rPr lang="en-US" altLang="zh-TW" dirty="0"/>
+              <a:t>" is a new data-type with two valid values: TRUE and FALSE</a:t>
+            </a:r>
+          </a:p>
+          <a:p>
+            <a:r>
+              <a:rPr lang="en-US" altLang="zh-TW" dirty="0"/>
+              <a:t>	typedef </a:t>
+            </a:r>
+            <a:r>
+              <a:rPr lang="en-US" altLang="zh-TW" dirty="0" err="1"/>
+              <a:t>enum</a:t>
+            </a:r>
+            <a:r>
+              <a:rPr lang="en-US" altLang="zh-TW" dirty="0"/>
+              <a:t> {TRUE, FALSE} </a:t>
+            </a:r>
+            <a:r>
+              <a:rPr lang="en-US" altLang="zh-TW" dirty="0" err="1"/>
+              <a:t>e_true_false</a:t>
+            </a:r>
+            <a:r>
+              <a:rPr lang="en-US" altLang="zh-TW" dirty="0"/>
+              <a:t>;</a:t>
+            </a:r>
+          </a:p>
+          <a:p>
+            <a:endParaRPr lang="en-US" altLang="zh-TW" dirty="0"/>
+          </a:p>
+          <a:p>
+            <a:r>
+              <a:rPr lang="en-US" altLang="zh-TW" dirty="0"/>
+              <a:t>	initial begin</a:t>
+            </a:r>
+          </a:p>
+          <a:p>
+            <a:r>
+              <a:rPr lang="en-US" altLang="zh-TW" dirty="0"/>
+              <a:t>		// Declare a variable of type "</a:t>
+            </a:r>
+            <a:r>
+              <a:rPr lang="en-US" altLang="zh-TW" dirty="0" err="1"/>
+              <a:t>e_true_false</a:t>
+            </a:r>
+            <a:r>
+              <a:rPr lang="en-US" altLang="zh-TW" dirty="0"/>
+              <a:t>" that can store TRUE or FALSE</a:t>
+            </a:r>
+          </a:p>
+          <a:p>
+            <a:r>
+              <a:rPr lang="en-US" altLang="zh-TW" dirty="0"/>
+              <a:t>		</a:t>
+            </a:r>
+            <a:r>
+              <a:rPr lang="en-US" altLang="zh-TW" dirty="0" err="1"/>
+              <a:t>e_true_false</a:t>
+            </a:r>
+            <a:r>
+              <a:rPr lang="en-US" altLang="zh-TW" dirty="0"/>
+              <a:t>  answer;</a:t>
+            </a:r>
+          </a:p>
+          <a:p>
+            <a:endParaRPr lang="en-US" altLang="zh-TW" dirty="0"/>
+          </a:p>
+          <a:p>
+            <a:r>
+              <a:rPr lang="en-US" altLang="zh-TW" dirty="0"/>
+              <a:t>		// Assign TRUE/FALSE to the enumerated variable</a:t>
+            </a:r>
+          </a:p>
+          <a:p>
+            <a:r>
+              <a:rPr lang="en-US" altLang="zh-TW" dirty="0"/>
+              <a:t>		answer = TRUE;</a:t>
+            </a:r>
+          </a:p>
+          <a:p>
+            <a:endParaRPr lang="en-US" altLang="zh-TW" dirty="0"/>
+          </a:p>
+          <a:p>
+            <a:r>
+              <a:rPr lang="en-US" altLang="zh-TW" dirty="0"/>
+              <a:t>		// Display string value of the variable</a:t>
+            </a:r>
+          </a:p>
+          <a:p>
+            <a:r>
+              <a:rPr lang="en-US" altLang="zh-TW" dirty="0"/>
+              <a:t>		$display ("answer = %s", answer.name);</a:t>
+            </a:r>
+          </a:p>
+          <a:p>
+            <a:r>
+              <a:rPr lang="en-US" altLang="zh-TW" dirty="0"/>
+              <a:t>	end</a:t>
+            </a:r>
+          </a:p>
+          <a:p>
+            <a:r>
+              <a:rPr lang="en-US" altLang="zh-TW" dirty="0" err="1"/>
+              <a:t>endmodule</a:t>
+            </a:r>
+            <a:endParaRPr lang="zh-TW" altLang="en-US" dirty="0"/>
+          </a:p>
+        </p:txBody>
+      </p:sp>
+    </p:spTree>
+    <p:extLst>
+      <p:ext uri="{BB962C8B-B14F-4D97-AF65-F5344CB8AC3E}">
+        <p14:creationId xmlns:p14="http://schemas.microsoft.com/office/powerpoint/2010/main" val="1156264965"/>
+      </p:ext>
+    </p:extLst>
+  </p:cSld>
+  <p:clrMapOvr>
+    <a:masterClrMapping/>
+  </p:clrMapOvr>
+</p:sld>
+</file>
+
+<file path=ppt/slides/slide15.xml><?xml version="1.0" encoding="utf-8"?>
+<p:sld xmlns:a="http://schemas.openxmlformats.org/drawingml/2006/main" xmlns:r="http://schemas.openxmlformats.org/officeDocument/2006/relationships" xmlns:p="http://schemas.openxmlformats.org/presentationml/2006/main">
+  <p:cSld>
+    <p:spTree>
+      <p:nvGrpSpPr>
+        <p:cNvPr id="1" name="">
+          <a:extLst>
+            <a:ext uri="{FF2B5EF4-FFF2-40B4-BE49-F238E27FC236}">
+              <a16:creationId xmlns:a16="http://schemas.microsoft.com/office/drawing/2014/main" id="{7F8098B8-7EA2-367E-AB63-E809F1799835}"/>
+            </a:ext>
+          </a:extLst>
+        </p:cNvPr>
+        <p:cNvGrpSpPr/>
+        <p:nvPr/>
+      </p:nvGrpSpPr>
+      <p:grpSpPr>
+        <a:xfrm>
+          <a:off x="0" y="0"/>
+          <a:ext cx="0" cy="0"/>
+          <a:chOff x="0" y="0"/>
+          <a:chExt cx="0" cy="0"/>
+        </a:xfrm>
+      </p:grpSpPr>
+      <p:sp>
+        <p:nvSpPr>
+          <p:cNvPr id="2" name="標題 1">
+            <a:extLst>
+              <a:ext uri="{FF2B5EF4-FFF2-40B4-BE49-F238E27FC236}">
+                <a16:creationId xmlns:a16="http://schemas.microsoft.com/office/drawing/2014/main" id="{7C0CA856-8763-9925-B402-5B26C293983F}"/>
+              </a:ext>
+            </a:extLst>
+          </p:cNvPr>
+          <p:cNvSpPr>
+            <a:spLocks noGrp="1"/>
+          </p:cNvSpPr>
+          <p:nvPr>
+            <p:ph type="title"/>
+          </p:nvPr>
+        </p:nvSpPr>
+        <p:spPr/>
+        <p:txBody>
+          <a:bodyPr/>
+          <a:lstStyle/>
+          <a:p>
+            <a:r>
+              <a:rPr lang="en-US" altLang="zh-TW" dirty="0"/>
+              <a:t>Array (1/)</a:t>
+            </a:r>
+            <a:endParaRPr lang="zh-TW" altLang="en-US" dirty="0"/>
+          </a:p>
+        </p:txBody>
+      </p:sp>
+      <p:sp>
+        <p:nvSpPr>
+          <p:cNvPr id="3" name="內容版面配置區 2">
+            <a:extLst>
+              <a:ext uri="{FF2B5EF4-FFF2-40B4-BE49-F238E27FC236}">
+                <a16:creationId xmlns:a16="http://schemas.microsoft.com/office/drawing/2014/main" id="{E6E524F9-F6A5-5935-E26B-D8E956CAAA96}"/>
+              </a:ext>
+            </a:extLst>
+          </p:cNvPr>
+          <p:cNvSpPr>
+            <a:spLocks noGrp="1"/>
+          </p:cNvSpPr>
+          <p:nvPr>
+            <p:ph idx="1"/>
+          </p:nvPr>
+        </p:nvSpPr>
+        <p:spPr/>
+        <p:txBody>
+          <a:bodyPr>
+            <a:normAutofit/>
+          </a:bodyPr>
+          <a:lstStyle/>
+          <a:p>
+            <a:r>
+              <a:rPr lang="zh-TW" altLang="en-US" dirty="0"/>
+              <a:t>分成</a:t>
+            </a:r>
+            <a:endParaRPr lang="en-US" altLang="zh-TW" dirty="0"/>
+          </a:p>
+          <a:p>
+            <a:pPr marL="914400" lvl="1" indent="-457200">
+              <a:buFont typeface="+mj-lt"/>
+              <a:buAutoNum type="arabicPeriod"/>
+            </a:pPr>
+            <a:r>
+              <a:rPr lang="en-US" altLang="zh-TW" dirty="0"/>
+              <a:t>Packed array</a:t>
+            </a:r>
+          </a:p>
+          <a:p>
+            <a:pPr marL="914400" lvl="1" indent="-457200">
+              <a:buFont typeface="+mj-lt"/>
+              <a:buAutoNum type="arabicPeriod"/>
+            </a:pPr>
+            <a:r>
+              <a:rPr lang="en-US" altLang="zh-TW" dirty="0"/>
+              <a:t>Unpacked array</a:t>
+            </a:r>
+          </a:p>
+        </p:txBody>
+      </p:sp>
+      <p:sp>
+        <p:nvSpPr>
+          <p:cNvPr id="6" name="文字方塊 5">
+            <a:extLst>
+              <a:ext uri="{FF2B5EF4-FFF2-40B4-BE49-F238E27FC236}">
+                <a16:creationId xmlns:a16="http://schemas.microsoft.com/office/drawing/2014/main" id="{CEE5D0F8-DF84-B2E2-A2DB-C3F6905FB709}"/>
+              </a:ext>
+            </a:extLst>
+          </p:cNvPr>
+          <p:cNvSpPr txBox="1"/>
+          <p:nvPr/>
+        </p:nvSpPr>
+        <p:spPr>
+          <a:xfrm>
+            <a:off x="1013604" y="3463733"/>
+            <a:ext cx="10164793" cy="2862322"/>
+          </a:xfrm>
+          <a:prstGeom prst="rect">
+            <a:avLst/>
+          </a:prstGeom>
+          <a:noFill/>
+          <a:ln>
+            <a:solidFill>
+              <a:schemeClr val="tx1"/>
+            </a:solidFill>
+          </a:ln>
+        </p:spPr>
+        <p:txBody>
+          <a:bodyPr wrap="square" rtlCol="0">
+            <a:spAutoFit/>
+          </a:bodyPr>
+          <a:lstStyle/>
+          <a:p>
+            <a:r>
+              <a:rPr lang="en-US" altLang="zh-TW" dirty="0"/>
+              <a:t>module tb;</a:t>
+            </a:r>
+          </a:p>
+          <a:p>
+            <a:r>
+              <a:rPr lang="en-US" altLang="zh-TW" dirty="0"/>
+              <a:t>	bit [7:0] 	                    </a:t>
+            </a:r>
+            <a:r>
+              <a:rPr lang="en-US" altLang="zh-TW" dirty="0" err="1"/>
+              <a:t>m_data</a:t>
+            </a:r>
+            <a:r>
+              <a:rPr lang="en-US" altLang="zh-TW" dirty="0"/>
+              <a:t>;                 	// A vector or 1D packed array</a:t>
+            </a:r>
+          </a:p>
+          <a:p>
+            <a:r>
+              <a:rPr lang="en-US" altLang="zh-TW" dirty="0"/>
+              <a:t>                    bit [3:0][7:0] 	m_data0;	// multidimensional packed array, 4 bytes</a:t>
+            </a:r>
+          </a:p>
+          <a:p>
+            <a:r>
+              <a:rPr lang="en-US" altLang="zh-TW" dirty="0"/>
+              <a:t>                    bit [2:0][3:0][7:0] 	m_data1; 	// multidimensional packed array, 12 bytes</a:t>
+            </a:r>
+          </a:p>
+          <a:p>
+            <a:endParaRPr lang="en-US" altLang="zh-TW" dirty="0"/>
+          </a:p>
+          <a:p>
+            <a:r>
+              <a:rPr lang="en-US" altLang="zh-TW" dirty="0"/>
+              <a:t>                    bit                                  </a:t>
+            </a:r>
+            <a:r>
+              <a:rPr lang="en-US" altLang="zh-TW" dirty="0" err="1"/>
+              <a:t>m_mem</a:t>
+            </a:r>
+            <a:r>
+              <a:rPr lang="en-US" altLang="zh-TW" dirty="0"/>
+              <a:t> [10]; 	// Unpacked</a:t>
+            </a:r>
+          </a:p>
+          <a:p>
+            <a:r>
+              <a:rPr lang="en-US" altLang="zh-TW" dirty="0"/>
+              <a:t>                    byte 	                    stack0 [2][4]; 	// Unpacked  2 rows, 4 cols</a:t>
+            </a:r>
+          </a:p>
+          <a:p>
+            <a:endParaRPr lang="en-US" altLang="zh-TW" dirty="0"/>
+          </a:p>
+          <a:p>
+            <a:r>
+              <a:rPr lang="en-US" altLang="zh-TW" dirty="0"/>
+              <a:t>                    bit [3:0][7:0] 	stack1 [2][4]; 	// packed + unpacked array.</a:t>
+            </a:r>
+          </a:p>
+          <a:p>
+            <a:r>
+              <a:rPr lang="en-US" altLang="zh-TW" dirty="0" err="1"/>
+              <a:t>endmodule</a:t>
+            </a:r>
+            <a:endParaRPr lang="zh-TW" altLang="en-US" dirty="0"/>
+          </a:p>
+        </p:txBody>
+      </p:sp>
+    </p:spTree>
+    <p:extLst>
+      <p:ext uri="{BB962C8B-B14F-4D97-AF65-F5344CB8AC3E}">
+        <p14:creationId xmlns:p14="http://schemas.microsoft.com/office/powerpoint/2010/main" val="1228019848"/>
+      </p:ext>
+    </p:extLst>
+  </p:cSld>
+  <p:clrMapOvr>
+    <a:masterClrMapping/>
+  </p:clrMapOvr>
+</p:sld>
+</file>
+
+<file path=ppt/slides/slide16.xml><?xml version="1.0" encoding="utf-8"?>
+<p:sld xmlns:a="http://schemas.openxmlformats.org/drawingml/2006/main" xmlns:r="http://schemas.openxmlformats.org/officeDocument/2006/relationships" xmlns:p="http://schemas.openxmlformats.org/presentationml/2006/main">
+  <p:cSld>
+    <p:spTree>
+      <p:nvGrpSpPr>
+        <p:cNvPr id="1" name="">
+          <a:extLst>
+            <a:ext uri="{FF2B5EF4-FFF2-40B4-BE49-F238E27FC236}">
+              <a16:creationId xmlns:a16="http://schemas.microsoft.com/office/drawing/2014/main" id="{5A57E9FA-005C-A9D5-3B42-7E7A8D5C8083}"/>
+            </a:ext>
+          </a:extLst>
+        </p:cNvPr>
+        <p:cNvGrpSpPr/>
+        <p:nvPr/>
+      </p:nvGrpSpPr>
+      <p:grpSpPr>
+        <a:xfrm>
+          <a:off x="0" y="0"/>
+          <a:ext cx="0" cy="0"/>
+          <a:chOff x="0" y="0"/>
+          <a:chExt cx="0" cy="0"/>
+        </a:xfrm>
+      </p:grpSpPr>
+      <p:sp>
+        <p:nvSpPr>
+          <p:cNvPr id="2" name="標題 1">
+            <a:extLst>
+              <a:ext uri="{FF2B5EF4-FFF2-40B4-BE49-F238E27FC236}">
+                <a16:creationId xmlns:a16="http://schemas.microsoft.com/office/drawing/2014/main" id="{DEDDF988-CC9F-5760-154D-A20E2DB7DBD1}"/>
+              </a:ext>
+            </a:extLst>
+          </p:cNvPr>
+          <p:cNvSpPr>
+            <a:spLocks noGrp="1"/>
+          </p:cNvSpPr>
+          <p:nvPr>
+            <p:ph type="title"/>
+          </p:nvPr>
+        </p:nvSpPr>
+        <p:spPr/>
+        <p:txBody>
+          <a:bodyPr/>
+          <a:lstStyle/>
+          <a:p>
+            <a:r>
+              <a:rPr lang="en-US" altLang="zh-TW" dirty="0"/>
+              <a:t>Array (2/)</a:t>
+            </a:r>
+            <a:endParaRPr lang="zh-TW" altLang="en-US" dirty="0"/>
+          </a:p>
+        </p:txBody>
+      </p:sp>
+      <p:grpSp>
+        <p:nvGrpSpPr>
+          <p:cNvPr id="5" name="群組 4">
+            <a:extLst>
+              <a:ext uri="{FF2B5EF4-FFF2-40B4-BE49-F238E27FC236}">
+                <a16:creationId xmlns:a16="http://schemas.microsoft.com/office/drawing/2014/main" id="{D856395B-2619-A09C-EBA9-AB15C5392650}"/>
+              </a:ext>
+            </a:extLst>
+          </p:cNvPr>
+          <p:cNvGrpSpPr/>
+          <p:nvPr/>
+        </p:nvGrpSpPr>
+        <p:grpSpPr>
+          <a:xfrm>
+            <a:off x="608522" y="1551209"/>
+            <a:ext cx="10974956" cy="5078313"/>
+            <a:chOff x="-565749" y="1538078"/>
+            <a:chExt cx="10974956" cy="5078313"/>
+          </a:xfrm>
+        </p:grpSpPr>
+        <p:sp>
+          <p:nvSpPr>
+            <p:cNvPr id="6" name="文字方塊 5">
+              <a:extLst>
+                <a:ext uri="{FF2B5EF4-FFF2-40B4-BE49-F238E27FC236}">
+                  <a16:creationId xmlns:a16="http://schemas.microsoft.com/office/drawing/2014/main" id="{A79327A7-CD3B-A5D8-8B9B-EC0EEAB0AC28}"/>
+                </a:ext>
+              </a:extLst>
+            </p:cNvPr>
+            <p:cNvSpPr txBox="1"/>
+            <p:nvPr/>
+          </p:nvSpPr>
+          <p:spPr>
+            <a:xfrm>
+              <a:off x="-565749" y="1538078"/>
+              <a:ext cx="7926957" cy="5078313"/>
+            </a:xfrm>
+            <a:prstGeom prst="rect">
+              <a:avLst/>
+            </a:prstGeom>
+            <a:noFill/>
+            <a:ln>
+              <a:solidFill>
+                <a:schemeClr val="tx1"/>
+              </a:solidFill>
+            </a:ln>
+          </p:spPr>
+          <p:txBody>
+            <a:bodyPr wrap="square" rtlCol="0">
+              <a:spAutoFit/>
+            </a:bodyPr>
+            <a:lstStyle/>
+            <a:p>
+              <a:r>
+                <a:rPr lang="en-US" altLang="zh-TW" dirty="0"/>
+                <a:t>module tb;</a:t>
+              </a:r>
+            </a:p>
+            <a:p>
+              <a:r>
+                <a:rPr lang="en-US" altLang="zh-TW" dirty="0"/>
+                <a:t>  </a:t>
+              </a:r>
+              <a:r>
+                <a:rPr lang="zh-TW" altLang="en-US" dirty="0"/>
+                <a:t>                  </a:t>
+              </a:r>
+              <a:r>
+                <a:rPr lang="en-US" altLang="zh-TW" dirty="0"/>
+                <a:t>bit [3:0][7:0] 	stack [2][4]; 		// 2 rows, 4 cols</a:t>
+              </a:r>
+            </a:p>
+            <a:p>
+              <a:endParaRPr lang="en-US" altLang="zh-TW" dirty="0"/>
+            </a:p>
+            <a:p>
+              <a:r>
+                <a:rPr lang="en-US" altLang="zh-TW" dirty="0"/>
+                <a:t>	initial begin</a:t>
+              </a:r>
+            </a:p>
+            <a:p>
+              <a:r>
+                <a:rPr lang="en-US" altLang="zh-TW" dirty="0"/>
+                <a:t>	</a:t>
+              </a:r>
+              <a:r>
+                <a:rPr lang="zh-TW" altLang="en-US" dirty="0"/>
+                <a:t>       </a:t>
+              </a:r>
+              <a:r>
+                <a:rPr lang="en-US" altLang="zh-TW" dirty="0"/>
+                <a:t>// Assign random values to each slot of the stack</a:t>
+              </a:r>
+            </a:p>
+            <a:p>
+              <a:r>
+                <a:rPr lang="en-US" altLang="zh-TW" dirty="0"/>
+                <a:t>	</a:t>
+              </a:r>
+              <a:r>
+                <a:rPr lang="zh-TW" altLang="en-US" dirty="0"/>
+                <a:t>       </a:t>
+              </a:r>
+              <a:r>
+                <a:rPr lang="en-US" altLang="zh-TW" dirty="0"/>
+                <a:t>foreach (stack[</a:t>
+              </a:r>
+              <a:r>
+                <a:rPr lang="en-US" altLang="zh-TW" dirty="0" err="1"/>
+                <a:t>i</a:t>
+              </a:r>
+              <a:r>
+                <a:rPr lang="en-US" altLang="zh-TW" dirty="0"/>
+                <a:t>])</a:t>
+              </a:r>
+            </a:p>
+            <a:p>
+              <a:r>
+                <a:rPr lang="en-US" altLang="zh-TW" dirty="0"/>
+                <a:t>          </a:t>
+              </a:r>
+              <a:r>
+                <a:rPr lang="zh-TW" altLang="en-US" dirty="0"/>
+                <a:t>                   </a:t>
+              </a:r>
+              <a:r>
+                <a:rPr lang="en-US" altLang="zh-TW" dirty="0"/>
+                <a:t>foreach (stack[</a:t>
+              </a:r>
+              <a:r>
+                <a:rPr lang="en-US" altLang="zh-TW" dirty="0" err="1"/>
+                <a:t>i</a:t>
+              </a:r>
+              <a:r>
+                <a:rPr lang="en-US" altLang="zh-TW" dirty="0"/>
+                <a:t>][j]) begin</a:t>
+              </a:r>
+            </a:p>
+            <a:p>
+              <a:r>
+                <a:rPr lang="en-US" altLang="zh-TW" dirty="0"/>
+                <a:t>            </a:t>
+              </a:r>
+              <a:r>
+                <a:rPr lang="zh-TW" altLang="en-US" dirty="0"/>
+                <a:t>                    </a:t>
+              </a:r>
+              <a:r>
+                <a:rPr lang="en-US" altLang="zh-TW" dirty="0"/>
+                <a:t>stack[</a:t>
+              </a:r>
+              <a:r>
+                <a:rPr lang="en-US" altLang="zh-TW" dirty="0" err="1"/>
+                <a:t>i</a:t>
+              </a:r>
+              <a:r>
+                <a:rPr lang="en-US" altLang="zh-TW" dirty="0"/>
+                <a:t>][j] = $random;</a:t>
+              </a:r>
+            </a:p>
+            <a:p>
+              <a:r>
+                <a:rPr lang="en-US" altLang="zh-TW" dirty="0"/>
+                <a:t>            </a:t>
+              </a:r>
+              <a:r>
+                <a:rPr lang="zh-TW" altLang="en-US" dirty="0"/>
+                <a:t>                    </a:t>
+              </a:r>
+              <a:r>
+                <a:rPr lang="en-US" altLang="zh-TW" dirty="0"/>
+                <a:t>$display ("stack[%0d][%0d] = 0x%0h", </a:t>
+              </a:r>
+              <a:r>
+                <a:rPr lang="en-US" altLang="zh-TW" dirty="0" err="1"/>
+                <a:t>i</a:t>
+              </a:r>
+              <a:r>
+                <a:rPr lang="en-US" altLang="zh-TW" dirty="0"/>
+                <a:t>, j, stack[</a:t>
+              </a:r>
+              <a:r>
+                <a:rPr lang="en-US" altLang="zh-TW" dirty="0" err="1"/>
+                <a:t>i</a:t>
+              </a:r>
+              <a:r>
+                <a:rPr lang="en-US" altLang="zh-TW" dirty="0"/>
+                <a:t>][j]);</a:t>
+              </a:r>
+            </a:p>
+            <a:p>
+              <a:r>
+                <a:rPr lang="en-US" altLang="zh-TW" dirty="0"/>
+                <a:t>	</a:t>
+              </a:r>
+              <a:r>
+                <a:rPr lang="zh-TW" altLang="en-US" dirty="0"/>
+                <a:t>             </a:t>
+              </a:r>
+              <a:r>
+                <a:rPr lang="en-US" altLang="zh-TW" dirty="0"/>
+                <a:t>end</a:t>
+              </a:r>
+            </a:p>
+            <a:p>
+              <a:endParaRPr lang="en-US" altLang="zh-TW" dirty="0"/>
+            </a:p>
+            <a:p>
+              <a:r>
+                <a:rPr lang="zh-TW" altLang="en-US" dirty="0"/>
+                <a:t>                           </a:t>
+              </a:r>
+              <a:r>
+                <a:rPr lang="en-US" altLang="zh-TW" dirty="0"/>
+                <a:t>// Print contents of the stack</a:t>
+              </a:r>
+            </a:p>
+            <a:p>
+              <a:r>
+                <a:rPr lang="en-US" altLang="zh-TW" dirty="0"/>
+                <a:t>	</a:t>
+              </a:r>
+              <a:r>
+                <a:rPr lang="zh-TW" altLang="en-US" dirty="0"/>
+                <a:t>       </a:t>
+              </a:r>
+              <a:r>
+                <a:rPr lang="en-US" altLang="zh-TW" dirty="0"/>
+                <a:t>$display ("stack = %p", stack);</a:t>
+              </a:r>
+            </a:p>
+            <a:p>
+              <a:endParaRPr lang="en-US" altLang="zh-TW" dirty="0"/>
+            </a:p>
+            <a:p>
+              <a:r>
+                <a:rPr lang="en-US" altLang="zh-TW" dirty="0"/>
+                <a:t>	</a:t>
+              </a:r>
+              <a:r>
+                <a:rPr lang="zh-TW" altLang="en-US" dirty="0"/>
+                <a:t>      </a:t>
+              </a:r>
+              <a:r>
+                <a:rPr lang="en-US" altLang="zh-TW" dirty="0"/>
+                <a:t>// Print content of a given index</a:t>
+              </a:r>
+            </a:p>
+            <a:p>
+              <a:r>
+                <a:rPr lang="en-US" altLang="zh-TW" dirty="0"/>
+                <a:t>        </a:t>
+              </a:r>
+              <a:r>
+                <a:rPr lang="zh-TW" altLang="en-US" dirty="0"/>
+                <a:t>                  </a:t>
+              </a:r>
+              <a:r>
+                <a:rPr lang="en-US" altLang="zh-TW" dirty="0"/>
+                <a:t>$display("stack[0][0][2] = 0x%0h", stack[0][0][2]);</a:t>
+              </a:r>
+            </a:p>
+            <a:p>
+              <a:r>
+                <a:rPr lang="zh-TW" altLang="en-US" dirty="0"/>
+                <a:t>                   </a:t>
+              </a:r>
+              <a:r>
+                <a:rPr lang="en-US" altLang="zh-TW" dirty="0"/>
+                <a:t>end</a:t>
+              </a:r>
+            </a:p>
+            <a:p>
+              <a:r>
+                <a:rPr lang="en-US" altLang="zh-TW" dirty="0" err="1"/>
+                <a:t>endmodule</a:t>
+              </a:r>
+              <a:endParaRPr lang="zh-TW" altLang="en-US" dirty="0"/>
+            </a:p>
+          </p:txBody>
+        </p:sp>
+        <p:sp>
+          <p:nvSpPr>
+            <p:cNvPr id="4" name="文字方塊 3">
+              <a:extLst>
+                <a:ext uri="{FF2B5EF4-FFF2-40B4-BE49-F238E27FC236}">
+                  <a16:creationId xmlns:a16="http://schemas.microsoft.com/office/drawing/2014/main" id="{A533A299-FEFE-ED8A-5CAE-4009044AB696}"/>
+                </a:ext>
+              </a:extLst>
+            </p:cNvPr>
+            <p:cNvSpPr txBox="1"/>
+            <p:nvPr/>
+          </p:nvSpPr>
+          <p:spPr>
+            <a:xfrm>
+              <a:off x="7599872" y="1538078"/>
+              <a:ext cx="2809335" cy="5078313"/>
+            </a:xfrm>
+            <a:prstGeom prst="rect">
+              <a:avLst/>
+            </a:prstGeom>
+            <a:noFill/>
+            <a:ln>
+              <a:solidFill>
+                <a:schemeClr val="tx1"/>
+              </a:solidFill>
+            </a:ln>
+          </p:spPr>
+          <p:txBody>
+            <a:bodyPr wrap="square" rtlCol="0">
+              <a:spAutoFit/>
+            </a:bodyPr>
+            <a:lstStyle/>
+            <a:p>
+              <a:r>
+                <a:rPr lang="zh-TW" altLang="en-US" dirty="0"/>
+                <a:t>模擬結果</a:t>
+              </a:r>
+              <a:r>
+                <a:rPr lang="en-US" altLang="zh-TW" dirty="0"/>
+                <a:t>:</a:t>
+              </a:r>
+            </a:p>
+            <a:p>
+              <a:r>
+                <a:rPr lang="en-US" altLang="zh-TW" dirty="0"/>
+                <a:t>stack[0][0] = 0x12153524</a:t>
+              </a:r>
+            </a:p>
+            <a:p>
+              <a:r>
+                <a:rPr lang="en-US" altLang="zh-TW" dirty="0"/>
+                <a:t>stack[0][1] = 0xc0895e81</a:t>
+              </a:r>
+            </a:p>
+            <a:p>
+              <a:r>
+                <a:rPr lang="en-US" altLang="zh-TW" dirty="0"/>
+                <a:t>stack[0][2] = 0x8484d609</a:t>
+              </a:r>
+            </a:p>
+            <a:p>
+              <a:r>
+                <a:rPr lang="en-US" altLang="zh-TW" dirty="0"/>
+                <a:t>stack[0][3] = 0xb1f05663</a:t>
+              </a:r>
+            </a:p>
+            <a:p>
+              <a:r>
+                <a:rPr lang="en-US" altLang="zh-TW" dirty="0"/>
+                <a:t>stack[1][0] = 0x6b97b0d</a:t>
+              </a:r>
+            </a:p>
+            <a:p>
+              <a:r>
+                <a:rPr lang="en-US" altLang="zh-TW" dirty="0"/>
+                <a:t>stack[1][1] = 0x46df998d</a:t>
+              </a:r>
+            </a:p>
+            <a:p>
+              <a:r>
+                <a:rPr lang="en-US" altLang="zh-TW" dirty="0"/>
+                <a:t>stack[1][2] = 0xb2c28465</a:t>
+              </a:r>
+            </a:p>
+            <a:p>
+              <a:r>
+                <a:rPr lang="en-US" altLang="zh-TW" dirty="0"/>
+                <a:t>stack[1][3] = 0x89375212</a:t>
+              </a:r>
+            </a:p>
+            <a:p>
+              <a:r>
+                <a:rPr lang="en-US" altLang="zh-TW" dirty="0"/>
+                <a:t>stack = '{'{'h12153524, 'hc0895e81, 'h8484d609, 'hb1f05663}, '{'h6b97b0d, 'h46df998d, 'hb2c28465, 'h89375212}}</a:t>
+              </a:r>
+            </a:p>
+            <a:p>
+              <a:r>
+                <a:rPr lang="en-US" altLang="zh-TW" dirty="0">
+                  <a:highlight>
+                    <a:srgbClr val="FFFF00"/>
+                  </a:highlight>
+                </a:rPr>
+                <a:t>stack[0][0][2] = 0x15</a:t>
+              </a:r>
+            </a:p>
+            <a:p>
+              <a:endParaRPr lang="en-US" altLang="zh-TW" dirty="0"/>
+            </a:p>
+            <a:p>
+              <a:endParaRPr lang="en-US" altLang="zh-TW" dirty="0"/>
+            </a:p>
+            <a:p>
+              <a:endParaRPr lang="zh-TW" altLang="en-US" dirty="0"/>
+            </a:p>
+          </p:txBody>
+        </p:sp>
+      </p:grpSp>
+    </p:spTree>
+    <p:extLst>
+      <p:ext uri="{BB962C8B-B14F-4D97-AF65-F5344CB8AC3E}">
+        <p14:creationId xmlns:p14="http://schemas.microsoft.com/office/powerpoint/2010/main" val="2146634666"/>
+      </p:ext>
+    </p:extLst>
+  </p:cSld>
+  <p:clrMapOvr>
+    <a:masterClrMapping/>
+  </p:clrMapOvr>
+</p:sld>
+</file>
+
+<file path=ppt/slides/slide17.xml><?xml version="1.0" encoding="utf-8"?>
+<p:sld xmlns:a="http://schemas.openxmlformats.org/drawingml/2006/main" xmlns:r="http://schemas.openxmlformats.org/officeDocument/2006/relationships" xmlns:p="http://schemas.openxmlformats.org/presentationml/2006/main">
+  <p:cSld>
+    <p:spTree>
+      <p:nvGrpSpPr>
+        <p:cNvPr id="1" name="">
+          <a:extLst>
+            <a:ext uri="{FF2B5EF4-FFF2-40B4-BE49-F238E27FC236}">
+              <a16:creationId xmlns:a16="http://schemas.microsoft.com/office/drawing/2014/main" id="{02134186-4C1C-9528-D991-CFD9BE857F2D}"/>
+            </a:ext>
+          </a:extLst>
+        </p:cNvPr>
+        <p:cNvGrpSpPr/>
+        <p:nvPr/>
+      </p:nvGrpSpPr>
+      <p:grpSpPr>
+        <a:xfrm>
+          <a:off x="0" y="0"/>
+          <a:ext cx="0" cy="0"/>
+          <a:chOff x="0" y="0"/>
+          <a:chExt cx="0" cy="0"/>
+        </a:xfrm>
+      </p:grpSpPr>
+      <p:sp>
+        <p:nvSpPr>
+          <p:cNvPr id="2" name="標題 1">
+            <a:extLst>
+              <a:ext uri="{FF2B5EF4-FFF2-40B4-BE49-F238E27FC236}">
+                <a16:creationId xmlns:a16="http://schemas.microsoft.com/office/drawing/2014/main" id="{9659ED8B-87F8-F81B-2583-13E66A49F82F}"/>
+              </a:ext>
+            </a:extLst>
+          </p:cNvPr>
+          <p:cNvSpPr>
+            <a:spLocks noGrp="1"/>
+          </p:cNvSpPr>
+          <p:nvPr>
+            <p:ph type="title"/>
+          </p:nvPr>
+        </p:nvSpPr>
+        <p:spPr/>
+        <p:txBody>
+          <a:bodyPr/>
+          <a:lstStyle/>
+          <a:p>
+            <a:r>
+              <a:rPr lang="en-US" altLang="zh-TW" dirty="0"/>
+              <a:t>Array (2/)</a:t>
+            </a:r>
+            <a:endParaRPr lang="zh-TW" altLang="en-US" dirty="0"/>
+          </a:p>
+        </p:txBody>
+      </p:sp>
+      <p:grpSp>
+        <p:nvGrpSpPr>
+          <p:cNvPr id="5" name="群組 4">
+            <a:extLst>
+              <a:ext uri="{FF2B5EF4-FFF2-40B4-BE49-F238E27FC236}">
+                <a16:creationId xmlns:a16="http://schemas.microsoft.com/office/drawing/2014/main" id="{9443D529-D072-B3BB-D3F1-B74843397F96}"/>
+              </a:ext>
+            </a:extLst>
+          </p:cNvPr>
+          <p:cNvGrpSpPr/>
+          <p:nvPr/>
+        </p:nvGrpSpPr>
+        <p:grpSpPr>
+          <a:xfrm>
+            <a:off x="608522" y="1551209"/>
+            <a:ext cx="10974956" cy="5078313"/>
+            <a:chOff x="-565749" y="1538078"/>
+            <a:chExt cx="10974956" cy="5078313"/>
+          </a:xfrm>
+        </p:grpSpPr>
+        <p:sp>
+          <p:nvSpPr>
+            <p:cNvPr id="6" name="文字方塊 5">
+              <a:extLst>
+                <a:ext uri="{FF2B5EF4-FFF2-40B4-BE49-F238E27FC236}">
+                  <a16:creationId xmlns:a16="http://schemas.microsoft.com/office/drawing/2014/main" id="{FA54275A-78A6-65A2-6533-4C6405AE66CE}"/>
+                </a:ext>
+              </a:extLst>
+            </p:cNvPr>
+            <p:cNvSpPr txBox="1"/>
+            <p:nvPr/>
+          </p:nvSpPr>
+          <p:spPr>
+            <a:xfrm>
+              <a:off x="-565749" y="1538078"/>
+              <a:ext cx="7926957" cy="5078313"/>
+            </a:xfrm>
+            <a:prstGeom prst="rect">
+              <a:avLst/>
+            </a:prstGeom>
+            <a:noFill/>
+            <a:ln>
+              <a:solidFill>
+                <a:schemeClr val="tx1"/>
+              </a:solidFill>
+            </a:ln>
+          </p:spPr>
+          <p:txBody>
+            <a:bodyPr wrap="square" rtlCol="0">
+              <a:spAutoFit/>
+            </a:bodyPr>
+            <a:lstStyle/>
+            <a:p>
+              <a:r>
+                <a:rPr lang="en-US" altLang="zh-TW" dirty="0"/>
+                <a:t>module tb;</a:t>
+              </a:r>
+            </a:p>
+            <a:p>
+              <a:r>
+                <a:rPr lang="en-US" altLang="zh-TW" dirty="0"/>
+                <a:t>  </a:t>
+              </a:r>
+              <a:r>
+                <a:rPr lang="zh-TW" altLang="en-US" dirty="0"/>
+                <a:t>                  </a:t>
+              </a:r>
+              <a:r>
+                <a:rPr lang="en-US" altLang="zh-TW" dirty="0"/>
+                <a:t>bit [3:0][7:0] 	stack [2][4]; 		// 2 rows, 4 cols</a:t>
+              </a:r>
+            </a:p>
+            <a:p>
+              <a:endParaRPr lang="en-US" altLang="zh-TW" dirty="0"/>
+            </a:p>
+            <a:p>
+              <a:r>
+                <a:rPr lang="en-US" altLang="zh-TW" dirty="0"/>
+                <a:t>	initial begin</a:t>
+              </a:r>
+            </a:p>
+            <a:p>
+              <a:r>
+                <a:rPr lang="en-US" altLang="zh-TW" dirty="0"/>
+                <a:t>	</a:t>
+              </a:r>
+              <a:r>
+                <a:rPr lang="zh-TW" altLang="en-US" dirty="0"/>
+                <a:t>       </a:t>
+              </a:r>
+              <a:r>
+                <a:rPr lang="en-US" altLang="zh-TW" dirty="0"/>
+                <a:t>// Assign random values to each slot of the stack</a:t>
+              </a:r>
+            </a:p>
+            <a:p>
+              <a:r>
+                <a:rPr lang="en-US" altLang="zh-TW" dirty="0"/>
+                <a:t>	</a:t>
+              </a:r>
+              <a:r>
+                <a:rPr lang="zh-TW" altLang="en-US" dirty="0"/>
+                <a:t>       </a:t>
+              </a:r>
+              <a:r>
+                <a:rPr lang="en-US" altLang="zh-TW" dirty="0"/>
+                <a:t>foreach (stack[</a:t>
+              </a:r>
+              <a:r>
+                <a:rPr lang="en-US" altLang="zh-TW" dirty="0" err="1"/>
+                <a:t>i</a:t>
+              </a:r>
+              <a:r>
+                <a:rPr lang="en-US" altLang="zh-TW" dirty="0"/>
+                <a:t>])</a:t>
+              </a:r>
+            </a:p>
+            <a:p>
+              <a:r>
+                <a:rPr lang="en-US" altLang="zh-TW" dirty="0"/>
+                <a:t>          </a:t>
+              </a:r>
+              <a:r>
+                <a:rPr lang="zh-TW" altLang="en-US" dirty="0"/>
+                <a:t>                   </a:t>
+              </a:r>
+              <a:r>
+                <a:rPr lang="en-US" altLang="zh-TW" dirty="0"/>
+                <a:t>foreach (stack[</a:t>
+              </a:r>
+              <a:r>
+                <a:rPr lang="en-US" altLang="zh-TW" dirty="0" err="1"/>
+                <a:t>i</a:t>
+              </a:r>
+              <a:r>
+                <a:rPr lang="en-US" altLang="zh-TW" dirty="0"/>
+                <a:t>][j]) begin</a:t>
+              </a:r>
+            </a:p>
+            <a:p>
+              <a:r>
+                <a:rPr lang="en-US" altLang="zh-TW" dirty="0"/>
+                <a:t>            </a:t>
+              </a:r>
+              <a:r>
+                <a:rPr lang="zh-TW" altLang="en-US" dirty="0"/>
+                <a:t>                    </a:t>
+              </a:r>
+              <a:r>
+                <a:rPr lang="en-US" altLang="zh-TW" dirty="0"/>
+                <a:t>stack[</a:t>
+              </a:r>
+              <a:r>
+                <a:rPr lang="en-US" altLang="zh-TW" dirty="0" err="1"/>
+                <a:t>i</a:t>
+              </a:r>
+              <a:r>
+                <a:rPr lang="en-US" altLang="zh-TW" dirty="0"/>
+                <a:t>][j] = $random;</a:t>
+              </a:r>
+            </a:p>
+            <a:p>
+              <a:r>
+                <a:rPr lang="en-US" altLang="zh-TW" dirty="0"/>
+                <a:t>            </a:t>
+              </a:r>
+              <a:r>
+                <a:rPr lang="zh-TW" altLang="en-US" dirty="0"/>
+                <a:t>                    </a:t>
+              </a:r>
+              <a:r>
+                <a:rPr lang="en-US" altLang="zh-TW" dirty="0"/>
+                <a:t>$display ("stack[%0d][%0d] = 0x%0h", </a:t>
+              </a:r>
+              <a:r>
+                <a:rPr lang="en-US" altLang="zh-TW" dirty="0" err="1"/>
+                <a:t>i</a:t>
+              </a:r>
+              <a:r>
+                <a:rPr lang="en-US" altLang="zh-TW" dirty="0"/>
+                <a:t>, j, stack[</a:t>
+              </a:r>
+              <a:r>
+                <a:rPr lang="en-US" altLang="zh-TW" dirty="0" err="1"/>
+                <a:t>i</a:t>
+              </a:r>
+              <a:r>
+                <a:rPr lang="en-US" altLang="zh-TW" dirty="0"/>
+                <a:t>][j]);</a:t>
+              </a:r>
+            </a:p>
+            <a:p>
+              <a:r>
+                <a:rPr lang="en-US" altLang="zh-TW" dirty="0"/>
+                <a:t>	</a:t>
+              </a:r>
+              <a:r>
+                <a:rPr lang="zh-TW" altLang="en-US" dirty="0"/>
+                <a:t>             </a:t>
+              </a:r>
+              <a:r>
+                <a:rPr lang="en-US" altLang="zh-TW" dirty="0"/>
+                <a:t>end</a:t>
+              </a:r>
+            </a:p>
+            <a:p>
+              <a:endParaRPr lang="en-US" altLang="zh-TW" dirty="0"/>
+            </a:p>
+            <a:p>
+              <a:r>
+                <a:rPr lang="zh-TW" altLang="en-US" dirty="0"/>
+                <a:t>                           </a:t>
+              </a:r>
+              <a:r>
+                <a:rPr lang="en-US" altLang="zh-TW" dirty="0"/>
+                <a:t>// Print contents of the stack</a:t>
+              </a:r>
+            </a:p>
+            <a:p>
+              <a:r>
+                <a:rPr lang="en-US" altLang="zh-TW" dirty="0"/>
+                <a:t>	</a:t>
+              </a:r>
+              <a:r>
+                <a:rPr lang="zh-TW" altLang="en-US" dirty="0"/>
+                <a:t>       </a:t>
+              </a:r>
+              <a:r>
+                <a:rPr lang="en-US" altLang="zh-TW" dirty="0"/>
+                <a:t>$display ("stack = %p", stack);</a:t>
+              </a:r>
+            </a:p>
+            <a:p>
+              <a:endParaRPr lang="en-US" altLang="zh-TW" dirty="0"/>
+            </a:p>
+            <a:p>
+              <a:r>
+                <a:rPr lang="en-US" altLang="zh-TW" dirty="0"/>
+                <a:t>	</a:t>
+              </a:r>
+              <a:r>
+                <a:rPr lang="zh-TW" altLang="en-US" dirty="0"/>
+                <a:t>      </a:t>
+              </a:r>
+              <a:r>
+                <a:rPr lang="en-US" altLang="zh-TW" dirty="0"/>
+                <a:t>// Print content of a given index</a:t>
+              </a:r>
+            </a:p>
+            <a:p>
+              <a:r>
+                <a:rPr lang="en-US" altLang="zh-TW" dirty="0"/>
+                <a:t>        </a:t>
+              </a:r>
+              <a:r>
+                <a:rPr lang="zh-TW" altLang="en-US" dirty="0"/>
+                <a:t>                  </a:t>
+              </a:r>
+              <a:r>
+                <a:rPr lang="en-US" altLang="zh-TW" dirty="0"/>
+                <a:t>$display("stack[0][0][2] = 0x%0h", stack[0][0][2]);</a:t>
+              </a:r>
+            </a:p>
+            <a:p>
+              <a:r>
+                <a:rPr lang="zh-TW" altLang="en-US" dirty="0"/>
+                <a:t>                   </a:t>
+              </a:r>
+              <a:r>
+                <a:rPr lang="en-US" altLang="zh-TW" dirty="0"/>
+                <a:t>end</a:t>
+              </a:r>
+            </a:p>
+            <a:p>
+              <a:r>
+                <a:rPr lang="en-US" altLang="zh-TW" dirty="0" err="1"/>
+                <a:t>endmodule</a:t>
+              </a:r>
+              <a:endParaRPr lang="zh-TW" altLang="en-US" dirty="0"/>
+            </a:p>
+          </p:txBody>
+        </p:sp>
+        <p:sp>
+          <p:nvSpPr>
+            <p:cNvPr id="4" name="文字方塊 3">
+              <a:extLst>
+                <a:ext uri="{FF2B5EF4-FFF2-40B4-BE49-F238E27FC236}">
+                  <a16:creationId xmlns:a16="http://schemas.microsoft.com/office/drawing/2014/main" id="{16812D44-1C93-1DCC-82A0-F5CA412821A5}"/>
+                </a:ext>
+              </a:extLst>
+            </p:cNvPr>
+            <p:cNvSpPr txBox="1"/>
+            <p:nvPr/>
+          </p:nvSpPr>
+          <p:spPr>
+            <a:xfrm>
+              <a:off x="7599872" y="1538078"/>
+              <a:ext cx="2809335" cy="5078313"/>
+            </a:xfrm>
+            <a:prstGeom prst="rect">
+              <a:avLst/>
+            </a:prstGeom>
+            <a:noFill/>
+            <a:ln>
+              <a:solidFill>
+                <a:schemeClr val="tx1"/>
+              </a:solidFill>
+            </a:ln>
+          </p:spPr>
+          <p:txBody>
+            <a:bodyPr wrap="square" rtlCol="0">
+              <a:spAutoFit/>
+            </a:bodyPr>
+            <a:lstStyle/>
+            <a:p>
+              <a:r>
+                <a:rPr lang="zh-TW" altLang="en-US" dirty="0"/>
+                <a:t>模擬結果</a:t>
+              </a:r>
+              <a:r>
+                <a:rPr lang="en-US" altLang="zh-TW" dirty="0"/>
+                <a:t>:</a:t>
+              </a:r>
+            </a:p>
+            <a:p>
+              <a:r>
+                <a:rPr lang="en-US" altLang="zh-TW" dirty="0"/>
+                <a:t>stack[0][0] = 0x12153524</a:t>
+              </a:r>
+            </a:p>
+            <a:p>
+              <a:r>
+                <a:rPr lang="en-US" altLang="zh-TW" dirty="0"/>
+                <a:t>stack[0][1] = 0xc0895e81</a:t>
+              </a:r>
+            </a:p>
+            <a:p>
+              <a:r>
+                <a:rPr lang="en-US" altLang="zh-TW" dirty="0"/>
+                <a:t>stack[0][2] = 0x8484d609</a:t>
+              </a:r>
+            </a:p>
+            <a:p>
+              <a:r>
+                <a:rPr lang="en-US" altLang="zh-TW" dirty="0"/>
+                <a:t>stack[0][3] = 0xb1f05663</a:t>
+              </a:r>
+            </a:p>
+            <a:p>
+              <a:r>
+                <a:rPr lang="en-US" altLang="zh-TW" dirty="0"/>
+                <a:t>stack[1][0] = 0x6b97b0d</a:t>
+              </a:r>
+            </a:p>
+            <a:p>
+              <a:r>
+                <a:rPr lang="en-US" altLang="zh-TW" dirty="0"/>
+                <a:t>stack[1][1] = 0x46df998d</a:t>
+              </a:r>
+            </a:p>
+            <a:p>
+              <a:r>
+                <a:rPr lang="en-US" altLang="zh-TW" dirty="0"/>
+                <a:t>stack[1][2] = 0xb2c28465</a:t>
+              </a:r>
+            </a:p>
+            <a:p>
+              <a:r>
+                <a:rPr lang="en-US" altLang="zh-TW" dirty="0"/>
+                <a:t>stack[1][3] = 0x89375212</a:t>
+              </a:r>
+            </a:p>
+            <a:p>
+              <a:r>
+                <a:rPr lang="en-US" altLang="zh-TW" dirty="0"/>
+                <a:t>stack = '{'{'h12153524, 'hc0895e81, 'h8484d609, 'hb1f05663}, '{'h6b97b0d, 'h46df998d, 'hb2c28465, 'h89375212}}</a:t>
+              </a:r>
+            </a:p>
+            <a:p>
+              <a:r>
+                <a:rPr lang="en-US" altLang="zh-TW" dirty="0">
+                  <a:highlight>
+                    <a:srgbClr val="FFFF00"/>
+                  </a:highlight>
+                </a:rPr>
+                <a:t>stack[0][0][2] = 0x15</a:t>
+              </a:r>
+            </a:p>
+            <a:p>
+              <a:endParaRPr lang="en-US" altLang="zh-TW" dirty="0"/>
+            </a:p>
+            <a:p>
+              <a:endParaRPr lang="en-US" altLang="zh-TW" dirty="0"/>
+            </a:p>
+            <a:p>
+              <a:endParaRPr lang="zh-TW" altLang="en-US" dirty="0"/>
+            </a:p>
+          </p:txBody>
+        </p:sp>
+      </p:grpSp>
+    </p:spTree>
+    <p:extLst>
+      <p:ext uri="{BB962C8B-B14F-4D97-AF65-F5344CB8AC3E}">
+        <p14:creationId xmlns:p14="http://schemas.microsoft.com/office/powerpoint/2010/main" val="556418391"/>
+      </p:ext>
+    </p:extLst>
+  </p:cSld>
+  <p:clrMapOvr>
+    <a:masterClrMapping/>
+  </p:clrMapOvr>
+</p:sld>
+</file>
+
 <file path=ppt/slides/slide2.xml><?xml version="1.0" encoding="utf-8"?>
 <p:sld xmlns:a="http://schemas.openxmlformats.org/drawingml/2006/main" xmlns:r="http://schemas.openxmlformats.org/officeDocument/2006/relationships" xmlns:p="http://schemas.openxmlformats.org/presentationml/2006/main">
   <p:cSld>
@@ -3516,15 +5958,15 @@
           <p:cNvPr id="2" name="標題 1">
             <a:extLst>
               <a:ext uri="{FF2B5EF4-FFF2-40B4-BE49-F238E27FC236}">
-                <a16:creationId xmlns:a16="http://schemas.microsoft.com/office/drawing/2014/main" id="{64FBECF2-AA53-D144-5315-9B32529CF7EA}"/>
-              </a:ext>
-            </a:extLst>
-          </p:cNvPr>
-          <p:cNvSpPr>
-            <a:spLocks noGrp="1"/>
-          </p:cNvSpPr>
-          <p:nvPr>
-            <p:ph type="title"/>
+                <a16:creationId xmlns:a16="http://schemas.microsoft.com/office/drawing/2014/main" id="{A8B5D6F8-A2BB-777F-620B-B162C56ED4C8}"/>
+              </a:ext>
+            </a:extLst>
+          </p:cNvPr>
+          <p:cNvSpPr>
+            <a:spLocks noGrp="1"/>
+          </p:cNvSpPr>
+          <p:nvPr>
+            <p:ph type="ctrTitle"/>
           </p:nvPr>
         </p:nvSpPr>
         <p:spPr/>
@@ -3533,140 +5975,47 @@
           <a:lstStyle/>
           <a:p>
             <a:r>
-              <a:rPr lang="zh-TW" altLang="en-US" dirty="0"/>
+              <a:rPr lang="en-US" altLang="zh-TW" dirty="0"/>
+              <a:t>Chapter 1</a:t>
+            </a:r>
+            <a:endParaRPr lang="zh-TW" altLang="en-US" dirty="0"/>
+          </a:p>
+        </p:txBody>
+      </p:sp>
+      <p:sp>
+        <p:nvSpPr>
+          <p:cNvPr id="3" name="副標題 2">
+            <a:extLst>
+              <a:ext uri="{FF2B5EF4-FFF2-40B4-BE49-F238E27FC236}">
+                <a16:creationId xmlns:a16="http://schemas.microsoft.com/office/drawing/2014/main" id="{36D43279-6C9C-56DD-F8D5-F4D99B41D89C}"/>
+              </a:ext>
+            </a:extLst>
+          </p:cNvPr>
+          <p:cNvSpPr>
+            <a:spLocks noGrp="1"/>
+          </p:cNvSpPr>
+          <p:nvPr>
+            <p:ph type="subTitle" idx="1"/>
+          </p:nvPr>
+        </p:nvSpPr>
+        <p:spPr/>
+        <p:txBody>
+          <a:bodyPr>
+            <a:normAutofit/>
+          </a:bodyPr>
+          <a:lstStyle/>
+          <a:p>
+            <a:r>
+              <a:rPr lang="zh-TW" altLang="en-US" sz="4000" dirty="0"/>
               <a:t>資料型態</a:t>
             </a:r>
-          </a:p>
-        </p:txBody>
-      </p:sp>
-      <p:sp>
-        <p:nvSpPr>
-          <p:cNvPr id="3" name="內容版面配置區 2">
-            <a:extLst>
-              <a:ext uri="{FF2B5EF4-FFF2-40B4-BE49-F238E27FC236}">
-                <a16:creationId xmlns:a16="http://schemas.microsoft.com/office/drawing/2014/main" id="{6128D30B-E3AA-F006-7C08-BBC581A86E61}"/>
-              </a:ext>
-            </a:extLst>
-          </p:cNvPr>
-          <p:cNvSpPr>
-            <a:spLocks noGrp="1"/>
-          </p:cNvSpPr>
-          <p:nvPr>
-            <p:ph idx="1"/>
-          </p:nvPr>
-        </p:nvSpPr>
-        <p:spPr/>
-        <p:txBody>
-          <a:bodyPr/>
-          <a:lstStyle/>
-          <a:p>
-            <a:r>
-              <a:rPr lang="en-US" altLang="zh-TW" dirty="0" err="1"/>
-              <a:t>SystemVerilog</a:t>
-            </a:r>
-            <a:r>
-              <a:rPr lang="en-US" altLang="zh-TW" dirty="0"/>
-              <a:t> </a:t>
-            </a:r>
-            <a:r>
-              <a:rPr lang="zh-TW" altLang="en-US" dirty="0"/>
-              <a:t>有分成 </a:t>
-            </a:r>
-            <a:r>
-              <a:rPr lang="en-US" altLang="zh-TW" dirty="0"/>
-              <a:t>2-state</a:t>
-            </a:r>
-            <a:r>
-              <a:rPr lang="zh-TW" altLang="en-US" dirty="0"/>
-              <a:t> 跟 </a:t>
-            </a:r>
-            <a:r>
-              <a:rPr lang="en-US" altLang="zh-TW" dirty="0"/>
-              <a:t>4-state </a:t>
-            </a:r>
-            <a:r>
-              <a:rPr lang="zh-TW" altLang="en-US" dirty="0"/>
-              <a:t>的資料型態</a:t>
-            </a:r>
-            <a:endParaRPr lang="en-US" altLang="zh-TW" dirty="0"/>
-          </a:p>
-          <a:p>
-            <a:pPr lvl="1"/>
-            <a:r>
-              <a:rPr lang="en-US" altLang="zh-TW" dirty="0"/>
-              <a:t>2-state:</a:t>
-            </a:r>
-            <a:r>
-              <a:rPr lang="zh-TW" altLang="en-US" dirty="0"/>
-              <a:t> 指資料只有 </a:t>
-            </a:r>
-            <a:r>
-              <a:rPr lang="en-US" altLang="zh-TW" dirty="0"/>
-              <a:t>0</a:t>
-            </a:r>
-            <a:r>
-              <a:rPr lang="zh-TW" altLang="en-US" dirty="0"/>
-              <a:t> 或 </a:t>
-            </a:r>
-            <a:r>
-              <a:rPr lang="en-US" altLang="zh-TW" dirty="0"/>
-              <a:t>1</a:t>
-            </a:r>
-          </a:p>
-          <a:p>
-            <a:pPr lvl="1"/>
-            <a:r>
-              <a:rPr lang="en-US" altLang="zh-TW" dirty="0"/>
-              <a:t>4-state:</a:t>
-            </a:r>
-            <a:r>
-              <a:rPr lang="zh-TW" altLang="en-US" dirty="0"/>
-              <a:t> 指資料分成 </a:t>
-            </a:r>
-            <a:r>
-              <a:rPr lang="en-US" altLang="zh-TW" dirty="0"/>
-              <a:t>0</a:t>
-            </a:r>
-            <a:r>
-              <a:rPr lang="zh-TW" altLang="en-US" dirty="0"/>
-              <a:t>、</a:t>
-            </a:r>
-            <a:r>
-              <a:rPr lang="en-US" altLang="zh-TW" dirty="0"/>
-              <a:t>1</a:t>
-            </a:r>
-            <a:r>
-              <a:rPr lang="zh-TW" altLang="en-US" dirty="0"/>
-              <a:t>、</a:t>
-            </a:r>
-            <a:r>
-              <a:rPr lang="en-US" altLang="zh-TW" dirty="0"/>
-              <a:t>Z(</a:t>
-            </a:r>
-            <a:r>
-              <a:rPr lang="zh-TW" altLang="en-US" dirty="0"/>
-              <a:t>高阻抗</a:t>
-            </a:r>
-            <a:r>
-              <a:rPr lang="en-US" altLang="zh-TW" dirty="0"/>
-              <a:t>)</a:t>
-            </a:r>
-            <a:r>
-              <a:rPr lang="zh-TW" altLang="en-US" dirty="0"/>
-              <a:t>、</a:t>
-            </a:r>
-            <a:r>
-              <a:rPr lang="en-US" altLang="zh-TW" dirty="0"/>
-              <a:t>X(don’t care)</a:t>
-            </a:r>
-            <a:endParaRPr lang="zh-TW" altLang="en-US" dirty="0"/>
           </a:p>
         </p:txBody>
       </p:sp>
     </p:spTree>
     <p:extLst>
       <p:ext uri="{BB962C8B-B14F-4D97-AF65-F5344CB8AC3E}">
-        <p14:creationId xmlns:p14="http://schemas.microsoft.com/office/powerpoint/2010/main" val="1276826767"/>
+        <p14:creationId xmlns:p14="http://schemas.microsoft.com/office/powerpoint/2010/main" val="3558549456"/>
       </p:ext>
     </p:extLst>
   </p:cSld>
@@ -3698,6 +6047,188 @@
           <p:cNvPr id="2" name="標題 1">
             <a:extLst>
               <a:ext uri="{FF2B5EF4-FFF2-40B4-BE49-F238E27FC236}">
+                <a16:creationId xmlns:a16="http://schemas.microsoft.com/office/drawing/2014/main" id="{64FBECF2-AA53-D144-5315-9B32529CF7EA}"/>
+              </a:ext>
+            </a:extLst>
+          </p:cNvPr>
+          <p:cNvSpPr>
+            <a:spLocks noGrp="1"/>
+          </p:cNvSpPr>
+          <p:nvPr>
+            <p:ph type="title"/>
+          </p:nvPr>
+        </p:nvSpPr>
+        <p:spPr/>
+        <p:txBody>
+          <a:bodyPr/>
+          <a:lstStyle/>
+          <a:p>
+            <a:r>
+              <a:rPr lang="zh-TW" altLang="en-US" dirty="0"/>
+              <a:t>資料型態總類</a:t>
+            </a:r>
+          </a:p>
+        </p:txBody>
+      </p:sp>
+      <p:sp>
+        <p:nvSpPr>
+          <p:cNvPr id="3" name="內容版面配置區 2">
+            <a:extLst>
+              <a:ext uri="{FF2B5EF4-FFF2-40B4-BE49-F238E27FC236}">
+                <a16:creationId xmlns:a16="http://schemas.microsoft.com/office/drawing/2014/main" id="{6128D30B-E3AA-F006-7C08-BBC581A86E61}"/>
+              </a:ext>
+            </a:extLst>
+          </p:cNvPr>
+          <p:cNvSpPr>
+            <a:spLocks noGrp="1"/>
+          </p:cNvSpPr>
+          <p:nvPr>
+            <p:ph idx="1"/>
+          </p:nvPr>
+        </p:nvSpPr>
+        <p:spPr/>
+        <p:txBody>
+          <a:bodyPr/>
+          <a:lstStyle/>
+          <a:p>
+            <a:r>
+              <a:rPr lang="en-US" altLang="zh-TW" dirty="0" err="1"/>
+              <a:t>SystemVerilog</a:t>
+            </a:r>
+            <a:r>
+              <a:rPr lang="en-US" altLang="zh-TW" dirty="0"/>
+              <a:t> </a:t>
+            </a:r>
+            <a:r>
+              <a:rPr lang="zh-TW" altLang="en-US" dirty="0"/>
+              <a:t>有分成 </a:t>
+            </a:r>
+            <a:r>
+              <a:rPr lang="en-US" altLang="zh-TW" dirty="0"/>
+              <a:t>2-state</a:t>
+            </a:r>
+            <a:r>
+              <a:rPr lang="zh-TW" altLang="en-US" dirty="0"/>
+              <a:t> 跟 </a:t>
+            </a:r>
+            <a:r>
+              <a:rPr lang="en-US" altLang="zh-TW" dirty="0"/>
+              <a:t>4-state </a:t>
+            </a:r>
+            <a:r>
+              <a:rPr lang="zh-TW" altLang="en-US" dirty="0"/>
+              <a:t>的資料型態</a:t>
+            </a:r>
+            <a:endParaRPr lang="en-US" altLang="zh-TW" dirty="0"/>
+          </a:p>
+          <a:p>
+            <a:pPr lvl="1"/>
+            <a:r>
+              <a:rPr lang="en-US" altLang="zh-TW" dirty="0"/>
+              <a:t>2-state:</a:t>
+            </a:r>
+            <a:r>
+              <a:rPr lang="zh-TW" altLang="en-US" dirty="0"/>
+              <a:t> 指資料只有 </a:t>
+            </a:r>
+            <a:r>
+              <a:rPr lang="en-US" altLang="zh-TW" dirty="0"/>
+              <a:t>0</a:t>
+            </a:r>
+            <a:r>
+              <a:rPr lang="zh-TW" altLang="en-US" dirty="0"/>
+              <a:t> 或 </a:t>
+            </a:r>
+            <a:r>
+              <a:rPr lang="en-US" altLang="zh-TW" dirty="0"/>
+              <a:t>1</a:t>
+            </a:r>
+          </a:p>
+          <a:p>
+            <a:pPr lvl="1"/>
+            <a:r>
+              <a:rPr lang="en-US" altLang="zh-TW" dirty="0"/>
+              <a:t>4-state:</a:t>
+            </a:r>
+            <a:r>
+              <a:rPr lang="zh-TW" altLang="en-US" dirty="0"/>
+              <a:t> 指資料分成 </a:t>
+            </a:r>
+            <a:r>
+              <a:rPr lang="en-US" altLang="zh-TW" dirty="0"/>
+              <a:t>0</a:t>
+            </a:r>
+            <a:r>
+              <a:rPr lang="zh-TW" altLang="en-US" dirty="0"/>
+              <a:t>、</a:t>
+            </a:r>
+            <a:r>
+              <a:rPr lang="en-US" altLang="zh-TW" dirty="0"/>
+              <a:t>1</a:t>
+            </a:r>
+            <a:r>
+              <a:rPr lang="zh-TW" altLang="en-US" dirty="0"/>
+              <a:t>、</a:t>
+            </a:r>
+            <a:r>
+              <a:rPr lang="en-US" altLang="zh-TW" dirty="0"/>
+              <a:t>Z(</a:t>
+            </a:r>
+            <a:r>
+              <a:rPr lang="zh-TW" altLang="en-US" dirty="0"/>
+              <a:t>高阻抗</a:t>
+            </a:r>
+            <a:r>
+              <a:rPr lang="en-US" altLang="zh-TW" dirty="0"/>
+              <a:t>)</a:t>
+            </a:r>
+            <a:r>
+              <a:rPr lang="zh-TW" altLang="en-US" dirty="0"/>
+              <a:t>、</a:t>
+            </a:r>
+            <a:r>
+              <a:rPr lang="en-US" altLang="zh-TW" dirty="0"/>
+              <a:t>X(don’t care)</a:t>
+            </a:r>
+            <a:endParaRPr lang="zh-TW" altLang="en-US" dirty="0"/>
+          </a:p>
+        </p:txBody>
+      </p:sp>
+    </p:spTree>
+    <p:extLst>
+      <p:ext uri="{BB962C8B-B14F-4D97-AF65-F5344CB8AC3E}">
+        <p14:creationId xmlns:p14="http://schemas.microsoft.com/office/powerpoint/2010/main" val="1276826767"/>
+      </p:ext>
+    </p:extLst>
+  </p:cSld>
+  <p:clrMapOvr>
+    <a:masterClrMapping/>
+  </p:clrMapOvr>
+</p:sld>
+</file>
+
+<file path=ppt/slides/slide5.xml><?xml version="1.0" encoding="utf-8"?>
+<p:sld xmlns:a="http://schemas.openxmlformats.org/drawingml/2006/main" xmlns:r="http://schemas.openxmlformats.org/officeDocument/2006/relationships" xmlns:p="http://schemas.openxmlformats.org/presentationml/2006/main">
+  <p:cSld>
+    <p:spTree>
+      <p:nvGrpSpPr>
+        <p:cNvPr id="1" name=""/>
+        <p:cNvGrpSpPr/>
+        <p:nvPr/>
+      </p:nvGrpSpPr>
+      <p:grpSpPr>
+        <a:xfrm>
+          <a:off x="0" y="0"/>
+          <a:ext cx="0" cy="0"/>
+          <a:chOff x="0" y="0"/>
+          <a:chExt cx="0" cy="0"/>
+        </a:xfrm>
+      </p:grpSpPr>
+      <p:sp>
+        <p:nvSpPr>
+          <p:cNvPr id="2" name="標題 1">
+            <a:extLst>
+              <a:ext uri="{FF2B5EF4-FFF2-40B4-BE49-F238E27FC236}">
                 <a16:creationId xmlns:a16="http://schemas.microsoft.com/office/drawing/2014/main" id="{EAB4D879-9C50-8C37-BA80-DBA1D8A20DB8}"/>
               </a:ext>
             </a:extLst>
@@ -3716,7 +6247,7 @@
           <a:p>
             <a:r>
               <a:rPr lang="zh-TW" altLang="en-US" dirty="0"/>
-              <a:t>資料型態</a:t>
+              <a:t>資料型態列表</a:t>
             </a:r>
           </a:p>
         </p:txBody>
@@ -3757,6 +6288,1248 @@
     <p:extLst>
       <p:ext uri="{BB962C8B-B14F-4D97-AF65-F5344CB8AC3E}">
         <p14:creationId xmlns:p14="http://schemas.microsoft.com/office/powerpoint/2010/main" val="2668830856"/>
+      </p:ext>
+    </p:extLst>
+  </p:cSld>
+  <p:clrMapOvr>
+    <a:masterClrMapping/>
+  </p:clrMapOvr>
+</p:sld>
+</file>
+
+<file path=ppt/slides/slide6.xml><?xml version="1.0" encoding="utf-8"?>
+<p:sld xmlns:a="http://schemas.openxmlformats.org/drawingml/2006/main" xmlns:r="http://schemas.openxmlformats.org/officeDocument/2006/relationships" xmlns:p="http://schemas.openxmlformats.org/presentationml/2006/main">
+  <p:cSld>
+    <p:spTree>
+      <p:nvGrpSpPr>
+        <p:cNvPr id="1" name="">
+          <a:extLst>
+            <a:ext uri="{FF2B5EF4-FFF2-40B4-BE49-F238E27FC236}">
+              <a16:creationId xmlns:a16="http://schemas.microsoft.com/office/drawing/2014/main" id="{8DEDB67B-485C-4998-5B96-45D3E0A93ADF}"/>
+            </a:ext>
+          </a:extLst>
+        </p:cNvPr>
+        <p:cNvGrpSpPr/>
+        <p:nvPr/>
+      </p:nvGrpSpPr>
+      <p:grpSpPr>
+        <a:xfrm>
+          <a:off x="0" y="0"/>
+          <a:ext cx="0" cy="0"/>
+          <a:chOff x="0" y="0"/>
+          <a:chExt cx="0" cy="0"/>
+        </a:xfrm>
+      </p:grpSpPr>
+      <p:sp>
+        <p:nvSpPr>
+          <p:cNvPr id="2" name="標題 1">
+            <a:extLst>
+              <a:ext uri="{FF2B5EF4-FFF2-40B4-BE49-F238E27FC236}">
+                <a16:creationId xmlns:a16="http://schemas.microsoft.com/office/drawing/2014/main" id="{BE52E05B-9DDD-AA42-010C-C03CA20C3D7F}"/>
+              </a:ext>
+            </a:extLst>
+          </p:cNvPr>
+          <p:cNvSpPr>
+            <a:spLocks noGrp="1"/>
+          </p:cNvSpPr>
+          <p:nvPr>
+            <p:ph type="title"/>
+          </p:nvPr>
+        </p:nvSpPr>
+        <p:spPr/>
+        <p:txBody>
+          <a:bodyPr/>
+          <a:lstStyle/>
+          <a:p>
+            <a:r>
+              <a:rPr lang="en-US" altLang="zh-TW" dirty="0"/>
+              <a:t>Logic (4-State) (1/3)</a:t>
+            </a:r>
+            <a:endParaRPr lang="zh-TW" altLang="en-US" dirty="0"/>
+          </a:p>
+        </p:txBody>
+      </p:sp>
+      <p:sp>
+        <p:nvSpPr>
+          <p:cNvPr id="5" name="內容版面配置區 4">
+            <a:extLst>
+              <a:ext uri="{FF2B5EF4-FFF2-40B4-BE49-F238E27FC236}">
+                <a16:creationId xmlns:a16="http://schemas.microsoft.com/office/drawing/2014/main" id="{0349F3B9-DB33-3B5A-A9D3-3F63977000C0}"/>
+              </a:ext>
+            </a:extLst>
+          </p:cNvPr>
+          <p:cNvSpPr>
+            <a:spLocks noGrp="1"/>
+          </p:cNvSpPr>
+          <p:nvPr>
+            <p:ph idx="1"/>
+          </p:nvPr>
+        </p:nvSpPr>
+        <p:spPr/>
+        <p:txBody>
+          <a:bodyPr/>
+          <a:lstStyle/>
+          <a:p>
+            <a:r>
+              <a:rPr lang="zh-TW" altLang="en-US" dirty="0">
+                <a:latin typeface="標楷體" panose="03000509000000000000" pitchFamily="65" charset="-120"/>
+                <a:ea typeface="標楷體" panose="03000509000000000000" pitchFamily="65" charset="-120"/>
+              </a:rPr>
+              <a:t>它是一個四狀態型別（</a:t>
+            </a:r>
+            <a:r>
+              <a:rPr lang="en-US" altLang="zh-TW" dirty="0">
+                <a:latin typeface="標楷體" panose="03000509000000000000" pitchFamily="65" charset="-120"/>
+                <a:ea typeface="標楷體" panose="03000509000000000000" pitchFamily="65" charset="-120"/>
+              </a:rPr>
+              <a:t>0</a:t>
+            </a:r>
+            <a:r>
+              <a:rPr lang="zh-TW" altLang="en-US" dirty="0">
+                <a:latin typeface="標楷體" panose="03000509000000000000" pitchFamily="65" charset="-120"/>
+                <a:ea typeface="標楷體" panose="03000509000000000000" pitchFamily="65" charset="-120"/>
+              </a:rPr>
+              <a:t>、</a:t>
+            </a:r>
+            <a:r>
+              <a:rPr lang="en-US" altLang="zh-TW" dirty="0">
+                <a:latin typeface="標楷體" panose="03000509000000000000" pitchFamily="65" charset="-120"/>
+                <a:ea typeface="標楷體" panose="03000509000000000000" pitchFamily="65" charset="-120"/>
+              </a:rPr>
+              <a:t>1</a:t>
+            </a:r>
+            <a:r>
+              <a:rPr lang="zh-TW" altLang="en-US" dirty="0">
+                <a:latin typeface="標楷體" panose="03000509000000000000" pitchFamily="65" charset="-120"/>
+                <a:ea typeface="標楷體" panose="03000509000000000000" pitchFamily="65" charset="-120"/>
+              </a:rPr>
+              <a:t>、</a:t>
+            </a:r>
+            <a:r>
+              <a:rPr lang="en-US" altLang="zh-TW" dirty="0">
+                <a:latin typeface="標楷體" panose="03000509000000000000" pitchFamily="65" charset="-120"/>
+                <a:ea typeface="標楷體" panose="03000509000000000000" pitchFamily="65" charset="-120"/>
+              </a:rPr>
+              <a:t>X</a:t>
+            </a:r>
+            <a:r>
+              <a:rPr lang="zh-TW" altLang="en-US" dirty="0">
+                <a:latin typeface="標楷體" panose="03000509000000000000" pitchFamily="65" charset="-120"/>
+                <a:ea typeface="標楷體" panose="03000509000000000000" pitchFamily="65" charset="-120"/>
+              </a:rPr>
+              <a:t>、</a:t>
+            </a:r>
+            <a:r>
+              <a:rPr lang="en-US" altLang="zh-TW" dirty="0">
+                <a:latin typeface="標楷體" panose="03000509000000000000" pitchFamily="65" charset="-120"/>
+                <a:ea typeface="標楷體" panose="03000509000000000000" pitchFamily="65" charset="-120"/>
+              </a:rPr>
+              <a:t>Z</a:t>
+            </a:r>
+            <a:r>
+              <a:rPr lang="zh-TW" altLang="en-US" dirty="0">
+                <a:latin typeface="標楷體" panose="03000509000000000000" pitchFamily="65" charset="-120"/>
+                <a:ea typeface="標楷體" panose="03000509000000000000" pitchFamily="65" charset="-120"/>
+              </a:rPr>
+              <a:t>）</a:t>
+            </a:r>
+            <a:endParaRPr lang="en-US" altLang="zh-TW" dirty="0">
+              <a:latin typeface="標楷體" panose="03000509000000000000" pitchFamily="65" charset="-120"/>
+              <a:ea typeface="標楷體" panose="03000509000000000000" pitchFamily="65" charset="-120"/>
+            </a:endParaRPr>
+          </a:p>
+          <a:p>
+            <a:r>
+              <a:rPr lang="zh-TW" altLang="en-US" dirty="0">
+                <a:latin typeface="標楷體" panose="03000509000000000000" pitchFamily="65" charset="-120"/>
+                <a:ea typeface="標楷體" panose="03000509000000000000" pitchFamily="65" charset="-120"/>
+              </a:rPr>
+              <a:t>可以在程序區塊（如</a:t>
+            </a:r>
+            <a:r>
+              <a:rPr lang="en-US" altLang="zh-TW" dirty="0">
+                <a:latin typeface="標楷體" panose="03000509000000000000" pitchFamily="65" charset="-120"/>
+                <a:ea typeface="標楷體" panose="03000509000000000000" pitchFamily="65" charset="-120"/>
+              </a:rPr>
+              <a:t>initial</a:t>
+            </a:r>
+            <a:r>
+              <a:rPr lang="zh-TW" altLang="en-US" dirty="0">
+                <a:latin typeface="標楷體" panose="03000509000000000000" pitchFamily="65" charset="-120"/>
+                <a:ea typeface="標楷體" panose="03000509000000000000" pitchFamily="65" charset="-120"/>
+              </a:rPr>
+              <a:t>、</a:t>
+            </a:r>
+            <a:r>
+              <a:rPr lang="en-US" altLang="zh-TW" dirty="0">
+                <a:latin typeface="標楷體" panose="03000509000000000000" pitchFamily="65" charset="-120"/>
+                <a:ea typeface="標楷體" panose="03000509000000000000" pitchFamily="65" charset="-120"/>
+              </a:rPr>
+              <a:t>always</a:t>
+            </a:r>
+            <a:r>
+              <a:rPr lang="zh-TW" altLang="en-US" dirty="0">
+                <a:latin typeface="標楷體" panose="03000509000000000000" pitchFamily="65" charset="-120"/>
+                <a:ea typeface="標楷體" panose="03000509000000000000" pitchFamily="65" charset="-120"/>
+              </a:rPr>
+              <a:t>）和連續賦值（如</a:t>
+            </a:r>
+            <a:r>
+              <a:rPr lang="en-US" altLang="zh-TW" dirty="0">
+                <a:latin typeface="標楷體" panose="03000509000000000000" pitchFamily="65" charset="-120"/>
+                <a:ea typeface="標楷體" panose="03000509000000000000" pitchFamily="65" charset="-120"/>
+              </a:rPr>
+              <a:t>assign</a:t>
+            </a:r>
+            <a:r>
+              <a:rPr lang="zh-TW" altLang="en-US" dirty="0">
+                <a:latin typeface="標楷體" panose="03000509000000000000" pitchFamily="65" charset="-120"/>
+                <a:ea typeface="標楷體" panose="03000509000000000000" pitchFamily="65" charset="-120"/>
+              </a:rPr>
+              <a:t>）中都被驅動</a:t>
+            </a:r>
+            <a:endParaRPr lang="en-US" altLang="zh-TW" dirty="0">
+              <a:latin typeface="標楷體" panose="03000509000000000000" pitchFamily="65" charset="-120"/>
+              <a:ea typeface="標楷體" panose="03000509000000000000" pitchFamily="65" charset="-120"/>
+            </a:endParaRPr>
+          </a:p>
+          <a:p>
+            <a:r>
+              <a:rPr lang="en-US" altLang="zh-TW" dirty="0">
+                <a:latin typeface="標楷體" panose="03000509000000000000" pitchFamily="65" charset="-120"/>
+                <a:ea typeface="標楷體" panose="03000509000000000000" pitchFamily="65" charset="-120"/>
+              </a:rPr>
+              <a:t>Logic </a:t>
+            </a:r>
+            <a:r>
+              <a:rPr lang="zh-TW" altLang="en-US" dirty="0">
+                <a:latin typeface="標楷體" panose="03000509000000000000" pitchFamily="65" charset="-120"/>
+                <a:ea typeface="標楷體" panose="03000509000000000000" pitchFamily="65" charset="-120"/>
+              </a:rPr>
+              <a:t>不能被使用在多個驅動源（</a:t>
+            </a:r>
+            <a:r>
+              <a:rPr lang="en-US" altLang="zh-TW" dirty="0">
+                <a:latin typeface="標楷體" panose="03000509000000000000" pitchFamily="65" charset="-120"/>
+                <a:ea typeface="標楷體" panose="03000509000000000000" pitchFamily="65" charset="-120"/>
+              </a:rPr>
+              <a:t>drivers</a:t>
+            </a:r>
+            <a:r>
+              <a:rPr lang="zh-TW" altLang="en-US" dirty="0">
+                <a:latin typeface="標楷體" panose="03000509000000000000" pitchFamily="65" charset="-120"/>
+                <a:ea typeface="標楷體" panose="03000509000000000000" pitchFamily="65" charset="-120"/>
+              </a:rPr>
+              <a:t>），</a:t>
+            </a:r>
+            <a:br>
+              <a:rPr lang="en-US" altLang="zh-TW" dirty="0">
+                <a:latin typeface="標楷體" panose="03000509000000000000" pitchFamily="65" charset="-120"/>
+                <a:ea typeface="標楷體" panose="03000509000000000000" pitchFamily="65" charset="-120"/>
+              </a:rPr>
+            </a:br>
+            <a:r>
+              <a:rPr lang="zh-TW" altLang="en-US" dirty="0">
+                <a:latin typeface="標楷體" panose="03000509000000000000" pitchFamily="65" charset="-120"/>
+                <a:ea typeface="標楷體" panose="03000509000000000000" pitchFamily="65" charset="-120"/>
+              </a:rPr>
+              <a:t>需使用</a:t>
+            </a:r>
+            <a:r>
+              <a:rPr lang="zh-TW" altLang="en-US" b="1" dirty="0">
+                <a:latin typeface="標楷體" panose="03000509000000000000" pitchFamily="65" charset="-120"/>
+                <a:ea typeface="標楷體" panose="03000509000000000000" pitchFamily="65" charset="-120"/>
+              </a:rPr>
+              <a:t>網路型別（</a:t>
+            </a:r>
+            <a:r>
+              <a:rPr lang="en-US" altLang="zh-TW" b="1" dirty="0">
+                <a:latin typeface="標楷體" panose="03000509000000000000" pitchFamily="65" charset="-120"/>
+                <a:ea typeface="標楷體" panose="03000509000000000000" pitchFamily="65" charset="-120"/>
+              </a:rPr>
+              <a:t>net-type</a:t>
+            </a:r>
+            <a:r>
+              <a:rPr lang="zh-TW" altLang="en-US" b="1" dirty="0">
+                <a:latin typeface="標楷體" panose="03000509000000000000" pitchFamily="65" charset="-120"/>
+                <a:ea typeface="標楷體" panose="03000509000000000000" pitchFamily="65" charset="-120"/>
+              </a:rPr>
+              <a:t>）</a:t>
+            </a:r>
+            <a:r>
+              <a:rPr lang="zh-TW" altLang="en-US" dirty="0">
+                <a:latin typeface="標楷體" panose="03000509000000000000" pitchFamily="65" charset="-120"/>
+                <a:ea typeface="標楷體" panose="03000509000000000000" pitchFamily="65" charset="-120"/>
+              </a:rPr>
+              <a:t>，例如</a:t>
+            </a:r>
+            <a:r>
+              <a:rPr lang="en-US" altLang="zh-TW" dirty="0">
+                <a:latin typeface="標楷體" panose="03000509000000000000" pitchFamily="65" charset="-120"/>
+                <a:ea typeface="標楷體" panose="03000509000000000000" pitchFamily="65" charset="-120"/>
+              </a:rPr>
+              <a:t>wire</a:t>
+            </a:r>
+            <a:r>
+              <a:rPr lang="zh-TW" altLang="en-US" dirty="0">
+                <a:latin typeface="標楷體" panose="03000509000000000000" pitchFamily="65" charset="-120"/>
+                <a:ea typeface="標楷體" panose="03000509000000000000" pitchFamily="65" charset="-120"/>
+              </a:rPr>
+              <a:t>，來代替。</a:t>
+            </a:r>
+            <a:br>
+              <a:rPr lang="en-US" altLang="zh-TW" dirty="0">
+                <a:latin typeface="標楷體" panose="03000509000000000000" pitchFamily="65" charset="-120"/>
+                <a:ea typeface="標楷體" panose="03000509000000000000" pitchFamily="65" charset="-120"/>
+              </a:rPr>
+            </a:br>
+            <a:r>
+              <a:rPr lang="zh-TW" altLang="en-US" dirty="0">
+                <a:latin typeface="標楷體" panose="03000509000000000000" pitchFamily="65" charset="-120"/>
+                <a:ea typeface="標楷體" panose="03000509000000000000" pitchFamily="65" charset="-120"/>
+              </a:rPr>
+              <a:t>因為</a:t>
+            </a:r>
+            <a:r>
+              <a:rPr lang="en-US" altLang="zh-TW" dirty="0" err="1">
+                <a:latin typeface="標楷體" panose="03000509000000000000" pitchFamily="65" charset="-120"/>
+                <a:ea typeface="標楷體" panose="03000509000000000000" pitchFamily="65" charset="-120"/>
+              </a:rPr>
+              <a:t>SystemVerilog</a:t>
+            </a:r>
+            <a:r>
+              <a:rPr lang="zh-TW" altLang="en-US" dirty="0">
+                <a:latin typeface="標楷體" panose="03000509000000000000" pitchFamily="65" charset="-120"/>
+                <a:ea typeface="標楷體" panose="03000509000000000000" pitchFamily="65" charset="-120"/>
+              </a:rPr>
+              <a:t>需要透過 強度解析（</a:t>
+            </a:r>
+            <a:r>
+              <a:rPr lang="en-US" altLang="zh-TW" dirty="0">
+                <a:latin typeface="標楷體" panose="03000509000000000000" pitchFamily="65" charset="-120"/>
+                <a:ea typeface="標楷體" panose="03000509000000000000" pitchFamily="65" charset="-120"/>
+              </a:rPr>
+              <a:t>strength resolution</a:t>
+            </a:r>
+            <a:r>
+              <a:rPr lang="zh-TW" altLang="en-US" dirty="0">
+                <a:latin typeface="標楷體" panose="03000509000000000000" pitchFamily="65" charset="-120"/>
+                <a:ea typeface="標楷體" panose="03000509000000000000" pitchFamily="65" charset="-120"/>
+              </a:rPr>
+              <a:t>） </a:t>
+            </a:r>
+            <a:br>
+              <a:rPr lang="en-US" altLang="zh-TW" dirty="0">
+                <a:latin typeface="標楷體" panose="03000509000000000000" pitchFamily="65" charset="-120"/>
+                <a:ea typeface="標楷體" panose="03000509000000000000" pitchFamily="65" charset="-120"/>
+              </a:rPr>
+            </a:br>
+            <a:r>
+              <a:rPr lang="zh-TW" altLang="en-US" dirty="0">
+                <a:latin typeface="標楷體" panose="03000509000000000000" pitchFamily="65" charset="-120"/>
+                <a:ea typeface="標楷體" panose="03000509000000000000" pitchFamily="65" charset="-120"/>
+              </a:rPr>
+              <a:t>來決定該信號的最終值</a:t>
+            </a:r>
+          </a:p>
+          <a:p>
+            <a:endParaRPr lang="zh-TW" altLang="en-US" dirty="0">
+              <a:latin typeface="標楷體" panose="03000509000000000000" pitchFamily="65" charset="-120"/>
+              <a:ea typeface="標楷體" panose="03000509000000000000" pitchFamily="65" charset="-120"/>
+            </a:endParaRPr>
+          </a:p>
+          <a:p>
+            <a:endParaRPr lang="zh-TW" altLang="en-US" dirty="0">
+              <a:latin typeface="標楷體" panose="03000509000000000000" pitchFamily="65" charset="-120"/>
+              <a:ea typeface="標楷體" panose="03000509000000000000" pitchFamily="65" charset="-120"/>
+            </a:endParaRPr>
+          </a:p>
+        </p:txBody>
+      </p:sp>
+    </p:spTree>
+    <p:extLst>
+      <p:ext uri="{BB962C8B-B14F-4D97-AF65-F5344CB8AC3E}">
+        <p14:creationId xmlns:p14="http://schemas.microsoft.com/office/powerpoint/2010/main" val="3665396237"/>
+      </p:ext>
+    </p:extLst>
+  </p:cSld>
+  <p:clrMapOvr>
+    <a:masterClrMapping/>
+  </p:clrMapOvr>
+</p:sld>
+</file>
+
+<file path=ppt/slides/slide7.xml><?xml version="1.0" encoding="utf-8"?>
+<p:sld xmlns:a="http://schemas.openxmlformats.org/drawingml/2006/main" xmlns:r="http://schemas.openxmlformats.org/officeDocument/2006/relationships" xmlns:p="http://schemas.openxmlformats.org/presentationml/2006/main">
+  <p:cSld>
+    <p:spTree>
+      <p:nvGrpSpPr>
+        <p:cNvPr id="1" name="">
+          <a:extLst>
+            <a:ext uri="{FF2B5EF4-FFF2-40B4-BE49-F238E27FC236}">
+              <a16:creationId xmlns:a16="http://schemas.microsoft.com/office/drawing/2014/main" id="{1AAEC4A1-7CFB-FD5B-D611-24AC444BCB35}"/>
+            </a:ext>
+          </a:extLst>
+        </p:cNvPr>
+        <p:cNvGrpSpPr/>
+        <p:nvPr/>
+      </p:nvGrpSpPr>
+      <p:grpSpPr>
+        <a:xfrm>
+          <a:off x="0" y="0"/>
+          <a:ext cx="0" cy="0"/>
+          <a:chOff x="0" y="0"/>
+          <a:chExt cx="0" cy="0"/>
+        </a:xfrm>
+      </p:grpSpPr>
+      <p:sp>
+        <p:nvSpPr>
+          <p:cNvPr id="2" name="標題 1">
+            <a:extLst>
+              <a:ext uri="{FF2B5EF4-FFF2-40B4-BE49-F238E27FC236}">
+                <a16:creationId xmlns:a16="http://schemas.microsoft.com/office/drawing/2014/main" id="{18B0F623-E7B5-0D2E-FB2E-FE4F9B1F6465}"/>
+              </a:ext>
+            </a:extLst>
+          </p:cNvPr>
+          <p:cNvSpPr>
+            <a:spLocks noGrp="1"/>
+          </p:cNvSpPr>
+          <p:nvPr>
+            <p:ph type="title"/>
+          </p:nvPr>
+        </p:nvSpPr>
+        <p:spPr/>
+        <p:txBody>
+          <a:bodyPr/>
+          <a:lstStyle/>
+          <a:p>
+            <a:r>
+              <a:rPr lang="en-US" altLang="zh-TW" dirty="0"/>
+              <a:t>Logic (4-State) (2/3)</a:t>
+            </a:r>
+            <a:endParaRPr lang="zh-TW" altLang="en-US" dirty="0"/>
+          </a:p>
+        </p:txBody>
+      </p:sp>
+      <p:sp>
+        <p:nvSpPr>
+          <p:cNvPr id="5" name="內容版面配置區 4">
+            <a:extLst>
+              <a:ext uri="{FF2B5EF4-FFF2-40B4-BE49-F238E27FC236}">
+                <a16:creationId xmlns:a16="http://schemas.microsoft.com/office/drawing/2014/main" id="{412ACE7C-D2FF-810E-F40C-703D967D8267}"/>
+              </a:ext>
+            </a:extLst>
+          </p:cNvPr>
+          <p:cNvSpPr>
+            <a:spLocks noGrp="1"/>
+          </p:cNvSpPr>
+          <p:nvPr>
+            <p:ph idx="1"/>
+          </p:nvPr>
+        </p:nvSpPr>
+        <p:spPr/>
+        <p:txBody>
+          <a:bodyPr/>
+          <a:lstStyle/>
+          <a:p>
+            <a:r>
+              <a:rPr lang="zh-TW" altLang="en-US" dirty="0">
+                <a:latin typeface="標楷體" panose="03000509000000000000" pitchFamily="65" charset="-120"/>
+                <a:ea typeface="標楷體" panose="03000509000000000000" pitchFamily="65" charset="-120"/>
+              </a:rPr>
+              <a:t>連續賦值（如</a:t>
+            </a:r>
+            <a:r>
+              <a:rPr lang="en-US" altLang="zh-TW" dirty="0">
+                <a:latin typeface="標楷體" panose="03000509000000000000" pitchFamily="65" charset="-120"/>
+                <a:ea typeface="標楷體" panose="03000509000000000000" pitchFamily="65" charset="-120"/>
+              </a:rPr>
+              <a:t>assign</a:t>
+            </a:r>
+            <a:r>
+              <a:rPr lang="zh-TW" altLang="en-US" dirty="0">
+                <a:latin typeface="標楷體" panose="03000509000000000000" pitchFamily="65" charset="-120"/>
+                <a:ea typeface="標楷體" panose="03000509000000000000" pitchFamily="65" charset="-120"/>
+              </a:rPr>
+              <a:t>）</a:t>
+            </a:r>
+            <a:endParaRPr lang="en-US" altLang="zh-TW" dirty="0">
+              <a:latin typeface="標楷體" panose="03000509000000000000" pitchFamily="65" charset="-120"/>
+              <a:ea typeface="標楷體" panose="03000509000000000000" pitchFamily="65" charset="-120"/>
+            </a:endParaRPr>
+          </a:p>
+          <a:p>
+            <a:pPr lvl="1"/>
+            <a:r>
+              <a:rPr lang="en-US" altLang="zh-TW" dirty="0" err="1">
+                <a:latin typeface="標楷體" panose="03000509000000000000" pitchFamily="65" charset="-120"/>
+                <a:ea typeface="標楷體" panose="03000509000000000000" pitchFamily="65" charset="-120"/>
+              </a:rPr>
+              <a:t>en</a:t>
+            </a:r>
+            <a:r>
+              <a:rPr lang="en-US" altLang="zh-TW" dirty="0">
+                <a:latin typeface="標楷體" panose="03000509000000000000" pitchFamily="65" charset="-120"/>
+                <a:ea typeface="標楷體" panose="03000509000000000000" pitchFamily="65" charset="-120"/>
+              </a:rPr>
+              <a:t> = 1</a:t>
+            </a:r>
+            <a:r>
+              <a:rPr lang="zh-TW" altLang="en-US" dirty="0">
+                <a:latin typeface="標楷體" panose="03000509000000000000" pitchFamily="65" charset="-120"/>
+                <a:ea typeface="標楷體" panose="03000509000000000000" pitchFamily="65" charset="-120"/>
+              </a:rPr>
+              <a:t>，因為</a:t>
+            </a:r>
+            <a:r>
+              <a:rPr lang="en-US" altLang="zh-TW" dirty="0" err="1">
+                <a:latin typeface="標楷體" panose="03000509000000000000" pitchFamily="65" charset="-120"/>
+                <a:ea typeface="標楷體" panose="03000509000000000000" pitchFamily="65" charset="-120"/>
+              </a:rPr>
+              <a:t>my_data</a:t>
+            </a:r>
+            <a:r>
+              <a:rPr lang="en-US" altLang="zh-TW" dirty="0">
+                <a:latin typeface="標楷體" panose="03000509000000000000" pitchFamily="65" charset="-120"/>
+                <a:ea typeface="標楷體" panose="03000509000000000000" pitchFamily="65" charset="-120"/>
+              </a:rPr>
+              <a:t>[0] = 1</a:t>
+            </a:r>
+          </a:p>
+          <a:p>
+            <a:pPr marL="0" indent="0">
+              <a:buNone/>
+            </a:pPr>
+            <a:endParaRPr lang="zh-TW" altLang="en-US" dirty="0">
+              <a:latin typeface="標楷體" panose="03000509000000000000" pitchFamily="65" charset="-120"/>
+              <a:ea typeface="標楷體" panose="03000509000000000000" pitchFamily="65" charset="-120"/>
+            </a:endParaRPr>
+          </a:p>
+          <a:p>
+            <a:endParaRPr lang="zh-TW" altLang="en-US" dirty="0">
+              <a:latin typeface="標楷體" panose="03000509000000000000" pitchFamily="65" charset="-120"/>
+              <a:ea typeface="標楷體" panose="03000509000000000000" pitchFamily="65" charset="-120"/>
+            </a:endParaRPr>
+          </a:p>
+        </p:txBody>
+      </p:sp>
+      <p:sp>
+        <p:nvSpPr>
+          <p:cNvPr id="4" name="文字方塊 3">
+            <a:extLst>
+              <a:ext uri="{FF2B5EF4-FFF2-40B4-BE49-F238E27FC236}">
+                <a16:creationId xmlns:a16="http://schemas.microsoft.com/office/drawing/2014/main" id="{95B93A86-56F3-8FCB-F7E8-614FFC5C243B}"/>
+              </a:ext>
+            </a:extLst>
+          </p:cNvPr>
+          <p:cNvSpPr txBox="1"/>
+          <p:nvPr/>
+        </p:nvSpPr>
+        <p:spPr>
+          <a:xfrm>
+            <a:off x="1417607" y="3153107"/>
+            <a:ext cx="9356786" cy="3139321"/>
+          </a:xfrm>
+          <a:prstGeom prst="rect">
+            <a:avLst/>
+          </a:prstGeom>
+          <a:noFill/>
+          <a:ln>
+            <a:solidFill>
+              <a:schemeClr val="tx1"/>
+            </a:solidFill>
+          </a:ln>
+        </p:spPr>
+        <p:txBody>
+          <a:bodyPr wrap="square" rtlCol="0">
+            <a:spAutoFit/>
+          </a:bodyPr>
+          <a:lstStyle/>
+          <a:p>
+            <a:r>
+              <a:rPr lang="en-US" altLang="zh-TW" dirty="0"/>
+              <a:t>module tb;</a:t>
+            </a:r>
+          </a:p>
+          <a:p>
+            <a:r>
+              <a:rPr lang="en-US" altLang="zh-TW" dirty="0"/>
+              <a:t>  logic [3:0] </a:t>
+            </a:r>
+            <a:r>
+              <a:rPr lang="en-US" altLang="zh-TW" dirty="0" err="1"/>
+              <a:t>my_data</a:t>
+            </a:r>
+            <a:r>
+              <a:rPr lang="en-US" altLang="zh-TW" dirty="0"/>
+              <a:t>;</a:t>
+            </a:r>
+          </a:p>
+          <a:p>
+            <a:r>
+              <a:rPr lang="en-US" altLang="zh-TW" dirty="0"/>
+              <a:t>  logic </a:t>
+            </a:r>
+            <a:r>
+              <a:rPr lang="en-US" altLang="zh-TW" dirty="0" err="1"/>
+              <a:t>en</a:t>
+            </a:r>
+            <a:r>
+              <a:rPr lang="en-US" altLang="zh-TW" dirty="0"/>
+              <a:t>;</a:t>
+            </a:r>
+          </a:p>
+          <a:p>
+            <a:r>
+              <a:rPr lang="en-US" altLang="zh-TW" dirty="0"/>
+              <a:t>  assign </a:t>
+            </a:r>
+            <a:r>
+              <a:rPr lang="en-US" altLang="zh-TW" dirty="0" err="1"/>
+              <a:t>en</a:t>
+            </a:r>
+            <a:r>
+              <a:rPr lang="en-US" altLang="zh-TW" dirty="0"/>
+              <a:t> = </a:t>
+            </a:r>
+            <a:r>
+              <a:rPr lang="en-US" altLang="zh-TW" dirty="0" err="1"/>
+              <a:t>my_data</a:t>
+            </a:r>
+            <a:r>
+              <a:rPr lang="en-US" altLang="zh-TW" dirty="0"/>
+              <a:t>[0];  // </a:t>
+            </a:r>
+            <a:r>
+              <a:rPr lang="zh-TW" altLang="en-US" dirty="0"/>
+              <a:t>連續賦值給</a:t>
+            </a:r>
+            <a:r>
+              <a:rPr lang="en-US" altLang="zh-TW" dirty="0"/>
+              <a:t>logic</a:t>
+            </a:r>
+            <a:r>
+              <a:rPr lang="zh-TW" altLang="en-US" dirty="0"/>
+              <a:t>型別</a:t>
+            </a:r>
+          </a:p>
+          <a:p>
+            <a:endParaRPr lang="zh-TW" altLang="en-US" dirty="0"/>
+          </a:p>
+          <a:p>
+            <a:r>
+              <a:rPr lang="zh-TW" altLang="en-US" dirty="0"/>
+              <a:t>  </a:t>
+            </a:r>
+            <a:r>
+              <a:rPr lang="en-US" altLang="zh-TW" dirty="0"/>
+              <a:t>initial begin</a:t>
+            </a:r>
+          </a:p>
+          <a:p>
+            <a:r>
+              <a:rPr lang="en-US" altLang="zh-TW" dirty="0"/>
+              <a:t>    </a:t>
+            </a:r>
+            <a:r>
+              <a:rPr lang="en-US" altLang="zh-TW" dirty="0" err="1"/>
+              <a:t>my_data</a:t>
+            </a:r>
+            <a:r>
+              <a:rPr lang="en-US" altLang="zh-TW" dirty="0"/>
+              <a:t> = 4'h3;  // </a:t>
+            </a:r>
+            <a:r>
+              <a:rPr lang="zh-TW" altLang="en-US" dirty="0"/>
+              <a:t>二進位 </a:t>
+            </a:r>
+            <a:r>
+              <a:rPr lang="en-US" altLang="zh-TW" dirty="0"/>
+              <a:t>0011</a:t>
+            </a:r>
+          </a:p>
+          <a:p>
+            <a:r>
+              <a:rPr lang="en-US" altLang="zh-TW" dirty="0"/>
+              <a:t>    #10;</a:t>
+            </a:r>
+          </a:p>
+          <a:p>
+            <a:r>
+              <a:rPr lang="en-US" altLang="zh-TW" dirty="0"/>
+              <a:t>    $display("</a:t>
+            </a:r>
+            <a:r>
+              <a:rPr lang="en-US" altLang="zh-TW" dirty="0" err="1"/>
+              <a:t>en</a:t>
+            </a:r>
+            <a:r>
+              <a:rPr lang="en-US" altLang="zh-TW" dirty="0"/>
+              <a:t> = %b", </a:t>
+            </a:r>
+            <a:r>
+              <a:rPr lang="en-US" altLang="zh-TW" dirty="0" err="1"/>
+              <a:t>en</a:t>
+            </a:r>
+            <a:r>
+              <a:rPr lang="en-US" altLang="zh-TW" dirty="0"/>
+              <a:t>);</a:t>
+            </a:r>
+          </a:p>
+          <a:p>
+            <a:r>
+              <a:rPr lang="en-US" altLang="zh-TW" dirty="0"/>
+              <a:t>  end</a:t>
+            </a:r>
+          </a:p>
+          <a:p>
+            <a:r>
+              <a:rPr lang="en-US" altLang="zh-TW" dirty="0" err="1"/>
+              <a:t>endmodule</a:t>
+            </a:r>
+            <a:endParaRPr lang="zh-TW" altLang="en-US" dirty="0"/>
+          </a:p>
+        </p:txBody>
+      </p:sp>
+    </p:spTree>
+    <p:extLst>
+      <p:ext uri="{BB962C8B-B14F-4D97-AF65-F5344CB8AC3E}">
+        <p14:creationId xmlns:p14="http://schemas.microsoft.com/office/powerpoint/2010/main" val="1555446494"/>
+      </p:ext>
+    </p:extLst>
+  </p:cSld>
+  <p:clrMapOvr>
+    <a:masterClrMapping/>
+  </p:clrMapOvr>
+</p:sld>
+</file>
+
+<file path=ppt/slides/slide8.xml><?xml version="1.0" encoding="utf-8"?>
+<p:sld xmlns:a="http://schemas.openxmlformats.org/drawingml/2006/main" xmlns:r="http://schemas.openxmlformats.org/officeDocument/2006/relationships" xmlns:p="http://schemas.openxmlformats.org/presentationml/2006/main">
+  <p:cSld>
+    <p:spTree>
+      <p:nvGrpSpPr>
+        <p:cNvPr id="1" name="">
+          <a:extLst>
+            <a:ext uri="{FF2B5EF4-FFF2-40B4-BE49-F238E27FC236}">
+              <a16:creationId xmlns:a16="http://schemas.microsoft.com/office/drawing/2014/main" id="{D02C9773-10C2-89F3-B2AF-C1F52AFAA9A0}"/>
+            </a:ext>
+          </a:extLst>
+        </p:cNvPr>
+        <p:cNvGrpSpPr/>
+        <p:nvPr/>
+      </p:nvGrpSpPr>
+      <p:grpSpPr>
+        <a:xfrm>
+          <a:off x="0" y="0"/>
+          <a:ext cx="0" cy="0"/>
+          <a:chOff x="0" y="0"/>
+          <a:chExt cx="0" cy="0"/>
+        </a:xfrm>
+      </p:grpSpPr>
+      <p:sp>
+        <p:nvSpPr>
+          <p:cNvPr id="2" name="標題 1">
+            <a:extLst>
+              <a:ext uri="{FF2B5EF4-FFF2-40B4-BE49-F238E27FC236}">
+                <a16:creationId xmlns:a16="http://schemas.microsoft.com/office/drawing/2014/main" id="{229096EC-5F93-A4A0-CAA4-66F1CF46A990}"/>
+              </a:ext>
+            </a:extLst>
+          </p:cNvPr>
+          <p:cNvSpPr>
+            <a:spLocks noGrp="1"/>
+          </p:cNvSpPr>
+          <p:nvPr>
+            <p:ph type="title"/>
+          </p:nvPr>
+        </p:nvSpPr>
+        <p:spPr/>
+        <p:txBody>
+          <a:bodyPr/>
+          <a:lstStyle/>
+          <a:p>
+            <a:r>
+              <a:rPr lang="en-US" altLang="zh-TW" dirty="0"/>
+              <a:t>Logic (4-State) (3/3)</a:t>
+            </a:r>
+            <a:endParaRPr lang="zh-TW" altLang="en-US" dirty="0"/>
+          </a:p>
+        </p:txBody>
+      </p:sp>
+      <p:sp>
+        <p:nvSpPr>
+          <p:cNvPr id="5" name="內容版面配置區 4">
+            <a:extLst>
+              <a:ext uri="{FF2B5EF4-FFF2-40B4-BE49-F238E27FC236}">
+                <a16:creationId xmlns:a16="http://schemas.microsoft.com/office/drawing/2014/main" id="{D4618CC1-B7C6-9BE3-D940-2FA6E2CC7E6F}"/>
+              </a:ext>
+            </a:extLst>
+          </p:cNvPr>
+          <p:cNvSpPr>
+            <a:spLocks noGrp="1"/>
+          </p:cNvSpPr>
+          <p:nvPr>
+            <p:ph idx="1"/>
+          </p:nvPr>
+        </p:nvSpPr>
+        <p:spPr/>
+        <p:txBody>
+          <a:bodyPr/>
+          <a:lstStyle/>
+          <a:p>
+            <a:r>
+              <a:rPr lang="zh-TW" altLang="en-US" dirty="0">
+                <a:latin typeface="標楷體" panose="03000509000000000000" pitchFamily="65" charset="-120"/>
+                <a:ea typeface="標楷體" panose="03000509000000000000" pitchFamily="65" charset="-120"/>
+              </a:rPr>
+              <a:t>多重驅動 </a:t>
+            </a:r>
+            <a:r>
+              <a:rPr lang="en-US" altLang="zh-TW" dirty="0">
+                <a:latin typeface="標楷體" panose="03000509000000000000" pitchFamily="65" charset="-120"/>
+                <a:ea typeface="標楷體" panose="03000509000000000000" pitchFamily="65" charset="-120"/>
+              </a:rPr>
+              <a:t>(</a:t>
+            </a:r>
+            <a:r>
+              <a:rPr lang="zh-TW" altLang="en-US" dirty="0">
+                <a:latin typeface="標楷體" panose="03000509000000000000" pitchFamily="65" charset="-120"/>
+                <a:ea typeface="標楷體" panose="03000509000000000000" pitchFamily="65" charset="-120"/>
+              </a:rPr>
+              <a:t>使用 </a:t>
+            </a:r>
+            <a:r>
+              <a:rPr lang="en-US" altLang="zh-TW" dirty="0">
+                <a:latin typeface="標楷體" panose="03000509000000000000" pitchFamily="65" charset="-120"/>
+                <a:ea typeface="標楷體" panose="03000509000000000000" pitchFamily="65" charset="-120"/>
+              </a:rPr>
+              <a:t>wire </a:t>
+            </a:r>
+            <a:r>
+              <a:rPr lang="zh-TW" altLang="en-US" dirty="0">
+                <a:latin typeface="標楷體" panose="03000509000000000000" pitchFamily="65" charset="-120"/>
+                <a:ea typeface="標楷體" panose="03000509000000000000" pitchFamily="65" charset="-120"/>
+              </a:rPr>
+              <a:t>示範</a:t>
+            </a:r>
+            <a:r>
+              <a:rPr lang="en-US" altLang="zh-TW" dirty="0">
+                <a:latin typeface="標楷體" panose="03000509000000000000" pitchFamily="65" charset="-120"/>
+                <a:ea typeface="標楷體" panose="03000509000000000000" pitchFamily="65" charset="-120"/>
+              </a:rPr>
+              <a:t>)</a:t>
+            </a:r>
+          </a:p>
+          <a:p>
+            <a:pPr lvl="1"/>
+            <a:r>
+              <a:rPr lang="en-US" altLang="zh-TW" dirty="0">
+                <a:latin typeface="標楷體" panose="03000509000000000000" pitchFamily="65" charset="-120"/>
+                <a:ea typeface="標楷體" panose="03000509000000000000" pitchFamily="65" charset="-120"/>
+              </a:rPr>
+              <a:t>strong</a:t>
+            </a:r>
+            <a:r>
+              <a:rPr lang="zh-TW" altLang="en-US" dirty="0">
+                <a:latin typeface="標楷體" panose="03000509000000000000" pitchFamily="65" charset="-120"/>
+                <a:ea typeface="標楷體" panose="03000509000000000000" pitchFamily="65" charset="-120"/>
+              </a:rPr>
+              <a:t>強度的</a:t>
+            </a:r>
+            <a:r>
+              <a:rPr lang="en-US" altLang="zh-TW" dirty="0">
+                <a:latin typeface="標楷體" panose="03000509000000000000" pitchFamily="65" charset="-120"/>
+                <a:ea typeface="標楷體" panose="03000509000000000000" pitchFamily="65" charset="-120"/>
+              </a:rPr>
+              <a:t>1</a:t>
+            </a:r>
+            <a:r>
+              <a:rPr lang="zh-TW" altLang="en-US" dirty="0">
+                <a:latin typeface="標楷體" panose="03000509000000000000" pitchFamily="65" charset="-120"/>
+                <a:ea typeface="標楷體" panose="03000509000000000000" pitchFamily="65" charset="-120"/>
+              </a:rPr>
+              <a:t>勝過</a:t>
+            </a:r>
+            <a:r>
+              <a:rPr lang="en-US" altLang="zh-TW" dirty="0">
+                <a:latin typeface="標楷體" panose="03000509000000000000" pitchFamily="65" charset="-120"/>
+                <a:ea typeface="標楷體" panose="03000509000000000000" pitchFamily="65" charset="-120"/>
+              </a:rPr>
+              <a:t>weak</a:t>
+            </a:r>
+            <a:r>
+              <a:rPr lang="zh-TW" altLang="en-US" dirty="0">
+                <a:latin typeface="標楷體" panose="03000509000000000000" pitchFamily="65" charset="-120"/>
+                <a:ea typeface="標楷體" panose="03000509000000000000" pitchFamily="65" charset="-120"/>
+              </a:rPr>
+              <a:t>強度的</a:t>
+            </a:r>
+            <a:r>
+              <a:rPr lang="en-US" altLang="zh-TW" dirty="0">
+                <a:latin typeface="標楷體" panose="03000509000000000000" pitchFamily="65" charset="-120"/>
+                <a:ea typeface="標楷體" panose="03000509000000000000" pitchFamily="65" charset="-120"/>
+              </a:rPr>
+              <a:t>0</a:t>
+            </a:r>
+            <a:r>
+              <a:rPr lang="zh-TW" altLang="en-US" dirty="0">
+                <a:latin typeface="標楷體" panose="03000509000000000000" pitchFamily="65" charset="-120"/>
+                <a:ea typeface="標楷體" panose="03000509000000000000" pitchFamily="65" charset="-120"/>
+              </a:rPr>
+              <a:t>，所以</a:t>
+            </a:r>
+            <a:r>
+              <a:rPr lang="en-US" altLang="zh-TW" dirty="0">
+                <a:latin typeface="標楷體" panose="03000509000000000000" pitchFamily="65" charset="-120"/>
+                <a:ea typeface="標楷體" panose="03000509000000000000" pitchFamily="65" charset="-120"/>
+              </a:rPr>
+              <a:t>signal = 1</a:t>
+            </a:r>
+            <a:r>
+              <a:rPr lang="zh-TW" altLang="en-US" dirty="0">
+                <a:latin typeface="標楷體" panose="03000509000000000000" pitchFamily="65" charset="-120"/>
+                <a:ea typeface="標楷體" panose="03000509000000000000" pitchFamily="65" charset="-120"/>
+              </a:rPr>
+              <a:t>。</a:t>
+            </a:r>
+          </a:p>
+          <a:p>
+            <a:endParaRPr lang="zh-TW" altLang="en-US" dirty="0">
+              <a:latin typeface="標楷體" panose="03000509000000000000" pitchFamily="65" charset="-120"/>
+              <a:ea typeface="標楷體" panose="03000509000000000000" pitchFamily="65" charset="-120"/>
+            </a:endParaRPr>
+          </a:p>
+        </p:txBody>
+      </p:sp>
+      <p:sp>
+        <p:nvSpPr>
+          <p:cNvPr id="4" name="文字方塊 3">
+            <a:extLst>
+              <a:ext uri="{FF2B5EF4-FFF2-40B4-BE49-F238E27FC236}">
+                <a16:creationId xmlns:a16="http://schemas.microsoft.com/office/drawing/2014/main" id="{6BDE0A58-EE8F-22F6-AC2D-ED205D58E7CA}"/>
+              </a:ext>
+            </a:extLst>
+          </p:cNvPr>
+          <p:cNvSpPr txBox="1"/>
+          <p:nvPr/>
+        </p:nvSpPr>
+        <p:spPr>
+          <a:xfrm>
+            <a:off x="1417607" y="3343093"/>
+            <a:ext cx="9356786" cy="3139321"/>
+          </a:xfrm>
+          <a:prstGeom prst="rect">
+            <a:avLst/>
+          </a:prstGeom>
+          <a:noFill/>
+          <a:ln>
+            <a:solidFill>
+              <a:schemeClr val="tx1"/>
+            </a:solidFill>
+          </a:ln>
+        </p:spPr>
+        <p:txBody>
+          <a:bodyPr wrap="square" rtlCol="0">
+            <a:spAutoFit/>
+          </a:bodyPr>
+          <a:lstStyle/>
+          <a:p>
+            <a:r>
+              <a:rPr lang="en-US" altLang="zh-TW" dirty="0"/>
+              <a:t>module tb;</a:t>
+            </a:r>
+          </a:p>
+          <a:p>
+            <a:r>
+              <a:rPr lang="en-US" altLang="zh-TW" dirty="0"/>
+              <a:t>  wire signal;</a:t>
+            </a:r>
+          </a:p>
+          <a:p>
+            <a:endParaRPr lang="en-US" altLang="zh-TW" dirty="0"/>
+          </a:p>
+          <a:p>
+            <a:r>
+              <a:rPr lang="en-US" altLang="zh-TW" dirty="0"/>
+              <a:t>  assign (strong1, weak0) signal = 1'b1;  // </a:t>
+            </a:r>
+            <a:r>
+              <a:rPr lang="zh-TW" altLang="en-US" dirty="0"/>
+              <a:t>第一個驅動源，強度為</a:t>
+            </a:r>
+            <a:r>
+              <a:rPr lang="en-US" altLang="zh-TW" dirty="0"/>
+              <a:t>strong</a:t>
+            </a:r>
+          </a:p>
+          <a:p>
+            <a:r>
+              <a:rPr lang="en-US" altLang="zh-TW" dirty="0"/>
+              <a:t>  assign (weak1, weak0) signal = 1'b0;    // </a:t>
+            </a:r>
+            <a:r>
+              <a:rPr lang="zh-TW" altLang="en-US" dirty="0"/>
+              <a:t>第二個驅動源，強度為</a:t>
+            </a:r>
+            <a:r>
+              <a:rPr lang="en-US" altLang="zh-TW" dirty="0"/>
+              <a:t>weak</a:t>
+            </a:r>
+          </a:p>
+          <a:p>
+            <a:endParaRPr lang="en-US" altLang="zh-TW" dirty="0"/>
+          </a:p>
+          <a:p>
+            <a:r>
+              <a:rPr lang="en-US" altLang="zh-TW" dirty="0"/>
+              <a:t>  initial begin</a:t>
+            </a:r>
+          </a:p>
+          <a:p>
+            <a:r>
+              <a:rPr lang="en-US" altLang="zh-TW" dirty="0"/>
+              <a:t>    #10;</a:t>
+            </a:r>
+          </a:p>
+          <a:p>
+            <a:r>
+              <a:rPr lang="en-US" altLang="zh-TW" dirty="0"/>
+              <a:t>    $display("signal = %b", signal);</a:t>
+            </a:r>
+          </a:p>
+          <a:p>
+            <a:r>
+              <a:rPr lang="en-US" altLang="zh-TW" dirty="0"/>
+              <a:t>  end</a:t>
+            </a:r>
+          </a:p>
+          <a:p>
+            <a:r>
+              <a:rPr lang="en-US" altLang="zh-TW" dirty="0" err="1"/>
+              <a:t>endmodule</a:t>
+            </a:r>
+            <a:endParaRPr lang="zh-TW" altLang="en-US" dirty="0"/>
+          </a:p>
+        </p:txBody>
+      </p:sp>
+    </p:spTree>
+    <p:extLst>
+      <p:ext uri="{BB962C8B-B14F-4D97-AF65-F5344CB8AC3E}">
+        <p14:creationId xmlns:p14="http://schemas.microsoft.com/office/powerpoint/2010/main" val="3845596266"/>
+      </p:ext>
+    </p:extLst>
+  </p:cSld>
+  <p:clrMapOvr>
+    <a:masterClrMapping/>
+  </p:clrMapOvr>
+</p:sld>
+</file>
+
+<file path=ppt/slides/slide9.xml><?xml version="1.0" encoding="utf-8"?>
+<p:sld xmlns:a="http://schemas.openxmlformats.org/drawingml/2006/main" xmlns:r="http://schemas.openxmlformats.org/officeDocument/2006/relationships" xmlns:p="http://schemas.openxmlformats.org/presentationml/2006/main">
+  <p:cSld>
+    <p:spTree>
+      <p:nvGrpSpPr>
+        <p:cNvPr id="1" name="">
+          <a:extLst>
+            <a:ext uri="{FF2B5EF4-FFF2-40B4-BE49-F238E27FC236}">
+              <a16:creationId xmlns:a16="http://schemas.microsoft.com/office/drawing/2014/main" id="{75D6E66C-BCB2-B960-32AF-5151FCD863B8}"/>
+            </a:ext>
+          </a:extLst>
+        </p:cNvPr>
+        <p:cNvGrpSpPr/>
+        <p:nvPr/>
+      </p:nvGrpSpPr>
+      <p:grpSpPr>
+        <a:xfrm>
+          <a:off x="0" y="0"/>
+          <a:ext cx="0" cy="0"/>
+          <a:chOff x="0" y="0"/>
+          <a:chExt cx="0" cy="0"/>
+        </a:xfrm>
+      </p:grpSpPr>
+      <p:sp>
+        <p:nvSpPr>
+          <p:cNvPr id="2" name="標題 1">
+            <a:extLst>
+              <a:ext uri="{FF2B5EF4-FFF2-40B4-BE49-F238E27FC236}">
+                <a16:creationId xmlns:a16="http://schemas.microsoft.com/office/drawing/2014/main" id="{0DA30CA9-839F-CBAA-8DD8-CA7B604A9F5B}"/>
+              </a:ext>
+            </a:extLst>
+          </p:cNvPr>
+          <p:cNvSpPr>
+            <a:spLocks noGrp="1"/>
+          </p:cNvSpPr>
+          <p:nvPr>
+            <p:ph type="title"/>
+          </p:nvPr>
+        </p:nvSpPr>
+        <p:spPr/>
+        <p:txBody>
+          <a:bodyPr/>
+          <a:lstStyle/>
+          <a:p>
+            <a:r>
+              <a:rPr lang="en-US" altLang="zh-TW" dirty="0"/>
+              <a:t>Bit, Byte, Int (2-State) (1/2)</a:t>
+            </a:r>
+            <a:endParaRPr lang="zh-TW" altLang="en-US" dirty="0"/>
+          </a:p>
+        </p:txBody>
+      </p:sp>
+      <p:sp>
+        <p:nvSpPr>
+          <p:cNvPr id="5" name="內容版面配置區 4">
+            <a:extLst>
+              <a:ext uri="{FF2B5EF4-FFF2-40B4-BE49-F238E27FC236}">
+                <a16:creationId xmlns:a16="http://schemas.microsoft.com/office/drawing/2014/main" id="{6202915D-7E6F-2213-2D94-88743F4717E3}"/>
+              </a:ext>
+            </a:extLst>
+          </p:cNvPr>
+          <p:cNvSpPr>
+            <a:spLocks noGrp="1"/>
+          </p:cNvSpPr>
+          <p:nvPr>
+            <p:ph idx="1"/>
+          </p:nvPr>
+        </p:nvSpPr>
+        <p:spPr/>
+        <p:txBody>
+          <a:bodyPr/>
+          <a:lstStyle/>
+          <a:p>
+            <a:r>
+              <a:rPr lang="zh-TW" altLang="en-US" dirty="0">
+                <a:latin typeface="標楷體" panose="03000509000000000000" pitchFamily="65" charset="-120"/>
+                <a:ea typeface="標楷體" panose="03000509000000000000" pitchFamily="65" charset="-120"/>
+              </a:rPr>
+              <a:t>它們是一個二狀態型別（</a:t>
+            </a:r>
+            <a:r>
+              <a:rPr lang="en-US" altLang="zh-TW" dirty="0">
+                <a:latin typeface="標楷體" panose="03000509000000000000" pitchFamily="65" charset="-120"/>
+                <a:ea typeface="標楷體" panose="03000509000000000000" pitchFamily="65" charset="-120"/>
+              </a:rPr>
+              <a:t>0</a:t>
+            </a:r>
+            <a:r>
+              <a:rPr lang="zh-TW" altLang="en-US" dirty="0">
+                <a:latin typeface="標楷體" panose="03000509000000000000" pitchFamily="65" charset="-120"/>
+                <a:ea typeface="標楷體" panose="03000509000000000000" pitchFamily="65" charset="-120"/>
+              </a:rPr>
+              <a:t>、</a:t>
+            </a:r>
+            <a:r>
+              <a:rPr lang="en-US" altLang="zh-TW" dirty="0">
+                <a:latin typeface="標楷體" panose="03000509000000000000" pitchFamily="65" charset="-120"/>
+                <a:ea typeface="標楷體" panose="03000509000000000000" pitchFamily="65" charset="-120"/>
+              </a:rPr>
+              <a:t>1</a:t>
+            </a:r>
+            <a:r>
+              <a:rPr lang="zh-TW" altLang="en-US" dirty="0">
+                <a:latin typeface="標楷體" panose="03000509000000000000" pitchFamily="65" charset="-120"/>
+                <a:ea typeface="標楷體" panose="03000509000000000000" pitchFamily="65" charset="-120"/>
+              </a:rPr>
+              <a:t>）</a:t>
+            </a:r>
+            <a:endParaRPr lang="en-US" altLang="zh-TW" dirty="0">
+              <a:latin typeface="標楷體" panose="03000509000000000000" pitchFamily="65" charset="-120"/>
+              <a:ea typeface="標楷體" panose="03000509000000000000" pitchFamily="65" charset="-120"/>
+            </a:endParaRPr>
+          </a:p>
+          <a:p>
+            <a:r>
+              <a:rPr lang="zh-TW" altLang="en-US" dirty="0">
+                <a:latin typeface="標楷體" panose="03000509000000000000" pitchFamily="65" charset="-120"/>
+                <a:ea typeface="標楷體" panose="03000509000000000000" pitchFamily="65" charset="-120"/>
+              </a:rPr>
+              <a:t>它們減少了模擬期間的記憶體使用量，因為每個位元只需要一位存儲</a:t>
+            </a:r>
+            <a:endParaRPr lang="en-US" altLang="zh-TW" dirty="0">
+              <a:latin typeface="標楷體" panose="03000509000000000000" pitchFamily="65" charset="-120"/>
+              <a:ea typeface="標楷體" panose="03000509000000000000" pitchFamily="65" charset="-120"/>
+            </a:endParaRPr>
+          </a:p>
+          <a:p>
+            <a:r>
+              <a:rPr lang="zh-TW" altLang="en-US" dirty="0">
+                <a:latin typeface="標楷體" panose="03000509000000000000" pitchFamily="65" charset="-120"/>
+                <a:ea typeface="標楷體" panose="03000509000000000000" pitchFamily="65" charset="-120"/>
+              </a:rPr>
+              <a:t>由於記憶體開銷較低且處理狀態的複雜性降低，</a:t>
+            </a:r>
+            <a:br>
+              <a:rPr lang="en-US" altLang="zh-TW" dirty="0">
+                <a:latin typeface="標楷體" panose="03000509000000000000" pitchFamily="65" charset="-120"/>
+                <a:ea typeface="標楷體" panose="03000509000000000000" pitchFamily="65" charset="-120"/>
+              </a:rPr>
+            </a:br>
+            <a:r>
+              <a:rPr lang="zh-TW" altLang="en-US" dirty="0">
+                <a:latin typeface="標楷體" panose="03000509000000000000" pitchFamily="65" charset="-120"/>
+                <a:ea typeface="標楷體" panose="03000509000000000000" pitchFamily="65" charset="-120"/>
+              </a:rPr>
+              <a:t>因此模擬效能更快。</a:t>
+            </a:r>
+            <a:endParaRPr lang="en-US" altLang="zh-TW" dirty="0">
+              <a:latin typeface="標楷體" panose="03000509000000000000" pitchFamily="65" charset="-120"/>
+              <a:ea typeface="標楷體" panose="03000509000000000000" pitchFamily="65" charset="-120"/>
+            </a:endParaRPr>
+          </a:p>
+          <a:p>
+            <a:endParaRPr lang="zh-TW" altLang="en-US" dirty="0">
+              <a:latin typeface="標楷體" panose="03000509000000000000" pitchFamily="65" charset="-120"/>
+              <a:ea typeface="標楷體" panose="03000509000000000000" pitchFamily="65" charset="-120"/>
+            </a:endParaRPr>
+          </a:p>
+          <a:p>
+            <a:endParaRPr lang="zh-TW" altLang="en-US" dirty="0">
+              <a:latin typeface="標楷體" panose="03000509000000000000" pitchFamily="65" charset="-120"/>
+              <a:ea typeface="標楷體" panose="03000509000000000000" pitchFamily="65" charset="-120"/>
+            </a:endParaRPr>
+          </a:p>
+        </p:txBody>
+      </p:sp>
+      <p:pic>
+        <p:nvPicPr>
+          <p:cNvPr id="6" name="圖片 5">
+            <a:extLst>
+              <a:ext uri="{FF2B5EF4-FFF2-40B4-BE49-F238E27FC236}">
+                <a16:creationId xmlns:a16="http://schemas.microsoft.com/office/drawing/2014/main" id="{BE5289B9-B78F-0389-A768-41882C7D4626}"/>
+              </a:ext>
+            </a:extLst>
+          </p:cNvPr>
+          <p:cNvPicPr>
+            <a:picLocks noChangeAspect="1"/>
+          </p:cNvPicPr>
+          <p:nvPr/>
+        </p:nvPicPr>
+        <p:blipFill>
+          <a:blip r:embed="rId2"/>
+          <a:stretch>
+            <a:fillRect/>
+          </a:stretch>
+        </p:blipFill>
+        <p:spPr>
+          <a:xfrm>
+            <a:off x="4839223" y="3806716"/>
+            <a:ext cx="6665735" cy="2920504"/>
+          </a:xfrm>
+          <a:prstGeom prst="rect">
+            <a:avLst/>
+          </a:prstGeom>
+          <a:ln>
+            <a:solidFill>
+              <a:schemeClr val="tx1"/>
+            </a:solidFill>
+          </a:ln>
+        </p:spPr>
+      </p:pic>
+    </p:spTree>
+    <p:extLst>
+      <p:ext uri="{BB962C8B-B14F-4D97-AF65-F5344CB8AC3E}">
+        <p14:creationId xmlns:p14="http://schemas.microsoft.com/office/powerpoint/2010/main" val="968109933"/>
       </p:ext>
     </p:extLst>
   </p:cSld>

</xml_diff>

<commit_message>
Modify: SystemVerilog_語法學習.pptx 1. add constraint slide
</commit_message>
<xml_diff>
--- a/systemverilog/SystemVerilog_語法學習.pptx
+++ b/systemverilog/SystemVerilog_語法學習.pptx
@@ -5,7 +5,7 @@
     <p:sldMasterId id="2147483648" r:id="rId1"/>
   </p:sldMasterIdLst>
   <p:notesMasterIdLst>
-    <p:notesMasterId r:id="rId49"/>
+    <p:notesMasterId r:id="rId52"/>
   </p:notesMasterIdLst>
   <p:sldIdLst>
     <p:sldId id="256" r:id="rId2"/>
@@ -55,6 +55,9 @@
     <p:sldId id="311" r:id="rId46"/>
     <p:sldId id="312" r:id="rId47"/>
     <p:sldId id="313" r:id="rId48"/>
+    <p:sldId id="314" r:id="rId49"/>
+    <p:sldId id="315" r:id="rId50"/>
+    <p:sldId id="316" r:id="rId51"/>
   </p:sldIdLst>
   <p:sldSz cx="12192000" cy="6858000"/>
   <p:notesSz cx="6858000" cy="9144000"/>
@@ -243,7 +246,7 @@
           <a:p>
             <a:fld id="{28C483A5-4075-4A6E-B921-74BFA7B8EF67}" type="datetimeFigureOut">
               <a:rPr lang="zh-TW" altLang="en-US" smtClean="0"/>
-              <a:t>2025/5/11</a:t>
+              <a:t>2025/6/24</a:t>
             </a:fld>
             <a:endParaRPr lang="zh-TW" altLang="en-US"/>
           </a:p>
@@ -825,7 +828,7 @@
           <a:p>
             <a:fld id="{2365240E-6CA3-4772-8803-719FF1315E51}" type="datetimeFigureOut">
               <a:rPr lang="zh-TW" altLang="en-US" smtClean="0"/>
-              <a:t>2025/5/11</a:t>
+              <a:t>2025/6/24</a:t>
             </a:fld>
             <a:endParaRPr lang="zh-TW" altLang="en-US"/>
           </a:p>
@@ -1023,7 +1026,7 @@
           <a:p>
             <a:fld id="{2365240E-6CA3-4772-8803-719FF1315E51}" type="datetimeFigureOut">
               <a:rPr lang="zh-TW" altLang="en-US" smtClean="0"/>
-              <a:t>2025/5/11</a:t>
+              <a:t>2025/6/24</a:t>
             </a:fld>
             <a:endParaRPr lang="zh-TW" altLang="en-US"/>
           </a:p>
@@ -1231,7 +1234,7 @@
           <a:p>
             <a:fld id="{2365240E-6CA3-4772-8803-719FF1315E51}" type="datetimeFigureOut">
               <a:rPr lang="zh-TW" altLang="en-US" smtClean="0"/>
-              <a:t>2025/5/11</a:t>
+              <a:t>2025/6/24</a:t>
             </a:fld>
             <a:endParaRPr lang="zh-TW" altLang="en-US"/>
           </a:p>
@@ -1429,7 +1432,7 @@
           <a:p>
             <a:fld id="{2365240E-6CA3-4772-8803-719FF1315E51}" type="datetimeFigureOut">
               <a:rPr lang="zh-TW" altLang="en-US" smtClean="0"/>
-              <a:t>2025/5/11</a:t>
+              <a:t>2025/6/24</a:t>
             </a:fld>
             <a:endParaRPr lang="zh-TW" altLang="en-US"/>
           </a:p>
@@ -1704,7 +1707,7 @@
           <a:p>
             <a:fld id="{2365240E-6CA3-4772-8803-719FF1315E51}" type="datetimeFigureOut">
               <a:rPr lang="zh-TW" altLang="en-US" smtClean="0"/>
-              <a:t>2025/5/11</a:t>
+              <a:t>2025/6/24</a:t>
             </a:fld>
             <a:endParaRPr lang="zh-TW" altLang="en-US"/>
           </a:p>
@@ -1969,7 +1972,7 @@
           <a:p>
             <a:fld id="{2365240E-6CA3-4772-8803-719FF1315E51}" type="datetimeFigureOut">
               <a:rPr lang="zh-TW" altLang="en-US" smtClean="0"/>
-              <a:t>2025/5/11</a:t>
+              <a:t>2025/6/24</a:t>
             </a:fld>
             <a:endParaRPr lang="zh-TW" altLang="en-US"/>
           </a:p>
@@ -2381,7 +2384,7 @@
           <a:p>
             <a:fld id="{2365240E-6CA3-4772-8803-719FF1315E51}" type="datetimeFigureOut">
               <a:rPr lang="zh-TW" altLang="en-US" smtClean="0"/>
-              <a:t>2025/5/11</a:t>
+              <a:t>2025/6/24</a:t>
             </a:fld>
             <a:endParaRPr lang="zh-TW" altLang="en-US"/>
           </a:p>
@@ -2522,7 +2525,7 @@
           <a:p>
             <a:fld id="{2365240E-6CA3-4772-8803-719FF1315E51}" type="datetimeFigureOut">
               <a:rPr lang="zh-TW" altLang="en-US" smtClean="0"/>
-              <a:t>2025/5/11</a:t>
+              <a:t>2025/6/24</a:t>
             </a:fld>
             <a:endParaRPr lang="zh-TW" altLang="en-US"/>
           </a:p>
@@ -2635,7 +2638,7 @@
           <a:p>
             <a:fld id="{2365240E-6CA3-4772-8803-719FF1315E51}" type="datetimeFigureOut">
               <a:rPr lang="zh-TW" altLang="en-US" smtClean="0"/>
-              <a:t>2025/5/11</a:t>
+              <a:t>2025/6/24</a:t>
             </a:fld>
             <a:endParaRPr lang="zh-TW" altLang="en-US"/>
           </a:p>
@@ -2946,7 +2949,7 @@
           <a:p>
             <a:fld id="{2365240E-6CA3-4772-8803-719FF1315E51}" type="datetimeFigureOut">
               <a:rPr lang="zh-TW" altLang="en-US" smtClean="0"/>
-              <a:t>2025/5/11</a:t>
+              <a:t>2025/6/24</a:t>
             </a:fld>
             <a:endParaRPr lang="zh-TW" altLang="en-US"/>
           </a:p>
@@ -3234,7 +3237,7 @@
           <a:p>
             <a:fld id="{2365240E-6CA3-4772-8803-719FF1315E51}" type="datetimeFigureOut">
               <a:rPr lang="zh-TW" altLang="en-US" smtClean="0"/>
-              <a:t>2025/5/11</a:t>
+              <a:t>2025/6/24</a:t>
             </a:fld>
             <a:endParaRPr lang="zh-TW" altLang="en-US"/>
           </a:p>
@@ -3475,7 +3478,7 @@
           <a:p>
             <a:fld id="{2365240E-6CA3-4772-8803-719FF1315E51}" type="datetimeFigureOut">
               <a:rPr lang="zh-TW" altLang="en-US" smtClean="0"/>
-              <a:t>2025/5/11</a:t>
+              <a:t>2025/6/24</a:t>
             </a:fld>
             <a:endParaRPr lang="zh-TW" altLang="en-US"/>
           </a:p>
@@ -15018,6 +15021,868 @@
 </p:sld>
 </file>
 
+<file path=ppt/slides/slide48.xml><?xml version="1.0" encoding="utf-8"?>
+<p:sld xmlns:a="http://schemas.openxmlformats.org/drawingml/2006/main" xmlns:r="http://schemas.openxmlformats.org/officeDocument/2006/relationships" xmlns:p="http://schemas.openxmlformats.org/presentationml/2006/main">
+  <p:cSld>
+    <p:spTree>
+      <p:nvGrpSpPr>
+        <p:cNvPr id="1" name="">
+          <a:extLst>
+            <a:ext uri="{FF2B5EF4-FFF2-40B4-BE49-F238E27FC236}">
+              <a16:creationId xmlns:a16="http://schemas.microsoft.com/office/drawing/2014/main" id="{39EAD1EA-8AE5-90F3-3B27-77AC74C7104B}"/>
+            </a:ext>
+          </a:extLst>
+        </p:cNvPr>
+        <p:cNvGrpSpPr/>
+        <p:nvPr/>
+      </p:nvGrpSpPr>
+      <p:grpSpPr>
+        <a:xfrm>
+          <a:off x="0" y="0"/>
+          <a:ext cx="0" cy="0"/>
+          <a:chOff x="0" y="0"/>
+          <a:chExt cx="0" cy="0"/>
+        </a:xfrm>
+      </p:grpSpPr>
+      <p:sp>
+        <p:nvSpPr>
+          <p:cNvPr id="2" name="標題 1">
+            <a:extLst>
+              <a:ext uri="{FF2B5EF4-FFF2-40B4-BE49-F238E27FC236}">
+                <a16:creationId xmlns:a16="http://schemas.microsoft.com/office/drawing/2014/main" id="{D27D56AD-70CF-8CB7-4B07-C3163A255461}"/>
+              </a:ext>
+            </a:extLst>
+          </p:cNvPr>
+          <p:cNvSpPr>
+            <a:spLocks noGrp="1"/>
+          </p:cNvSpPr>
+          <p:nvPr>
+            <p:ph type="title"/>
+          </p:nvPr>
+        </p:nvSpPr>
+        <p:spPr/>
+        <p:txBody>
+          <a:bodyPr/>
+          <a:lstStyle/>
+          <a:p>
+            <a:r>
+              <a:rPr lang="en-US" altLang="zh-TW" dirty="0"/>
+              <a:t>Random </a:t>
+            </a:r>
+            <a:r>
+              <a:rPr lang="zh-TW" altLang="en-US" dirty="0"/>
+              <a:t>變數</a:t>
+            </a:r>
+            <a:r>
+              <a:rPr lang="en-US" altLang="zh-TW" dirty="0"/>
+              <a:t> (1/1)</a:t>
+            </a:r>
+            <a:endParaRPr lang="zh-TW" altLang="en-US" dirty="0"/>
+          </a:p>
+        </p:txBody>
+      </p:sp>
+      <p:sp>
+        <p:nvSpPr>
+          <p:cNvPr id="4" name="內容版面配置區 3">
+            <a:extLst>
+              <a:ext uri="{FF2B5EF4-FFF2-40B4-BE49-F238E27FC236}">
+                <a16:creationId xmlns:a16="http://schemas.microsoft.com/office/drawing/2014/main" id="{32BAA5C9-2123-1122-A60A-E5ED360D673F}"/>
+              </a:ext>
+            </a:extLst>
+          </p:cNvPr>
+          <p:cNvSpPr>
+            <a:spLocks noGrp="1"/>
+          </p:cNvSpPr>
+          <p:nvPr>
+            <p:ph idx="1"/>
+          </p:nvPr>
+        </p:nvSpPr>
+        <p:spPr/>
+        <p:txBody>
+          <a:bodyPr/>
+          <a:lstStyle/>
+          <a:p>
+            <a:r>
+              <a:rPr lang="en-US" altLang="zh-TW" dirty="0"/>
+              <a:t>rand</a:t>
+            </a:r>
+          </a:p>
+          <a:p>
+            <a:pPr lvl="1"/>
+            <a:r>
+              <a:rPr lang="zh-TW" altLang="en-US" dirty="0"/>
+              <a:t>會隨機產生數值</a:t>
+            </a:r>
+            <a:endParaRPr lang="en-US" altLang="zh-TW" dirty="0"/>
+          </a:p>
+          <a:p>
+            <a:r>
+              <a:rPr lang="en-US" altLang="zh-TW" dirty="0" err="1"/>
+              <a:t>randc</a:t>
+            </a:r>
+            <a:endParaRPr lang="en-US" altLang="zh-TW" dirty="0"/>
+          </a:p>
+          <a:p>
+            <a:pPr lvl="1"/>
+            <a:r>
+              <a:rPr lang="zh-TW" altLang="en-US" dirty="0"/>
+              <a:t>會隨機產生數值，且在一週期內數值不重複，等所有可能都出現過後，才會結束週期</a:t>
+            </a:r>
+          </a:p>
+          <a:p>
+            <a:pPr lvl="1"/>
+            <a:endParaRPr lang="en-US" altLang="zh-TW" dirty="0"/>
+          </a:p>
+          <a:p>
+            <a:endParaRPr lang="zh-TW" altLang="en-US" dirty="0"/>
+          </a:p>
+        </p:txBody>
+      </p:sp>
+      <p:sp>
+        <p:nvSpPr>
+          <p:cNvPr id="6" name="文字方塊 5">
+            <a:extLst>
+              <a:ext uri="{FF2B5EF4-FFF2-40B4-BE49-F238E27FC236}">
+                <a16:creationId xmlns:a16="http://schemas.microsoft.com/office/drawing/2014/main" id="{34A80880-3F68-8AB9-8475-219E40A0907A}"/>
+              </a:ext>
+            </a:extLst>
+          </p:cNvPr>
+          <p:cNvSpPr txBox="1"/>
+          <p:nvPr/>
+        </p:nvSpPr>
+        <p:spPr>
+          <a:xfrm>
+            <a:off x="3921629" y="3738963"/>
+            <a:ext cx="4231771" cy="2893100"/>
+          </a:xfrm>
+          <a:prstGeom prst="rect">
+            <a:avLst/>
+          </a:prstGeom>
+          <a:noFill/>
+          <a:ln>
+            <a:solidFill>
+              <a:schemeClr val="tx1"/>
+            </a:solidFill>
+          </a:ln>
+        </p:spPr>
+        <p:txBody>
+          <a:bodyPr wrap="square" rtlCol="0">
+            <a:spAutoFit/>
+          </a:bodyPr>
+          <a:lstStyle/>
+          <a:p>
+            <a:r>
+              <a:rPr lang="en-US" altLang="zh-TW" sz="1400" dirty="0"/>
+              <a:t>class Packet;</a:t>
+            </a:r>
+          </a:p>
+          <a:p>
+            <a:r>
+              <a:rPr lang="en-US" altLang="zh-TW" sz="1400" dirty="0"/>
+              <a:t>    </a:t>
+            </a:r>
+            <a:r>
+              <a:rPr lang="en-US" altLang="zh-TW" sz="1400" dirty="0" err="1">
+                <a:solidFill>
+                  <a:srgbClr val="FF0000"/>
+                </a:solidFill>
+              </a:rPr>
+              <a:t>randc</a:t>
+            </a:r>
+            <a:r>
+              <a:rPr lang="en-US" altLang="zh-TW" sz="1400" dirty="0"/>
+              <a:t> bit [2:0] data;</a:t>
+            </a:r>
+          </a:p>
+          <a:p>
+            <a:r>
+              <a:rPr lang="en-US" altLang="zh-TW" sz="1400" dirty="0" err="1"/>
+              <a:t>endclass</a:t>
+            </a:r>
+            <a:endParaRPr lang="en-US" altLang="zh-TW" sz="1400" dirty="0"/>
+          </a:p>
+          <a:p>
+            <a:br>
+              <a:rPr lang="en-US" altLang="zh-TW" sz="1400" dirty="0"/>
+            </a:br>
+            <a:r>
+              <a:rPr lang="en-US" altLang="zh-TW" sz="1400" dirty="0"/>
+              <a:t>module tb;</a:t>
+            </a:r>
+          </a:p>
+          <a:p>
+            <a:r>
+              <a:rPr lang="en-US" altLang="zh-TW" sz="1400" dirty="0"/>
+              <a:t>    initial begin</a:t>
+            </a:r>
+          </a:p>
+          <a:p>
+            <a:r>
+              <a:rPr lang="en-US" altLang="zh-TW" sz="1400" dirty="0"/>
+              <a:t>        Packet pkt = new ();</a:t>
+            </a:r>
+          </a:p>
+          <a:p>
+            <a:r>
+              <a:rPr lang="en-US" altLang="zh-TW" sz="1400" dirty="0"/>
+              <a:t>        for (int </a:t>
+            </a:r>
+            <a:r>
+              <a:rPr lang="en-US" altLang="zh-TW" sz="1400" dirty="0" err="1"/>
+              <a:t>i</a:t>
+            </a:r>
+            <a:r>
+              <a:rPr lang="en-US" altLang="zh-TW" sz="1400" dirty="0"/>
+              <a:t> = 0 ; </a:t>
+            </a:r>
+            <a:r>
+              <a:rPr lang="en-US" altLang="zh-TW" sz="1400" dirty="0" err="1"/>
+              <a:t>i</a:t>
+            </a:r>
+            <a:r>
+              <a:rPr lang="en-US" altLang="zh-TW" sz="1400" dirty="0"/>
+              <a:t> &lt; 10; </a:t>
+            </a:r>
+            <a:r>
+              <a:rPr lang="en-US" altLang="zh-TW" sz="1400" dirty="0" err="1"/>
+              <a:t>i</a:t>
+            </a:r>
+            <a:r>
+              <a:rPr lang="en-US" altLang="zh-TW" sz="1400" dirty="0"/>
+              <a:t>++) begin</a:t>
+            </a:r>
+          </a:p>
+          <a:p>
+            <a:r>
+              <a:rPr lang="en-US" altLang="zh-TW" sz="1400" dirty="0"/>
+              <a:t>            </a:t>
+            </a:r>
+            <a:r>
+              <a:rPr lang="en-US" altLang="zh-TW" sz="1400" dirty="0" err="1"/>
+              <a:t>pkt.randomize</a:t>
+            </a:r>
+            <a:r>
+              <a:rPr lang="en-US" altLang="zh-TW" sz="1400" dirty="0"/>
+              <a:t> ();</a:t>
+            </a:r>
+          </a:p>
+          <a:p>
+            <a:r>
+              <a:rPr lang="en-US" altLang="zh-TW" sz="1400" dirty="0"/>
+              <a:t>            $display ("</a:t>
+            </a:r>
+            <a:r>
+              <a:rPr lang="en-US" altLang="zh-TW" sz="1400" dirty="0" err="1"/>
+              <a:t>itr</a:t>
+            </a:r>
+            <a:r>
+              <a:rPr lang="en-US" altLang="zh-TW" sz="1400" dirty="0"/>
+              <a:t>=%0d data=0x%0h", </a:t>
+            </a:r>
+            <a:r>
+              <a:rPr lang="en-US" altLang="zh-TW" sz="1400" dirty="0" err="1"/>
+              <a:t>i</a:t>
+            </a:r>
+            <a:r>
+              <a:rPr lang="en-US" altLang="zh-TW" sz="1400" dirty="0"/>
+              <a:t>, </a:t>
+            </a:r>
+            <a:r>
+              <a:rPr lang="en-US" altLang="zh-TW" sz="1400" dirty="0" err="1"/>
+              <a:t>pkt.data</a:t>
+            </a:r>
+            <a:r>
+              <a:rPr lang="en-US" altLang="zh-TW" sz="1400" dirty="0"/>
+              <a:t>);</a:t>
+            </a:r>
+          </a:p>
+          <a:p>
+            <a:r>
+              <a:rPr lang="en-US" altLang="zh-TW" sz="1400" dirty="0"/>
+              <a:t>        end</a:t>
+            </a:r>
+          </a:p>
+          <a:p>
+            <a:r>
+              <a:rPr lang="en-US" altLang="zh-TW" sz="1400" dirty="0"/>
+              <a:t>    end</a:t>
+            </a:r>
+          </a:p>
+          <a:p>
+            <a:r>
+              <a:rPr lang="en-US" altLang="zh-TW" sz="1400" dirty="0" err="1"/>
+              <a:t>endmodule</a:t>
+            </a:r>
+            <a:endParaRPr lang="en-US" altLang="zh-TW" sz="1400" dirty="0"/>
+          </a:p>
+        </p:txBody>
+      </p:sp>
+      <p:sp>
+        <p:nvSpPr>
+          <p:cNvPr id="8" name="矩形 7">
+            <a:extLst>
+              <a:ext uri="{FF2B5EF4-FFF2-40B4-BE49-F238E27FC236}">
+                <a16:creationId xmlns:a16="http://schemas.microsoft.com/office/drawing/2014/main" id="{8BE1707C-A417-75A8-1EBD-77A217C9912B}"/>
+              </a:ext>
+            </a:extLst>
+          </p:cNvPr>
+          <p:cNvSpPr/>
+          <p:nvPr/>
+        </p:nvSpPr>
+        <p:spPr>
+          <a:xfrm>
+            <a:off x="8338457" y="3738963"/>
+            <a:ext cx="2541814" cy="2893100"/>
+          </a:xfrm>
+          <a:prstGeom prst="rect">
+            <a:avLst/>
+          </a:prstGeom>
+          <a:noFill/>
+          <a:ln w="12700">
+            <a:solidFill>
+              <a:schemeClr val="tx1"/>
+            </a:solidFill>
+          </a:ln>
+        </p:spPr>
+        <p:style>
+          <a:lnRef idx="2">
+            <a:schemeClr val="accent1">
+              <a:shade val="15000"/>
+            </a:schemeClr>
+          </a:lnRef>
+          <a:fillRef idx="1">
+            <a:schemeClr val="accent1"/>
+          </a:fillRef>
+          <a:effectRef idx="0">
+            <a:schemeClr val="accent1"/>
+          </a:effectRef>
+          <a:fontRef idx="minor">
+            <a:schemeClr val="lt1"/>
+          </a:fontRef>
+        </p:style>
+        <p:txBody>
+          <a:bodyPr rtlCol="0" anchor="ctr"/>
+          <a:lstStyle/>
+          <a:p>
+            <a:endParaRPr lang="en-US" altLang="zh-TW" sz="1400" dirty="0">
+              <a:solidFill>
+                <a:schemeClr val="tx1"/>
+              </a:solidFill>
+            </a:endParaRPr>
+          </a:p>
+          <a:p>
+            <a:r>
+              <a:rPr lang="en-US" altLang="zh-TW" sz="1400" dirty="0">
+                <a:solidFill>
+                  <a:schemeClr val="tx1"/>
+                </a:solidFill>
+              </a:rPr>
+              <a:t>// </a:t>
+            </a:r>
+            <a:r>
+              <a:rPr lang="zh-TW" altLang="en-US" sz="1400" dirty="0">
+                <a:solidFill>
+                  <a:schemeClr val="tx1"/>
+                </a:solidFill>
+              </a:rPr>
+              <a:t>執行結果</a:t>
+            </a:r>
+            <a:endParaRPr lang="en-US" altLang="zh-TW" sz="1400" dirty="0">
+              <a:solidFill>
+                <a:schemeClr val="tx1"/>
+              </a:solidFill>
+            </a:endParaRPr>
+          </a:p>
+          <a:p>
+            <a:r>
+              <a:rPr lang="en-US" altLang="zh-TW" sz="1400" dirty="0" err="1">
+                <a:solidFill>
+                  <a:schemeClr val="tx1"/>
+                </a:solidFill>
+              </a:rPr>
+              <a:t>itr</a:t>
+            </a:r>
+            <a:r>
+              <a:rPr lang="en-US" altLang="zh-TW" sz="1400" dirty="0">
+                <a:solidFill>
+                  <a:schemeClr val="tx1"/>
+                </a:solidFill>
+              </a:rPr>
+              <a:t>=0 data=0x6</a:t>
+            </a:r>
+          </a:p>
+          <a:p>
+            <a:r>
+              <a:rPr lang="en-US" altLang="zh-TW" sz="1400" dirty="0" err="1">
+                <a:solidFill>
+                  <a:schemeClr val="tx1"/>
+                </a:solidFill>
+              </a:rPr>
+              <a:t>itr</a:t>
+            </a:r>
+            <a:r>
+              <a:rPr lang="en-US" altLang="zh-TW" sz="1400" dirty="0">
+                <a:solidFill>
+                  <a:schemeClr val="tx1"/>
+                </a:solidFill>
+              </a:rPr>
+              <a:t>=1 data=0x3</a:t>
+            </a:r>
+          </a:p>
+          <a:p>
+            <a:r>
+              <a:rPr lang="en-US" altLang="zh-TW" sz="1400" dirty="0" err="1">
+                <a:solidFill>
+                  <a:schemeClr val="tx1"/>
+                </a:solidFill>
+              </a:rPr>
+              <a:t>itr</a:t>
+            </a:r>
+            <a:r>
+              <a:rPr lang="en-US" altLang="zh-TW" sz="1400" dirty="0">
+                <a:solidFill>
+                  <a:schemeClr val="tx1"/>
+                </a:solidFill>
+              </a:rPr>
+              <a:t>=2 data=0x4</a:t>
+            </a:r>
+          </a:p>
+          <a:p>
+            <a:r>
+              <a:rPr lang="en-US" altLang="zh-TW" sz="1400" dirty="0" err="1">
+                <a:solidFill>
+                  <a:schemeClr val="tx1"/>
+                </a:solidFill>
+              </a:rPr>
+              <a:t>itr</a:t>
+            </a:r>
+            <a:r>
+              <a:rPr lang="en-US" altLang="zh-TW" sz="1400" dirty="0">
+                <a:solidFill>
+                  <a:schemeClr val="tx1"/>
+                </a:solidFill>
+              </a:rPr>
+              <a:t>=3 data=0x7</a:t>
+            </a:r>
+          </a:p>
+          <a:p>
+            <a:r>
+              <a:rPr lang="en-US" altLang="zh-TW" sz="1400" dirty="0" err="1">
+                <a:solidFill>
+                  <a:schemeClr val="tx1"/>
+                </a:solidFill>
+              </a:rPr>
+              <a:t>itr</a:t>
+            </a:r>
+            <a:r>
+              <a:rPr lang="en-US" altLang="zh-TW" sz="1400" dirty="0">
+                <a:solidFill>
+                  <a:schemeClr val="tx1"/>
+                </a:solidFill>
+              </a:rPr>
+              <a:t>=4 data=0x0</a:t>
+            </a:r>
+          </a:p>
+          <a:p>
+            <a:r>
+              <a:rPr lang="en-US" altLang="zh-TW" sz="1400" dirty="0" err="1">
+                <a:solidFill>
+                  <a:schemeClr val="tx1"/>
+                </a:solidFill>
+              </a:rPr>
+              <a:t>itr</a:t>
+            </a:r>
+            <a:r>
+              <a:rPr lang="en-US" altLang="zh-TW" sz="1400" dirty="0">
+                <a:solidFill>
+                  <a:schemeClr val="tx1"/>
+                </a:solidFill>
+              </a:rPr>
+              <a:t>=5 data=0x1</a:t>
+            </a:r>
+          </a:p>
+          <a:p>
+            <a:r>
+              <a:rPr lang="en-US" altLang="zh-TW" sz="1400" dirty="0" err="1">
+                <a:solidFill>
+                  <a:schemeClr val="tx1"/>
+                </a:solidFill>
+              </a:rPr>
+              <a:t>itr</a:t>
+            </a:r>
+            <a:r>
+              <a:rPr lang="en-US" altLang="zh-TW" sz="1400" dirty="0">
+                <a:solidFill>
+                  <a:schemeClr val="tx1"/>
+                </a:solidFill>
+              </a:rPr>
+              <a:t>=6 data=0x5</a:t>
+            </a:r>
+          </a:p>
+          <a:p>
+            <a:r>
+              <a:rPr lang="en-US" altLang="zh-TW" sz="1400" dirty="0" err="1">
+                <a:solidFill>
+                  <a:schemeClr val="tx1"/>
+                </a:solidFill>
+              </a:rPr>
+              <a:t>itr</a:t>
+            </a:r>
+            <a:r>
+              <a:rPr lang="en-US" altLang="zh-TW" sz="1400" dirty="0">
+                <a:solidFill>
+                  <a:schemeClr val="tx1"/>
+                </a:solidFill>
+              </a:rPr>
+              <a:t>=7 data=0x2  // </a:t>
+            </a:r>
+            <a:r>
+              <a:rPr lang="zh-TW" altLang="en-US" sz="1400" dirty="0">
+                <a:solidFill>
+                  <a:schemeClr val="tx1"/>
+                </a:solidFill>
+              </a:rPr>
+              <a:t>一個週期結束，以上數字不重複</a:t>
+            </a:r>
+          </a:p>
+          <a:p>
+            <a:r>
+              <a:rPr lang="en-US" altLang="zh-TW" sz="1400" dirty="0" err="1">
+                <a:solidFill>
+                  <a:schemeClr val="tx1"/>
+                </a:solidFill>
+              </a:rPr>
+              <a:t>itr</a:t>
+            </a:r>
+            <a:r>
+              <a:rPr lang="en-US" altLang="zh-TW" sz="1400" dirty="0">
+                <a:solidFill>
+                  <a:schemeClr val="tx1"/>
+                </a:solidFill>
+              </a:rPr>
+              <a:t>=8 data=0x5</a:t>
+            </a:r>
+          </a:p>
+          <a:p>
+            <a:r>
+              <a:rPr lang="en-US" altLang="zh-TW" sz="1400" dirty="0" err="1">
+                <a:solidFill>
+                  <a:schemeClr val="tx1"/>
+                </a:solidFill>
+              </a:rPr>
+              <a:t>itr</a:t>
+            </a:r>
+            <a:r>
+              <a:rPr lang="en-US" altLang="zh-TW" sz="1400" dirty="0">
+                <a:solidFill>
+                  <a:schemeClr val="tx1"/>
+                </a:solidFill>
+              </a:rPr>
+              <a:t>=9 data=0x0</a:t>
+            </a:r>
+          </a:p>
+          <a:p>
+            <a:pPr algn="ctr"/>
+            <a:endParaRPr lang="zh-TW" altLang="en-US" sz="1400" dirty="0">
+              <a:solidFill>
+                <a:schemeClr val="tx1"/>
+              </a:solidFill>
+            </a:endParaRPr>
+          </a:p>
+        </p:txBody>
+      </p:sp>
+    </p:spTree>
+    <p:extLst>
+      <p:ext uri="{BB962C8B-B14F-4D97-AF65-F5344CB8AC3E}">
+        <p14:creationId xmlns:p14="http://schemas.microsoft.com/office/powerpoint/2010/main" val="1244935800"/>
+      </p:ext>
+    </p:extLst>
+  </p:cSld>
+  <p:clrMapOvr>
+    <a:masterClrMapping/>
+  </p:clrMapOvr>
+</p:sld>
+</file>
+
+<file path=ppt/slides/slide49.xml><?xml version="1.0" encoding="utf-8"?>
+<p:sld xmlns:a="http://schemas.openxmlformats.org/drawingml/2006/main" xmlns:r="http://schemas.openxmlformats.org/officeDocument/2006/relationships" xmlns:p="http://schemas.openxmlformats.org/presentationml/2006/main">
+  <p:cSld>
+    <p:spTree>
+      <p:nvGrpSpPr>
+        <p:cNvPr id="1" name="">
+          <a:extLst>
+            <a:ext uri="{FF2B5EF4-FFF2-40B4-BE49-F238E27FC236}">
+              <a16:creationId xmlns:a16="http://schemas.microsoft.com/office/drawing/2014/main" id="{3DD82196-1FAD-17E2-8ABE-268BB4620198}"/>
+            </a:ext>
+          </a:extLst>
+        </p:cNvPr>
+        <p:cNvGrpSpPr/>
+        <p:nvPr/>
+      </p:nvGrpSpPr>
+      <p:grpSpPr>
+        <a:xfrm>
+          <a:off x="0" y="0"/>
+          <a:ext cx="0" cy="0"/>
+          <a:chOff x="0" y="0"/>
+          <a:chExt cx="0" cy="0"/>
+        </a:xfrm>
+      </p:grpSpPr>
+      <p:sp>
+        <p:nvSpPr>
+          <p:cNvPr id="2" name="標題 1">
+            <a:extLst>
+              <a:ext uri="{FF2B5EF4-FFF2-40B4-BE49-F238E27FC236}">
+                <a16:creationId xmlns:a16="http://schemas.microsoft.com/office/drawing/2014/main" id="{903616B5-4A86-D192-DA53-85A7E0C1080C}"/>
+              </a:ext>
+            </a:extLst>
+          </p:cNvPr>
+          <p:cNvSpPr>
+            <a:spLocks noGrp="1"/>
+          </p:cNvSpPr>
+          <p:nvPr>
+            <p:ph type="title"/>
+          </p:nvPr>
+        </p:nvSpPr>
+        <p:spPr/>
+        <p:txBody>
+          <a:bodyPr/>
+          <a:lstStyle/>
+          <a:p>
+            <a:r>
+              <a:rPr lang="en-US" altLang="zh-TW" dirty="0"/>
+              <a:t>Constraint blocks</a:t>
+            </a:r>
+            <a:r>
+              <a:rPr lang="zh-TW" altLang="en-US" dirty="0"/>
+              <a:t> </a:t>
+            </a:r>
+            <a:r>
+              <a:rPr lang="en-US" altLang="zh-TW" dirty="0"/>
+              <a:t>(1/1)</a:t>
+            </a:r>
+            <a:endParaRPr lang="zh-TW" altLang="en-US" dirty="0"/>
+          </a:p>
+        </p:txBody>
+      </p:sp>
+      <p:sp>
+        <p:nvSpPr>
+          <p:cNvPr id="5" name="內容版面配置區 4">
+            <a:extLst>
+              <a:ext uri="{FF2B5EF4-FFF2-40B4-BE49-F238E27FC236}">
+                <a16:creationId xmlns:a16="http://schemas.microsoft.com/office/drawing/2014/main" id="{372CB59C-6D66-4C5B-9A4D-08ED2D5A2C8A}"/>
+              </a:ext>
+            </a:extLst>
+          </p:cNvPr>
+          <p:cNvSpPr>
+            <a:spLocks noGrp="1"/>
+          </p:cNvSpPr>
+          <p:nvPr>
+            <p:ph idx="1"/>
+          </p:nvPr>
+        </p:nvSpPr>
+        <p:spPr/>
+        <p:txBody>
+          <a:bodyPr/>
+          <a:lstStyle/>
+          <a:p>
+            <a:r>
+              <a:rPr lang="zh-TW" altLang="en-US" dirty="0"/>
+              <a:t>可以針對 </a:t>
+            </a:r>
+            <a:r>
+              <a:rPr lang="en-US" altLang="zh-TW" dirty="0"/>
+              <a:t>random </a:t>
+            </a:r>
+            <a:r>
+              <a:rPr lang="zh-TW" altLang="en-US" dirty="0"/>
+              <a:t>變數做限制</a:t>
+            </a:r>
+            <a:endParaRPr lang="en-US" altLang="zh-TW" dirty="0"/>
+          </a:p>
+          <a:p>
+            <a:r>
+              <a:rPr lang="zh-TW" altLang="en-US" dirty="0"/>
+              <a:t>在做</a:t>
+            </a:r>
+            <a:r>
+              <a:rPr lang="en-US" altLang="zh-TW" dirty="0"/>
+              <a:t>randomize() </a:t>
+            </a:r>
+            <a:r>
+              <a:rPr lang="zh-TW" altLang="en-US" dirty="0"/>
+              <a:t>時，變數會依照 </a:t>
+            </a:r>
+            <a:r>
+              <a:rPr lang="en-US" altLang="zh-TW" dirty="0"/>
+              <a:t>Constraint blocks</a:t>
+            </a:r>
+            <a:r>
+              <a:rPr lang="zh-TW" altLang="en-US" dirty="0"/>
+              <a:t> 內容</a:t>
+            </a:r>
+            <a:br>
+              <a:rPr lang="en-US" altLang="zh-TW" dirty="0"/>
+            </a:br>
+            <a:r>
+              <a:rPr lang="zh-TW" altLang="en-US" dirty="0"/>
+              <a:t>隨機化出符合規定的數值</a:t>
+            </a:r>
+            <a:endParaRPr lang="en-US" altLang="zh-TW" dirty="0"/>
+          </a:p>
+        </p:txBody>
+      </p:sp>
+      <p:sp>
+        <p:nvSpPr>
+          <p:cNvPr id="6" name="文字方塊 5">
+            <a:extLst>
+              <a:ext uri="{FF2B5EF4-FFF2-40B4-BE49-F238E27FC236}">
+                <a16:creationId xmlns:a16="http://schemas.microsoft.com/office/drawing/2014/main" id="{F02A86FF-4F86-B69F-46F3-60979D95F864}"/>
+              </a:ext>
+            </a:extLst>
+          </p:cNvPr>
+          <p:cNvSpPr txBox="1"/>
+          <p:nvPr/>
+        </p:nvSpPr>
+        <p:spPr>
+          <a:xfrm>
+            <a:off x="2449104" y="3726577"/>
+            <a:ext cx="7293792" cy="2585323"/>
+          </a:xfrm>
+          <a:prstGeom prst="rect">
+            <a:avLst/>
+          </a:prstGeom>
+          <a:noFill/>
+          <a:ln>
+            <a:solidFill>
+              <a:schemeClr val="tx1"/>
+            </a:solidFill>
+          </a:ln>
+        </p:spPr>
+        <p:txBody>
+          <a:bodyPr wrap="none" rtlCol="0">
+            <a:spAutoFit/>
+          </a:bodyPr>
+          <a:lstStyle/>
+          <a:p>
+            <a:r>
+              <a:rPr lang="en-US" altLang="zh-TW" dirty="0"/>
+              <a:t>class ABC;</a:t>
+            </a:r>
+          </a:p>
+          <a:p>
+            <a:r>
+              <a:rPr lang="en-US" altLang="zh-TW" dirty="0"/>
+              <a:t>    rand bit [3:0] mode;</a:t>
+            </a:r>
+          </a:p>
+          <a:p>
+            <a:br>
+              <a:rPr lang="en-US" altLang="zh-TW" dirty="0"/>
+            </a:br>
+            <a:r>
+              <a:rPr lang="en-US" altLang="zh-TW" dirty="0"/>
+              <a:t>    // </a:t>
+            </a:r>
+            <a:r>
+              <a:rPr lang="zh-TW" altLang="en-US" dirty="0"/>
+              <a:t>建立一個 </a:t>
+            </a:r>
+            <a:r>
+              <a:rPr lang="en-US" altLang="zh-TW" dirty="0"/>
+              <a:t>constrain block </a:t>
+            </a:r>
+            <a:r>
+              <a:rPr lang="zh-TW" altLang="en-US" dirty="0"/>
+              <a:t>來限制 </a:t>
+            </a:r>
+            <a:r>
+              <a:rPr lang="en-US" altLang="zh-TW" dirty="0"/>
+              <a:t>mode </a:t>
+            </a:r>
+            <a:r>
+              <a:rPr lang="zh-TW" altLang="en-US" dirty="0"/>
+              <a:t>的數值範圍， </a:t>
+            </a:r>
+            <a:r>
+              <a:rPr lang="en-US" altLang="zh-TW" dirty="0"/>
+              <a:t>2 &lt; mode &lt;= 6</a:t>
+            </a:r>
+          </a:p>
+          <a:p>
+            <a:r>
+              <a:rPr lang="en-US" altLang="zh-TW" dirty="0"/>
+              <a:t>    </a:t>
+            </a:r>
+            <a:r>
+              <a:rPr lang="en-US" altLang="zh-TW" dirty="0">
+                <a:solidFill>
+                  <a:srgbClr val="FF0000"/>
+                </a:solidFill>
+              </a:rPr>
+              <a:t>constraint </a:t>
+            </a:r>
+            <a:r>
+              <a:rPr lang="en-US" altLang="zh-TW" dirty="0" err="1">
+                <a:solidFill>
+                  <a:srgbClr val="FF0000"/>
+                </a:solidFill>
+              </a:rPr>
+              <a:t>c_mode</a:t>
+            </a:r>
+            <a:r>
+              <a:rPr lang="en-US" altLang="zh-TW" dirty="0">
+                <a:solidFill>
+                  <a:srgbClr val="FF0000"/>
+                </a:solidFill>
+              </a:rPr>
+              <a:t> { mode &gt; 2;</a:t>
+            </a:r>
+          </a:p>
+          <a:p>
+            <a:r>
+              <a:rPr lang="en-US" altLang="zh-TW" dirty="0">
+                <a:solidFill>
+                  <a:srgbClr val="FF0000"/>
+                </a:solidFill>
+              </a:rPr>
+              <a:t>                        mode &lt;= 6;</a:t>
+            </a:r>
+          </a:p>
+          <a:p>
+            <a:r>
+              <a:rPr lang="en-US" altLang="zh-TW" dirty="0">
+                <a:solidFill>
+                  <a:srgbClr val="FF0000"/>
+                </a:solidFill>
+              </a:rPr>
+              <a:t>                      };</a:t>
+            </a:r>
+          </a:p>
+          <a:p>
+            <a:r>
+              <a:rPr lang="en-US" altLang="zh-TW" dirty="0" err="1"/>
+              <a:t>endclass</a:t>
+            </a:r>
+            <a:endParaRPr lang="en-US" altLang="zh-TW" dirty="0"/>
+          </a:p>
+          <a:p>
+            <a:endParaRPr lang="zh-TW" altLang="en-US" dirty="0"/>
+          </a:p>
+        </p:txBody>
+      </p:sp>
+    </p:spTree>
+    <p:extLst>
+      <p:ext uri="{BB962C8B-B14F-4D97-AF65-F5344CB8AC3E}">
+        <p14:creationId xmlns:p14="http://schemas.microsoft.com/office/powerpoint/2010/main" val="1262935101"/>
+      </p:ext>
+    </p:extLst>
+  </p:cSld>
+  <p:clrMapOvr>
+    <a:masterClrMapping/>
+  </p:clrMapOvr>
+</p:sld>
+</file>
+
 <file path=ppt/slides/slide5.xml><?xml version="1.0" encoding="utf-8"?>
 <p:sld xmlns:a="http://schemas.openxmlformats.org/drawingml/2006/main" xmlns:r="http://schemas.openxmlformats.org/officeDocument/2006/relationships" xmlns:p="http://schemas.openxmlformats.org/presentationml/2006/main">
   <p:cSld>
@@ -15099,6 +15964,191 @@
     <p:extLst>
       <p:ext uri="{BB962C8B-B14F-4D97-AF65-F5344CB8AC3E}">
         <p14:creationId xmlns:p14="http://schemas.microsoft.com/office/powerpoint/2010/main" val="2668830856"/>
+      </p:ext>
+    </p:extLst>
+  </p:cSld>
+  <p:clrMapOvr>
+    <a:masterClrMapping/>
+  </p:clrMapOvr>
+</p:sld>
+</file>
+
+<file path=ppt/slides/slide50.xml><?xml version="1.0" encoding="utf-8"?>
+<p:sld xmlns:a="http://schemas.openxmlformats.org/drawingml/2006/main" xmlns:r="http://schemas.openxmlformats.org/officeDocument/2006/relationships" xmlns:p="http://schemas.openxmlformats.org/presentationml/2006/main">
+  <p:cSld>
+    <p:spTree>
+      <p:nvGrpSpPr>
+        <p:cNvPr id="1" name="">
+          <a:extLst>
+            <a:ext uri="{FF2B5EF4-FFF2-40B4-BE49-F238E27FC236}">
+              <a16:creationId xmlns:a16="http://schemas.microsoft.com/office/drawing/2014/main" id="{761EB2F5-DC64-13B3-6D74-4C3EC10184E0}"/>
+            </a:ext>
+          </a:extLst>
+        </p:cNvPr>
+        <p:cNvGrpSpPr/>
+        <p:nvPr/>
+      </p:nvGrpSpPr>
+      <p:grpSpPr>
+        <a:xfrm>
+          <a:off x="0" y="0"/>
+          <a:ext cx="0" cy="0"/>
+          <a:chOff x="0" y="0"/>
+          <a:chExt cx="0" cy="0"/>
+        </a:xfrm>
+      </p:grpSpPr>
+      <p:sp>
+        <p:nvSpPr>
+          <p:cNvPr id="2" name="標題 1">
+            <a:extLst>
+              <a:ext uri="{FF2B5EF4-FFF2-40B4-BE49-F238E27FC236}">
+                <a16:creationId xmlns:a16="http://schemas.microsoft.com/office/drawing/2014/main" id="{36B7E0D2-C525-2A80-7253-DD08FBBFEAB4}"/>
+              </a:ext>
+            </a:extLst>
+          </p:cNvPr>
+          <p:cNvSpPr>
+            <a:spLocks noGrp="1"/>
+          </p:cNvSpPr>
+          <p:nvPr>
+            <p:ph type="title"/>
+          </p:nvPr>
+        </p:nvSpPr>
+        <p:spPr/>
+        <p:txBody>
+          <a:bodyPr/>
+          <a:lstStyle/>
+          <a:p>
+            <a:r>
+              <a:rPr lang="en-US" altLang="zh-TW" dirty="0"/>
+              <a:t>Constraint Operator</a:t>
+            </a:r>
+            <a:r>
+              <a:rPr lang="zh-TW" altLang="en-US" dirty="0"/>
+              <a:t> </a:t>
+            </a:r>
+            <a:r>
+              <a:rPr lang="en-US" altLang="zh-TW" dirty="0"/>
+              <a:t>(1/)</a:t>
+            </a:r>
+            <a:endParaRPr lang="zh-TW" altLang="en-US" dirty="0"/>
+          </a:p>
+        </p:txBody>
+      </p:sp>
+      <p:sp>
+        <p:nvSpPr>
+          <p:cNvPr id="5" name="內容版面配置區 4">
+            <a:extLst>
+              <a:ext uri="{FF2B5EF4-FFF2-40B4-BE49-F238E27FC236}">
+                <a16:creationId xmlns:a16="http://schemas.microsoft.com/office/drawing/2014/main" id="{581D8D80-A2B9-E237-01C9-6426691C19CE}"/>
+              </a:ext>
+            </a:extLst>
+          </p:cNvPr>
+          <p:cNvSpPr>
+            <a:spLocks noGrp="1"/>
+          </p:cNvSpPr>
+          <p:nvPr>
+            <p:ph idx="1"/>
+          </p:nvPr>
+        </p:nvSpPr>
+        <p:spPr/>
+        <p:txBody>
+          <a:bodyPr/>
+          <a:lstStyle/>
+          <a:p>
+            <a:pPr marL="514350" indent="-514350">
+              <a:buFont typeface="+mj-lt"/>
+              <a:buAutoNum type="arabicPeriod"/>
+            </a:pPr>
+            <a:r>
+              <a:rPr lang="en-US" altLang="zh-TW" dirty="0"/>
+              <a:t>inside operator</a:t>
+            </a:r>
+          </a:p>
+          <a:p>
+            <a:pPr marL="514350" indent="-514350">
+              <a:buFont typeface="+mj-lt"/>
+              <a:buAutoNum type="arabicPeriod"/>
+            </a:pPr>
+            <a:r>
+              <a:rPr lang="en-US" altLang="zh-TW" dirty="0"/>
+              <a:t>weighted distributions</a:t>
+            </a:r>
+          </a:p>
+          <a:p>
+            <a:pPr marL="514350" indent="-514350">
+              <a:buFont typeface="+mj-lt"/>
+              <a:buAutoNum type="arabicPeriod"/>
+            </a:pPr>
+            <a:r>
+              <a:rPr lang="zh-TW" altLang="en-US" dirty="0"/>
+              <a:t>在 </a:t>
+            </a:r>
+            <a:r>
+              <a:rPr lang="en-US" altLang="zh-TW" dirty="0" err="1"/>
+              <a:t>constriant</a:t>
+            </a:r>
+            <a:r>
+              <a:rPr lang="en-US" altLang="zh-TW" dirty="0"/>
+              <a:t> block </a:t>
+            </a:r>
+            <a:r>
+              <a:rPr lang="zh-TW" altLang="en-US" dirty="0"/>
+              <a:t>常見的用法</a:t>
+            </a:r>
+          </a:p>
+          <a:p>
+            <a:pPr marL="971550" lvl="1" indent="-514350">
+              <a:buFont typeface="+mj-lt"/>
+              <a:buAutoNum type="arabicPeriod"/>
+            </a:pPr>
+            <a:r>
+              <a:rPr lang="en-US" altLang="zh-TW" dirty="0"/>
+              <a:t>-&gt;</a:t>
+            </a:r>
+            <a:endParaRPr lang="zh-TW" altLang="en-US" dirty="0"/>
+          </a:p>
+          <a:p>
+            <a:pPr marL="971550" lvl="1" indent="-514350">
+              <a:buFont typeface="+mj-lt"/>
+              <a:buAutoNum type="arabicPeriod"/>
+            </a:pPr>
+            <a:r>
+              <a:rPr lang="en-US" altLang="zh-TW" dirty="0"/>
+              <a:t>if else</a:t>
+            </a:r>
+          </a:p>
+          <a:p>
+            <a:pPr marL="971550" lvl="1" indent="-514350">
+              <a:buFont typeface="+mj-lt"/>
+              <a:buAutoNum type="arabicPeriod"/>
+            </a:pPr>
+            <a:r>
+              <a:rPr lang="en-US" altLang="zh-TW" dirty="0"/>
+              <a:t>foreach</a:t>
+            </a:r>
+          </a:p>
+          <a:p>
+            <a:pPr marL="971550" lvl="1" indent="-514350">
+              <a:buFont typeface="+mj-lt"/>
+              <a:buAutoNum type="arabicPeriod"/>
+            </a:pPr>
+            <a:r>
+              <a:rPr lang="en-US" altLang="zh-TW" dirty="0"/>
+              <a:t>solve before</a:t>
+            </a:r>
+          </a:p>
+          <a:p>
+            <a:pPr marL="971550" lvl="1" indent="-514350">
+              <a:buFont typeface="+mj-lt"/>
+              <a:buAutoNum type="arabicPeriod"/>
+            </a:pPr>
+            <a:endParaRPr lang="en-US" altLang="zh-TW" dirty="0"/>
+          </a:p>
+        </p:txBody>
+      </p:sp>
+    </p:spTree>
+    <p:extLst>
+      <p:ext uri="{BB962C8B-B14F-4D97-AF65-F5344CB8AC3E}">
+        <p14:creationId xmlns:p14="http://schemas.microsoft.com/office/powerpoint/2010/main" val="2412732231"/>
       </p:ext>
     </p:extLst>
   </p:cSld>

</xml_diff>

<commit_message>
Modify: SystemVerilog_語法學習.pptx Add: chapter 6 Constraints
</commit_message>
<xml_diff>
--- a/systemverilog/SystemVerilog_語法學習.pptx
+++ b/systemverilog/SystemVerilog_語法學習.pptx
@@ -5,7 +5,7 @@
     <p:sldMasterId id="2147483648" r:id="rId1"/>
   </p:sldMasterIdLst>
   <p:notesMasterIdLst>
-    <p:notesMasterId r:id="rId52"/>
+    <p:notesMasterId r:id="rId66"/>
   </p:notesMasterIdLst>
   <p:sldIdLst>
     <p:sldId id="256" r:id="rId2"/>
@@ -58,6 +58,20 @@
     <p:sldId id="314" r:id="rId49"/>
     <p:sldId id="315" r:id="rId50"/>
     <p:sldId id="316" r:id="rId51"/>
+    <p:sldId id="317" r:id="rId52"/>
+    <p:sldId id="318" r:id="rId53"/>
+    <p:sldId id="319" r:id="rId54"/>
+    <p:sldId id="320" r:id="rId55"/>
+    <p:sldId id="321" r:id="rId56"/>
+    <p:sldId id="322" r:id="rId57"/>
+    <p:sldId id="323" r:id="rId58"/>
+    <p:sldId id="324" r:id="rId59"/>
+    <p:sldId id="325" r:id="rId60"/>
+    <p:sldId id="326" r:id="rId61"/>
+    <p:sldId id="327" r:id="rId62"/>
+    <p:sldId id="328" r:id="rId63"/>
+    <p:sldId id="329" r:id="rId64"/>
+    <p:sldId id="330" r:id="rId65"/>
   </p:sldIdLst>
   <p:sldSz cx="12192000" cy="6858000"/>
   <p:notesSz cx="6858000" cy="9144000"/>
@@ -246,7 +260,7 @@
           <a:p>
             <a:fld id="{28C483A5-4075-4A6E-B921-74BFA7B8EF67}" type="datetimeFigureOut">
               <a:rPr lang="zh-TW" altLang="en-US" smtClean="0"/>
-              <a:t>2025/6/24</a:t>
+              <a:t>2025/7/1</a:t>
             </a:fld>
             <a:endParaRPr lang="zh-TW" altLang="en-US"/>
           </a:p>
@@ -828,7 +842,7 @@
           <a:p>
             <a:fld id="{2365240E-6CA3-4772-8803-719FF1315E51}" type="datetimeFigureOut">
               <a:rPr lang="zh-TW" altLang="en-US" smtClean="0"/>
-              <a:t>2025/6/24</a:t>
+              <a:t>2025/7/1</a:t>
             </a:fld>
             <a:endParaRPr lang="zh-TW" altLang="en-US"/>
           </a:p>
@@ -1026,7 +1040,7 @@
           <a:p>
             <a:fld id="{2365240E-6CA3-4772-8803-719FF1315E51}" type="datetimeFigureOut">
               <a:rPr lang="zh-TW" altLang="en-US" smtClean="0"/>
-              <a:t>2025/6/24</a:t>
+              <a:t>2025/7/1</a:t>
             </a:fld>
             <a:endParaRPr lang="zh-TW" altLang="en-US"/>
           </a:p>
@@ -1234,7 +1248,7 @@
           <a:p>
             <a:fld id="{2365240E-6CA3-4772-8803-719FF1315E51}" type="datetimeFigureOut">
               <a:rPr lang="zh-TW" altLang="en-US" smtClean="0"/>
-              <a:t>2025/6/24</a:t>
+              <a:t>2025/7/1</a:t>
             </a:fld>
             <a:endParaRPr lang="zh-TW" altLang="en-US"/>
           </a:p>
@@ -1432,7 +1446,7 @@
           <a:p>
             <a:fld id="{2365240E-6CA3-4772-8803-719FF1315E51}" type="datetimeFigureOut">
               <a:rPr lang="zh-TW" altLang="en-US" smtClean="0"/>
-              <a:t>2025/6/24</a:t>
+              <a:t>2025/7/1</a:t>
             </a:fld>
             <a:endParaRPr lang="zh-TW" altLang="en-US"/>
           </a:p>
@@ -1707,7 +1721,7 @@
           <a:p>
             <a:fld id="{2365240E-6CA3-4772-8803-719FF1315E51}" type="datetimeFigureOut">
               <a:rPr lang="zh-TW" altLang="en-US" smtClean="0"/>
-              <a:t>2025/6/24</a:t>
+              <a:t>2025/7/1</a:t>
             </a:fld>
             <a:endParaRPr lang="zh-TW" altLang="en-US"/>
           </a:p>
@@ -1972,7 +1986,7 @@
           <a:p>
             <a:fld id="{2365240E-6CA3-4772-8803-719FF1315E51}" type="datetimeFigureOut">
               <a:rPr lang="zh-TW" altLang="en-US" smtClean="0"/>
-              <a:t>2025/6/24</a:t>
+              <a:t>2025/7/1</a:t>
             </a:fld>
             <a:endParaRPr lang="zh-TW" altLang="en-US"/>
           </a:p>
@@ -2384,7 +2398,7 @@
           <a:p>
             <a:fld id="{2365240E-6CA3-4772-8803-719FF1315E51}" type="datetimeFigureOut">
               <a:rPr lang="zh-TW" altLang="en-US" smtClean="0"/>
-              <a:t>2025/6/24</a:t>
+              <a:t>2025/7/1</a:t>
             </a:fld>
             <a:endParaRPr lang="zh-TW" altLang="en-US"/>
           </a:p>
@@ -2525,7 +2539,7 @@
           <a:p>
             <a:fld id="{2365240E-6CA3-4772-8803-719FF1315E51}" type="datetimeFigureOut">
               <a:rPr lang="zh-TW" altLang="en-US" smtClean="0"/>
-              <a:t>2025/6/24</a:t>
+              <a:t>2025/7/1</a:t>
             </a:fld>
             <a:endParaRPr lang="zh-TW" altLang="en-US"/>
           </a:p>
@@ -2638,7 +2652,7 @@
           <a:p>
             <a:fld id="{2365240E-6CA3-4772-8803-719FF1315E51}" type="datetimeFigureOut">
               <a:rPr lang="zh-TW" altLang="en-US" smtClean="0"/>
-              <a:t>2025/6/24</a:t>
+              <a:t>2025/7/1</a:t>
             </a:fld>
             <a:endParaRPr lang="zh-TW" altLang="en-US"/>
           </a:p>
@@ -2949,7 +2963,7 @@
           <a:p>
             <a:fld id="{2365240E-6CA3-4772-8803-719FF1315E51}" type="datetimeFigureOut">
               <a:rPr lang="zh-TW" altLang="en-US" smtClean="0"/>
-              <a:t>2025/6/24</a:t>
+              <a:t>2025/7/1</a:t>
             </a:fld>
             <a:endParaRPr lang="zh-TW" altLang="en-US"/>
           </a:p>
@@ -3237,7 +3251,7 @@
           <a:p>
             <a:fld id="{2365240E-6CA3-4772-8803-719FF1315E51}" type="datetimeFigureOut">
               <a:rPr lang="zh-TW" altLang="en-US" smtClean="0"/>
-              <a:t>2025/6/24</a:t>
+              <a:t>2025/7/1</a:t>
             </a:fld>
             <a:endParaRPr lang="zh-TW" altLang="en-US"/>
           </a:p>
@@ -3478,7 +3492,7 @@
           <a:p>
             <a:fld id="{2365240E-6CA3-4772-8803-719FF1315E51}" type="datetimeFigureOut">
               <a:rPr lang="zh-TW" altLang="en-US" smtClean="0"/>
-              <a:t>2025/6/24</a:t>
+              <a:t>2025/7/1</a:t>
             </a:fld>
             <a:endParaRPr lang="zh-TW" altLang="en-US"/>
           </a:p>
@@ -7423,6 +7437,17 @@
               <a:rPr lang="en-US" altLang="zh-TW" dirty="0"/>
               <a:t>Constraints</a:t>
             </a:r>
+          </a:p>
+          <a:p>
+            <a:pPr marL="514350" indent="-514350">
+              <a:buFont typeface="+mj-lt"/>
+              <a:buAutoNum type="arabicPeriod"/>
+            </a:pPr>
+            <a:r>
+              <a:rPr lang="en-US" altLang="zh-TW"/>
+              <a:t>Functional Coverage</a:t>
+            </a:r>
+            <a:endParaRPr lang="en-US" altLang="zh-TW" dirty="0"/>
           </a:p>
           <a:p>
             <a:pPr marL="514350" indent="-514350">
@@ -16027,7 +16052,7 @@
             </a:r>
             <a:r>
               <a:rPr lang="en-US" altLang="zh-TW" dirty="0"/>
-              <a:t>(1/)</a:t>
+              <a:t>(1/5)</a:t>
             </a:r>
             <a:endParaRPr lang="zh-TW" altLang="en-US" dirty="0"/>
           </a:p>
@@ -16137,6 +16162,33 @@
             </a:r>
           </a:p>
           <a:p>
+            <a:pPr marL="514350" indent="-514350">
+              <a:buFont typeface="+mj-lt"/>
+              <a:buAutoNum type="arabicPeriod"/>
+            </a:pPr>
+            <a:r>
+              <a:rPr lang="zh-TW" altLang="en-US" dirty="0"/>
+              <a:t>直接在 </a:t>
+            </a:r>
+            <a:r>
+              <a:rPr lang="en-US" altLang="zh-TW" dirty="0"/>
+              <a:t>randomize()</a:t>
+            </a:r>
+            <a:r>
+              <a:rPr lang="zh-TW" altLang="en-US" dirty="0"/>
+              <a:t> 後面加上 </a:t>
+            </a:r>
+            <a:r>
+              <a:rPr lang="en-US" altLang="zh-TW" dirty="0"/>
+              <a:t>with() </a:t>
+            </a:r>
+            <a:r>
+              <a:rPr lang="zh-TW" altLang="en-US" dirty="0"/>
+              <a:t>來做限制</a:t>
+            </a:r>
+            <a:endParaRPr lang="en-US" altLang="zh-TW" dirty="0"/>
+          </a:p>
+          <a:p>
             <a:pPr marL="971550" lvl="1" indent="-514350">
               <a:buFont typeface="+mj-lt"/>
               <a:buAutoNum type="arabicPeriod"/>
@@ -16149,6 +16201,2595 @@
     <p:extLst>
       <p:ext uri="{BB962C8B-B14F-4D97-AF65-F5344CB8AC3E}">
         <p14:creationId xmlns:p14="http://schemas.microsoft.com/office/powerpoint/2010/main" val="2412732231"/>
+      </p:ext>
+    </p:extLst>
+  </p:cSld>
+  <p:clrMapOvr>
+    <a:masterClrMapping/>
+  </p:clrMapOvr>
+</p:sld>
+</file>
+
+<file path=ppt/slides/slide51.xml><?xml version="1.0" encoding="utf-8"?>
+<p:sld xmlns:a="http://schemas.openxmlformats.org/drawingml/2006/main" xmlns:r="http://schemas.openxmlformats.org/officeDocument/2006/relationships" xmlns:p="http://schemas.openxmlformats.org/presentationml/2006/main">
+  <p:cSld>
+    <p:spTree>
+      <p:nvGrpSpPr>
+        <p:cNvPr id="1" name="">
+          <a:extLst>
+            <a:ext uri="{FF2B5EF4-FFF2-40B4-BE49-F238E27FC236}">
+              <a16:creationId xmlns:a16="http://schemas.microsoft.com/office/drawing/2014/main" id="{22B909E4-7A23-F68B-E560-FA1F434FC7A9}"/>
+            </a:ext>
+          </a:extLst>
+        </p:cNvPr>
+        <p:cNvGrpSpPr/>
+        <p:nvPr/>
+      </p:nvGrpSpPr>
+      <p:grpSpPr>
+        <a:xfrm>
+          <a:off x="0" y="0"/>
+          <a:ext cx="0" cy="0"/>
+          <a:chOff x="0" y="0"/>
+          <a:chExt cx="0" cy="0"/>
+        </a:xfrm>
+      </p:grpSpPr>
+      <p:sp>
+        <p:nvSpPr>
+          <p:cNvPr id="2" name="標題 1">
+            <a:extLst>
+              <a:ext uri="{FF2B5EF4-FFF2-40B4-BE49-F238E27FC236}">
+                <a16:creationId xmlns:a16="http://schemas.microsoft.com/office/drawing/2014/main" id="{A2184137-1A27-77A8-08FA-03FB04D3D6B2}"/>
+              </a:ext>
+            </a:extLst>
+          </p:cNvPr>
+          <p:cNvSpPr>
+            <a:spLocks noGrp="1"/>
+          </p:cNvSpPr>
+          <p:nvPr>
+            <p:ph type="title"/>
+          </p:nvPr>
+        </p:nvSpPr>
+        <p:spPr/>
+        <p:txBody>
+          <a:bodyPr/>
+          <a:lstStyle/>
+          <a:p>
+            <a:r>
+              <a:rPr lang="en-US" altLang="zh-TW" dirty="0"/>
+              <a:t>Constraint Operator</a:t>
+            </a:r>
+            <a:r>
+              <a:rPr lang="zh-TW" altLang="en-US" dirty="0"/>
+              <a:t> </a:t>
+            </a:r>
+            <a:r>
+              <a:rPr lang="en-US" altLang="zh-TW" dirty="0"/>
+              <a:t>(2/5)</a:t>
+            </a:r>
+            <a:endParaRPr lang="zh-TW" altLang="en-US" dirty="0"/>
+          </a:p>
+        </p:txBody>
+      </p:sp>
+      <p:sp>
+        <p:nvSpPr>
+          <p:cNvPr id="5" name="內容版面配置區 4">
+            <a:extLst>
+              <a:ext uri="{FF2B5EF4-FFF2-40B4-BE49-F238E27FC236}">
+                <a16:creationId xmlns:a16="http://schemas.microsoft.com/office/drawing/2014/main" id="{4E11944F-99D6-A935-3E5D-885858D8D6E2}"/>
+              </a:ext>
+            </a:extLst>
+          </p:cNvPr>
+          <p:cNvSpPr>
+            <a:spLocks noGrp="1"/>
+          </p:cNvSpPr>
+          <p:nvPr>
+            <p:ph idx="1"/>
+          </p:nvPr>
+        </p:nvSpPr>
+        <p:spPr/>
+        <p:txBody>
+          <a:bodyPr/>
+          <a:lstStyle/>
+          <a:p>
+            <a:pPr marL="514350" indent="-514350">
+              <a:buFont typeface="+mj-lt"/>
+              <a:buAutoNum type="arabicPeriod"/>
+            </a:pPr>
+            <a:r>
+              <a:rPr lang="en-US" altLang="zh-TW" dirty="0"/>
+              <a:t>inside operator</a:t>
+            </a:r>
+          </a:p>
+        </p:txBody>
+      </p:sp>
+      <p:sp>
+        <p:nvSpPr>
+          <p:cNvPr id="3" name="文字方塊 2">
+            <a:extLst>
+              <a:ext uri="{FF2B5EF4-FFF2-40B4-BE49-F238E27FC236}">
+                <a16:creationId xmlns:a16="http://schemas.microsoft.com/office/drawing/2014/main" id="{A506AB23-8C7A-6F4F-AE58-99DC9DE137EF}"/>
+              </a:ext>
+            </a:extLst>
+          </p:cNvPr>
+          <p:cNvSpPr txBox="1"/>
+          <p:nvPr/>
+        </p:nvSpPr>
+        <p:spPr>
+          <a:xfrm>
+            <a:off x="2868868" y="2933220"/>
+            <a:ext cx="6454264" cy="2554545"/>
+          </a:xfrm>
+          <a:prstGeom prst="rect">
+            <a:avLst/>
+          </a:prstGeom>
+          <a:noFill/>
+          <a:ln>
+            <a:solidFill>
+              <a:schemeClr val="tx1"/>
+            </a:solidFill>
+          </a:ln>
+        </p:spPr>
+        <p:txBody>
+          <a:bodyPr wrap="square" rtlCol="0">
+            <a:spAutoFit/>
+          </a:bodyPr>
+          <a:lstStyle/>
+          <a:p>
+            <a:r>
+              <a:rPr lang="en-US" altLang="zh-TW" sz="2000" dirty="0"/>
+              <a:t>constraint </a:t>
+            </a:r>
+            <a:r>
+              <a:rPr lang="en-US" altLang="zh-TW" sz="2000" dirty="0" err="1"/>
+              <a:t>my_range</a:t>
+            </a:r>
+            <a:r>
+              <a:rPr lang="en-US" altLang="zh-TW" sz="2000" dirty="0"/>
+              <a:t> { </a:t>
+            </a:r>
+            <a:r>
+              <a:rPr lang="en-US" altLang="zh-TW" sz="2000" dirty="0" err="1"/>
+              <a:t>typ</a:t>
+            </a:r>
+            <a:r>
+              <a:rPr lang="en-US" altLang="zh-TW" sz="2000" dirty="0"/>
+              <a:t> &gt; 32;</a:t>
+            </a:r>
+          </a:p>
+          <a:p>
+            <a:r>
+              <a:rPr lang="en-US" altLang="zh-TW" sz="2000" dirty="0"/>
+              <a:t>                     </a:t>
+            </a:r>
+            <a:r>
+              <a:rPr lang="zh-TW" altLang="en-US" sz="2000" dirty="0"/>
+              <a:t>                        </a:t>
+            </a:r>
+            <a:r>
+              <a:rPr lang="en-US" altLang="zh-TW" sz="2000" dirty="0"/>
+              <a:t> </a:t>
+            </a:r>
+            <a:r>
+              <a:rPr lang="en-US" altLang="zh-TW" sz="2000" dirty="0" err="1"/>
+              <a:t>typ</a:t>
+            </a:r>
+            <a:r>
+              <a:rPr lang="en-US" altLang="zh-TW" sz="2000" dirty="0"/>
+              <a:t> &lt; 256; }</a:t>
+            </a:r>
+          </a:p>
+          <a:p>
+            <a:endParaRPr lang="en-US" altLang="zh-TW" sz="2000" dirty="0"/>
+          </a:p>
+          <a:p>
+            <a:r>
+              <a:rPr lang="en-US" altLang="zh-TW" sz="2000" dirty="0"/>
+              <a:t>// </a:t>
+            </a:r>
+            <a:r>
+              <a:rPr lang="en-US" altLang="zh-TW" sz="2000" dirty="0" err="1"/>
+              <a:t>typ</a:t>
+            </a:r>
+            <a:r>
+              <a:rPr lang="en-US" altLang="zh-TW" sz="2000" dirty="0"/>
+              <a:t> &gt;= 32 and </a:t>
+            </a:r>
+            <a:r>
+              <a:rPr lang="en-US" altLang="zh-TW" sz="2000" dirty="0" err="1"/>
+              <a:t>typ</a:t>
+            </a:r>
+            <a:r>
+              <a:rPr lang="en-US" altLang="zh-TW" sz="2000" dirty="0"/>
+              <a:t> &lt;= 256</a:t>
+            </a:r>
+          </a:p>
+          <a:p>
+            <a:r>
+              <a:rPr lang="en-US" altLang="zh-TW" sz="2000" dirty="0"/>
+              <a:t>constraint </a:t>
+            </a:r>
+            <a:r>
+              <a:rPr lang="en-US" altLang="zh-TW" sz="2000" dirty="0" err="1"/>
+              <a:t>new_range</a:t>
+            </a:r>
+            <a:r>
+              <a:rPr lang="en-US" altLang="zh-TW" sz="2000" dirty="0"/>
+              <a:t> { </a:t>
+            </a:r>
+            <a:r>
+              <a:rPr lang="en-US" altLang="zh-TW" sz="2000" dirty="0" err="1"/>
+              <a:t>typ</a:t>
+            </a:r>
+            <a:r>
+              <a:rPr lang="en-US" altLang="zh-TW" sz="2000" dirty="0"/>
+              <a:t> inside {[32:256]}; }</a:t>
+            </a:r>
+          </a:p>
+          <a:p>
+            <a:endParaRPr lang="en-US" altLang="zh-TW" sz="2000" dirty="0"/>
+          </a:p>
+          <a:p>
+            <a:r>
+              <a:rPr lang="en-US" altLang="zh-TW" sz="2000" dirty="0"/>
+              <a:t>// </a:t>
+            </a:r>
+            <a:r>
+              <a:rPr lang="zh-TW" altLang="en-US" sz="2000" dirty="0"/>
+              <a:t>選擇 </a:t>
+            </a:r>
+            <a:r>
+              <a:rPr lang="en-US" altLang="zh-TW" sz="2000" dirty="0"/>
+              <a:t>32 or 64 or 128</a:t>
+            </a:r>
+          </a:p>
+          <a:p>
+            <a:r>
+              <a:rPr lang="en-US" altLang="zh-TW" sz="2000" dirty="0"/>
+              <a:t>constraint </a:t>
+            </a:r>
+            <a:r>
+              <a:rPr lang="en-US" altLang="zh-TW" sz="2000" dirty="0" err="1"/>
+              <a:t>spec_range</a:t>
+            </a:r>
+            <a:r>
+              <a:rPr lang="en-US" altLang="zh-TW" sz="2000" dirty="0"/>
+              <a:t> { type inside {32, 64, 128}; }</a:t>
+            </a:r>
+            <a:endParaRPr lang="zh-TW" altLang="en-US" sz="2000" dirty="0"/>
+          </a:p>
+        </p:txBody>
+      </p:sp>
+    </p:spTree>
+    <p:extLst>
+      <p:ext uri="{BB962C8B-B14F-4D97-AF65-F5344CB8AC3E}">
+        <p14:creationId xmlns:p14="http://schemas.microsoft.com/office/powerpoint/2010/main" val="383638006"/>
+      </p:ext>
+    </p:extLst>
+  </p:cSld>
+  <p:clrMapOvr>
+    <a:masterClrMapping/>
+  </p:clrMapOvr>
+</p:sld>
+</file>
+
+<file path=ppt/slides/slide52.xml><?xml version="1.0" encoding="utf-8"?>
+<p:sld xmlns:a="http://schemas.openxmlformats.org/drawingml/2006/main" xmlns:r="http://schemas.openxmlformats.org/officeDocument/2006/relationships" xmlns:p="http://schemas.openxmlformats.org/presentationml/2006/main">
+  <p:cSld>
+    <p:spTree>
+      <p:nvGrpSpPr>
+        <p:cNvPr id="1" name="">
+          <a:extLst>
+            <a:ext uri="{FF2B5EF4-FFF2-40B4-BE49-F238E27FC236}">
+              <a16:creationId xmlns:a16="http://schemas.microsoft.com/office/drawing/2014/main" id="{2F84AED9-CFD8-E758-D0CB-84B49DCC3555}"/>
+            </a:ext>
+          </a:extLst>
+        </p:cNvPr>
+        <p:cNvGrpSpPr/>
+        <p:nvPr/>
+      </p:nvGrpSpPr>
+      <p:grpSpPr>
+        <a:xfrm>
+          <a:off x="0" y="0"/>
+          <a:ext cx="0" cy="0"/>
+          <a:chOff x="0" y="0"/>
+          <a:chExt cx="0" cy="0"/>
+        </a:xfrm>
+      </p:grpSpPr>
+      <p:sp>
+        <p:nvSpPr>
+          <p:cNvPr id="2" name="標題 1">
+            <a:extLst>
+              <a:ext uri="{FF2B5EF4-FFF2-40B4-BE49-F238E27FC236}">
+                <a16:creationId xmlns:a16="http://schemas.microsoft.com/office/drawing/2014/main" id="{C01A83BD-02A8-13AC-DEED-DDCF7DB3946B}"/>
+              </a:ext>
+            </a:extLst>
+          </p:cNvPr>
+          <p:cNvSpPr>
+            <a:spLocks noGrp="1"/>
+          </p:cNvSpPr>
+          <p:nvPr>
+            <p:ph type="title"/>
+          </p:nvPr>
+        </p:nvSpPr>
+        <p:spPr/>
+        <p:txBody>
+          <a:bodyPr/>
+          <a:lstStyle/>
+          <a:p>
+            <a:r>
+              <a:rPr lang="en-US" altLang="zh-TW" dirty="0"/>
+              <a:t>Constraint Operator</a:t>
+            </a:r>
+            <a:r>
+              <a:rPr lang="zh-TW" altLang="en-US" dirty="0"/>
+              <a:t> </a:t>
+            </a:r>
+            <a:r>
+              <a:rPr lang="en-US" altLang="zh-TW" dirty="0"/>
+              <a:t>(3/5)</a:t>
+            </a:r>
+            <a:endParaRPr lang="zh-TW" altLang="en-US" dirty="0"/>
+          </a:p>
+        </p:txBody>
+      </p:sp>
+      <p:sp>
+        <p:nvSpPr>
+          <p:cNvPr id="5" name="內容版面配置區 4">
+            <a:extLst>
+              <a:ext uri="{FF2B5EF4-FFF2-40B4-BE49-F238E27FC236}">
+                <a16:creationId xmlns:a16="http://schemas.microsoft.com/office/drawing/2014/main" id="{A0D16DE5-C5B2-D7A0-AC65-23B83E62D4CD}"/>
+              </a:ext>
+            </a:extLst>
+          </p:cNvPr>
+          <p:cNvSpPr>
+            <a:spLocks noGrp="1"/>
+          </p:cNvSpPr>
+          <p:nvPr>
+            <p:ph idx="1"/>
+          </p:nvPr>
+        </p:nvSpPr>
+        <p:spPr/>
+        <p:txBody>
+          <a:bodyPr/>
+          <a:lstStyle/>
+          <a:p>
+            <a:pPr marL="514350" indent="-514350">
+              <a:buFont typeface="+mj-lt"/>
+              <a:buAutoNum type="arabicPeriod" startAt="2"/>
+            </a:pPr>
+            <a:r>
+              <a:rPr lang="en-US" altLang="zh-TW" dirty="0"/>
+              <a:t>weighted distributions ( := )</a:t>
+            </a:r>
+          </a:p>
+          <a:p>
+            <a:pPr marL="971550" lvl="1" indent="-514350">
+              <a:buFont typeface="+mj-lt"/>
+              <a:buAutoNum type="arabicPeriod"/>
+            </a:pPr>
+            <a:endParaRPr lang="en-US" altLang="zh-TW" dirty="0"/>
+          </a:p>
+        </p:txBody>
+      </p:sp>
+      <p:sp>
+        <p:nvSpPr>
+          <p:cNvPr id="3" name="文字方塊 2">
+            <a:extLst>
+              <a:ext uri="{FF2B5EF4-FFF2-40B4-BE49-F238E27FC236}">
+                <a16:creationId xmlns:a16="http://schemas.microsoft.com/office/drawing/2014/main" id="{C5F1D3B9-685D-07E4-8AE6-6D513F32A182}"/>
+              </a:ext>
+            </a:extLst>
+          </p:cNvPr>
+          <p:cNvSpPr txBox="1"/>
+          <p:nvPr/>
+        </p:nvSpPr>
+        <p:spPr>
+          <a:xfrm>
+            <a:off x="2868868" y="2760643"/>
+            <a:ext cx="6454264" cy="3416320"/>
+          </a:xfrm>
+          <a:prstGeom prst="rect">
+            <a:avLst/>
+          </a:prstGeom>
+          <a:noFill/>
+          <a:ln>
+            <a:solidFill>
+              <a:schemeClr val="tx1"/>
+            </a:solidFill>
+          </a:ln>
+        </p:spPr>
+        <p:txBody>
+          <a:bodyPr wrap="square" rtlCol="0">
+            <a:spAutoFit/>
+          </a:bodyPr>
+          <a:lstStyle/>
+          <a:p>
+            <a:r>
+              <a:rPr lang="en-US" altLang="zh-TW" dirty="0"/>
+              <a:t>class </a:t>
+            </a:r>
+            <a:r>
+              <a:rPr lang="en-US" altLang="zh-TW" dirty="0" err="1"/>
+              <a:t>myClass</a:t>
+            </a:r>
+            <a:r>
+              <a:rPr lang="en-US" altLang="zh-TW" dirty="0"/>
+              <a:t>;</a:t>
+            </a:r>
+          </a:p>
+          <a:p>
+            <a:r>
+              <a:rPr lang="en-US" altLang="zh-TW" dirty="0"/>
+              <a:t>  rand bit [2:0] </a:t>
+            </a:r>
+            <a:r>
+              <a:rPr lang="en-US" altLang="zh-TW" dirty="0" err="1"/>
+              <a:t>typ</a:t>
+            </a:r>
+            <a:r>
+              <a:rPr lang="en-US" altLang="zh-TW" dirty="0"/>
+              <a:t>;</a:t>
+            </a:r>
+          </a:p>
+          <a:p>
+            <a:br>
+              <a:rPr lang="en-US" altLang="zh-TW" dirty="0"/>
+            </a:br>
+            <a:r>
+              <a:rPr lang="en-US" altLang="zh-TW" dirty="0"/>
+              <a:t>    // </a:t>
+            </a:r>
+            <a:r>
+              <a:rPr lang="zh-TW" altLang="en-US" dirty="0"/>
+              <a:t>權重分配，使用 </a:t>
+            </a:r>
+            <a:r>
+              <a:rPr lang="en-US" altLang="zh-TW" dirty="0"/>
+              <a:t>:=</a:t>
+            </a:r>
+            <a:endParaRPr lang="zh-TW" altLang="en-US" dirty="0"/>
+          </a:p>
+          <a:p>
+            <a:r>
+              <a:rPr lang="zh-TW" altLang="en-US" dirty="0"/>
+              <a:t>    </a:t>
+            </a:r>
+            <a:r>
+              <a:rPr lang="en-US" altLang="zh-TW" dirty="0"/>
+              <a:t>// 0 </a:t>
+            </a:r>
+            <a:r>
+              <a:rPr lang="zh-TW" altLang="en-US" dirty="0"/>
+              <a:t>有 </a:t>
+            </a:r>
+            <a:r>
+              <a:rPr lang="en-US" altLang="zh-TW" dirty="0"/>
+              <a:t>20</a:t>
+            </a:r>
+            <a:endParaRPr lang="zh-TW" altLang="en-US" dirty="0"/>
+          </a:p>
+          <a:p>
+            <a:r>
+              <a:rPr lang="zh-TW" altLang="en-US" dirty="0"/>
+              <a:t>    </a:t>
+            </a:r>
+            <a:r>
+              <a:rPr lang="en-US" altLang="zh-TW" dirty="0"/>
+              <a:t>// 1~5 </a:t>
+            </a:r>
+            <a:r>
+              <a:rPr lang="zh-TW" altLang="en-US" dirty="0"/>
+              <a:t>各有 </a:t>
+            </a:r>
+            <a:r>
+              <a:rPr lang="en-US" altLang="zh-TW" dirty="0"/>
+              <a:t>50</a:t>
+            </a:r>
+            <a:endParaRPr lang="zh-TW" altLang="en-US" dirty="0"/>
+          </a:p>
+          <a:p>
+            <a:r>
+              <a:rPr lang="zh-TW" altLang="en-US" dirty="0"/>
+              <a:t>    </a:t>
+            </a:r>
+            <a:r>
+              <a:rPr lang="en-US" altLang="zh-TW" dirty="0"/>
+              <a:t>// 6 </a:t>
+            </a:r>
+            <a:r>
+              <a:rPr lang="zh-TW" altLang="en-US" dirty="0"/>
+              <a:t>有 </a:t>
+            </a:r>
+            <a:r>
+              <a:rPr lang="en-US" altLang="zh-TW" dirty="0"/>
+              <a:t>40</a:t>
+            </a:r>
+            <a:endParaRPr lang="zh-TW" altLang="en-US" dirty="0"/>
+          </a:p>
+          <a:p>
+            <a:r>
+              <a:rPr lang="zh-TW" altLang="en-US" dirty="0"/>
+              <a:t>    </a:t>
+            </a:r>
+            <a:r>
+              <a:rPr lang="en-US" altLang="zh-TW" dirty="0"/>
+              <a:t>// 7 </a:t>
+            </a:r>
+            <a:r>
+              <a:rPr lang="zh-TW" altLang="en-US" dirty="0"/>
+              <a:t>有 </a:t>
+            </a:r>
+            <a:r>
+              <a:rPr lang="en-US" altLang="zh-TW" dirty="0"/>
+              <a:t>10</a:t>
+            </a:r>
+            <a:endParaRPr lang="zh-TW" altLang="en-US" dirty="0"/>
+          </a:p>
+          <a:p>
+            <a:r>
+              <a:rPr lang="zh-TW" altLang="en-US" dirty="0"/>
+              <a:t>    </a:t>
+            </a:r>
+            <a:r>
+              <a:rPr lang="en-US" altLang="zh-TW" dirty="0"/>
+              <a:t>// </a:t>
+            </a:r>
+            <a:r>
+              <a:rPr lang="zh-TW" altLang="en-US" dirty="0"/>
+              <a:t>總共 </a:t>
+            </a:r>
+            <a:r>
+              <a:rPr lang="en-US" altLang="zh-TW" dirty="0"/>
+              <a:t>320</a:t>
+            </a:r>
+            <a:endParaRPr lang="zh-TW" altLang="en-US" dirty="0"/>
+          </a:p>
+          <a:p>
+            <a:r>
+              <a:rPr lang="zh-TW" altLang="en-US" dirty="0"/>
+              <a:t>    </a:t>
+            </a:r>
+            <a:r>
+              <a:rPr lang="en-US" altLang="zh-TW" dirty="0"/>
+              <a:t>// </a:t>
+            </a:r>
+            <a:r>
+              <a:rPr lang="zh-TW" altLang="en-US" dirty="0"/>
+              <a:t>產生 </a:t>
+            </a:r>
+            <a:r>
+              <a:rPr lang="en-US" altLang="zh-TW" dirty="0"/>
+              <a:t>0 </a:t>
+            </a:r>
+            <a:r>
+              <a:rPr lang="zh-TW" altLang="en-US" dirty="0"/>
+              <a:t>的機率為 </a:t>
+            </a:r>
+            <a:r>
+              <a:rPr lang="en-US" altLang="zh-TW" dirty="0"/>
+              <a:t>20/320</a:t>
+            </a:r>
+            <a:endParaRPr lang="zh-TW" altLang="en-US" dirty="0"/>
+          </a:p>
+          <a:p>
+            <a:r>
+              <a:rPr lang="zh-TW" altLang="en-US" dirty="0"/>
+              <a:t>  </a:t>
+            </a:r>
+            <a:r>
+              <a:rPr lang="en-US" altLang="zh-TW" dirty="0"/>
+              <a:t>constraint dist1  {  </a:t>
+            </a:r>
+            <a:r>
+              <a:rPr lang="en-US" altLang="zh-TW" dirty="0" err="1"/>
+              <a:t>typ</a:t>
+            </a:r>
+            <a:r>
+              <a:rPr lang="en-US" altLang="zh-TW" dirty="0"/>
+              <a:t> </a:t>
+            </a:r>
+            <a:r>
+              <a:rPr lang="en-US" altLang="zh-TW" dirty="0" err="1"/>
+              <a:t>dist</a:t>
+            </a:r>
+            <a:r>
+              <a:rPr lang="en-US" altLang="zh-TW" dirty="0"/>
+              <a:t> { 0:=20, [1:5]:=50, 6:=40, 7:=10}; }</a:t>
+            </a:r>
+          </a:p>
+          <a:p>
+            <a:r>
+              <a:rPr lang="en-US" altLang="zh-TW" dirty="0" err="1"/>
+              <a:t>endclass</a:t>
+            </a:r>
+            <a:endParaRPr lang="en-US" altLang="zh-TW" dirty="0"/>
+          </a:p>
+        </p:txBody>
+      </p:sp>
+    </p:spTree>
+    <p:extLst>
+      <p:ext uri="{BB962C8B-B14F-4D97-AF65-F5344CB8AC3E}">
+        <p14:creationId xmlns:p14="http://schemas.microsoft.com/office/powerpoint/2010/main" val="3328798311"/>
+      </p:ext>
+    </p:extLst>
+  </p:cSld>
+  <p:clrMapOvr>
+    <a:masterClrMapping/>
+  </p:clrMapOvr>
+</p:sld>
+</file>
+
+<file path=ppt/slides/slide53.xml><?xml version="1.0" encoding="utf-8"?>
+<p:sld xmlns:a="http://schemas.openxmlformats.org/drawingml/2006/main" xmlns:r="http://schemas.openxmlformats.org/officeDocument/2006/relationships" xmlns:p="http://schemas.openxmlformats.org/presentationml/2006/main">
+  <p:cSld>
+    <p:spTree>
+      <p:nvGrpSpPr>
+        <p:cNvPr id="1" name="">
+          <a:extLst>
+            <a:ext uri="{FF2B5EF4-FFF2-40B4-BE49-F238E27FC236}">
+              <a16:creationId xmlns:a16="http://schemas.microsoft.com/office/drawing/2014/main" id="{96FA53DD-D9CC-3572-CBFF-08E4993C5A01}"/>
+            </a:ext>
+          </a:extLst>
+        </p:cNvPr>
+        <p:cNvGrpSpPr/>
+        <p:nvPr/>
+      </p:nvGrpSpPr>
+      <p:grpSpPr>
+        <a:xfrm>
+          <a:off x="0" y="0"/>
+          <a:ext cx="0" cy="0"/>
+          <a:chOff x="0" y="0"/>
+          <a:chExt cx="0" cy="0"/>
+        </a:xfrm>
+      </p:grpSpPr>
+      <p:sp>
+        <p:nvSpPr>
+          <p:cNvPr id="2" name="標題 1">
+            <a:extLst>
+              <a:ext uri="{FF2B5EF4-FFF2-40B4-BE49-F238E27FC236}">
+                <a16:creationId xmlns:a16="http://schemas.microsoft.com/office/drawing/2014/main" id="{3011EA4F-1500-2281-B596-D7849AB31B7F}"/>
+              </a:ext>
+            </a:extLst>
+          </p:cNvPr>
+          <p:cNvSpPr>
+            <a:spLocks noGrp="1"/>
+          </p:cNvSpPr>
+          <p:nvPr>
+            <p:ph type="title"/>
+          </p:nvPr>
+        </p:nvSpPr>
+        <p:spPr/>
+        <p:txBody>
+          <a:bodyPr/>
+          <a:lstStyle/>
+          <a:p>
+            <a:r>
+              <a:rPr lang="en-US" altLang="zh-TW" dirty="0"/>
+              <a:t>Constraint Operator</a:t>
+            </a:r>
+            <a:r>
+              <a:rPr lang="zh-TW" altLang="en-US" dirty="0"/>
+              <a:t> </a:t>
+            </a:r>
+            <a:r>
+              <a:rPr lang="en-US" altLang="zh-TW" dirty="0"/>
+              <a:t>(4/5)</a:t>
+            </a:r>
+            <a:endParaRPr lang="zh-TW" altLang="en-US" dirty="0"/>
+          </a:p>
+        </p:txBody>
+      </p:sp>
+      <p:sp>
+        <p:nvSpPr>
+          <p:cNvPr id="5" name="內容版面配置區 4">
+            <a:extLst>
+              <a:ext uri="{FF2B5EF4-FFF2-40B4-BE49-F238E27FC236}">
+                <a16:creationId xmlns:a16="http://schemas.microsoft.com/office/drawing/2014/main" id="{7C72E379-ACE4-FAC5-827E-4F0FE59473A1}"/>
+              </a:ext>
+            </a:extLst>
+          </p:cNvPr>
+          <p:cNvSpPr>
+            <a:spLocks noGrp="1"/>
+          </p:cNvSpPr>
+          <p:nvPr>
+            <p:ph idx="1"/>
+          </p:nvPr>
+        </p:nvSpPr>
+        <p:spPr/>
+        <p:txBody>
+          <a:bodyPr/>
+          <a:lstStyle/>
+          <a:p>
+            <a:pPr marL="514350" indent="-514350">
+              <a:buFont typeface="+mj-lt"/>
+              <a:buAutoNum type="arabicPeriod" startAt="3"/>
+            </a:pPr>
+            <a:r>
+              <a:rPr lang="zh-TW" altLang="en-US" dirty="0"/>
+              <a:t>在 </a:t>
+            </a:r>
+            <a:r>
+              <a:rPr lang="en-US" altLang="zh-TW" dirty="0" err="1"/>
+              <a:t>constriant</a:t>
+            </a:r>
+            <a:r>
+              <a:rPr lang="en-US" altLang="zh-TW" dirty="0"/>
+              <a:t> block </a:t>
+            </a:r>
+            <a:r>
+              <a:rPr lang="zh-TW" altLang="en-US" dirty="0"/>
+              <a:t>常見的用法</a:t>
+            </a:r>
+          </a:p>
+          <a:p>
+            <a:pPr marL="971550" lvl="1" indent="-514350">
+              <a:buFont typeface="+mj-lt"/>
+              <a:buAutoNum type="arabicPeriod"/>
+            </a:pPr>
+            <a:r>
+              <a:rPr lang="en-US" altLang="zh-TW" dirty="0"/>
+              <a:t>-&gt;</a:t>
+            </a:r>
+            <a:endParaRPr lang="zh-TW" altLang="en-US" dirty="0"/>
+          </a:p>
+          <a:p>
+            <a:pPr marL="971550" lvl="1" indent="-514350">
+              <a:buFont typeface="+mj-lt"/>
+              <a:buAutoNum type="arabicPeriod"/>
+            </a:pPr>
+            <a:endParaRPr lang="en-US" altLang="zh-TW" dirty="0"/>
+          </a:p>
+        </p:txBody>
+      </p:sp>
+      <p:sp>
+        <p:nvSpPr>
+          <p:cNvPr id="3" name="文字方塊 2">
+            <a:extLst>
+              <a:ext uri="{FF2B5EF4-FFF2-40B4-BE49-F238E27FC236}">
+                <a16:creationId xmlns:a16="http://schemas.microsoft.com/office/drawing/2014/main" id="{CFA42DD9-160B-F365-233A-7E9A214D69F5}"/>
+              </a:ext>
+            </a:extLst>
+          </p:cNvPr>
+          <p:cNvSpPr txBox="1"/>
+          <p:nvPr/>
+        </p:nvSpPr>
+        <p:spPr>
+          <a:xfrm>
+            <a:off x="2868868" y="3429000"/>
+            <a:ext cx="6454264" cy="2031325"/>
+          </a:xfrm>
+          <a:prstGeom prst="rect">
+            <a:avLst/>
+          </a:prstGeom>
+          <a:noFill/>
+          <a:ln>
+            <a:solidFill>
+              <a:schemeClr val="tx1"/>
+            </a:solidFill>
+          </a:ln>
+        </p:spPr>
+        <p:txBody>
+          <a:bodyPr wrap="square" rtlCol="0">
+            <a:spAutoFit/>
+          </a:bodyPr>
+          <a:lstStyle/>
+          <a:p>
+            <a:r>
+              <a:rPr lang="en-US" altLang="zh-TW" dirty="0"/>
+              <a:t>// </a:t>
+            </a:r>
+            <a:r>
+              <a:rPr lang="zh-TW" altLang="en-US" dirty="0"/>
+              <a:t>當 </a:t>
+            </a:r>
+            <a:r>
+              <a:rPr lang="en-US" altLang="zh-TW" dirty="0"/>
+              <a:t>mode == 2 </a:t>
+            </a:r>
+            <a:r>
+              <a:rPr lang="zh-TW" altLang="en-US" dirty="0"/>
+              <a:t>時，</a:t>
+            </a:r>
+            <a:r>
+              <a:rPr lang="en-US" altLang="zh-TW" dirty="0" err="1"/>
+              <a:t>len</a:t>
+            </a:r>
+            <a:r>
+              <a:rPr lang="en-US" altLang="zh-TW" dirty="0"/>
+              <a:t> &gt; 10</a:t>
+            </a:r>
+          </a:p>
+          <a:p>
+            <a:r>
+              <a:rPr lang="en-US" altLang="zh-TW" dirty="0"/>
+              <a:t>constraint </a:t>
+            </a:r>
+            <a:r>
+              <a:rPr lang="en-US" altLang="zh-TW" dirty="0" err="1"/>
+              <a:t>c_mode</a:t>
+            </a:r>
+            <a:r>
+              <a:rPr lang="en-US" altLang="zh-TW" dirty="0"/>
+              <a:t> {  mode == 2 -&gt; </a:t>
+            </a:r>
+            <a:r>
+              <a:rPr lang="en-US" altLang="zh-TW" dirty="0" err="1"/>
+              <a:t>len</a:t>
+            </a:r>
+            <a:r>
+              <a:rPr lang="en-US" altLang="zh-TW" dirty="0"/>
+              <a:t> &gt; 10; }</a:t>
+            </a:r>
+          </a:p>
+          <a:p>
+            <a:br>
+              <a:rPr lang="en-US" altLang="zh-TW" dirty="0"/>
+            </a:br>
+            <a:r>
+              <a:rPr lang="en-US" altLang="zh-TW" dirty="0"/>
+              <a:t>// </a:t>
+            </a:r>
+            <a:r>
+              <a:rPr lang="zh-TW" altLang="en-US" dirty="0"/>
+              <a:t>意思跟上面一樣</a:t>
+            </a:r>
+          </a:p>
+          <a:p>
+            <a:r>
+              <a:rPr lang="en-US" altLang="zh-TW" dirty="0"/>
+              <a:t>constraint </a:t>
+            </a:r>
+            <a:r>
+              <a:rPr lang="en-US" altLang="zh-TW" dirty="0" err="1"/>
+              <a:t>c_mode</a:t>
+            </a:r>
+            <a:r>
+              <a:rPr lang="en-US" altLang="zh-TW" dirty="0"/>
+              <a:t> { if (mode == 2)</a:t>
+            </a:r>
+          </a:p>
+          <a:p>
+            <a:r>
+              <a:rPr lang="en-US" altLang="zh-TW" dirty="0"/>
+              <a:t>                                              </a:t>
+            </a:r>
+            <a:r>
+              <a:rPr lang="en-US" altLang="zh-TW" dirty="0" err="1"/>
+              <a:t>len</a:t>
+            </a:r>
+            <a:r>
+              <a:rPr lang="en-US" altLang="zh-TW" dirty="0"/>
+              <a:t> &gt; 10;</a:t>
+            </a:r>
+          </a:p>
+          <a:p>
+            <a:r>
+              <a:rPr lang="en-US" altLang="zh-TW" dirty="0"/>
+              <a:t>                                          }</a:t>
+            </a:r>
+          </a:p>
+        </p:txBody>
+      </p:sp>
+    </p:spTree>
+    <p:extLst>
+      <p:ext uri="{BB962C8B-B14F-4D97-AF65-F5344CB8AC3E}">
+        <p14:creationId xmlns:p14="http://schemas.microsoft.com/office/powerpoint/2010/main" val="1452776486"/>
+      </p:ext>
+    </p:extLst>
+  </p:cSld>
+  <p:clrMapOvr>
+    <a:masterClrMapping/>
+  </p:clrMapOvr>
+</p:sld>
+</file>
+
+<file path=ppt/slides/slide54.xml><?xml version="1.0" encoding="utf-8"?>
+<p:sld xmlns:a="http://schemas.openxmlformats.org/drawingml/2006/main" xmlns:r="http://schemas.openxmlformats.org/officeDocument/2006/relationships" xmlns:p="http://schemas.openxmlformats.org/presentationml/2006/main">
+  <p:cSld>
+    <p:spTree>
+      <p:nvGrpSpPr>
+        <p:cNvPr id="1" name="">
+          <a:extLst>
+            <a:ext uri="{FF2B5EF4-FFF2-40B4-BE49-F238E27FC236}">
+              <a16:creationId xmlns:a16="http://schemas.microsoft.com/office/drawing/2014/main" id="{F4224935-DB5D-8F6F-9914-986834B530E1}"/>
+            </a:ext>
+          </a:extLst>
+        </p:cNvPr>
+        <p:cNvGrpSpPr/>
+        <p:nvPr/>
+      </p:nvGrpSpPr>
+      <p:grpSpPr>
+        <a:xfrm>
+          <a:off x="0" y="0"/>
+          <a:ext cx="0" cy="0"/>
+          <a:chOff x="0" y="0"/>
+          <a:chExt cx="0" cy="0"/>
+        </a:xfrm>
+      </p:grpSpPr>
+      <p:sp>
+        <p:nvSpPr>
+          <p:cNvPr id="2" name="標題 1">
+            <a:extLst>
+              <a:ext uri="{FF2B5EF4-FFF2-40B4-BE49-F238E27FC236}">
+                <a16:creationId xmlns:a16="http://schemas.microsoft.com/office/drawing/2014/main" id="{EC92A836-F5A3-5DE6-01A7-0BE370FED0BA}"/>
+              </a:ext>
+            </a:extLst>
+          </p:cNvPr>
+          <p:cNvSpPr>
+            <a:spLocks noGrp="1"/>
+          </p:cNvSpPr>
+          <p:nvPr>
+            <p:ph type="title"/>
+          </p:nvPr>
+        </p:nvSpPr>
+        <p:spPr/>
+        <p:txBody>
+          <a:bodyPr/>
+          <a:lstStyle/>
+          <a:p>
+            <a:r>
+              <a:rPr lang="en-US" altLang="zh-TW" dirty="0"/>
+              <a:t>Constraint Operator</a:t>
+            </a:r>
+            <a:r>
+              <a:rPr lang="zh-TW" altLang="en-US" dirty="0"/>
+              <a:t> </a:t>
+            </a:r>
+            <a:r>
+              <a:rPr lang="en-US" altLang="zh-TW" dirty="0"/>
+              <a:t>(5/5)</a:t>
+            </a:r>
+            <a:endParaRPr lang="zh-TW" altLang="en-US" dirty="0"/>
+          </a:p>
+        </p:txBody>
+      </p:sp>
+      <p:sp>
+        <p:nvSpPr>
+          <p:cNvPr id="5" name="內容版面配置區 4">
+            <a:extLst>
+              <a:ext uri="{FF2B5EF4-FFF2-40B4-BE49-F238E27FC236}">
+                <a16:creationId xmlns:a16="http://schemas.microsoft.com/office/drawing/2014/main" id="{F62D658F-5EDC-4FAE-0155-1EDA33005813}"/>
+              </a:ext>
+            </a:extLst>
+          </p:cNvPr>
+          <p:cNvSpPr>
+            <a:spLocks noGrp="1"/>
+          </p:cNvSpPr>
+          <p:nvPr>
+            <p:ph idx="1"/>
+          </p:nvPr>
+        </p:nvSpPr>
+        <p:spPr/>
+        <p:txBody>
+          <a:bodyPr/>
+          <a:lstStyle/>
+          <a:p>
+            <a:pPr marL="514350" indent="-514350">
+              <a:buFont typeface="+mj-lt"/>
+              <a:buAutoNum type="arabicPeriod" startAt="3"/>
+            </a:pPr>
+            <a:r>
+              <a:rPr lang="zh-TW" altLang="en-US" dirty="0"/>
+              <a:t>在 </a:t>
+            </a:r>
+            <a:r>
+              <a:rPr lang="en-US" altLang="zh-TW" dirty="0" err="1"/>
+              <a:t>constriant</a:t>
+            </a:r>
+            <a:r>
+              <a:rPr lang="en-US" altLang="zh-TW" dirty="0"/>
+              <a:t> block </a:t>
+            </a:r>
+            <a:r>
+              <a:rPr lang="zh-TW" altLang="en-US" dirty="0"/>
+              <a:t>常見的用法</a:t>
+            </a:r>
+          </a:p>
+          <a:p>
+            <a:pPr marL="971550" lvl="1" indent="-514350">
+              <a:buFont typeface="+mj-lt"/>
+              <a:buAutoNum type="arabicPeriod" startAt="4"/>
+            </a:pPr>
+            <a:r>
+              <a:rPr lang="en-US" altLang="zh-TW" dirty="0"/>
+              <a:t>solve before</a:t>
+            </a:r>
+          </a:p>
+          <a:p>
+            <a:pPr marL="971550" lvl="1" indent="-514350">
+              <a:buFont typeface="+mj-lt"/>
+              <a:buAutoNum type="arabicPeriod" startAt="4"/>
+            </a:pPr>
+            <a:endParaRPr lang="zh-TW" altLang="en-US" dirty="0"/>
+          </a:p>
+          <a:p>
+            <a:pPr marL="971550" lvl="1" indent="-514350">
+              <a:buFont typeface="+mj-lt"/>
+              <a:buAutoNum type="arabicPeriod" startAt="4"/>
+            </a:pPr>
+            <a:endParaRPr lang="en-US" altLang="zh-TW" dirty="0"/>
+          </a:p>
+        </p:txBody>
+      </p:sp>
+      <p:sp>
+        <p:nvSpPr>
+          <p:cNvPr id="3" name="文字方塊 2">
+            <a:extLst>
+              <a:ext uri="{FF2B5EF4-FFF2-40B4-BE49-F238E27FC236}">
+                <a16:creationId xmlns:a16="http://schemas.microsoft.com/office/drawing/2014/main" id="{48F60D44-C083-957C-34DB-03C07889DD64}"/>
+              </a:ext>
+            </a:extLst>
+          </p:cNvPr>
+          <p:cNvSpPr txBox="1"/>
+          <p:nvPr/>
+        </p:nvSpPr>
+        <p:spPr>
+          <a:xfrm>
+            <a:off x="2868868" y="2799556"/>
+            <a:ext cx="6454264" cy="3693319"/>
+          </a:xfrm>
+          <a:prstGeom prst="rect">
+            <a:avLst/>
+          </a:prstGeom>
+          <a:noFill/>
+          <a:ln>
+            <a:solidFill>
+              <a:schemeClr val="tx1"/>
+            </a:solidFill>
+          </a:ln>
+        </p:spPr>
+        <p:txBody>
+          <a:bodyPr wrap="square" rtlCol="0">
+            <a:spAutoFit/>
+          </a:bodyPr>
+          <a:lstStyle/>
+          <a:p>
+            <a:r>
+              <a:rPr lang="en-US" altLang="zh-TW" dirty="0"/>
+              <a:t>class ABC;</a:t>
+            </a:r>
+          </a:p>
+          <a:p>
+            <a:r>
+              <a:rPr lang="en-US" altLang="zh-TW" dirty="0"/>
+              <a:t>  rand  bit     a;</a:t>
+            </a:r>
+          </a:p>
+          <a:p>
+            <a:r>
+              <a:rPr lang="en-US" altLang="zh-TW" dirty="0"/>
+              <a:t>  rand  bit [1:0]   b;</a:t>
+            </a:r>
+          </a:p>
+          <a:p>
+            <a:r>
+              <a:rPr lang="en-US" altLang="zh-TW" dirty="0"/>
+              <a:t>  </a:t>
+            </a:r>
+          </a:p>
+          <a:p>
+            <a:r>
+              <a:rPr lang="en-US" altLang="zh-TW" dirty="0"/>
+              <a:t>  // a == 0 </a:t>
+            </a:r>
+            <a:r>
+              <a:rPr lang="zh-TW" altLang="en-US" dirty="0"/>
+              <a:t>時，</a:t>
+            </a:r>
+            <a:r>
+              <a:rPr lang="en-US" altLang="zh-TW" dirty="0"/>
+              <a:t>b </a:t>
+            </a:r>
+            <a:r>
+              <a:rPr lang="zh-TW" altLang="en-US" dirty="0"/>
+              <a:t>的可能值為 </a:t>
+            </a:r>
+            <a:r>
+              <a:rPr lang="en-US" altLang="zh-TW" dirty="0"/>
+              <a:t>0 ~ 3   </a:t>
+            </a:r>
+            <a:r>
+              <a:rPr lang="zh-TW" altLang="en-US" dirty="0"/>
+              <a:t>這個部分的機率為 </a:t>
+            </a:r>
+            <a:r>
+              <a:rPr lang="en-US" altLang="zh-TW" dirty="0"/>
+              <a:t>1/2 * 1/4</a:t>
+            </a:r>
+            <a:endParaRPr lang="zh-TW" altLang="en-US" dirty="0"/>
+          </a:p>
+          <a:p>
+            <a:r>
+              <a:rPr lang="zh-TW" altLang="en-US" dirty="0"/>
+              <a:t>  </a:t>
+            </a:r>
+            <a:r>
+              <a:rPr lang="en-US" altLang="zh-TW" dirty="0"/>
+              <a:t>// a == 1 </a:t>
+            </a:r>
+            <a:r>
+              <a:rPr lang="zh-TW" altLang="en-US" dirty="0"/>
+              <a:t>時，</a:t>
+            </a:r>
+            <a:r>
+              <a:rPr lang="en-US" altLang="zh-TW" dirty="0"/>
+              <a:t>b </a:t>
+            </a:r>
+            <a:r>
+              <a:rPr lang="zh-TW" altLang="en-US" dirty="0"/>
+              <a:t>的可能值為 </a:t>
+            </a:r>
+            <a:r>
+              <a:rPr lang="en-US" altLang="zh-TW" dirty="0"/>
+              <a:t>3       </a:t>
+            </a:r>
+            <a:r>
+              <a:rPr lang="zh-TW" altLang="en-US" dirty="0"/>
+              <a:t>這個部分的機率為 </a:t>
+            </a:r>
+            <a:r>
+              <a:rPr lang="en-US" altLang="zh-TW" dirty="0"/>
+              <a:t>1/2</a:t>
+            </a:r>
+            <a:endParaRPr lang="zh-TW" altLang="en-US" dirty="0"/>
+          </a:p>
+          <a:p>
+            <a:r>
+              <a:rPr lang="zh-TW" altLang="en-US" dirty="0"/>
+              <a:t>  </a:t>
+            </a:r>
+            <a:r>
+              <a:rPr lang="en-US" altLang="zh-TW" dirty="0"/>
+              <a:t>constraint </a:t>
+            </a:r>
+            <a:r>
+              <a:rPr lang="en-US" altLang="zh-TW" dirty="0" err="1"/>
+              <a:t>c_ab</a:t>
+            </a:r>
+            <a:r>
+              <a:rPr lang="en-US" altLang="zh-TW" dirty="0"/>
+              <a:t> { a -&gt; b == 3'h3;</a:t>
+            </a:r>
+          </a:p>
+          <a:p>
+            <a:br>
+              <a:rPr lang="en-US" altLang="zh-TW" dirty="0"/>
+            </a:br>
+            <a:r>
+              <a:rPr lang="en-US" altLang="zh-TW" dirty="0"/>
+              <a:t>                                       // </a:t>
+            </a:r>
+            <a:r>
+              <a:rPr lang="zh-TW" altLang="en-US" dirty="0"/>
+              <a:t>告訴 </a:t>
+            </a:r>
+            <a:r>
+              <a:rPr lang="en-US" altLang="zh-TW" dirty="0"/>
+              <a:t>solver </a:t>
+            </a:r>
+          </a:p>
+          <a:p>
+            <a:r>
+              <a:rPr lang="en-US" altLang="zh-TW" dirty="0"/>
+              <a:t>                                       // </a:t>
+            </a:r>
+            <a:r>
+              <a:rPr lang="zh-TW" altLang="en-US" dirty="0"/>
+              <a:t>先 決定 </a:t>
+            </a:r>
+            <a:r>
+              <a:rPr lang="en-US" altLang="zh-TW" dirty="0"/>
+              <a:t>a</a:t>
+            </a:r>
+            <a:r>
+              <a:rPr lang="zh-TW" altLang="en-US" dirty="0"/>
+              <a:t>，在依照 </a:t>
+            </a:r>
+            <a:r>
+              <a:rPr lang="en-US" altLang="zh-TW" dirty="0"/>
+              <a:t>constraint </a:t>
+            </a:r>
+            <a:r>
+              <a:rPr lang="zh-TW" altLang="en-US" dirty="0"/>
+              <a:t>去決定 </a:t>
+            </a:r>
+            <a:r>
+              <a:rPr lang="en-US" altLang="zh-TW" dirty="0"/>
+              <a:t>b</a:t>
+            </a:r>
+          </a:p>
+          <a:p>
+            <a:r>
+              <a:rPr lang="en-US" altLang="zh-TW" dirty="0"/>
+              <a:t>                                       solve a before b;</a:t>
+            </a:r>
+          </a:p>
+          <a:p>
+            <a:r>
+              <a:rPr lang="en-US" altLang="zh-TW" dirty="0"/>
+              <a:t>                                     }</a:t>
+            </a:r>
+          </a:p>
+          <a:p>
+            <a:r>
+              <a:rPr lang="en-US" altLang="zh-TW" dirty="0" err="1"/>
+              <a:t>endclass</a:t>
+            </a:r>
+            <a:endParaRPr lang="en-US" altLang="zh-TW" dirty="0"/>
+          </a:p>
+        </p:txBody>
+      </p:sp>
+    </p:spTree>
+    <p:extLst>
+      <p:ext uri="{BB962C8B-B14F-4D97-AF65-F5344CB8AC3E}">
+        <p14:creationId xmlns:p14="http://schemas.microsoft.com/office/powerpoint/2010/main" val="3930105507"/>
+      </p:ext>
+    </p:extLst>
+  </p:cSld>
+  <p:clrMapOvr>
+    <a:masterClrMapping/>
+  </p:clrMapOvr>
+</p:sld>
+</file>
+
+<file path=ppt/slides/slide55.xml><?xml version="1.0" encoding="utf-8"?>
+<p:sld xmlns:a="http://schemas.openxmlformats.org/drawingml/2006/main" xmlns:r="http://schemas.openxmlformats.org/officeDocument/2006/relationships" xmlns:p="http://schemas.openxmlformats.org/presentationml/2006/main">
+  <p:cSld>
+    <p:spTree>
+      <p:nvGrpSpPr>
+        <p:cNvPr id="1" name="">
+          <a:extLst>
+            <a:ext uri="{FF2B5EF4-FFF2-40B4-BE49-F238E27FC236}">
+              <a16:creationId xmlns:a16="http://schemas.microsoft.com/office/drawing/2014/main" id="{2C7AE8B6-CED5-3C23-8C38-79E1EEF94ABA}"/>
+            </a:ext>
+          </a:extLst>
+        </p:cNvPr>
+        <p:cNvGrpSpPr/>
+        <p:nvPr/>
+      </p:nvGrpSpPr>
+      <p:grpSpPr>
+        <a:xfrm>
+          <a:off x="0" y="0"/>
+          <a:ext cx="0" cy="0"/>
+          <a:chOff x="0" y="0"/>
+          <a:chExt cx="0" cy="0"/>
+        </a:xfrm>
+      </p:grpSpPr>
+      <p:sp>
+        <p:nvSpPr>
+          <p:cNvPr id="2" name="標題 1">
+            <a:extLst>
+              <a:ext uri="{FF2B5EF4-FFF2-40B4-BE49-F238E27FC236}">
+                <a16:creationId xmlns:a16="http://schemas.microsoft.com/office/drawing/2014/main" id="{CB212A7D-378A-B654-47FC-2D07E5285F00}"/>
+              </a:ext>
+            </a:extLst>
+          </p:cNvPr>
+          <p:cNvSpPr>
+            <a:spLocks noGrp="1"/>
+          </p:cNvSpPr>
+          <p:nvPr>
+            <p:ph type="title"/>
+          </p:nvPr>
+        </p:nvSpPr>
+        <p:spPr/>
+        <p:txBody>
+          <a:bodyPr/>
+          <a:lstStyle/>
+          <a:p>
+            <a:r>
+              <a:rPr lang="en-US" altLang="zh-TW" dirty="0"/>
+              <a:t>Static constraint (1/2)</a:t>
+            </a:r>
+            <a:endParaRPr lang="zh-TW" altLang="en-US" dirty="0"/>
+          </a:p>
+        </p:txBody>
+      </p:sp>
+      <p:sp>
+        <p:nvSpPr>
+          <p:cNvPr id="4" name="內容版面配置區 3">
+            <a:extLst>
+              <a:ext uri="{FF2B5EF4-FFF2-40B4-BE49-F238E27FC236}">
+                <a16:creationId xmlns:a16="http://schemas.microsoft.com/office/drawing/2014/main" id="{2CE59000-0C70-AE60-D32E-DD8D0C094510}"/>
+              </a:ext>
+            </a:extLst>
+          </p:cNvPr>
+          <p:cNvSpPr>
+            <a:spLocks noGrp="1"/>
+          </p:cNvSpPr>
+          <p:nvPr>
+            <p:ph idx="1"/>
+          </p:nvPr>
+        </p:nvSpPr>
+        <p:spPr/>
+        <p:txBody>
+          <a:bodyPr/>
+          <a:lstStyle/>
+          <a:p>
+            <a:r>
+              <a:rPr lang="en-US" altLang="zh-TW" dirty="0"/>
+              <a:t>constraint </a:t>
+            </a:r>
+            <a:r>
+              <a:rPr lang="zh-TW" altLang="en-US" dirty="0"/>
+              <a:t>可以宣告成 </a:t>
+            </a:r>
+            <a:r>
+              <a:rPr lang="en-US" altLang="zh-TW" dirty="0"/>
+              <a:t>static </a:t>
+            </a:r>
+            <a:r>
+              <a:rPr lang="zh-TW" altLang="en-US" dirty="0"/>
+              <a:t>型態</a:t>
+            </a:r>
+            <a:endParaRPr lang="en-US" altLang="zh-TW" dirty="0"/>
+          </a:p>
+          <a:p>
+            <a:endParaRPr lang="en-US" altLang="zh-TW" dirty="0"/>
+          </a:p>
+          <a:p>
+            <a:r>
+              <a:rPr lang="zh-TW" altLang="en-US" dirty="0"/>
+              <a:t>當 </a:t>
+            </a:r>
+            <a:r>
+              <a:rPr lang="en-US" altLang="zh-TW" dirty="0"/>
+              <a:t>constraint </a:t>
+            </a:r>
+            <a:r>
+              <a:rPr lang="zh-TW" altLang="en-US" dirty="0"/>
+              <a:t>為 </a:t>
+            </a:r>
+            <a:r>
+              <a:rPr lang="en-US" altLang="zh-TW" dirty="0"/>
+              <a:t>static</a:t>
+            </a:r>
+            <a:r>
+              <a:rPr lang="zh-TW" altLang="en-US" dirty="0"/>
+              <a:t>，則此 </a:t>
+            </a:r>
+            <a:r>
+              <a:rPr lang="en-US" altLang="zh-TW" dirty="0"/>
+              <a:t>constraint </a:t>
+            </a:r>
+            <a:r>
+              <a:rPr lang="zh-TW" altLang="en-US" dirty="0"/>
+              <a:t>為個物件共用的 </a:t>
+            </a:r>
+            <a:r>
+              <a:rPr lang="en-US" altLang="zh-TW" dirty="0"/>
+              <a:t>constraint</a:t>
+            </a:r>
+          </a:p>
+          <a:p>
+            <a:endParaRPr lang="en-US" altLang="zh-TW" dirty="0"/>
+          </a:p>
+          <a:p>
+            <a:r>
+              <a:rPr lang="zh-TW" altLang="en-US" dirty="0"/>
+              <a:t>有任一物件使用 </a:t>
+            </a:r>
+            <a:r>
+              <a:rPr lang="en-US" altLang="zh-TW" dirty="0">
+                <a:solidFill>
+                  <a:srgbClr val="FF0000"/>
+                </a:solidFill>
+              </a:rPr>
+              <a:t>.</a:t>
+            </a:r>
+            <a:r>
+              <a:rPr lang="en-US" altLang="zh-TW" dirty="0" err="1">
+                <a:solidFill>
+                  <a:srgbClr val="FF0000"/>
+                </a:solidFill>
+              </a:rPr>
+              <a:t>constraint_mode</a:t>
+            </a:r>
+            <a:r>
+              <a:rPr lang="en-US" altLang="zh-TW" dirty="0">
+                <a:solidFill>
+                  <a:srgbClr val="FF0000"/>
+                </a:solidFill>
+              </a:rPr>
+              <a:t>(); </a:t>
+            </a:r>
+            <a:r>
+              <a:rPr lang="zh-TW" altLang="en-US" dirty="0"/>
+              <a:t>去開關 </a:t>
+            </a:r>
+            <a:r>
+              <a:rPr lang="en-US" altLang="zh-TW" dirty="0"/>
+              <a:t>constraint </a:t>
+            </a:r>
+            <a:r>
+              <a:rPr lang="zh-TW" altLang="en-US" dirty="0"/>
+              <a:t>時，</a:t>
+            </a:r>
+            <a:br>
+              <a:rPr lang="en-US" altLang="zh-TW" dirty="0"/>
+            </a:br>
+            <a:r>
+              <a:rPr lang="zh-TW" altLang="en-US" dirty="0"/>
+              <a:t>其他物件也會開關此 </a:t>
+            </a:r>
+            <a:r>
+              <a:rPr lang="en-US" altLang="zh-TW" dirty="0"/>
+              <a:t>static constraint</a:t>
+            </a:r>
+          </a:p>
+          <a:p>
+            <a:endParaRPr lang="zh-TW" altLang="en-US" dirty="0"/>
+          </a:p>
+        </p:txBody>
+      </p:sp>
+    </p:spTree>
+    <p:extLst>
+      <p:ext uri="{BB962C8B-B14F-4D97-AF65-F5344CB8AC3E}">
+        <p14:creationId xmlns:p14="http://schemas.microsoft.com/office/powerpoint/2010/main" val="2009178219"/>
+      </p:ext>
+    </p:extLst>
+  </p:cSld>
+  <p:clrMapOvr>
+    <a:masterClrMapping/>
+  </p:clrMapOvr>
+</p:sld>
+</file>
+
+<file path=ppt/slides/slide56.xml><?xml version="1.0" encoding="utf-8"?>
+<p:sld xmlns:a="http://schemas.openxmlformats.org/drawingml/2006/main" xmlns:r="http://schemas.openxmlformats.org/officeDocument/2006/relationships" xmlns:p="http://schemas.openxmlformats.org/presentationml/2006/main">
+  <p:cSld>
+    <p:spTree>
+      <p:nvGrpSpPr>
+        <p:cNvPr id="1" name="">
+          <a:extLst>
+            <a:ext uri="{FF2B5EF4-FFF2-40B4-BE49-F238E27FC236}">
+              <a16:creationId xmlns:a16="http://schemas.microsoft.com/office/drawing/2014/main" id="{0E08BC10-2E13-16DB-CCB0-DAD644CF2E61}"/>
+            </a:ext>
+          </a:extLst>
+        </p:cNvPr>
+        <p:cNvGrpSpPr/>
+        <p:nvPr/>
+      </p:nvGrpSpPr>
+      <p:grpSpPr>
+        <a:xfrm>
+          <a:off x="0" y="0"/>
+          <a:ext cx="0" cy="0"/>
+          <a:chOff x="0" y="0"/>
+          <a:chExt cx="0" cy="0"/>
+        </a:xfrm>
+      </p:grpSpPr>
+      <p:sp>
+        <p:nvSpPr>
+          <p:cNvPr id="2" name="標題 1">
+            <a:extLst>
+              <a:ext uri="{FF2B5EF4-FFF2-40B4-BE49-F238E27FC236}">
+                <a16:creationId xmlns:a16="http://schemas.microsoft.com/office/drawing/2014/main" id="{B494E9CF-8866-BE6F-6DFF-FC1E29269FCB}"/>
+              </a:ext>
+            </a:extLst>
+          </p:cNvPr>
+          <p:cNvSpPr>
+            <a:spLocks noGrp="1"/>
+          </p:cNvSpPr>
+          <p:nvPr>
+            <p:ph type="title"/>
+          </p:nvPr>
+        </p:nvSpPr>
+        <p:spPr/>
+        <p:txBody>
+          <a:bodyPr/>
+          <a:lstStyle/>
+          <a:p>
+            <a:r>
+              <a:rPr lang="en-US" altLang="zh-TW" dirty="0"/>
+              <a:t>Static constraint (2/2)</a:t>
+            </a:r>
+            <a:endParaRPr lang="zh-TW" altLang="en-US" dirty="0"/>
+          </a:p>
+        </p:txBody>
+      </p:sp>
+      <p:sp>
+        <p:nvSpPr>
+          <p:cNvPr id="4" name="內容版面配置區 3">
+            <a:extLst>
+              <a:ext uri="{FF2B5EF4-FFF2-40B4-BE49-F238E27FC236}">
+                <a16:creationId xmlns:a16="http://schemas.microsoft.com/office/drawing/2014/main" id="{AF1FBF55-DE0A-1AEC-5173-D0760B027157}"/>
+              </a:ext>
+            </a:extLst>
+          </p:cNvPr>
+          <p:cNvSpPr>
+            <a:spLocks noGrp="1"/>
+          </p:cNvSpPr>
+          <p:nvPr>
+            <p:ph idx="1"/>
+          </p:nvPr>
+        </p:nvSpPr>
+        <p:spPr/>
+        <p:txBody>
+          <a:bodyPr/>
+          <a:lstStyle/>
+          <a:p>
+            <a:pPr marL="0" indent="0">
+              <a:buNone/>
+            </a:pPr>
+            <a:r>
+              <a:rPr lang="en-US" altLang="zh-TW" dirty="0"/>
+              <a:t>Ex:</a:t>
+            </a:r>
+            <a:endParaRPr lang="zh-TW" altLang="en-US" dirty="0"/>
+          </a:p>
+        </p:txBody>
+      </p:sp>
+      <p:sp>
+        <p:nvSpPr>
+          <p:cNvPr id="3" name="文字方塊 2">
+            <a:extLst>
+              <a:ext uri="{FF2B5EF4-FFF2-40B4-BE49-F238E27FC236}">
+                <a16:creationId xmlns:a16="http://schemas.microsoft.com/office/drawing/2014/main" id="{BE5B7448-28B6-6AB1-FB28-02F1B0857A62}"/>
+              </a:ext>
+            </a:extLst>
+          </p:cNvPr>
+          <p:cNvSpPr txBox="1"/>
+          <p:nvPr/>
+        </p:nvSpPr>
+        <p:spPr>
+          <a:xfrm>
+            <a:off x="1184447" y="2474892"/>
+            <a:ext cx="3660269" cy="2246769"/>
+          </a:xfrm>
+          <a:prstGeom prst="rect">
+            <a:avLst/>
+          </a:prstGeom>
+          <a:noFill/>
+          <a:ln>
+            <a:solidFill>
+              <a:schemeClr val="tx1"/>
+            </a:solidFill>
+          </a:ln>
+        </p:spPr>
+        <p:txBody>
+          <a:bodyPr wrap="square" rtlCol="0">
+            <a:spAutoFit/>
+          </a:bodyPr>
+          <a:lstStyle/>
+          <a:p>
+            <a:r>
+              <a:rPr lang="en-US" altLang="zh-TW" sz="1600" dirty="0"/>
+              <a:t>class ABC;</a:t>
+            </a:r>
+          </a:p>
+          <a:p>
+            <a:r>
+              <a:rPr lang="en-US" altLang="zh-TW" sz="1600" dirty="0"/>
+              <a:t>  rand bit [3:0]  a;</a:t>
+            </a:r>
+          </a:p>
+          <a:p>
+            <a:br>
+              <a:rPr lang="en-US" altLang="zh-TW" sz="1600" dirty="0"/>
+            </a:br>
+            <a:r>
+              <a:rPr lang="en-US" altLang="zh-TW" sz="1600" dirty="0"/>
+              <a:t>  // "c1" is non-static, but "c2" is static</a:t>
+            </a:r>
+          </a:p>
+          <a:p>
+            <a:r>
+              <a:rPr lang="en-US" altLang="zh-TW" sz="1600" dirty="0"/>
+              <a:t>  constraint c1 { a &gt; 5; }</a:t>
+            </a:r>
+          </a:p>
+          <a:p>
+            <a:r>
+              <a:rPr lang="en-US" altLang="zh-TW" sz="1600" dirty="0"/>
+              <a:t>  static constraint c2 { a &lt; 12; }</a:t>
+            </a:r>
+          </a:p>
+          <a:p>
+            <a:r>
+              <a:rPr lang="en-US" altLang="zh-TW" sz="1600" dirty="0" err="1"/>
+              <a:t>endclass</a:t>
+            </a:r>
+            <a:endParaRPr lang="en-US" altLang="zh-TW" sz="1600" dirty="0"/>
+          </a:p>
+          <a:p>
+            <a:br>
+              <a:rPr lang="en-US" altLang="zh-TW" sz="1400" dirty="0"/>
+            </a:br>
+            <a:endParaRPr lang="en-US" altLang="zh-TW" sz="1400" dirty="0"/>
+          </a:p>
+        </p:txBody>
+      </p:sp>
+      <p:sp>
+        <p:nvSpPr>
+          <p:cNvPr id="5" name="文字方塊 4">
+            <a:extLst>
+              <a:ext uri="{FF2B5EF4-FFF2-40B4-BE49-F238E27FC236}">
+                <a16:creationId xmlns:a16="http://schemas.microsoft.com/office/drawing/2014/main" id="{A764FBD0-CA34-527B-02B7-830C8258B8F1}"/>
+              </a:ext>
+            </a:extLst>
+          </p:cNvPr>
+          <p:cNvSpPr txBox="1"/>
+          <p:nvPr/>
+        </p:nvSpPr>
+        <p:spPr>
+          <a:xfrm>
+            <a:off x="5624100" y="2474892"/>
+            <a:ext cx="6194921" cy="4154984"/>
+          </a:xfrm>
+          <a:prstGeom prst="rect">
+            <a:avLst/>
+          </a:prstGeom>
+          <a:noFill/>
+          <a:ln>
+            <a:solidFill>
+              <a:schemeClr val="tx1"/>
+            </a:solidFill>
+          </a:ln>
+        </p:spPr>
+        <p:txBody>
+          <a:bodyPr wrap="square" rtlCol="0">
+            <a:spAutoFit/>
+          </a:bodyPr>
+          <a:lstStyle/>
+          <a:p>
+            <a:r>
+              <a:rPr lang="en-US" altLang="zh-TW" sz="1600" dirty="0"/>
+              <a:t>module tb;</a:t>
+            </a:r>
+          </a:p>
+          <a:p>
+            <a:r>
+              <a:rPr lang="en-US" altLang="zh-TW" sz="1600" dirty="0"/>
+              <a:t>  initial begin</a:t>
+            </a:r>
+          </a:p>
+          <a:p>
+            <a:r>
+              <a:rPr lang="en-US" altLang="zh-TW" sz="1600" dirty="0"/>
+              <a:t>    ABC obj1 = new;</a:t>
+            </a:r>
+          </a:p>
+          <a:p>
+            <a:r>
+              <a:rPr lang="en-US" altLang="zh-TW" sz="1600" dirty="0"/>
+              <a:t>    ABC obj2 = new;</a:t>
+            </a:r>
+          </a:p>
+          <a:p>
+            <a:br>
+              <a:rPr lang="en-US" altLang="zh-TW" sz="1600" dirty="0"/>
+            </a:br>
+            <a:r>
+              <a:rPr lang="en-US" altLang="zh-TW" sz="1600" dirty="0"/>
+              <a:t>    // Turn non-static constraint</a:t>
+            </a:r>
+          </a:p>
+          <a:p>
+            <a:r>
+              <a:rPr lang="en-US" altLang="zh-TW" sz="1600" dirty="0"/>
+              <a:t>    // </a:t>
+            </a:r>
+            <a:r>
+              <a:rPr lang="zh-TW" altLang="en-US" sz="1600" dirty="0"/>
+              <a:t>當 </a:t>
+            </a:r>
+            <a:r>
+              <a:rPr lang="en-US" altLang="zh-TW" sz="1600" dirty="0"/>
+              <a:t>obj1 </a:t>
+            </a:r>
+            <a:r>
+              <a:rPr lang="zh-TW" altLang="en-US" sz="1600" dirty="0"/>
+              <a:t>去關閉 </a:t>
+            </a:r>
+            <a:r>
+              <a:rPr lang="en-US" altLang="zh-TW" sz="1600" dirty="0"/>
+              <a:t>c2 constraint</a:t>
+            </a:r>
+            <a:r>
+              <a:rPr lang="zh-TW" altLang="en-US" sz="1600" dirty="0"/>
+              <a:t>，則 </a:t>
+            </a:r>
+            <a:r>
+              <a:rPr lang="en-US" altLang="zh-TW" sz="1600" dirty="0"/>
+              <a:t>obj2 </a:t>
+            </a:r>
+            <a:r>
+              <a:rPr lang="zh-TW" altLang="en-US" sz="1600" dirty="0"/>
+              <a:t>的 </a:t>
+            </a:r>
+            <a:r>
+              <a:rPr lang="en-US" altLang="zh-TW" sz="1600" dirty="0"/>
+              <a:t>c2 </a:t>
+            </a:r>
+            <a:r>
+              <a:rPr lang="zh-TW" altLang="en-US" sz="1600" dirty="0"/>
+              <a:t>也會被關閉</a:t>
+            </a:r>
+          </a:p>
+          <a:p>
+            <a:r>
+              <a:rPr lang="zh-TW" altLang="en-US" sz="1600" dirty="0"/>
+              <a:t>    </a:t>
+            </a:r>
+            <a:r>
+              <a:rPr lang="en-US" altLang="zh-TW" sz="1600" dirty="0"/>
+              <a:t>obj1.c2.constraint_mode(0);</a:t>
+            </a:r>
+          </a:p>
+          <a:p>
+            <a:br>
+              <a:rPr lang="en-US" altLang="zh-TW" sz="1600" dirty="0"/>
+            </a:br>
+            <a:r>
+              <a:rPr lang="en-US" altLang="zh-TW" sz="1600" dirty="0"/>
+              <a:t>    for (int </a:t>
+            </a:r>
+            <a:r>
+              <a:rPr lang="en-US" altLang="zh-TW" sz="1600" dirty="0" err="1"/>
+              <a:t>i</a:t>
+            </a:r>
+            <a:r>
+              <a:rPr lang="en-US" altLang="zh-TW" sz="1600" dirty="0"/>
+              <a:t> = 0; </a:t>
+            </a:r>
+            <a:r>
+              <a:rPr lang="en-US" altLang="zh-TW" sz="1600" dirty="0" err="1"/>
+              <a:t>i</a:t>
+            </a:r>
+            <a:r>
+              <a:rPr lang="en-US" altLang="zh-TW" sz="1600" dirty="0"/>
+              <a:t> &lt; 5; </a:t>
+            </a:r>
+            <a:r>
+              <a:rPr lang="en-US" altLang="zh-TW" sz="1600" dirty="0" err="1"/>
+              <a:t>i</a:t>
+            </a:r>
+            <a:r>
+              <a:rPr lang="en-US" altLang="zh-TW" sz="1600" dirty="0"/>
+              <a:t>++) begin</a:t>
+            </a:r>
+          </a:p>
+          <a:p>
+            <a:r>
+              <a:rPr lang="en-US" altLang="zh-TW" sz="1600" dirty="0"/>
+              <a:t>      obj1.randomize();</a:t>
+            </a:r>
+          </a:p>
+          <a:p>
+            <a:r>
+              <a:rPr lang="en-US" altLang="zh-TW" sz="1600" dirty="0"/>
+              <a:t>      obj2.randomize();</a:t>
+            </a:r>
+          </a:p>
+          <a:p>
+            <a:r>
+              <a:rPr lang="en-US" altLang="zh-TW" sz="1600" dirty="0"/>
+              <a:t>      $display ("obj1.a = %0d, obj2.a = %0d", obj1.a, obj2.a);</a:t>
+            </a:r>
+          </a:p>
+          <a:p>
+            <a:r>
+              <a:rPr lang="en-US" altLang="zh-TW" sz="1600" dirty="0"/>
+              <a:t>    end</a:t>
+            </a:r>
+          </a:p>
+          <a:p>
+            <a:r>
+              <a:rPr lang="en-US" altLang="zh-TW" sz="1600" dirty="0"/>
+              <a:t>  end</a:t>
+            </a:r>
+          </a:p>
+          <a:p>
+            <a:r>
+              <a:rPr lang="en-US" altLang="zh-TW" sz="1600" dirty="0" err="1"/>
+              <a:t>endmodule</a:t>
+            </a:r>
+            <a:endParaRPr lang="en-US" altLang="zh-TW" sz="1600" dirty="0"/>
+          </a:p>
+        </p:txBody>
+      </p:sp>
+    </p:spTree>
+    <p:extLst>
+      <p:ext uri="{BB962C8B-B14F-4D97-AF65-F5344CB8AC3E}">
+        <p14:creationId xmlns:p14="http://schemas.microsoft.com/office/powerpoint/2010/main" val="1118955081"/>
+      </p:ext>
+    </p:extLst>
+  </p:cSld>
+  <p:clrMapOvr>
+    <a:masterClrMapping/>
+  </p:clrMapOvr>
+</p:sld>
+</file>
+
+<file path=ppt/slides/slide57.xml><?xml version="1.0" encoding="utf-8"?>
+<p:sld xmlns:a="http://schemas.openxmlformats.org/drawingml/2006/main" xmlns:r="http://schemas.openxmlformats.org/officeDocument/2006/relationships" xmlns:p="http://schemas.openxmlformats.org/presentationml/2006/main">
+  <p:cSld>
+    <p:spTree>
+      <p:nvGrpSpPr>
+        <p:cNvPr id="1" name="">
+          <a:extLst>
+            <a:ext uri="{FF2B5EF4-FFF2-40B4-BE49-F238E27FC236}">
+              <a16:creationId xmlns:a16="http://schemas.microsoft.com/office/drawing/2014/main" id="{2144666E-4165-E4C6-8969-17E24B15EA51}"/>
+            </a:ext>
+          </a:extLst>
+        </p:cNvPr>
+        <p:cNvGrpSpPr/>
+        <p:nvPr/>
+      </p:nvGrpSpPr>
+      <p:grpSpPr>
+        <a:xfrm>
+          <a:off x="0" y="0"/>
+          <a:ext cx="0" cy="0"/>
+          <a:chOff x="0" y="0"/>
+          <a:chExt cx="0" cy="0"/>
+        </a:xfrm>
+      </p:grpSpPr>
+      <p:sp>
+        <p:nvSpPr>
+          <p:cNvPr id="2" name="標題 1">
+            <a:extLst>
+              <a:ext uri="{FF2B5EF4-FFF2-40B4-BE49-F238E27FC236}">
+                <a16:creationId xmlns:a16="http://schemas.microsoft.com/office/drawing/2014/main" id="{A86401DF-DD4A-4417-69C7-CA1AD50F9E3C}"/>
+              </a:ext>
+            </a:extLst>
+          </p:cNvPr>
+          <p:cNvSpPr>
+            <a:spLocks noGrp="1"/>
+          </p:cNvSpPr>
+          <p:nvPr>
+            <p:ph type="title"/>
+          </p:nvPr>
+        </p:nvSpPr>
+        <p:spPr/>
+        <p:txBody>
+          <a:bodyPr/>
+          <a:lstStyle/>
+          <a:p>
+            <a:r>
+              <a:rPr lang="en-US" altLang="zh-TW" dirty="0"/>
+              <a:t>pre &amp; post randomize (1/2)</a:t>
+            </a:r>
+            <a:endParaRPr lang="zh-TW" altLang="en-US" dirty="0"/>
+          </a:p>
+        </p:txBody>
+      </p:sp>
+      <p:sp>
+        <p:nvSpPr>
+          <p:cNvPr id="4" name="內容版面配置區 3">
+            <a:extLst>
+              <a:ext uri="{FF2B5EF4-FFF2-40B4-BE49-F238E27FC236}">
+                <a16:creationId xmlns:a16="http://schemas.microsoft.com/office/drawing/2014/main" id="{1748D028-BC81-08E1-F2B9-35E341ED4333}"/>
+              </a:ext>
+            </a:extLst>
+          </p:cNvPr>
+          <p:cNvSpPr>
+            <a:spLocks noGrp="1"/>
+          </p:cNvSpPr>
+          <p:nvPr>
+            <p:ph idx="1"/>
+          </p:nvPr>
+        </p:nvSpPr>
+        <p:spPr/>
+        <p:txBody>
+          <a:bodyPr/>
+          <a:lstStyle/>
+          <a:p>
+            <a:pPr marL="514350" indent="-514350">
+              <a:buFont typeface="+mj-lt"/>
+              <a:buAutoNum type="arabicPeriod"/>
+            </a:pPr>
+            <a:r>
+              <a:rPr lang="en-US" altLang="zh-TW" dirty="0" err="1"/>
+              <a:t>pre_randomize</a:t>
+            </a:r>
+            <a:r>
+              <a:rPr lang="en-US" altLang="zh-TW" dirty="0"/>
+              <a:t>()</a:t>
+            </a:r>
+          </a:p>
+          <a:p>
+            <a:pPr lvl="1"/>
+            <a:r>
+              <a:rPr lang="zh-TW" altLang="en-US" dirty="0"/>
+              <a:t>物件呼叫 </a:t>
+            </a:r>
+            <a:r>
+              <a:rPr lang="en-US" altLang="zh-TW" dirty="0"/>
+              <a:t>randomize() </a:t>
+            </a:r>
+            <a:r>
+              <a:rPr lang="zh-TW" altLang="en-US" dirty="0"/>
+              <a:t>後，先執行</a:t>
+            </a:r>
+            <a:r>
+              <a:rPr lang="en-US" altLang="zh-TW" dirty="0" err="1"/>
+              <a:t>pre_randomize</a:t>
+            </a:r>
+            <a:r>
+              <a:rPr lang="en-US" altLang="zh-TW" dirty="0"/>
+              <a:t>() </a:t>
+            </a:r>
+            <a:r>
+              <a:rPr lang="zh-TW" altLang="en-US" dirty="0"/>
+              <a:t>在去做 </a:t>
+            </a:r>
+            <a:r>
+              <a:rPr lang="en-US" altLang="zh-TW" dirty="0"/>
+              <a:t>random </a:t>
+            </a:r>
+            <a:r>
+              <a:rPr lang="zh-TW" altLang="en-US" dirty="0"/>
+              <a:t>動作</a:t>
+            </a:r>
+            <a:endParaRPr lang="en-US" altLang="zh-TW" dirty="0"/>
+          </a:p>
+          <a:p>
+            <a:pPr lvl="1"/>
+            <a:endParaRPr lang="en-US" altLang="zh-TW" dirty="0"/>
+          </a:p>
+          <a:p>
+            <a:pPr marL="514350" indent="-514350">
+              <a:buFont typeface="+mj-lt"/>
+              <a:buAutoNum type="arabicPeriod"/>
+            </a:pPr>
+            <a:r>
+              <a:rPr lang="en-US" altLang="zh-TW" dirty="0" err="1"/>
+              <a:t>post_randomize</a:t>
+            </a:r>
+            <a:r>
+              <a:rPr lang="en-US" altLang="zh-TW" dirty="0"/>
+              <a:t>()</a:t>
+            </a:r>
+          </a:p>
+          <a:p>
+            <a:pPr lvl="1"/>
+            <a:r>
+              <a:rPr lang="zh-TW" altLang="en-US" dirty="0"/>
+              <a:t>物件呼叫 </a:t>
+            </a:r>
+            <a:r>
+              <a:rPr lang="en-US" altLang="zh-TW" dirty="0"/>
+              <a:t>randomize() </a:t>
+            </a:r>
+            <a:r>
+              <a:rPr lang="zh-TW" altLang="en-US" dirty="0"/>
+              <a:t>後，</a:t>
+            </a:r>
+            <a:r>
+              <a:rPr lang="en-US" altLang="zh-TW" dirty="0"/>
+              <a:t>randomize() </a:t>
+            </a:r>
+            <a:r>
+              <a:rPr lang="zh-TW" altLang="en-US" dirty="0"/>
+              <a:t>執行成功後，執行 </a:t>
+            </a:r>
+            <a:r>
+              <a:rPr lang="en-US" altLang="zh-TW" dirty="0" err="1"/>
+              <a:t>post_randomize</a:t>
+            </a:r>
+            <a:r>
+              <a:rPr lang="en-US" altLang="zh-TW" dirty="0"/>
+              <a:t>()</a:t>
+            </a:r>
+          </a:p>
+          <a:p>
+            <a:pPr lvl="1"/>
+            <a:r>
+              <a:rPr lang="zh-TW" altLang="en-US" dirty="0"/>
+              <a:t>如果 </a:t>
+            </a:r>
+            <a:r>
+              <a:rPr lang="en-US" altLang="zh-TW" dirty="0"/>
+              <a:t>randomize() </a:t>
+            </a:r>
+            <a:r>
+              <a:rPr lang="zh-TW" altLang="en-US" dirty="0"/>
+              <a:t>沒成功，不執行 </a:t>
+            </a:r>
+            <a:r>
+              <a:rPr lang="en-US" altLang="zh-TW" dirty="0" err="1"/>
+              <a:t>post_randomize</a:t>
+            </a:r>
+            <a:r>
+              <a:rPr lang="en-US" altLang="zh-TW" dirty="0"/>
+              <a:t>()</a:t>
+            </a:r>
+            <a:endParaRPr lang="zh-TW" altLang="en-US" dirty="0"/>
+          </a:p>
+        </p:txBody>
+      </p:sp>
+    </p:spTree>
+    <p:extLst>
+      <p:ext uri="{BB962C8B-B14F-4D97-AF65-F5344CB8AC3E}">
+        <p14:creationId xmlns:p14="http://schemas.microsoft.com/office/powerpoint/2010/main" val="1901289018"/>
+      </p:ext>
+    </p:extLst>
+  </p:cSld>
+  <p:clrMapOvr>
+    <a:masterClrMapping/>
+  </p:clrMapOvr>
+</p:sld>
+</file>
+
+<file path=ppt/slides/slide58.xml><?xml version="1.0" encoding="utf-8"?>
+<p:sld xmlns:a="http://schemas.openxmlformats.org/drawingml/2006/main" xmlns:r="http://schemas.openxmlformats.org/officeDocument/2006/relationships" xmlns:p="http://schemas.openxmlformats.org/presentationml/2006/main">
+  <p:cSld>
+    <p:spTree>
+      <p:nvGrpSpPr>
+        <p:cNvPr id="1" name="">
+          <a:extLst>
+            <a:ext uri="{FF2B5EF4-FFF2-40B4-BE49-F238E27FC236}">
+              <a16:creationId xmlns:a16="http://schemas.microsoft.com/office/drawing/2014/main" id="{7EED1861-9C1B-EB47-E66B-DE724D794E08}"/>
+            </a:ext>
+          </a:extLst>
+        </p:cNvPr>
+        <p:cNvGrpSpPr/>
+        <p:nvPr/>
+      </p:nvGrpSpPr>
+      <p:grpSpPr>
+        <a:xfrm>
+          <a:off x="0" y="0"/>
+          <a:ext cx="0" cy="0"/>
+          <a:chOff x="0" y="0"/>
+          <a:chExt cx="0" cy="0"/>
+        </a:xfrm>
+      </p:grpSpPr>
+      <p:sp>
+        <p:nvSpPr>
+          <p:cNvPr id="2" name="標題 1">
+            <a:extLst>
+              <a:ext uri="{FF2B5EF4-FFF2-40B4-BE49-F238E27FC236}">
+                <a16:creationId xmlns:a16="http://schemas.microsoft.com/office/drawing/2014/main" id="{4EEBCFFA-1252-9D71-78C6-C66AFBBF0099}"/>
+              </a:ext>
+            </a:extLst>
+          </p:cNvPr>
+          <p:cNvSpPr>
+            <a:spLocks noGrp="1"/>
+          </p:cNvSpPr>
+          <p:nvPr>
+            <p:ph type="title"/>
+          </p:nvPr>
+        </p:nvSpPr>
+        <p:spPr/>
+        <p:txBody>
+          <a:bodyPr/>
+          <a:lstStyle/>
+          <a:p>
+            <a:r>
+              <a:rPr lang="en-US" altLang="zh-TW" dirty="0"/>
+              <a:t>pre &amp; post randomize (2/2)</a:t>
+            </a:r>
+            <a:endParaRPr lang="zh-TW" altLang="en-US" dirty="0"/>
+          </a:p>
+        </p:txBody>
+      </p:sp>
+      <p:sp>
+        <p:nvSpPr>
+          <p:cNvPr id="4" name="內容版面配置區 3">
+            <a:extLst>
+              <a:ext uri="{FF2B5EF4-FFF2-40B4-BE49-F238E27FC236}">
+                <a16:creationId xmlns:a16="http://schemas.microsoft.com/office/drawing/2014/main" id="{9588A544-E614-A8F0-1024-1EDC017C7352}"/>
+              </a:ext>
+            </a:extLst>
+          </p:cNvPr>
+          <p:cNvSpPr>
+            <a:spLocks noGrp="1"/>
+          </p:cNvSpPr>
+          <p:nvPr>
+            <p:ph idx="1"/>
+          </p:nvPr>
+        </p:nvSpPr>
+        <p:spPr/>
+        <p:txBody>
+          <a:bodyPr/>
+          <a:lstStyle/>
+          <a:p>
+            <a:pPr marL="0" indent="0">
+              <a:buNone/>
+            </a:pPr>
+            <a:r>
+              <a:rPr lang="en-US" altLang="zh-TW" dirty="0"/>
+              <a:t>Ex:</a:t>
+            </a:r>
+          </a:p>
+        </p:txBody>
+      </p:sp>
+      <p:grpSp>
+        <p:nvGrpSpPr>
+          <p:cNvPr id="7" name="群組 6">
+            <a:extLst>
+              <a:ext uri="{FF2B5EF4-FFF2-40B4-BE49-F238E27FC236}">
+                <a16:creationId xmlns:a16="http://schemas.microsoft.com/office/drawing/2014/main" id="{7BE32888-B65F-A340-8275-2292C844D303}"/>
+              </a:ext>
+            </a:extLst>
+          </p:cNvPr>
+          <p:cNvGrpSpPr/>
+          <p:nvPr/>
+        </p:nvGrpSpPr>
+        <p:grpSpPr>
+          <a:xfrm>
+            <a:off x="445169" y="2509153"/>
+            <a:ext cx="11301662" cy="4278094"/>
+            <a:chOff x="613611" y="2434400"/>
+            <a:chExt cx="11301662" cy="4278094"/>
+          </a:xfrm>
+        </p:grpSpPr>
+        <p:sp>
+          <p:nvSpPr>
+            <p:cNvPr id="3" name="文字方塊 2">
+              <a:extLst>
+                <a:ext uri="{FF2B5EF4-FFF2-40B4-BE49-F238E27FC236}">
+                  <a16:creationId xmlns:a16="http://schemas.microsoft.com/office/drawing/2014/main" id="{443909FF-FBE4-9FD7-A787-BF1B183DF9DD}"/>
+                </a:ext>
+              </a:extLst>
+            </p:cNvPr>
+            <p:cNvSpPr txBox="1"/>
+            <p:nvPr/>
+          </p:nvSpPr>
+          <p:spPr>
+            <a:xfrm>
+              <a:off x="613611" y="2434400"/>
+              <a:ext cx="5482389" cy="4278094"/>
+            </a:xfrm>
+            <a:prstGeom prst="rect">
+              <a:avLst/>
+            </a:prstGeom>
+            <a:noFill/>
+            <a:ln>
+              <a:solidFill>
+                <a:schemeClr val="tx1"/>
+              </a:solidFill>
+            </a:ln>
+          </p:spPr>
+          <p:txBody>
+            <a:bodyPr wrap="square" rtlCol="0">
+              <a:spAutoFit/>
+            </a:bodyPr>
+            <a:lstStyle/>
+            <a:p>
+              <a:r>
+                <a:rPr lang="en-US" altLang="zh-TW" sz="1600" dirty="0"/>
+                <a:t>class Beverage;</a:t>
+              </a:r>
+            </a:p>
+            <a:p>
+              <a:r>
+                <a:rPr lang="en-US" altLang="zh-TW" sz="1600" dirty="0"/>
+                <a:t>  rand bit [7:0]  </a:t>
+              </a:r>
+              <a:r>
+                <a:rPr lang="en-US" altLang="zh-TW" sz="1600" dirty="0" err="1"/>
+                <a:t>beer_id</a:t>
+              </a:r>
+              <a:r>
+                <a:rPr lang="en-US" altLang="zh-TW" sz="1600" dirty="0"/>
+                <a:t>;</a:t>
+              </a:r>
+            </a:p>
+            <a:p>
+              <a:br>
+                <a:rPr lang="en-US" altLang="zh-TW" sz="1600" dirty="0"/>
+              </a:br>
+              <a:r>
+                <a:rPr lang="en-US" altLang="zh-TW" sz="1600" dirty="0"/>
+                <a:t>  constraint </a:t>
+              </a:r>
+              <a:r>
+                <a:rPr lang="en-US" altLang="zh-TW" sz="1600" dirty="0" err="1"/>
+                <a:t>c_beer_id</a:t>
+              </a:r>
+              <a:r>
+                <a:rPr lang="en-US" altLang="zh-TW" sz="1600" dirty="0"/>
+                <a:t> { </a:t>
+              </a:r>
+              <a:r>
+                <a:rPr lang="en-US" altLang="zh-TW" sz="1600" dirty="0" err="1"/>
+                <a:t>beer_id</a:t>
+              </a:r>
+              <a:r>
+                <a:rPr lang="en-US" altLang="zh-TW" sz="1600" dirty="0"/>
+                <a:t> &gt;= 10;</a:t>
+              </a:r>
+            </a:p>
+            <a:p>
+              <a:r>
+                <a:rPr lang="en-US" altLang="zh-TW" sz="1600" dirty="0"/>
+                <a:t>                        </a:t>
+              </a:r>
+              <a:r>
+                <a:rPr lang="en-US" altLang="zh-TW" sz="1600" dirty="0" err="1"/>
+                <a:t>beer_id</a:t>
+              </a:r>
+              <a:r>
+                <a:rPr lang="en-US" altLang="zh-TW" sz="1600" dirty="0"/>
+                <a:t> &lt;= 50; };</a:t>
+              </a:r>
+            </a:p>
+            <a:p>
+              <a:br>
+                <a:rPr lang="en-US" altLang="zh-TW" sz="1600" dirty="0"/>
+              </a:br>
+              <a:r>
+                <a:rPr lang="en-US" altLang="zh-TW" sz="1600" dirty="0"/>
+                <a:t>  function void </a:t>
+              </a:r>
+              <a:r>
+                <a:rPr lang="en-US" altLang="zh-TW" sz="1600" dirty="0" err="1"/>
+                <a:t>pre_randomize</a:t>
+              </a:r>
+              <a:r>
+                <a:rPr lang="en-US" altLang="zh-TW" sz="1600" dirty="0"/>
+                <a:t> ();</a:t>
+              </a:r>
+            </a:p>
+            <a:p>
+              <a:r>
+                <a:rPr lang="en-US" altLang="zh-TW" sz="1600" dirty="0"/>
+                <a:t>    $display ("This will be called just before randomization");</a:t>
+              </a:r>
+            </a:p>
+            <a:p>
+              <a:r>
+                <a:rPr lang="en-US" altLang="zh-TW" sz="1600" dirty="0"/>
+                <a:t>  </a:t>
+              </a:r>
+              <a:r>
+                <a:rPr lang="en-US" altLang="zh-TW" sz="1600" dirty="0" err="1"/>
+                <a:t>endfunction</a:t>
+              </a:r>
+              <a:endParaRPr lang="en-US" altLang="zh-TW" sz="1600" dirty="0"/>
+            </a:p>
+            <a:p>
+              <a:br>
+                <a:rPr lang="en-US" altLang="zh-TW" sz="1600" dirty="0"/>
+              </a:br>
+              <a:r>
+                <a:rPr lang="en-US" altLang="zh-TW" sz="1600" dirty="0"/>
+                <a:t>  function void </a:t>
+              </a:r>
+              <a:r>
+                <a:rPr lang="en-US" altLang="zh-TW" sz="1600" dirty="0" err="1"/>
+                <a:t>post_randomize</a:t>
+              </a:r>
+              <a:r>
+                <a:rPr lang="en-US" altLang="zh-TW" sz="1600" dirty="0"/>
+                <a:t> ();</a:t>
+              </a:r>
+            </a:p>
+            <a:p>
+              <a:r>
+                <a:rPr lang="en-US" altLang="zh-TW" sz="1600" dirty="0"/>
+                <a:t>    $display ("This will be called just after randomization");</a:t>
+              </a:r>
+            </a:p>
+            <a:p>
+              <a:r>
+                <a:rPr lang="en-US" altLang="zh-TW" sz="1600" dirty="0"/>
+                <a:t>  </a:t>
+              </a:r>
+              <a:r>
+                <a:rPr lang="en-US" altLang="zh-TW" sz="1600" dirty="0" err="1"/>
+                <a:t>endfunction</a:t>
+              </a:r>
+              <a:endParaRPr lang="en-US" altLang="zh-TW" sz="1600" dirty="0"/>
+            </a:p>
+            <a:p>
+              <a:br>
+                <a:rPr lang="en-US" altLang="zh-TW" sz="1600" dirty="0"/>
+              </a:br>
+              <a:r>
+                <a:rPr lang="en-US" altLang="zh-TW" sz="1600" dirty="0" err="1"/>
+                <a:t>endclass</a:t>
+              </a:r>
+              <a:endParaRPr lang="en-US" altLang="zh-TW" sz="1600" dirty="0"/>
+            </a:p>
+            <a:p>
+              <a:br>
+                <a:rPr lang="en-US" altLang="zh-TW" sz="1600" dirty="0"/>
+              </a:br>
+              <a:endParaRPr lang="en-US" altLang="zh-TW" sz="1600" dirty="0"/>
+            </a:p>
+          </p:txBody>
+        </p:sp>
+        <p:sp>
+          <p:nvSpPr>
+            <p:cNvPr id="6" name="文字方塊 5">
+              <a:extLst>
+                <a:ext uri="{FF2B5EF4-FFF2-40B4-BE49-F238E27FC236}">
+                  <a16:creationId xmlns:a16="http://schemas.microsoft.com/office/drawing/2014/main" id="{2C72A42E-0CC7-E226-877E-D201EB02B323}"/>
+                </a:ext>
+              </a:extLst>
+            </p:cNvPr>
+            <p:cNvSpPr txBox="1"/>
+            <p:nvPr/>
+          </p:nvSpPr>
+          <p:spPr>
+            <a:xfrm>
+              <a:off x="6432884" y="2434400"/>
+              <a:ext cx="5482389" cy="2800767"/>
+            </a:xfrm>
+            <a:prstGeom prst="rect">
+              <a:avLst/>
+            </a:prstGeom>
+            <a:noFill/>
+            <a:ln>
+              <a:solidFill>
+                <a:schemeClr val="tx1"/>
+              </a:solidFill>
+            </a:ln>
+          </p:spPr>
+          <p:txBody>
+            <a:bodyPr wrap="square" rtlCol="0">
+              <a:spAutoFit/>
+            </a:bodyPr>
+            <a:lstStyle/>
+            <a:p>
+              <a:r>
+                <a:rPr lang="en-US" altLang="zh-TW" sz="1600" dirty="0"/>
+                <a:t>module tb;</a:t>
+              </a:r>
+            </a:p>
+            <a:p>
+              <a:r>
+                <a:rPr lang="en-US" altLang="zh-TW" sz="1600" dirty="0"/>
+                <a:t>   Beverage b;</a:t>
+              </a:r>
+            </a:p>
+            <a:p>
+              <a:br>
+                <a:rPr lang="en-US" altLang="zh-TW" sz="1600" dirty="0"/>
+              </a:br>
+              <a:r>
+                <a:rPr lang="en-US" altLang="zh-TW" sz="1600" dirty="0"/>
+                <a:t>    initial begin</a:t>
+              </a:r>
+            </a:p>
+            <a:p>
+              <a:r>
+                <a:rPr lang="en-US" altLang="zh-TW" sz="1600" dirty="0"/>
+                <a:t>      b = new ();</a:t>
+              </a:r>
+            </a:p>
+            <a:p>
+              <a:r>
+                <a:rPr lang="en-US" altLang="zh-TW" sz="1600" dirty="0"/>
+                <a:t>      $display ("Initial </a:t>
+              </a:r>
+              <a:r>
+                <a:rPr lang="en-US" altLang="zh-TW" sz="1600" dirty="0" err="1"/>
+                <a:t>beerId</a:t>
+              </a:r>
+              <a:r>
+                <a:rPr lang="en-US" altLang="zh-TW" sz="1600" dirty="0"/>
+                <a:t> = %0d", </a:t>
+              </a:r>
+              <a:r>
+                <a:rPr lang="en-US" altLang="zh-TW" sz="1600" dirty="0" err="1"/>
+                <a:t>b.beer_id</a:t>
+              </a:r>
+              <a:r>
+                <a:rPr lang="en-US" altLang="zh-TW" sz="1600" dirty="0"/>
+                <a:t>);</a:t>
+              </a:r>
+            </a:p>
+            <a:p>
+              <a:r>
+                <a:rPr lang="en-US" altLang="zh-TW" sz="1600" dirty="0"/>
+                <a:t>      if (</a:t>
+              </a:r>
+              <a:r>
+                <a:rPr lang="en-US" altLang="zh-TW" sz="1600" dirty="0" err="1"/>
+                <a:t>b.randomize</a:t>
+              </a:r>
+              <a:r>
+                <a:rPr lang="en-US" altLang="zh-TW" sz="1600" dirty="0"/>
+                <a:t> ())</a:t>
+              </a:r>
+            </a:p>
+            <a:p>
+              <a:r>
+                <a:rPr lang="en-US" altLang="zh-TW" sz="1600" dirty="0"/>
+                <a:t>        $display ("Randomization successful !");</a:t>
+              </a:r>
+            </a:p>
+            <a:p>
+              <a:r>
+                <a:rPr lang="en-US" altLang="zh-TW" sz="1600" dirty="0"/>
+                <a:t>      $display ("After randomization </a:t>
+              </a:r>
+              <a:r>
+                <a:rPr lang="en-US" altLang="zh-TW" sz="1600" dirty="0" err="1"/>
+                <a:t>beerId</a:t>
+              </a:r>
+              <a:r>
+                <a:rPr lang="en-US" altLang="zh-TW" sz="1600" dirty="0"/>
+                <a:t> = %0d", </a:t>
+              </a:r>
+              <a:r>
+                <a:rPr lang="en-US" altLang="zh-TW" sz="1600" dirty="0" err="1"/>
+                <a:t>b.beer_id</a:t>
+              </a:r>
+              <a:r>
+                <a:rPr lang="en-US" altLang="zh-TW" sz="1600" dirty="0"/>
+                <a:t>);</a:t>
+              </a:r>
+            </a:p>
+            <a:p>
+              <a:r>
+                <a:rPr lang="en-US" altLang="zh-TW" sz="1600" dirty="0"/>
+                <a:t>    end</a:t>
+              </a:r>
+            </a:p>
+            <a:p>
+              <a:r>
+                <a:rPr lang="en-US" altLang="zh-TW" sz="1600" dirty="0" err="1"/>
+                <a:t>endmodule</a:t>
+              </a:r>
+              <a:endParaRPr lang="en-US" altLang="zh-TW" sz="1600" dirty="0"/>
+            </a:p>
+          </p:txBody>
+        </p:sp>
+      </p:grpSp>
+    </p:spTree>
+    <p:extLst>
+      <p:ext uri="{BB962C8B-B14F-4D97-AF65-F5344CB8AC3E}">
+        <p14:creationId xmlns:p14="http://schemas.microsoft.com/office/powerpoint/2010/main" val="318066849"/>
+      </p:ext>
+    </p:extLst>
+  </p:cSld>
+  <p:clrMapOvr>
+    <a:masterClrMapping/>
+  </p:clrMapOvr>
+</p:sld>
+</file>
+
+<file path=ppt/slides/slide59.xml><?xml version="1.0" encoding="utf-8"?>
+<p:sld xmlns:a="http://schemas.openxmlformats.org/drawingml/2006/main" xmlns:r="http://schemas.openxmlformats.org/officeDocument/2006/relationships" xmlns:p="http://schemas.openxmlformats.org/presentationml/2006/main">
+  <p:cSld>
+    <p:spTree>
+      <p:nvGrpSpPr>
+        <p:cNvPr id="1" name="">
+          <a:extLst>
+            <a:ext uri="{FF2B5EF4-FFF2-40B4-BE49-F238E27FC236}">
+              <a16:creationId xmlns:a16="http://schemas.microsoft.com/office/drawing/2014/main" id="{C20AFF97-6383-D665-D9F9-652E4C44DF4E}"/>
+            </a:ext>
+          </a:extLst>
+        </p:cNvPr>
+        <p:cNvGrpSpPr/>
+        <p:nvPr/>
+      </p:nvGrpSpPr>
+      <p:grpSpPr>
+        <a:xfrm>
+          <a:off x="0" y="0"/>
+          <a:ext cx="0" cy="0"/>
+          <a:chOff x="0" y="0"/>
+          <a:chExt cx="0" cy="0"/>
+        </a:xfrm>
+      </p:grpSpPr>
+      <p:sp>
+        <p:nvSpPr>
+          <p:cNvPr id="2" name="標題 1">
+            <a:extLst>
+              <a:ext uri="{FF2B5EF4-FFF2-40B4-BE49-F238E27FC236}">
+                <a16:creationId xmlns:a16="http://schemas.microsoft.com/office/drawing/2014/main" id="{11D4A07D-0BCC-A01F-5AA0-A57F5A2F8991}"/>
+              </a:ext>
+            </a:extLst>
+          </p:cNvPr>
+          <p:cNvSpPr>
+            <a:spLocks noGrp="1"/>
+          </p:cNvSpPr>
+          <p:nvPr>
+            <p:ph type="title"/>
+          </p:nvPr>
+        </p:nvSpPr>
+        <p:spPr/>
+        <p:txBody>
+          <a:bodyPr/>
+          <a:lstStyle/>
+          <a:p>
+            <a:r>
+              <a:rPr lang="en-US" altLang="zh-TW" dirty="0"/>
+              <a:t>Soft Constraints (1/1)</a:t>
+            </a:r>
+            <a:endParaRPr lang="zh-TW" altLang="en-US" dirty="0"/>
+          </a:p>
+        </p:txBody>
+      </p:sp>
+      <p:sp>
+        <p:nvSpPr>
+          <p:cNvPr id="4" name="內容版面配置區 3">
+            <a:extLst>
+              <a:ext uri="{FF2B5EF4-FFF2-40B4-BE49-F238E27FC236}">
+                <a16:creationId xmlns:a16="http://schemas.microsoft.com/office/drawing/2014/main" id="{B9CE7D37-D72F-6489-2F77-8EC1E6220300}"/>
+              </a:ext>
+            </a:extLst>
+          </p:cNvPr>
+          <p:cNvSpPr>
+            <a:spLocks noGrp="1"/>
+          </p:cNvSpPr>
+          <p:nvPr>
+            <p:ph idx="1"/>
+          </p:nvPr>
+        </p:nvSpPr>
+        <p:spPr/>
+        <p:txBody>
+          <a:bodyPr/>
+          <a:lstStyle/>
+          <a:p>
+            <a:r>
+              <a:rPr lang="en-US" altLang="zh-TW" dirty="0"/>
+              <a:t>soft constraint </a:t>
+            </a:r>
+            <a:r>
+              <a:rPr lang="zh-TW" altLang="en-US" dirty="0"/>
+              <a:t>是一種 弱約束條件</a:t>
+            </a:r>
+            <a:endParaRPr lang="en-US" altLang="zh-TW" dirty="0"/>
+          </a:p>
+          <a:p>
+            <a:endParaRPr lang="zh-TW" altLang="en-US" dirty="0"/>
+          </a:p>
+          <a:p>
+            <a:r>
+              <a:rPr lang="zh-TW" altLang="en-US" dirty="0"/>
+              <a:t>如果該變數沒有其他會與</a:t>
+            </a:r>
+            <a:r>
+              <a:rPr lang="en-US" altLang="zh-TW" dirty="0"/>
+              <a:t>soft constraint</a:t>
+            </a:r>
+            <a:r>
+              <a:rPr lang="zh-TW" altLang="en-US" dirty="0"/>
+              <a:t>牴觸的限制，</a:t>
+            </a:r>
+            <a:r>
+              <a:rPr lang="en-US" altLang="zh-TW" dirty="0"/>
+              <a:t>soft constraint </a:t>
+            </a:r>
+            <a:r>
+              <a:rPr lang="zh-TW" altLang="en-US" dirty="0"/>
+              <a:t>會生效</a:t>
+            </a:r>
+            <a:endParaRPr lang="en-US" altLang="zh-TW" dirty="0"/>
+          </a:p>
+          <a:p>
+            <a:endParaRPr lang="zh-TW" altLang="en-US" dirty="0"/>
+          </a:p>
+          <a:p>
+            <a:r>
+              <a:rPr lang="zh-TW" altLang="en-US" dirty="0"/>
+              <a:t>如果有其他強制 </a:t>
+            </a:r>
+            <a:r>
+              <a:rPr lang="en-US" altLang="zh-TW" dirty="0"/>
+              <a:t>constraint</a:t>
+            </a:r>
+            <a:r>
+              <a:rPr lang="zh-TW" altLang="en-US" dirty="0"/>
+              <a:t>、直接指定值或使用 </a:t>
+            </a:r>
+            <a:r>
+              <a:rPr lang="en-US" altLang="zh-TW" dirty="0"/>
+              <a:t>.randomize() with {}</a:t>
+            </a:r>
+            <a:r>
+              <a:rPr lang="zh-TW" altLang="en-US" dirty="0"/>
+              <a:t>，那麼 </a:t>
+            </a:r>
+            <a:r>
+              <a:rPr lang="en-US" altLang="zh-TW" dirty="0"/>
+              <a:t>soft constraint </a:t>
+            </a:r>
+            <a:r>
+              <a:rPr lang="zh-TW" altLang="en-US" dirty="0"/>
+              <a:t>就會被忽略。</a:t>
+            </a:r>
+          </a:p>
+        </p:txBody>
+      </p:sp>
+    </p:spTree>
+    <p:extLst>
+      <p:ext uri="{BB962C8B-B14F-4D97-AF65-F5344CB8AC3E}">
+        <p14:creationId xmlns:p14="http://schemas.microsoft.com/office/powerpoint/2010/main" val="235449205"/>
       </p:ext>
     </p:extLst>
   </p:cSld>
@@ -16511,6 +19152,1409 @@
     <p:extLst>
       <p:ext uri="{BB962C8B-B14F-4D97-AF65-F5344CB8AC3E}">
         <p14:creationId xmlns:p14="http://schemas.microsoft.com/office/powerpoint/2010/main" val="3665396237"/>
+      </p:ext>
+    </p:extLst>
+  </p:cSld>
+  <p:clrMapOvr>
+    <a:masterClrMapping/>
+  </p:clrMapOvr>
+</p:sld>
+</file>
+
+<file path=ppt/slides/slide60.xml><?xml version="1.0" encoding="utf-8"?>
+<p:sld xmlns:a="http://schemas.openxmlformats.org/drawingml/2006/main" xmlns:r="http://schemas.openxmlformats.org/officeDocument/2006/relationships" xmlns:p="http://schemas.openxmlformats.org/presentationml/2006/main">
+  <p:cSld>
+    <p:spTree>
+      <p:nvGrpSpPr>
+        <p:cNvPr id="1" name="">
+          <a:extLst>
+            <a:ext uri="{FF2B5EF4-FFF2-40B4-BE49-F238E27FC236}">
+              <a16:creationId xmlns:a16="http://schemas.microsoft.com/office/drawing/2014/main" id="{7F51A3EA-B841-826E-B246-7355E0372429}"/>
+            </a:ext>
+          </a:extLst>
+        </p:cNvPr>
+        <p:cNvGrpSpPr/>
+        <p:nvPr/>
+      </p:nvGrpSpPr>
+      <p:grpSpPr>
+        <a:xfrm>
+          <a:off x="0" y="0"/>
+          <a:ext cx="0" cy="0"/>
+          <a:chOff x="0" y="0"/>
+          <a:chExt cx="0" cy="0"/>
+        </a:xfrm>
+      </p:grpSpPr>
+      <p:sp>
+        <p:nvSpPr>
+          <p:cNvPr id="2" name="標題 1">
+            <a:extLst>
+              <a:ext uri="{FF2B5EF4-FFF2-40B4-BE49-F238E27FC236}">
+                <a16:creationId xmlns:a16="http://schemas.microsoft.com/office/drawing/2014/main" id="{528A2E93-959E-3C44-4961-110B416D248A}"/>
+              </a:ext>
+            </a:extLst>
+          </p:cNvPr>
+          <p:cNvSpPr>
+            <a:spLocks noGrp="1"/>
+          </p:cNvSpPr>
+          <p:nvPr>
+            <p:ph type="title"/>
+          </p:nvPr>
+        </p:nvSpPr>
+        <p:spPr/>
+        <p:txBody>
+          <a:bodyPr/>
+          <a:lstStyle/>
+          <a:p>
+            <a:r>
+              <a:rPr lang="en-US" altLang="zh-TW" dirty="0"/>
+              <a:t>Disable Constraints (1/2)</a:t>
+            </a:r>
+            <a:endParaRPr lang="zh-TW" altLang="en-US" dirty="0"/>
+          </a:p>
+        </p:txBody>
+      </p:sp>
+      <p:sp>
+        <p:nvSpPr>
+          <p:cNvPr id="4" name="內容版面配置區 3">
+            <a:extLst>
+              <a:ext uri="{FF2B5EF4-FFF2-40B4-BE49-F238E27FC236}">
+                <a16:creationId xmlns:a16="http://schemas.microsoft.com/office/drawing/2014/main" id="{F91C27A6-9E1C-8D47-6758-5ADD81681E4F}"/>
+              </a:ext>
+            </a:extLst>
+          </p:cNvPr>
+          <p:cNvSpPr>
+            <a:spLocks noGrp="1"/>
+          </p:cNvSpPr>
+          <p:nvPr>
+            <p:ph idx="1"/>
+          </p:nvPr>
+        </p:nvSpPr>
+        <p:spPr/>
+        <p:txBody>
+          <a:bodyPr/>
+          <a:lstStyle/>
+          <a:p>
+            <a:r>
+              <a:rPr lang="en-US" altLang="zh-TW" dirty="0" err="1"/>
+              <a:t>constraint_mode</a:t>
+            </a:r>
+            <a:r>
+              <a:rPr lang="en-US" altLang="zh-TW" dirty="0"/>
+              <a:t>() </a:t>
+            </a:r>
+            <a:r>
+              <a:rPr lang="zh-TW" altLang="en-US" dirty="0"/>
+              <a:t>可以</a:t>
+            </a:r>
+            <a:r>
+              <a:rPr lang="zh-TW" altLang="en-US" dirty="0">
+                <a:solidFill>
+                  <a:srgbClr val="FF0000"/>
+                </a:solidFill>
+              </a:rPr>
+              <a:t>用來關閉 </a:t>
+            </a:r>
+            <a:r>
+              <a:rPr lang="en-US" altLang="zh-TW" dirty="0">
+                <a:solidFill>
+                  <a:srgbClr val="FF0000"/>
+                </a:solidFill>
+              </a:rPr>
+              <a:t>constraint </a:t>
+            </a:r>
+          </a:p>
+          <a:p>
+            <a:r>
+              <a:rPr lang="en-US" altLang="zh-TW" dirty="0"/>
+              <a:t>.</a:t>
+            </a:r>
+            <a:r>
+              <a:rPr lang="en-US" altLang="zh-TW" dirty="0" err="1"/>
+              <a:t>constraint_mode</a:t>
+            </a:r>
+            <a:r>
+              <a:rPr lang="en-US" altLang="zh-TW" dirty="0"/>
+              <a:t>(0)   -&gt; </a:t>
+            </a:r>
+            <a:r>
+              <a:rPr lang="zh-TW" altLang="en-US" dirty="0"/>
+              <a:t>關閉</a:t>
+            </a:r>
+          </a:p>
+          <a:p>
+            <a:r>
+              <a:rPr lang="en-US" altLang="zh-TW" dirty="0"/>
+              <a:t>.</a:t>
+            </a:r>
+            <a:r>
+              <a:rPr lang="en-US" altLang="zh-TW" dirty="0" err="1"/>
+              <a:t>constraint_mode</a:t>
+            </a:r>
+            <a:r>
+              <a:rPr lang="en-US" altLang="zh-TW" dirty="0"/>
+              <a:t>(1)   -&gt; </a:t>
+            </a:r>
+            <a:r>
+              <a:rPr lang="zh-TW" altLang="en-US" dirty="0"/>
+              <a:t>開啟</a:t>
+            </a:r>
+          </a:p>
+          <a:p>
+            <a:r>
+              <a:rPr lang="en-US" altLang="zh-TW" dirty="0"/>
+              <a:t>.</a:t>
+            </a:r>
+            <a:r>
+              <a:rPr lang="en-US" altLang="zh-TW" dirty="0" err="1"/>
+              <a:t>constraint_mode</a:t>
+            </a:r>
+            <a:r>
+              <a:rPr lang="en-US" altLang="zh-TW" dirty="0"/>
+              <a:t>() =&gt; </a:t>
+            </a:r>
+            <a:r>
+              <a:rPr lang="zh-TW" altLang="en-US" dirty="0"/>
+              <a:t>不帶任何參數，</a:t>
+            </a:r>
+            <a:br>
+              <a:rPr lang="en-US" altLang="zh-TW" dirty="0"/>
+            </a:br>
+            <a:r>
+              <a:rPr lang="zh-TW" altLang="en-US" dirty="0"/>
+              <a:t>回傳目前 </a:t>
+            </a:r>
+            <a:r>
+              <a:rPr lang="en-US" altLang="zh-TW" dirty="0"/>
+              <a:t>constraint </a:t>
+            </a:r>
+            <a:r>
+              <a:rPr lang="zh-TW" altLang="en-US" dirty="0"/>
+              <a:t>狀態  </a:t>
+            </a:r>
+            <a:r>
+              <a:rPr lang="en-US" altLang="zh-TW" dirty="0"/>
+              <a:t>0 -&gt; disable, 1 -&gt; enable</a:t>
+            </a:r>
+          </a:p>
+          <a:p>
+            <a:endParaRPr lang="en-US" altLang="zh-TW" dirty="0"/>
+          </a:p>
+          <a:p>
+            <a:r>
+              <a:rPr lang="zh-TW" altLang="en-US" dirty="0"/>
+              <a:t>常搭配 </a:t>
+            </a:r>
+            <a:r>
+              <a:rPr lang="en-US" altLang="zh-TW" dirty="0" err="1"/>
+              <a:t>pre_randomize</a:t>
+            </a:r>
+            <a:r>
+              <a:rPr lang="en-US" altLang="zh-TW" dirty="0"/>
+              <a:t>() </a:t>
+            </a:r>
+            <a:r>
+              <a:rPr lang="zh-TW" altLang="en-US" dirty="0"/>
+              <a:t>來決定是否開啟 </a:t>
+            </a:r>
+            <a:r>
+              <a:rPr lang="en-US" altLang="zh-TW" dirty="0"/>
+              <a:t>constraint</a:t>
+            </a:r>
+            <a:endParaRPr lang="zh-TW" altLang="en-US" dirty="0"/>
+          </a:p>
+        </p:txBody>
+      </p:sp>
+    </p:spTree>
+    <p:extLst>
+      <p:ext uri="{BB962C8B-B14F-4D97-AF65-F5344CB8AC3E}">
+        <p14:creationId xmlns:p14="http://schemas.microsoft.com/office/powerpoint/2010/main" val="731470737"/>
+      </p:ext>
+    </p:extLst>
+  </p:cSld>
+  <p:clrMapOvr>
+    <a:masterClrMapping/>
+  </p:clrMapOvr>
+</p:sld>
+</file>
+
+<file path=ppt/slides/slide61.xml><?xml version="1.0" encoding="utf-8"?>
+<p:sld xmlns:a="http://schemas.openxmlformats.org/drawingml/2006/main" xmlns:r="http://schemas.openxmlformats.org/officeDocument/2006/relationships" xmlns:p="http://schemas.openxmlformats.org/presentationml/2006/main">
+  <p:cSld>
+    <p:spTree>
+      <p:nvGrpSpPr>
+        <p:cNvPr id="1" name="">
+          <a:extLst>
+            <a:ext uri="{FF2B5EF4-FFF2-40B4-BE49-F238E27FC236}">
+              <a16:creationId xmlns:a16="http://schemas.microsoft.com/office/drawing/2014/main" id="{B0676219-6C2F-4A2E-5E3A-6518B0EC082C}"/>
+            </a:ext>
+          </a:extLst>
+        </p:cNvPr>
+        <p:cNvGrpSpPr/>
+        <p:nvPr/>
+      </p:nvGrpSpPr>
+      <p:grpSpPr>
+        <a:xfrm>
+          <a:off x="0" y="0"/>
+          <a:ext cx="0" cy="0"/>
+          <a:chOff x="0" y="0"/>
+          <a:chExt cx="0" cy="0"/>
+        </a:xfrm>
+      </p:grpSpPr>
+      <p:sp>
+        <p:nvSpPr>
+          <p:cNvPr id="2" name="標題 1">
+            <a:extLst>
+              <a:ext uri="{FF2B5EF4-FFF2-40B4-BE49-F238E27FC236}">
+                <a16:creationId xmlns:a16="http://schemas.microsoft.com/office/drawing/2014/main" id="{52E9317E-9EC4-FE97-D159-039F1830A9E0}"/>
+              </a:ext>
+            </a:extLst>
+          </p:cNvPr>
+          <p:cNvSpPr>
+            <a:spLocks noGrp="1"/>
+          </p:cNvSpPr>
+          <p:nvPr>
+            <p:ph type="title"/>
+          </p:nvPr>
+        </p:nvSpPr>
+        <p:spPr/>
+        <p:txBody>
+          <a:bodyPr/>
+          <a:lstStyle/>
+          <a:p>
+            <a:r>
+              <a:rPr lang="en-US" altLang="zh-TW" dirty="0"/>
+              <a:t>Disable Constraints (2/2)</a:t>
+            </a:r>
+            <a:endParaRPr lang="zh-TW" altLang="en-US" dirty="0"/>
+          </a:p>
+        </p:txBody>
+      </p:sp>
+      <p:sp>
+        <p:nvSpPr>
+          <p:cNvPr id="4" name="內容版面配置區 3">
+            <a:extLst>
+              <a:ext uri="{FF2B5EF4-FFF2-40B4-BE49-F238E27FC236}">
+                <a16:creationId xmlns:a16="http://schemas.microsoft.com/office/drawing/2014/main" id="{7E08EDC8-5862-1217-CD8C-9E10DF99315C}"/>
+              </a:ext>
+            </a:extLst>
+          </p:cNvPr>
+          <p:cNvSpPr>
+            <a:spLocks noGrp="1"/>
+          </p:cNvSpPr>
+          <p:nvPr>
+            <p:ph idx="1"/>
+          </p:nvPr>
+        </p:nvSpPr>
+        <p:spPr/>
+        <p:txBody>
+          <a:bodyPr/>
+          <a:lstStyle/>
+          <a:p>
+            <a:pPr marL="0" indent="0">
+              <a:buNone/>
+            </a:pPr>
+            <a:r>
+              <a:rPr lang="en-US" altLang="zh-TW" dirty="0"/>
+              <a:t>Ex:</a:t>
+            </a:r>
+            <a:endParaRPr lang="zh-TW" altLang="en-US" dirty="0"/>
+          </a:p>
+        </p:txBody>
+      </p:sp>
+      <p:grpSp>
+        <p:nvGrpSpPr>
+          <p:cNvPr id="3" name="群組 2">
+            <a:extLst>
+              <a:ext uri="{FF2B5EF4-FFF2-40B4-BE49-F238E27FC236}">
+                <a16:creationId xmlns:a16="http://schemas.microsoft.com/office/drawing/2014/main" id="{5AEC8DD3-6FD2-E681-EC02-B8E4B3B0A7C1}"/>
+              </a:ext>
+            </a:extLst>
+          </p:cNvPr>
+          <p:cNvGrpSpPr/>
+          <p:nvPr/>
+        </p:nvGrpSpPr>
+        <p:grpSpPr>
+          <a:xfrm>
+            <a:off x="445169" y="2333685"/>
+            <a:ext cx="11301662" cy="4524315"/>
+            <a:chOff x="613611" y="2434400"/>
+            <a:chExt cx="11301662" cy="4524315"/>
+          </a:xfrm>
+        </p:grpSpPr>
+        <p:sp>
+          <p:nvSpPr>
+            <p:cNvPr id="5" name="文字方塊 4">
+              <a:extLst>
+                <a:ext uri="{FF2B5EF4-FFF2-40B4-BE49-F238E27FC236}">
+                  <a16:creationId xmlns:a16="http://schemas.microsoft.com/office/drawing/2014/main" id="{24ED558F-169B-5EC9-6A4D-DF445A9E242C}"/>
+                </a:ext>
+              </a:extLst>
+            </p:cNvPr>
+            <p:cNvSpPr txBox="1"/>
+            <p:nvPr/>
+          </p:nvSpPr>
+          <p:spPr>
+            <a:xfrm>
+              <a:off x="613611" y="2434400"/>
+              <a:ext cx="5482389" cy="1569660"/>
+            </a:xfrm>
+            <a:prstGeom prst="rect">
+              <a:avLst/>
+            </a:prstGeom>
+            <a:noFill/>
+            <a:ln>
+              <a:solidFill>
+                <a:schemeClr val="tx1"/>
+              </a:solidFill>
+            </a:ln>
+          </p:spPr>
+          <p:txBody>
+            <a:bodyPr wrap="square" rtlCol="0">
+              <a:spAutoFit/>
+            </a:bodyPr>
+            <a:lstStyle/>
+            <a:p>
+              <a:r>
+                <a:rPr lang="en-US" altLang="zh-TW" sz="1600" dirty="0"/>
+                <a:t>class Fruits;</a:t>
+              </a:r>
+            </a:p>
+            <a:p>
+              <a:r>
+                <a:rPr lang="en-US" altLang="zh-TW" sz="1600" dirty="0"/>
+                <a:t>  rand bit[3:0]  num; 				</a:t>
+              </a:r>
+            </a:p>
+            <a:p>
+              <a:endParaRPr lang="en-US" altLang="zh-TW" sz="1600" dirty="0"/>
+            </a:p>
+            <a:p>
+              <a:r>
+                <a:rPr lang="en-US" altLang="zh-TW" sz="1600" dirty="0"/>
+                <a:t>  constraint </a:t>
+              </a:r>
+              <a:r>
+                <a:rPr lang="en-US" altLang="zh-TW" sz="1600" dirty="0" err="1"/>
+                <a:t>c_num</a:t>
+              </a:r>
+              <a:r>
+                <a:rPr lang="en-US" altLang="zh-TW" sz="1600" dirty="0"/>
+                <a:t> { num &gt; 4;  		</a:t>
+              </a:r>
+            </a:p>
+            <a:p>
+              <a:r>
+                <a:rPr lang="en-US" altLang="zh-TW" sz="1600" dirty="0"/>
+                <a:t>                                          num &lt; 9; }; 	</a:t>
+              </a:r>
+            </a:p>
+            <a:p>
+              <a:r>
+                <a:rPr lang="en-US" altLang="zh-TW" sz="1600" dirty="0" err="1"/>
+                <a:t>endclass</a:t>
+              </a:r>
+              <a:endParaRPr lang="en-US" altLang="zh-TW" sz="1600" dirty="0"/>
+            </a:p>
+          </p:txBody>
+        </p:sp>
+        <p:sp>
+          <p:nvSpPr>
+            <p:cNvPr id="6" name="文字方塊 5">
+              <a:extLst>
+                <a:ext uri="{FF2B5EF4-FFF2-40B4-BE49-F238E27FC236}">
+                  <a16:creationId xmlns:a16="http://schemas.microsoft.com/office/drawing/2014/main" id="{2DA04704-FF74-8A3C-B24F-AA3579A9D383}"/>
+                </a:ext>
+              </a:extLst>
+            </p:cNvPr>
+            <p:cNvSpPr txBox="1"/>
+            <p:nvPr/>
+          </p:nvSpPr>
+          <p:spPr>
+            <a:xfrm>
+              <a:off x="6432884" y="2434400"/>
+              <a:ext cx="5482389" cy="4524315"/>
+            </a:xfrm>
+            <a:prstGeom prst="rect">
+              <a:avLst/>
+            </a:prstGeom>
+            <a:noFill/>
+            <a:ln>
+              <a:solidFill>
+                <a:schemeClr val="tx1"/>
+              </a:solidFill>
+            </a:ln>
+          </p:spPr>
+          <p:txBody>
+            <a:bodyPr wrap="square" rtlCol="0">
+              <a:spAutoFit/>
+            </a:bodyPr>
+            <a:lstStyle/>
+            <a:p>
+              <a:r>
+                <a:rPr lang="en-US" altLang="zh-TW" sz="1600" dirty="0"/>
+                <a:t>module tb;</a:t>
+              </a:r>
+            </a:p>
+            <a:p>
+              <a:r>
+                <a:rPr lang="en-US" altLang="zh-TW" sz="1600" dirty="0"/>
+                <a:t>  initial begin</a:t>
+              </a:r>
+            </a:p>
+            <a:p>
+              <a:r>
+                <a:rPr lang="en-US" altLang="zh-TW" sz="1600" dirty="0"/>
+                <a:t>    Fruits f = new ();</a:t>
+              </a:r>
+            </a:p>
+            <a:p>
+              <a:r>
+                <a:rPr lang="en-US" altLang="zh-TW" sz="1600" dirty="0"/>
+                <a:t>    $display ("Before randomization num = %0d", </a:t>
+              </a:r>
+              <a:r>
+                <a:rPr lang="en-US" altLang="zh-TW" sz="1600" dirty="0" err="1"/>
+                <a:t>f.num</a:t>
+              </a:r>
+              <a:r>
+                <a:rPr lang="en-US" altLang="zh-TW" sz="1600" dirty="0"/>
+                <a:t>);</a:t>
+              </a:r>
+            </a:p>
+            <a:p>
+              <a:endParaRPr lang="en-US" altLang="zh-TW" sz="1600" dirty="0"/>
+            </a:p>
+            <a:p>
+              <a:r>
+                <a:rPr lang="en-US" altLang="zh-TW" sz="1600" dirty="0"/>
+                <a:t>    // Disable constraint</a:t>
+              </a:r>
+            </a:p>
+            <a:p>
+              <a:r>
+                <a:rPr lang="en-US" altLang="zh-TW" sz="1600" dirty="0"/>
+                <a:t>    </a:t>
+              </a:r>
+              <a:r>
+                <a:rPr lang="en-US" altLang="zh-TW" sz="1600" dirty="0" err="1">
+                  <a:solidFill>
+                    <a:srgbClr val="FF0000"/>
+                  </a:solidFill>
+                </a:rPr>
+                <a:t>f.c_num.constraint_mode</a:t>
+              </a:r>
+              <a:r>
+                <a:rPr lang="en-US" altLang="zh-TW" sz="1600" dirty="0">
+                  <a:solidFill>
+                    <a:srgbClr val="FF0000"/>
+                  </a:solidFill>
+                </a:rPr>
+                <a:t>(0);</a:t>
+              </a:r>
+            </a:p>
+            <a:p>
+              <a:endParaRPr lang="en-US" altLang="zh-TW" sz="1600" dirty="0"/>
+            </a:p>
+            <a:p>
+              <a:r>
+                <a:rPr lang="en-US" altLang="zh-TW" sz="1600" dirty="0"/>
+                <a:t>    if (</a:t>
+              </a:r>
+              <a:r>
+                <a:rPr lang="en-US" altLang="zh-TW" sz="1600" dirty="0" err="1"/>
+                <a:t>f.c_num.constraint_mode</a:t>
+              </a:r>
+              <a:r>
+                <a:rPr lang="en-US" altLang="zh-TW" sz="1600" dirty="0"/>
+                <a:t> ())</a:t>
+              </a:r>
+            </a:p>
+            <a:p>
+              <a:r>
+                <a:rPr lang="en-US" altLang="zh-TW" sz="1600" dirty="0"/>
+                <a:t>      $display ("Constraint </a:t>
+              </a:r>
+              <a:r>
+                <a:rPr lang="en-US" altLang="zh-TW" sz="1600" dirty="0" err="1"/>
+                <a:t>c_num</a:t>
+              </a:r>
+              <a:r>
+                <a:rPr lang="en-US" altLang="zh-TW" sz="1600" dirty="0"/>
+                <a:t> is enabled");</a:t>
+              </a:r>
+            </a:p>
+            <a:p>
+              <a:r>
+                <a:rPr lang="en-US" altLang="zh-TW" sz="1600" dirty="0"/>
+                <a:t>    else</a:t>
+              </a:r>
+            </a:p>
+            <a:p>
+              <a:r>
+                <a:rPr lang="en-US" altLang="zh-TW" sz="1600" dirty="0"/>
+                <a:t>      $display ("Constraint </a:t>
+              </a:r>
+              <a:r>
+                <a:rPr lang="en-US" altLang="zh-TW" sz="1600" dirty="0" err="1"/>
+                <a:t>c_num</a:t>
+              </a:r>
+              <a:r>
+                <a:rPr lang="en-US" altLang="zh-TW" sz="1600" dirty="0"/>
+                <a:t> is disabled");</a:t>
+              </a:r>
+            </a:p>
+            <a:p>
+              <a:endParaRPr lang="en-US" altLang="zh-TW" sz="1600" dirty="0"/>
+            </a:p>
+            <a:p>
+              <a:r>
+                <a:rPr lang="en-US" altLang="zh-TW" sz="1600" dirty="0"/>
+                <a:t>    // Randomize the variable and display</a:t>
+              </a:r>
+            </a:p>
+            <a:p>
+              <a:r>
+                <a:rPr lang="en-US" altLang="zh-TW" sz="1600" dirty="0"/>
+                <a:t>    </a:t>
+              </a:r>
+              <a:r>
+                <a:rPr lang="en-US" altLang="zh-TW" sz="1600" dirty="0" err="1"/>
+                <a:t>f.randomize</a:t>
+              </a:r>
+              <a:r>
+                <a:rPr lang="en-US" altLang="zh-TW" sz="1600" dirty="0"/>
+                <a:t> ();</a:t>
+              </a:r>
+            </a:p>
+            <a:p>
+              <a:r>
+                <a:rPr lang="en-US" altLang="zh-TW" sz="1600" dirty="0"/>
+                <a:t>    $display ("After randomization num = %0d", </a:t>
+              </a:r>
+              <a:r>
+                <a:rPr lang="en-US" altLang="zh-TW" sz="1600" dirty="0" err="1"/>
+                <a:t>f.num</a:t>
+              </a:r>
+              <a:r>
+                <a:rPr lang="en-US" altLang="zh-TW" sz="1600" dirty="0"/>
+                <a:t>);</a:t>
+              </a:r>
+            </a:p>
+            <a:p>
+              <a:r>
+                <a:rPr lang="en-US" altLang="zh-TW" sz="1600" dirty="0"/>
+                <a:t>  end</a:t>
+              </a:r>
+            </a:p>
+            <a:p>
+              <a:r>
+                <a:rPr lang="en-US" altLang="zh-TW" sz="1600" dirty="0" err="1"/>
+                <a:t>endmodule</a:t>
+              </a:r>
+              <a:endParaRPr lang="en-US" altLang="zh-TW" sz="1600" dirty="0"/>
+            </a:p>
+          </p:txBody>
+        </p:sp>
+      </p:grpSp>
+    </p:spTree>
+    <p:extLst>
+      <p:ext uri="{BB962C8B-B14F-4D97-AF65-F5344CB8AC3E}">
+        <p14:creationId xmlns:p14="http://schemas.microsoft.com/office/powerpoint/2010/main" val="3294776746"/>
+      </p:ext>
+    </p:extLst>
+  </p:cSld>
+  <p:clrMapOvr>
+    <a:masterClrMapping/>
+  </p:clrMapOvr>
+</p:sld>
+</file>
+
+<file path=ppt/slides/slide62.xml><?xml version="1.0" encoding="utf-8"?>
+<p:sld xmlns:a="http://schemas.openxmlformats.org/drawingml/2006/main" xmlns:r="http://schemas.openxmlformats.org/officeDocument/2006/relationships" xmlns:p="http://schemas.openxmlformats.org/presentationml/2006/main">
+  <p:cSld>
+    <p:spTree>
+      <p:nvGrpSpPr>
+        <p:cNvPr id="1" name="">
+          <a:extLst>
+            <a:ext uri="{FF2B5EF4-FFF2-40B4-BE49-F238E27FC236}">
+              <a16:creationId xmlns:a16="http://schemas.microsoft.com/office/drawing/2014/main" id="{38F51A42-46F0-41A7-67A4-3E0A015AFD55}"/>
+            </a:ext>
+          </a:extLst>
+        </p:cNvPr>
+        <p:cNvGrpSpPr/>
+        <p:nvPr/>
+      </p:nvGrpSpPr>
+      <p:grpSpPr>
+        <a:xfrm>
+          <a:off x="0" y="0"/>
+          <a:ext cx="0" cy="0"/>
+          <a:chOff x="0" y="0"/>
+          <a:chExt cx="0" cy="0"/>
+        </a:xfrm>
+      </p:grpSpPr>
+      <p:sp>
+        <p:nvSpPr>
+          <p:cNvPr id="2" name="標題 1">
+            <a:extLst>
+              <a:ext uri="{FF2B5EF4-FFF2-40B4-BE49-F238E27FC236}">
+                <a16:creationId xmlns:a16="http://schemas.microsoft.com/office/drawing/2014/main" id="{6BFF9CC2-641B-6728-EE05-B3A7EFA499FA}"/>
+              </a:ext>
+            </a:extLst>
+          </p:cNvPr>
+          <p:cNvSpPr>
+            <a:spLocks noGrp="1"/>
+          </p:cNvSpPr>
+          <p:nvPr>
+            <p:ph type="title"/>
+          </p:nvPr>
+        </p:nvSpPr>
+        <p:spPr/>
+        <p:txBody>
+          <a:bodyPr/>
+          <a:lstStyle/>
+          <a:p>
+            <a:r>
+              <a:rPr lang="en-US" altLang="zh-TW" dirty="0"/>
+              <a:t>Disable Randomization (1/1)</a:t>
+            </a:r>
+            <a:endParaRPr lang="zh-TW" altLang="en-US" dirty="0"/>
+          </a:p>
+        </p:txBody>
+      </p:sp>
+      <p:sp>
+        <p:nvSpPr>
+          <p:cNvPr id="4" name="內容版面配置區 3">
+            <a:extLst>
+              <a:ext uri="{FF2B5EF4-FFF2-40B4-BE49-F238E27FC236}">
+                <a16:creationId xmlns:a16="http://schemas.microsoft.com/office/drawing/2014/main" id="{38A74AF6-80E9-344A-32E3-9520AC1D2232}"/>
+              </a:ext>
+            </a:extLst>
+          </p:cNvPr>
+          <p:cNvSpPr>
+            <a:spLocks noGrp="1"/>
+          </p:cNvSpPr>
+          <p:nvPr>
+            <p:ph idx="1"/>
+          </p:nvPr>
+        </p:nvSpPr>
+        <p:spPr/>
+        <p:txBody>
+          <a:bodyPr/>
+          <a:lstStyle/>
+          <a:p>
+            <a:r>
+              <a:rPr lang="en-US" altLang="zh-TW" dirty="0" err="1"/>
+              <a:t>rand_mode</a:t>
+            </a:r>
+            <a:r>
+              <a:rPr lang="en-US" altLang="zh-TW" dirty="0"/>
+              <a:t>()   </a:t>
+            </a:r>
+            <a:r>
+              <a:rPr lang="zh-TW" altLang="en-US" dirty="0"/>
+              <a:t>用來</a:t>
+            </a:r>
+            <a:r>
+              <a:rPr lang="zh-TW" altLang="en-US" dirty="0">
+                <a:solidFill>
+                  <a:srgbClr val="FF0000"/>
+                </a:solidFill>
+              </a:rPr>
+              <a:t>關閉某個參數的隨機化</a:t>
+            </a:r>
+          </a:p>
+        </p:txBody>
+      </p:sp>
+      <p:grpSp>
+        <p:nvGrpSpPr>
+          <p:cNvPr id="3" name="群組 2">
+            <a:extLst>
+              <a:ext uri="{FF2B5EF4-FFF2-40B4-BE49-F238E27FC236}">
+                <a16:creationId xmlns:a16="http://schemas.microsoft.com/office/drawing/2014/main" id="{3C12ED93-08B4-ABA6-1B65-79688DB73832}"/>
+              </a:ext>
+            </a:extLst>
+          </p:cNvPr>
+          <p:cNvGrpSpPr/>
+          <p:nvPr/>
+        </p:nvGrpSpPr>
+        <p:grpSpPr>
+          <a:xfrm>
+            <a:off x="445169" y="2333685"/>
+            <a:ext cx="11301662" cy="4401205"/>
+            <a:chOff x="613611" y="2434400"/>
+            <a:chExt cx="11301662" cy="4401205"/>
+          </a:xfrm>
+        </p:grpSpPr>
+        <p:sp>
+          <p:nvSpPr>
+            <p:cNvPr id="5" name="文字方塊 4">
+              <a:extLst>
+                <a:ext uri="{FF2B5EF4-FFF2-40B4-BE49-F238E27FC236}">
+                  <a16:creationId xmlns:a16="http://schemas.microsoft.com/office/drawing/2014/main" id="{D3F3294E-F3AD-4513-1D76-B65246FC923F}"/>
+                </a:ext>
+              </a:extLst>
+            </p:cNvPr>
+            <p:cNvSpPr txBox="1"/>
+            <p:nvPr/>
+          </p:nvSpPr>
+          <p:spPr>
+            <a:xfrm>
+              <a:off x="613611" y="2434400"/>
+              <a:ext cx="5482389" cy="1077218"/>
+            </a:xfrm>
+            <a:prstGeom prst="rect">
+              <a:avLst/>
+            </a:prstGeom>
+            <a:noFill/>
+            <a:ln>
+              <a:solidFill>
+                <a:schemeClr val="tx1"/>
+              </a:solidFill>
+            </a:ln>
+          </p:spPr>
+          <p:txBody>
+            <a:bodyPr wrap="square" rtlCol="0">
+              <a:spAutoFit/>
+            </a:bodyPr>
+            <a:lstStyle/>
+            <a:p>
+              <a:r>
+                <a:rPr lang="sv-SE" altLang="zh-TW" sz="1600" dirty="0"/>
+                <a:t>class Fruits;</a:t>
+              </a:r>
+            </a:p>
+            <a:p>
+              <a:r>
+                <a:rPr lang="sv-SE" altLang="zh-TW" sz="1600" dirty="0"/>
+                <a:t>  rand bit [3:0] var1;</a:t>
+              </a:r>
+            </a:p>
+            <a:p>
+              <a:r>
+                <a:rPr lang="sv-SE" altLang="zh-TW" sz="1600" dirty="0"/>
+                <a:t>  rand bit [1:0] var2;</a:t>
+              </a:r>
+            </a:p>
+            <a:p>
+              <a:r>
+                <a:rPr lang="sv-SE" altLang="zh-TW" sz="1600" dirty="0"/>
+                <a:t>endclass</a:t>
+              </a:r>
+              <a:endParaRPr lang="en-US" altLang="zh-TW" sz="1600" dirty="0"/>
+            </a:p>
+          </p:txBody>
+        </p:sp>
+        <p:sp>
+          <p:nvSpPr>
+            <p:cNvPr id="6" name="文字方塊 5">
+              <a:extLst>
+                <a:ext uri="{FF2B5EF4-FFF2-40B4-BE49-F238E27FC236}">
+                  <a16:creationId xmlns:a16="http://schemas.microsoft.com/office/drawing/2014/main" id="{41342190-3F80-8737-2493-38339D0C6E83}"/>
+                </a:ext>
+              </a:extLst>
+            </p:cNvPr>
+            <p:cNvSpPr txBox="1"/>
+            <p:nvPr/>
+          </p:nvSpPr>
+          <p:spPr>
+            <a:xfrm>
+              <a:off x="6432884" y="2434400"/>
+              <a:ext cx="5482389" cy="4401205"/>
+            </a:xfrm>
+            <a:prstGeom prst="rect">
+              <a:avLst/>
+            </a:prstGeom>
+            <a:noFill/>
+            <a:ln>
+              <a:solidFill>
+                <a:schemeClr val="tx1"/>
+              </a:solidFill>
+            </a:ln>
+          </p:spPr>
+          <p:txBody>
+            <a:bodyPr wrap="square" rtlCol="0">
+              <a:spAutoFit/>
+            </a:bodyPr>
+            <a:lstStyle/>
+            <a:p>
+              <a:r>
+                <a:rPr lang="en-US" altLang="zh-TW" sz="1400" dirty="0"/>
+                <a:t>module tb;</a:t>
+              </a:r>
+            </a:p>
+            <a:p>
+              <a:r>
+                <a:rPr lang="en-US" altLang="zh-TW" sz="1400" dirty="0"/>
+                <a:t>  initial begin</a:t>
+              </a:r>
+            </a:p>
+            <a:p>
+              <a:r>
+                <a:rPr lang="en-US" altLang="zh-TW" sz="1400" dirty="0"/>
+                <a:t>    Fruits f = new();</a:t>
+              </a:r>
+            </a:p>
+            <a:p>
+              <a:r>
+                <a:rPr lang="en-US" altLang="zh-TW" sz="1400" dirty="0"/>
+                <a:t>    $display ("Before randomization var1=%0d var2=%0d", f.var1, f.var2);</a:t>
+              </a:r>
+            </a:p>
+            <a:p>
+              <a:endParaRPr lang="en-US" altLang="zh-TW" sz="1400" dirty="0"/>
+            </a:p>
+            <a:p>
+              <a:r>
+                <a:rPr lang="en-US" altLang="zh-TW" sz="1400" dirty="0"/>
+                <a:t>    // Turn off randomization for var1</a:t>
+              </a:r>
+            </a:p>
+            <a:p>
+              <a:r>
+                <a:rPr lang="en-US" altLang="zh-TW" sz="1400" dirty="0"/>
+                <a:t>    </a:t>
+              </a:r>
+              <a:r>
+                <a:rPr lang="en-US" altLang="zh-TW" sz="1400" dirty="0">
+                  <a:solidFill>
+                    <a:srgbClr val="FF0000"/>
+                  </a:solidFill>
+                </a:rPr>
+                <a:t>f.var1.rand_mode (0);</a:t>
+              </a:r>
+            </a:p>
+            <a:p>
+              <a:endParaRPr lang="en-US" altLang="zh-TW" sz="1400" dirty="0"/>
+            </a:p>
+            <a:p>
+              <a:r>
+                <a:rPr lang="en-US" altLang="zh-TW" sz="1400" dirty="0"/>
+                <a:t>    // Print if var1 has randomization enabled/disabled</a:t>
+              </a:r>
+            </a:p>
+            <a:p>
+              <a:r>
+                <a:rPr lang="en-US" altLang="zh-TW" sz="1400" dirty="0"/>
+                <a:t>    if (f.var1.rand_mode())</a:t>
+              </a:r>
+            </a:p>
+            <a:p>
+              <a:r>
+                <a:rPr lang="en-US" altLang="zh-TW" sz="1400" dirty="0"/>
+                <a:t>      $display ("Randomization of var1 enabled");</a:t>
+              </a:r>
+            </a:p>
+            <a:p>
+              <a:r>
+                <a:rPr lang="en-US" altLang="zh-TW" sz="1400" dirty="0"/>
+                <a:t>    else</a:t>
+              </a:r>
+            </a:p>
+            <a:p>
+              <a:r>
+                <a:rPr lang="en-US" altLang="zh-TW" sz="1400" dirty="0"/>
+                <a:t>      $display ("Randomization of var1 disabled");</a:t>
+              </a:r>
+            </a:p>
+            <a:p>
+              <a:endParaRPr lang="en-US" altLang="zh-TW" sz="1400" dirty="0"/>
+            </a:p>
+            <a:p>
+              <a:r>
+                <a:rPr lang="en-US" altLang="zh-TW" sz="1400" dirty="0"/>
+                <a:t>    </a:t>
+              </a:r>
+              <a:r>
+                <a:rPr lang="en-US" altLang="zh-TW" sz="1400" dirty="0" err="1"/>
+                <a:t>f.randomize</a:t>
+              </a:r>
+              <a:r>
+                <a:rPr lang="en-US" altLang="zh-TW" sz="1400" dirty="0"/>
+                <a:t>();</a:t>
+              </a:r>
+            </a:p>
+            <a:p>
+              <a:endParaRPr lang="en-US" altLang="zh-TW" sz="1400" dirty="0"/>
+            </a:p>
+            <a:p>
+              <a:r>
+                <a:rPr lang="en-US" altLang="zh-TW" sz="1400" dirty="0"/>
+                <a:t>    $display ("After randomization var1=%0d var2=%0d", f.var1, f.var2);</a:t>
+              </a:r>
+            </a:p>
+            <a:p>
+              <a:r>
+                <a:rPr lang="en-US" altLang="zh-TW" sz="1400" dirty="0"/>
+                <a:t>  end</a:t>
+              </a:r>
+            </a:p>
+            <a:p>
+              <a:r>
+                <a:rPr lang="en-US" altLang="zh-TW" sz="1400" dirty="0" err="1"/>
+                <a:t>endmodule</a:t>
+              </a:r>
+              <a:endParaRPr lang="en-US" altLang="zh-TW" sz="1600" dirty="0"/>
+            </a:p>
+          </p:txBody>
+        </p:sp>
+      </p:grpSp>
+    </p:spTree>
+    <p:extLst>
+      <p:ext uri="{BB962C8B-B14F-4D97-AF65-F5344CB8AC3E}">
+        <p14:creationId xmlns:p14="http://schemas.microsoft.com/office/powerpoint/2010/main" val="3150408999"/>
+      </p:ext>
+    </p:extLst>
+  </p:cSld>
+  <p:clrMapOvr>
+    <a:masterClrMapping/>
+  </p:clrMapOvr>
+</p:sld>
+</file>
+
+<file path=ppt/slides/slide63.xml><?xml version="1.0" encoding="utf-8"?>
+<p:sld xmlns:a="http://schemas.openxmlformats.org/drawingml/2006/main" xmlns:r="http://schemas.openxmlformats.org/officeDocument/2006/relationships" xmlns:p="http://schemas.openxmlformats.org/presentationml/2006/main">
+  <p:cSld>
+    <p:spTree>
+      <p:nvGrpSpPr>
+        <p:cNvPr id="1" name="">
+          <a:extLst>
+            <a:ext uri="{FF2B5EF4-FFF2-40B4-BE49-F238E27FC236}">
+              <a16:creationId xmlns:a16="http://schemas.microsoft.com/office/drawing/2014/main" id="{17B76267-F282-34BE-2361-0B41A1349910}"/>
+            </a:ext>
+          </a:extLst>
+        </p:cNvPr>
+        <p:cNvGrpSpPr/>
+        <p:nvPr/>
+      </p:nvGrpSpPr>
+      <p:grpSpPr>
+        <a:xfrm>
+          <a:off x="0" y="0"/>
+          <a:ext cx="0" cy="0"/>
+          <a:chOff x="0" y="0"/>
+          <a:chExt cx="0" cy="0"/>
+        </a:xfrm>
+      </p:grpSpPr>
+      <p:sp>
+        <p:nvSpPr>
+          <p:cNvPr id="2" name="標題 1">
+            <a:extLst>
+              <a:ext uri="{FF2B5EF4-FFF2-40B4-BE49-F238E27FC236}">
+                <a16:creationId xmlns:a16="http://schemas.microsoft.com/office/drawing/2014/main" id="{AE512E0E-DA67-8B66-8FB3-4CCD5FC30DBA}"/>
+              </a:ext>
+            </a:extLst>
+          </p:cNvPr>
+          <p:cNvSpPr>
+            <a:spLocks noGrp="1"/>
+          </p:cNvSpPr>
+          <p:nvPr>
+            <p:ph type="title"/>
+          </p:nvPr>
+        </p:nvSpPr>
+        <p:spPr/>
+        <p:txBody>
+          <a:bodyPr/>
+          <a:lstStyle/>
+          <a:p>
+            <a:r>
+              <a:rPr lang="en-US" altLang="zh-TW" dirty="0"/>
+              <a:t>Random weighted case (1/1)</a:t>
+            </a:r>
+            <a:endParaRPr lang="zh-TW" altLang="en-US" dirty="0"/>
+          </a:p>
+        </p:txBody>
+      </p:sp>
+      <p:sp>
+        <p:nvSpPr>
+          <p:cNvPr id="4" name="內容版面配置區 3">
+            <a:extLst>
+              <a:ext uri="{FF2B5EF4-FFF2-40B4-BE49-F238E27FC236}">
+                <a16:creationId xmlns:a16="http://schemas.microsoft.com/office/drawing/2014/main" id="{E7ECE370-9357-52D4-2E8B-3EE73F9E39C0}"/>
+              </a:ext>
+            </a:extLst>
+          </p:cNvPr>
+          <p:cNvSpPr>
+            <a:spLocks noGrp="1"/>
+          </p:cNvSpPr>
+          <p:nvPr>
+            <p:ph idx="1"/>
+          </p:nvPr>
+        </p:nvSpPr>
+        <p:spPr/>
+        <p:txBody>
+          <a:bodyPr/>
+          <a:lstStyle/>
+          <a:p>
+            <a:r>
+              <a:rPr lang="zh-TW" altLang="en-US" dirty="0"/>
+              <a:t>可以自己創造自己想要的 </a:t>
+            </a:r>
+            <a:r>
+              <a:rPr lang="en-US" altLang="zh-TW" dirty="0"/>
+              <a:t>case</a:t>
+            </a:r>
+            <a:r>
+              <a:rPr lang="zh-TW" altLang="en-US" dirty="0"/>
+              <a:t>，並給予他們</a:t>
+            </a:r>
+            <a:r>
+              <a:rPr lang="zh-TW" altLang="en-US" dirty="0">
+                <a:solidFill>
+                  <a:srgbClr val="FF0000"/>
+                </a:solidFill>
+              </a:rPr>
+              <a:t>權重</a:t>
+            </a:r>
+          </a:p>
+        </p:txBody>
+      </p:sp>
+      <p:sp>
+        <p:nvSpPr>
+          <p:cNvPr id="6" name="文字方塊 5">
+            <a:extLst>
+              <a:ext uri="{FF2B5EF4-FFF2-40B4-BE49-F238E27FC236}">
+                <a16:creationId xmlns:a16="http://schemas.microsoft.com/office/drawing/2014/main" id="{590BE5BB-0588-E98B-8418-8172C52E68FF}"/>
+              </a:ext>
+            </a:extLst>
+          </p:cNvPr>
+          <p:cNvSpPr txBox="1"/>
+          <p:nvPr/>
+        </p:nvSpPr>
+        <p:spPr>
+          <a:xfrm>
+            <a:off x="3354805" y="2842643"/>
+            <a:ext cx="5482389" cy="3539430"/>
+          </a:xfrm>
+          <a:prstGeom prst="rect">
+            <a:avLst/>
+          </a:prstGeom>
+          <a:noFill/>
+          <a:ln>
+            <a:solidFill>
+              <a:schemeClr val="tx1"/>
+            </a:solidFill>
+          </a:ln>
+        </p:spPr>
+        <p:txBody>
+          <a:bodyPr wrap="square" rtlCol="0">
+            <a:spAutoFit/>
+          </a:bodyPr>
+          <a:lstStyle/>
+          <a:p>
+            <a:r>
+              <a:rPr lang="en-US" altLang="zh-TW" sz="1600" dirty="0"/>
+              <a:t>module tb;</a:t>
+            </a:r>
+          </a:p>
+          <a:p>
+            <a:r>
+              <a:rPr lang="en-US" altLang="zh-TW" sz="1600" dirty="0"/>
+              <a:t>      initial begin</a:t>
+            </a:r>
+          </a:p>
+          <a:p>
+            <a:r>
+              <a:rPr lang="en-US" altLang="zh-TW" sz="1600" dirty="0"/>
+              <a:t>      for (int </a:t>
+            </a:r>
+            <a:r>
+              <a:rPr lang="en-US" altLang="zh-TW" sz="1600" dirty="0" err="1"/>
+              <a:t>i</a:t>
+            </a:r>
+            <a:r>
+              <a:rPr lang="en-US" altLang="zh-TW" sz="1600" dirty="0"/>
+              <a:t> = 0; </a:t>
+            </a:r>
+            <a:r>
+              <a:rPr lang="en-US" altLang="zh-TW" sz="1600" dirty="0" err="1"/>
+              <a:t>i</a:t>
+            </a:r>
+            <a:r>
+              <a:rPr lang="en-US" altLang="zh-TW" sz="1600" dirty="0"/>
+              <a:t> &lt; 10; </a:t>
+            </a:r>
+            <a:r>
+              <a:rPr lang="en-US" altLang="zh-TW" sz="1600" dirty="0" err="1"/>
+              <a:t>i</a:t>
+            </a:r>
+            <a:r>
+              <a:rPr lang="en-US" altLang="zh-TW" sz="1600" dirty="0"/>
+              <a:t>++)</a:t>
+            </a:r>
+          </a:p>
+          <a:p>
+            <a:r>
+              <a:rPr lang="en-US" altLang="zh-TW" sz="1600" dirty="0"/>
+              <a:t>        // </a:t>
+            </a:r>
+            <a:r>
+              <a:rPr lang="zh-TW" altLang="en-US" sz="1600" dirty="0"/>
+              <a:t>此 </a:t>
+            </a:r>
+            <a:r>
+              <a:rPr lang="en-US" altLang="zh-TW" sz="1600" dirty="0"/>
+              <a:t>case </a:t>
+            </a:r>
+            <a:r>
+              <a:rPr lang="zh-TW" altLang="en-US" sz="1600" dirty="0"/>
+              <a:t>分母為 </a:t>
+            </a:r>
+            <a:r>
+              <a:rPr lang="en-US" altLang="zh-TW" sz="1600" dirty="0"/>
+              <a:t>1+5+3 = 9</a:t>
+            </a:r>
+          </a:p>
+          <a:p>
+            <a:r>
+              <a:rPr lang="en-US" altLang="zh-TW" sz="1600" dirty="0"/>
+              <a:t>        // </a:t>
+            </a:r>
+            <a:r>
+              <a:rPr lang="zh-TW" altLang="en-US" sz="1600" dirty="0"/>
+              <a:t>出現 </a:t>
+            </a:r>
+            <a:r>
+              <a:rPr lang="en-US" altLang="zh-TW" sz="1600" dirty="0"/>
+              <a:t>0 </a:t>
+            </a:r>
+            <a:r>
+              <a:rPr lang="zh-TW" altLang="en-US" sz="1600" dirty="0"/>
+              <a:t>的機率為 </a:t>
+            </a:r>
+            <a:r>
+              <a:rPr lang="en-US" altLang="zh-TW" sz="1600" dirty="0"/>
+              <a:t>1/9</a:t>
+            </a:r>
+          </a:p>
+          <a:p>
+            <a:r>
+              <a:rPr lang="en-US" altLang="zh-TW" sz="1600" dirty="0"/>
+              <a:t>        // </a:t>
+            </a:r>
+            <a:r>
+              <a:rPr lang="zh-TW" altLang="en-US" sz="1600" dirty="0"/>
+              <a:t>出現 </a:t>
+            </a:r>
+            <a:r>
+              <a:rPr lang="en-US" altLang="zh-TW" sz="1600" dirty="0"/>
+              <a:t>5 </a:t>
+            </a:r>
+            <a:r>
+              <a:rPr lang="zh-TW" altLang="en-US" sz="1600" dirty="0"/>
+              <a:t>的機率為 </a:t>
+            </a:r>
+            <a:r>
+              <a:rPr lang="en-US" altLang="zh-TW" sz="1600" dirty="0"/>
+              <a:t>5/9</a:t>
+            </a:r>
+          </a:p>
+          <a:p>
+            <a:r>
+              <a:rPr lang="en-US" altLang="zh-TW" sz="1600" dirty="0"/>
+              <a:t>        // </a:t>
+            </a:r>
+            <a:r>
+              <a:rPr lang="zh-TW" altLang="en-US" sz="1600" dirty="0"/>
+              <a:t>出現 </a:t>
+            </a:r>
+            <a:r>
+              <a:rPr lang="en-US" altLang="zh-TW" sz="1600" dirty="0"/>
+              <a:t>3 </a:t>
+            </a:r>
+            <a:r>
+              <a:rPr lang="zh-TW" altLang="en-US" sz="1600" dirty="0"/>
+              <a:t>的機率為 </a:t>
+            </a:r>
+            <a:r>
+              <a:rPr lang="en-US" altLang="zh-TW" sz="1600" dirty="0"/>
+              <a:t>3/9        </a:t>
+            </a:r>
+          </a:p>
+          <a:p>
+            <a:r>
+              <a:rPr lang="en-US" altLang="zh-TW" sz="1600" dirty="0"/>
+              <a:t>        </a:t>
+            </a:r>
+            <a:r>
+              <a:rPr lang="en-US" altLang="zh-TW" sz="1600" dirty="0" err="1">
+                <a:solidFill>
+                  <a:srgbClr val="FF0000"/>
+                </a:solidFill>
+              </a:rPr>
+              <a:t>randcase</a:t>
+            </a:r>
+            <a:endParaRPr lang="en-US" altLang="zh-TW" sz="1600" dirty="0">
+              <a:solidFill>
+                <a:srgbClr val="FF0000"/>
+              </a:solidFill>
+            </a:endParaRPr>
+          </a:p>
+          <a:p>
+            <a:r>
+              <a:rPr lang="en-US" altLang="zh-TW" sz="1600" dirty="0"/>
+              <a:t>            0 : 	$display ("</a:t>
+            </a:r>
+            <a:r>
+              <a:rPr lang="en-US" altLang="zh-TW" sz="1600" dirty="0" err="1"/>
+              <a:t>Wt</a:t>
+            </a:r>
+            <a:r>
+              <a:rPr lang="en-US" altLang="zh-TW" sz="1600" dirty="0"/>
+              <a:t> 1");</a:t>
+            </a:r>
+          </a:p>
+          <a:p>
+            <a:r>
+              <a:rPr lang="en-US" altLang="zh-TW" sz="1600" dirty="0"/>
+              <a:t>            5 : 	$display ("</a:t>
+            </a:r>
+            <a:r>
+              <a:rPr lang="en-US" altLang="zh-TW" sz="1600" dirty="0" err="1"/>
+              <a:t>Wt</a:t>
+            </a:r>
+            <a:r>
+              <a:rPr lang="en-US" altLang="zh-TW" sz="1600" dirty="0"/>
+              <a:t> 5");</a:t>
+            </a:r>
+          </a:p>
+          <a:p>
+            <a:r>
+              <a:rPr lang="en-US" altLang="zh-TW" sz="1600" dirty="0"/>
+              <a:t>            3 : 	$display ("</a:t>
+            </a:r>
+            <a:r>
+              <a:rPr lang="en-US" altLang="zh-TW" sz="1600" dirty="0" err="1"/>
+              <a:t>Wt</a:t>
+            </a:r>
+            <a:r>
+              <a:rPr lang="en-US" altLang="zh-TW" sz="1600" dirty="0"/>
+              <a:t> 3");</a:t>
+            </a:r>
+          </a:p>
+          <a:p>
+            <a:r>
+              <a:rPr lang="en-US" altLang="zh-TW" sz="1600" dirty="0"/>
+              <a:t>        </a:t>
+            </a:r>
+            <a:r>
+              <a:rPr lang="en-US" altLang="zh-TW" sz="1600" dirty="0" err="1"/>
+              <a:t>endcase</a:t>
+            </a:r>
+            <a:endParaRPr lang="en-US" altLang="zh-TW" sz="1600" dirty="0"/>
+          </a:p>
+          <a:p>
+            <a:r>
+              <a:rPr lang="en-US" altLang="zh-TW" sz="1600" dirty="0"/>
+              <a:t>    end</a:t>
+            </a:r>
+          </a:p>
+          <a:p>
+            <a:r>
+              <a:rPr lang="en-US" altLang="zh-TW" sz="1600" dirty="0" err="1"/>
+              <a:t>endmodule</a:t>
+            </a:r>
+            <a:endParaRPr lang="en-US" altLang="zh-TW" dirty="0"/>
+          </a:p>
+        </p:txBody>
+      </p:sp>
+    </p:spTree>
+    <p:extLst>
+      <p:ext uri="{BB962C8B-B14F-4D97-AF65-F5344CB8AC3E}">
+        <p14:creationId xmlns:p14="http://schemas.microsoft.com/office/powerpoint/2010/main" val="1830280657"/>
+      </p:ext>
+    </p:extLst>
+  </p:cSld>
+  <p:clrMapOvr>
+    <a:masterClrMapping/>
+  </p:clrMapOvr>
+</p:sld>
+</file>
+
+<file path=ppt/slides/slide64.xml><?xml version="1.0" encoding="utf-8"?>
+<p:sld xmlns:a="http://schemas.openxmlformats.org/drawingml/2006/main" xmlns:r="http://schemas.openxmlformats.org/officeDocument/2006/relationships" xmlns:p="http://schemas.openxmlformats.org/presentationml/2006/main">
+  <p:cSld>
+    <p:spTree>
+      <p:nvGrpSpPr>
+        <p:cNvPr id="1" name="">
+          <a:extLst>
+            <a:ext uri="{FF2B5EF4-FFF2-40B4-BE49-F238E27FC236}">
+              <a16:creationId xmlns:a16="http://schemas.microsoft.com/office/drawing/2014/main" id="{FEE4DFE3-BEA3-9BEC-E3B6-150B355EED62}"/>
+            </a:ext>
+          </a:extLst>
+        </p:cNvPr>
+        <p:cNvGrpSpPr/>
+        <p:nvPr/>
+      </p:nvGrpSpPr>
+      <p:grpSpPr>
+        <a:xfrm>
+          <a:off x="0" y="0"/>
+          <a:ext cx="0" cy="0"/>
+          <a:chOff x="0" y="0"/>
+          <a:chExt cx="0" cy="0"/>
+        </a:xfrm>
+      </p:grpSpPr>
+      <p:sp>
+        <p:nvSpPr>
+          <p:cNvPr id="2" name="標題 1">
+            <a:extLst>
+              <a:ext uri="{FF2B5EF4-FFF2-40B4-BE49-F238E27FC236}">
+                <a16:creationId xmlns:a16="http://schemas.microsoft.com/office/drawing/2014/main" id="{509032CE-63BD-F9D3-1CB1-D2A0BFB1CC4B}"/>
+              </a:ext>
+            </a:extLst>
+          </p:cNvPr>
+          <p:cNvSpPr>
+            <a:spLocks noGrp="1"/>
+          </p:cNvSpPr>
+          <p:nvPr>
+            <p:ph type="ctrTitle"/>
+          </p:nvPr>
+        </p:nvSpPr>
+        <p:spPr/>
+        <p:txBody>
+          <a:bodyPr/>
+          <a:lstStyle/>
+          <a:p>
+            <a:r>
+              <a:rPr lang="en-US" altLang="zh-TW" dirty="0"/>
+              <a:t>Chapter 7</a:t>
+            </a:r>
+            <a:endParaRPr lang="zh-TW" altLang="en-US" dirty="0"/>
+          </a:p>
+        </p:txBody>
+      </p:sp>
+      <p:sp>
+        <p:nvSpPr>
+          <p:cNvPr id="3" name="副標題 2">
+            <a:extLst>
+              <a:ext uri="{FF2B5EF4-FFF2-40B4-BE49-F238E27FC236}">
+                <a16:creationId xmlns:a16="http://schemas.microsoft.com/office/drawing/2014/main" id="{34F767BA-31DA-EFE3-CCDD-741F2991C60E}"/>
+              </a:ext>
+            </a:extLst>
+          </p:cNvPr>
+          <p:cNvSpPr>
+            <a:spLocks noGrp="1"/>
+          </p:cNvSpPr>
+          <p:nvPr>
+            <p:ph type="subTitle" idx="1"/>
+          </p:nvPr>
+        </p:nvSpPr>
+        <p:spPr/>
+        <p:txBody>
+          <a:bodyPr>
+            <a:normAutofit/>
+          </a:bodyPr>
+          <a:lstStyle/>
+          <a:p>
+            <a:r>
+              <a:rPr lang="en-US" altLang="zh-TW" sz="4000" dirty="0"/>
+              <a:t>Functional Coverage</a:t>
+            </a:r>
+          </a:p>
+        </p:txBody>
+      </p:sp>
+    </p:spTree>
+    <p:extLst>
+      <p:ext uri="{BB962C8B-B14F-4D97-AF65-F5344CB8AC3E}">
+        <p14:creationId xmlns:p14="http://schemas.microsoft.com/office/powerpoint/2010/main" val="1823758266"/>
       </p:ext>
     </p:extLst>
   </p:cSld>

</xml_diff>

<commit_message>
Modify: SystemVerilog_語法學習.pptx 1. add link
</commit_message>
<xml_diff>
--- a/systemverilog/SystemVerilog_語法學習.pptx
+++ b/systemverilog/SystemVerilog_語法學習.pptx
@@ -7382,7 +7382,9 @@
               <a:buAutoNum type="arabicPeriod"/>
             </a:pPr>
             <a:r>
-              <a:rPr lang="en-US" altLang="zh-TW" dirty="0" err="1"/>
+              <a:rPr lang="en-US" altLang="zh-TW" dirty="0">
+                <a:hlinkClick r:id="rId2" action="ppaction://hlinksldjump"/>
+              </a:rPr>
               <a:t>Data_Type</a:t>
             </a:r>
             <a:endParaRPr lang="en-US" altLang="zh-TW" dirty="0"/>
@@ -7393,7 +7395,9 @@
               <a:buAutoNum type="arabicPeriod"/>
             </a:pPr>
             <a:r>
-              <a:rPr lang="en-US" altLang="zh-TW" dirty="0" err="1"/>
+              <a:rPr lang="en-US" altLang="zh-TW" dirty="0">
+                <a:hlinkClick r:id="rId3" action="ppaction://hlinksldjump"/>
+              </a:rPr>
               <a:t>Control_Flow</a:t>
             </a:r>
             <a:endParaRPr lang="en-US" altLang="zh-TW" dirty="0"/>
@@ -7404,9 +7408,12 @@
               <a:buAutoNum type="arabicPeriod"/>
             </a:pPr>
             <a:r>
-              <a:rPr lang="en-US" altLang="zh-TW" dirty="0"/>
+              <a:rPr lang="en-US" altLang="zh-TW" dirty="0">
+                <a:hlinkClick r:id="rId4" action="ppaction://hlinksldjump"/>
+              </a:rPr>
               <a:t>Processes</a:t>
             </a:r>
+            <a:endParaRPr lang="en-US" altLang="zh-TW" dirty="0"/>
           </a:p>
           <a:p>
             <a:pPr marL="514350" indent="-514350">
@@ -7414,9 +7421,12 @@
               <a:buAutoNum type="arabicPeriod"/>
             </a:pPr>
             <a:r>
-              <a:rPr lang="en-US" altLang="zh-TW" dirty="0"/>
+              <a:rPr lang="en-US" altLang="zh-TW" dirty="0">
+                <a:hlinkClick r:id="rId5" action="ppaction://hlinksldjump"/>
+              </a:rPr>
               <a:t>Communication</a:t>
             </a:r>
+            <a:endParaRPr lang="en-US" altLang="zh-TW" dirty="0"/>
           </a:p>
           <a:p>
             <a:pPr marL="514350" indent="-514350">
@@ -7424,9 +7434,12 @@
               <a:buAutoNum type="arabicPeriod"/>
             </a:pPr>
             <a:r>
-              <a:rPr lang="en-US" altLang="zh-TW" dirty="0"/>
+              <a:rPr lang="en-US" altLang="zh-TW" dirty="0">
+                <a:hlinkClick r:id="rId6" action="ppaction://hlinksldjump"/>
+              </a:rPr>
               <a:t>Interface</a:t>
             </a:r>
+            <a:endParaRPr lang="en-US" altLang="zh-TW" dirty="0"/>
           </a:p>
           <a:p>
             <a:pPr marL="514350" indent="-514350">
@@ -7434,9 +7447,12 @@
               <a:buAutoNum type="arabicPeriod"/>
             </a:pPr>
             <a:r>
-              <a:rPr lang="en-US" altLang="zh-TW" dirty="0"/>
+              <a:rPr lang="en-US" altLang="zh-TW" dirty="0">
+                <a:hlinkClick r:id="rId7" action="ppaction://hlinksldjump"/>
+              </a:rPr>
               <a:t>Constraints</a:t>
             </a:r>
+            <a:endParaRPr lang="en-US" altLang="zh-TW" dirty="0"/>
           </a:p>
           <a:p>
             <a:pPr marL="514350" indent="-514350">
@@ -7444,7 +7460,9 @@
               <a:buAutoNum type="arabicPeriod"/>
             </a:pPr>
             <a:r>
-              <a:rPr lang="en-US" altLang="zh-TW"/>
+              <a:rPr lang="en-US" altLang="zh-TW" dirty="0">
+                <a:hlinkClick r:id="rId8" action="ppaction://hlinksldjump"/>
+              </a:rPr>
               <a:t>Functional Coverage</a:t>
             </a:r>
             <a:endParaRPr lang="en-US" altLang="zh-TW" dirty="0"/>

</xml_diff>

<commit_message>
Modify: SystemVerilog_語法學習.pptx 1. Add: chapter 7 Functional Coverage
</commit_message>
<xml_diff>
--- a/systemverilog/SystemVerilog_語法學習.pptx
+++ b/systemverilog/SystemVerilog_語法學習.pptx
@@ -5,7 +5,7 @@
     <p:sldMasterId id="2147483648" r:id="rId1"/>
   </p:sldMasterIdLst>
   <p:notesMasterIdLst>
-    <p:notesMasterId r:id="rId66"/>
+    <p:notesMasterId r:id="rId68"/>
   </p:notesMasterIdLst>
   <p:sldIdLst>
     <p:sldId id="256" r:id="rId2"/>
@@ -72,6 +72,8 @@
     <p:sldId id="328" r:id="rId63"/>
     <p:sldId id="329" r:id="rId64"/>
     <p:sldId id="330" r:id="rId65"/>
+    <p:sldId id="331" r:id="rId66"/>
+    <p:sldId id="332" r:id="rId67"/>
   </p:sldIdLst>
   <p:sldSz cx="12192000" cy="6858000"/>
   <p:notesSz cx="6858000" cy="9144000"/>
@@ -260,7 +262,7 @@
           <a:p>
             <a:fld id="{28C483A5-4075-4A6E-B921-74BFA7B8EF67}" type="datetimeFigureOut">
               <a:rPr lang="zh-TW" altLang="en-US" smtClean="0"/>
-              <a:t>2025/7/1</a:t>
+              <a:t>2025/7/2</a:t>
             </a:fld>
             <a:endParaRPr lang="zh-TW" altLang="en-US"/>
           </a:p>
@@ -842,7 +844,7 @@
           <a:p>
             <a:fld id="{2365240E-6CA3-4772-8803-719FF1315E51}" type="datetimeFigureOut">
               <a:rPr lang="zh-TW" altLang="en-US" smtClean="0"/>
-              <a:t>2025/7/1</a:t>
+              <a:t>2025/7/2</a:t>
             </a:fld>
             <a:endParaRPr lang="zh-TW" altLang="en-US"/>
           </a:p>
@@ -1040,7 +1042,7 @@
           <a:p>
             <a:fld id="{2365240E-6CA3-4772-8803-719FF1315E51}" type="datetimeFigureOut">
               <a:rPr lang="zh-TW" altLang="en-US" smtClean="0"/>
-              <a:t>2025/7/1</a:t>
+              <a:t>2025/7/2</a:t>
             </a:fld>
             <a:endParaRPr lang="zh-TW" altLang="en-US"/>
           </a:p>
@@ -1248,7 +1250,7 @@
           <a:p>
             <a:fld id="{2365240E-6CA3-4772-8803-719FF1315E51}" type="datetimeFigureOut">
               <a:rPr lang="zh-TW" altLang="en-US" smtClean="0"/>
-              <a:t>2025/7/1</a:t>
+              <a:t>2025/7/2</a:t>
             </a:fld>
             <a:endParaRPr lang="zh-TW" altLang="en-US"/>
           </a:p>
@@ -1446,7 +1448,7 @@
           <a:p>
             <a:fld id="{2365240E-6CA3-4772-8803-719FF1315E51}" type="datetimeFigureOut">
               <a:rPr lang="zh-TW" altLang="en-US" smtClean="0"/>
-              <a:t>2025/7/1</a:t>
+              <a:t>2025/7/2</a:t>
             </a:fld>
             <a:endParaRPr lang="zh-TW" altLang="en-US"/>
           </a:p>
@@ -1721,7 +1723,7 @@
           <a:p>
             <a:fld id="{2365240E-6CA3-4772-8803-719FF1315E51}" type="datetimeFigureOut">
               <a:rPr lang="zh-TW" altLang="en-US" smtClean="0"/>
-              <a:t>2025/7/1</a:t>
+              <a:t>2025/7/2</a:t>
             </a:fld>
             <a:endParaRPr lang="zh-TW" altLang="en-US"/>
           </a:p>
@@ -1986,7 +1988,7 @@
           <a:p>
             <a:fld id="{2365240E-6CA3-4772-8803-719FF1315E51}" type="datetimeFigureOut">
               <a:rPr lang="zh-TW" altLang="en-US" smtClean="0"/>
-              <a:t>2025/7/1</a:t>
+              <a:t>2025/7/2</a:t>
             </a:fld>
             <a:endParaRPr lang="zh-TW" altLang="en-US"/>
           </a:p>
@@ -2398,7 +2400,7 @@
           <a:p>
             <a:fld id="{2365240E-6CA3-4772-8803-719FF1315E51}" type="datetimeFigureOut">
               <a:rPr lang="zh-TW" altLang="en-US" smtClean="0"/>
-              <a:t>2025/7/1</a:t>
+              <a:t>2025/7/2</a:t>
             </a:fld>
             <a:endParaRPr lang="zh-TW" altLang="en-US"/>
           </a:p>
@@ -2539,7 +2541,7 @@
           <a:p>
             <a:fld id="{2365240E-6CA3-4772-8803-719FF1315E51}" type="datetimeFigureOut">
               <a:rPr lang="zh-TW" altLang="en-US" smtClean="0"/>
-              <a:t>2025/7/1</a:t>
+              <a:t>2025/7/2</a:t>
             </a:fld>
             <a:endParaRPr lang="zh-TW" altLang="en-US"/>
           </a:p>
@@ -2652,7 +2654,7 @@
           <a:p>
             <a:fld id="{2365240E-6CA3-4772-8803-719FF1315E51}" type="datetimeFigureOut">
               <a:rPr lang="zh-TW" altLang="en-US" smtClean="0"/>
-              <a:t>2025/7/1</a:t>
+              <a:t>2025/7/2</a:t>
             </a:fld>
             <a:endParaRPr lang="zh-TW" altLang="en-US"/>
           </a:p>
@@ -2963,7 +2965,7 @@
           <a:p>
             <a:fld id="{2365240E-6CA3-4772-8803-719FF1315E51}" type="datetimeFigureOut">
               <a:rPr lang="zh-TW" altLang="en-US" smtClean="0"/>
-              <a:t>2025/7/1</a:t>
+              <a:t>2025/7/2</a:t>
             </a:fld>
             <a:endParaRPr lang="zh-TW" altLang="en-US"/>
           </a:p>
@@ -3251,7 +3253,7 @@
           <a:p>
             <a:fld id="{2365240E-6CA3-4772-8803-719FF1315E51}" type="datetimeFigureOut">
               <a:rPr lang="zh-TW" altLang="en-US" smtClean="0"/>
-              <a:t>2025/7/1</a:t>
+              <a:t>2025/7/2</a:t>
             </a:fld>
             <a:endParaRPr lang="zh-TW" altLang="en-US"/>
           </a:p>
@@ -3492,7 +3494,7 @@
           <a:p>
             <a:fld id="{2365240E-6CA3-4772-8803-719FF1315E51}" type="datetimeFigureOut">
               <a:rPr lang="zh-TW" altLang="en-US" smtClean="0"/>
-              <a:t>2025/7/1</a:t>
+              <a:t>2025/7/2</a:t>
             </a:fld>
             <a:endParaRPr lang="zh-TW" altLang="en-US"/>
           </a:p>
@@ -20582,6 +20584,536 @@
 </p:sld>
 </file>
 
+<file path=ppt/slides/slide65.xml><?xml version="1.0" encoding="utf-8"?>
+<p:sld xmlns:a="http://schemas.openxmlformats.org/drawingml/2006/main" xmlns:r="http://schemas.openxmlformats.org/officeDocument/2006/relationships" xmlns:p="http://schemas.openxmlformats.org/presentationml/2006/main">
+  <p:cSld>
+    <p:spTree>
+      <p:nvGrpSpPr>
+        <p:cNvPr id="1" name="">
+          <a:extLst>
+            <a:ext uri="{FF2B5EF4-FFF2-40B4-BE49-F238E27FC236}">
+              <a16:creationId xmlns:a16="http://schemas.microsoft.com/office/drawing/2014/main" id="{6C28FC58-DACC-C6E7-96A6-1DE1A1CD2189}"/>
+            </a:ext>
+          </a:extLst>
+        </p:cNvPr>
+        <p:cNvGrpSpPr/>
+        <p:nvPr/>
+      </p:nvGrpSpPr>
+      <p:grpSpPr>
+        <a:xfrm>
+          <a:off x="0" y="0"/>
+          <a:ext cx="0" cy="0"/>
+          <a:chOff x="0" y="0"/>
+          <a:chExt cx="0" cy="0"/>
+        </a:xfrm>
+      </p:grpSpPr>
+      <p:sp>
+        <p:nvSpPr>
+          <p:cNvPr id="2" name="標題 1">
+            <a:extLst>
+              <a:ext uri="{FF2B5EF4-FFF2-40B4-BE49-F238E27FC236}">
+                <a16:creationId xmlns:a16="http://schemas.microsoft.com/office/drawing/2014/main" id="{1EA57ED0-B105-DA7D-B072-4250013E170E}"/>
+              </a:ext>
+            </a:extLst>
+          </p:cNvPr>
+          <p:cNvSpPr>
+            <a:spLocks noGrp="1"/>
+          </p:cNvSpPr>
+          <p:nvPr>
+            <p:ph type="title"/>
+          </p:nvPr>
+        </p:nvSpPr>
+        <p:spPr/>
+        <p:txBody>
+          <a:bodyPr/>
+          <a:lstStyle/>
+          <a:p>
+            <a:r>
+              <a:rPr lang="en-US" altLang="zh-TW" dirty="0"/>
+              <a:t>Functional Coverage</a:t>
+            </a:r>
+            <a:r>
+              <a:rPr lang="zh-TW" altLang="en-US" dirty="0"/>
+              <a:t> 介紹</a:t>
+            </a:r>
+            <a:r>
+              <a:rPr lang="en-US" altLang="zh-TW" dirty="0"/>
+              <a:t>(1/1)</a:t>
+            </a:r>
+            <a:endParaRPr lang="zh-TW" altLang="en-US" dirty="0"/>
+          </a:p>
+        </p:txBody>
+      </p:sp>
+      <p:sp>
+        <p:nvSpPr>
+          <p:cNvPr id="4" name="內容版面配置區 3">
+            <a:extLst>
+              <a:ext uri="{FF2B5EF4-FFF2-40B4-BE49-F238E27FC236}">
+                <a16:creationId xmlns:a16="http://schemas.microsoft.com/office/drawing/2014/main" id="{4A18F5D0-A25A-AE1F-4B95-A7B02CD63505}"/>
+              </a:ext>
+            </a:extLst>
+          </p:cNvPr>
+          <p:cNvSpPr>
+            <a:spLocks noGrp="1"/>
+          </p:cNvSpPr>
+          <p:nvPr>
+            <p:ph idx="1"/>
+          </p:nvPr>
+        </p:nvSpPr>
+        <p:spPr/>
+        <p:txBody>
+          <a:bodyPr/>
+          <a:lstStyle/>
+          <a:p>
+            <a:pPr marL="514350" indent="-514350">
+              <a:buFont typeface="+mj-lt"/>
+              <a:buAutoNum type="arabicPeriod"/>
+            </a:pPr>
+            <a:r>
+              <a:rPr lang="zh-TW" altLang="en-US" dirty="0"/>
+              <a:t>驗證是否所有功能條件都有被測試到</a:t>
+            </a:r>
+            <a:endParaRPr lang="en-US" altLang="zh-TW" dirty="0"/>
+          </a:p>
+          <a:p>
+            <a:pPr marL="514350" indent="-514350">
+              <a:buFont typeface="+mj-lt"/>
+              <a:buAutoNum type="arabicPeriod"/>
+            </a:pPr>
+            <a:r>
+              <a:rPr lang="zh-TW" altLang="en-US" dirty="0"/>
+              <a:t>輔助判斷 </a:t>
+            </a:r>
+            <a:r>
+              <a:rPr lang="en-US" altLang="zh-TW" dirty="0"/>
+              <a:t>testbench </a:t>
+            </a:r>
+            <a:r>
+              <a:rPr lang="zh-TW" altLang="en-US" dirty="0"/>
+              <a:t>的完整性與測試範圍</a:t>
+            </a:r>
+            <a:endParaRPr lang="en-US" altLang="zh-TW" dirty="0"/>
+          </a:p>
+          <a:p>
+            <a:pPr marL="514350" indent="-514350">
+              <a:buFont typeface="+mj-lt"/>
+              <a:buAutoNum type="arabicPeriod"/>
+            </a:pPr>
+            <a:r>
+              <a:rPr lang="zh-TW" altLang="en-US" dirty="0"/>
+              <a:t>找出測試盲區</a:t>
+            </a:r>
+            <a:endParaRPr lang="en-US" altLang="zh-TW" dirty="0"/>
+          </a:p>
+          <a:p>
+            <a:pPr marL="0" indent="0">
+              <a:buNone/>
+            </a:pPr>
+            <a:endParaRPr lang="zh-TW" altLang="en-US" dirty="0">
+              <a:solidFill>
+                <a:srgbClr val="FF0000"/>
+              </a:solidFill>
+            </a:endParaRPr>
+          </a:p>
+        </p:txBody>
+      </p:sp>
+    </p:spTree>
+    <p:extLst>
+      <p:ext uri="{BB962C8B-B14F-4D97-AF65-F5344CB8AC3E}">
+        <p14:creationId xmlns:p14="http://schemas.microsoft.com/office/powerpoint/2010/main" val="2220657473"/>
+      </p:ext>
+    </p:extLst>
+  </p:cSld>
+  <p:clrMapOvr>
+    <a:masterClrMapping/>
+  </p:clrMapOvr>
+</p:sld>
+</file>
+
+<file path=ppt/slides/slide66.xml><?xml version="1.0" encoding="utf-8"?>
+<p:sld xmlns:a="http://schemas.openxmlformats.org/drawingml/2006/main" xmlns:r="http://schemas.openxmlformats.org/officeDocument/2006/relationships" xmlns:p="http://schemas.openxmlformats.org/presentationml/2006/main">
+  <p:cSld>
+    <p:spTree>
+      <p:nvGrpSpPr>
+        <p:cNvPr id="1" name="">
+          <a:extLst>
+            <a:ext uri="{FF2B5EF4-FFF2-40B4-BE49-F238E27FC236}">
+              <a16:creationId xmlns:a16="http://schemas.microsoft.com/office/drawing/2014/main" id="{8E8DD003-F2F8-2140-1405-FD57F5F4D237}"/>
+            </a:ext>
+          </a:extLst>
+        </p:cNvPr>
+        <p:cNvGrpSpPr/>
+        <p:nvPr/>
+      </p:nvGrpSpPr>
+      <p:grpSpPr>
+        <a:xfrm>
+          <a:off x="0" y="0"/>
+          <a:ext cx="0" cy="0"/>
+          <a:chOff x="0" y="0"/>
+          <a:chExt cx="0" cy="0"/>
+        </a:xfrm>
+      </p:grpSpPr>
+      <p:sp>
+        <p:nvSpPr>
+          <p:cNvPr id="2" name="標題 1">
+            <a:extLst>
+              <a:ext uri="{FF2B5EF4-FFF2-40B4-BE49-F238E27FC236}">
+                <a16:creationId xmlns:a16="http://schemas.microsoft.com/office/drawing/2014/main" id="{1FA0F706-A29D-5D13-7FFE-F6BF2712E2F4}"/>
+              </a:ext>
+            </a:extLst>
+          </p:cNvPr>
+          <p:cNvSpPr>
+            <a:spLocks noGrp="1"/>
+          </p:cNvSpPr>
+          <p:nvPr>
+            <p:ph type="title"/>
+          </p:nvPr>
+        </p:nvSpPr>
+        <p:spPr/>
+        <p:txBody>
+          <a:bodyPr/>
+          <a:lstStyle/>
+          <a:p>
+            <a:r>
+              <a:rPr lang="en-US" altLang="zh-TW" dirty="0"/>
+              <a:t>Functional Coverage</a:t>
+            </a:r>
+            <a:r>
+              <a:rPr lang="zh-TW" altLang="en-US" dirty="0"/>
+              <a:t> 基本結構 </a:t>
+            </a:r>
+            <a:r>
+              <a:rPr lang="en-US" altLang="zh-TW" dirty="0"/>
+              <a:t>(1/1)</a:t>
+            </a:r>
+            <a:endParaRPr lang="zh-TW" altLang="en-US" dirty="0"/>
+          </a:p>
+        </p:txBody>
+      </p:sp>
+      <p:graphicFrame>
+        <p:nvGraphicFramePr>
+          <p:cNvPr id="12" name="內容版面配置區 11">
+            <a:extLst>
+              <a:ext uri="{FF2B5EF4-FFF2-40B4-BE49-F238E27FC236}">
+                <a16:creationId xmlns:a16="http://schemas.microsoft.com/office/drawing/2014/main" id="{E516790B-2546-AF4D-3E6B-569FFB33E8A3}"/>
+              </a:ext>
+            </a:extLst>
+          </p:cNvPr>
+          <p:cNvGraphicFramePr>
+            <a:graphicFrameLocks noGrp="1"/>
+          </p:cNvGraphicFramePr>
+          <p:nvPr>
+            <p:ph idx="1"/>
+            <p:extLst>
+              <p:ext uri="{D42A27DB-BD31-4B8C-83A1-F6EECF244321}">
+                <p14:modId xmlns:p14="http://schemas.microsoft.com/office/powerpoint/2010/main" val="1955124511"/>
+              </p:ext>
+            </p:extLst>
+          </p:nvPr>
+        </p:nvGraphicFramePr>
+        <p:xfrm>
+          <a:off x="838200" y="2766854"/>
+          <a:ext cx="10515600" cy="2468880"/>
+        </p:xfrm>
+        <a:graphic>
+          <a:graphicData uri="http://schemas.openxmlformats.org/drawingml/2006/table">
+            <a:tbl>
+              <a:tblPr>
+                <a:tableStyleId>{3C2FFA5D-87B4-456A-9821-1D502468CF0F}</a:tableStyleId>
+              </a:tblPr>
+              <a:tblGrid>
+                <a:gridCol w="5257800">
+                  <a:extLst>
+                    <a:ext uri="{9D8B030D-6E8A-4147-A177-3AD203B41FA5}">
+                      <a16:colId xmlns:a16="http://schemas.microsoft.com/office/drawing/2014/main" val="853527410"/>
+                    </a:ext>
+                  </a:extLst>
+                </a:gridCol>
+                <a:gridCol w="5257800">
+                  <a:extLst>
+                    <a:ext uri="{9D8B030D-6E8A-4147-A177-3AD203B41FA5}">
+                      <a16:colId xmlns:a16="http://schemas.microsoft.com/office/drawing/2014/main" val="199525580"/>
+                    </a:ext>
+                  </a:extLst>
+                </a:gridCol>
+              </a:tblGrid>
+              <a:tr h="0">
+                <a:tc>
+                  <a:txBody>
+                    <a:bodyPr/>
+                    <a:lstStyle/>
+                    <a:p>
+                      <a:pPr algn="ctr"/>
+                      <a:r>
+                        <a:rPr lang="zh-TW" altLang="en-US" dirty="0"/>
+                        <a:t>元素</a:t>
+                      </a:r>
+                    </a:p>
+                  </a:txBody>
+                  <a:tcPr anchor="ctr">
+                    <a:solidFill>
+                      <a:schemeClr val="bg2">
+                        <a:lumMod val="90000"/>
+                      </a:schemeClr>
+                    </a:solidFill>
+                  </a:tcPr>
+                </a:tc>
+                <a:tc>
+                  <a:txBody>
+                    <a:bodyPr/>
+                    <a:lstStyle/>
+                    <a:p>
+                      <a:pPr algn="ctr"/>
+                      <a:r>
+                        <a:rPr lang="zh-TW" altLang="en-US" dirty="0"/>
+                        <a:t>說明</a:t>
+                      </a:r>
+                    </a:p>
+                  </a:txBody>
+                  <a:tcPr anchor="ctr">
+                    <a:solidFill>
+                      <a:schemeClr val="bg2">
+                        <a:lumMod val="90000"/>
+                      </a:schemeClr>
+                    </a:solidFill>
+                  </a:tcPr>
+                </a:tc>
+                <a:extLst>
+                  <a:ext uri="{0D108BD9-81ED-4DB2-BD59-A6C34878D82A}">
+                    <a16:rowId xmlns:a16="http://schemas.microsoft.com/office/drawing/2014/main" val="462440274"/>
+                  </a:ext>
+                </a:extLst>
+              </a:tr>
+              <a:tr h="0">
+                <a:tc>
+                  <a:txBody>
+                    <a:bodyPr/>
+                    <a:lstStyle/>
+                    <a:p>
+                      <a:pPr algn="ctr"/>
+                      <a:r>
+                        <a:rPr lang="en-US" dirty="0" err="1"/>
+                        <a:t>covergroup</a:t>
+                      </a:r>
+                      <a:endParaRPr lang="en-US" dirty="0"/>
+                    </a:p>
+                  </a:txBody>
+                  <a:tcPr anchor="ctr"/>
+                </a:tc>
+                <a:tc>
+                  <a:txBody>
+                    <a:bodyPr/>
+                    <a:lstStyle/>
+                    <a:p>
+                      <a:pPr algn="ctr"/>
+                      <a:r>
+                        <a:rPr lang="zh-TW" altLang="en-US" dirty="0"/>
+                        <a:t>宣告一組要收集的覆蓋資訊</a:t>
+                      </a:r>
+                    </a:p>
+                  </a:txBody>
+                  <a:tcPr anchor="ctr"/>
+                </a:tc>
+                <a:extLst>
+                  <a:ext uri="{0D108BD9-81ED-4DB2-BD59-A6C34878D82A}">
+                    <a16:rowId xmlns:a16="http://schemas.microsoft.com/office/drawing/2014/main" val="71911579"/>
+                  </a:ext>
+                </a:extLst>
+              </a:tr>
+              <a:tr h="0">
+                <a:tc>
+                  <a:txBody>
+                    <a:bodyPr/>
+                    <a:lstStyle/>
+                    <a:p>
+                      <a:pPr algn="ctr"/>
+                      <a:r>
+                        <a:rPr lang="en-US" dirty="0" err="1"/>
+                        <a:t>coverpoint</a:t>
+                      </a:r>
+                      <a:endParaRPr lang="en-US" dirty="0"/>
+                    </a:p>
+                  </a:txBody>
+                  <a:tcPr anchor="ctr"/>
+                </a:tc>
+                <a:tc>
+                  <a:txBody>
+                    <a:bodyPr/>
+                    <a:lstStyle/>
+                    <a:p>
+                      <a:pPr algn="ctr"/>
+                      <a:r>
+                        <a:rPr lang="zh-TW" altLang="en-US" dirty="0"/>
+                        <a:t>定義觀察的訊號或變數</a:t>
+                      </a:r>
+                    </a:p>
+                  </a:txBody>
+                  <a:tcPr anchor="ctr"/>
+                </a:tc>
+                <a:extLst>
+                  <a:ext uri="{0D108BD9-81ED-4DB2-BD59-A6C34878D82A}">
+                    <a16:rowId xmlns:a16="http://schemas.microsoft.com/office/drawing/2014/main" val="1324941000"/>
+                  </a:ext>
+                </a:extLst>
+              </a:tr>
+              <a:tr h="0">
+                <a:tc>
+                  <a:txBody>
+                    <a:bodyPr/>
+                    <a:lstStyle/>
+                    <a:p>
+                      <a:pPr algn="ctr"/>
+                      <a:r>
+                        <a:rPr lang="en-US" dirty="0"/>
+                        <a:t>bins</a:t>
+                      </a:r>
+                    </a:p>
+                  </a:txBody>
+                  <a:tcPr anchor="ctr"/>
+                </a:tc>
+                <a:tc>
+                  <a:txBody>
+                    <a:bodyPr/>
+                    <a:lstStyle/>
+                    <a:p>
+                      <a:pPr algn="ctr"/>
+                      <a:r>
+                        <a:rPr lang="zh-TW" altLang="en-US"/>
+                        <a:t>覆蓋的值範圍或特定值，未命中 </a:t>
+                      </a:r>
+                      <a:r>
+                        <a:rPr lang="en-US" altLang="zh-TW"/>
+                        <a:t>bin </a:t>
+                      </a:r>
+                      <a:r>
+                        <a:rPr lang="zh-TW" altLang="en-US"/>
+                        <a:t>就不算覆蓋</a:t>
+                      </a:r>
+                    </a:p>
+                  </a:txBody>
+                  <a:tcPr anchor="ctr"/>
+                </a:tc>
+                <a:extLst>
+                  <a:ext uri="{0D108BD9-81ED-4DB2-BD59-A6C34878D82A}">
+                    <a16:rowId xmlns:a16="http://schemas.microsoft.com/office/drawing/2014/main" val="1314665441"/>
+                  </a:ext>
+                </a:extLst>
+              </a:tr>
+              <a:tr h="0">
+                <a:tc>
+                  <a:txBody>
+                    <a:bodyPr/>
+                    <a:lstStyle/>
+                    <a:p>
+                      <a:pPr algn="ctr"/>
+                      <a:r>
+                        <a:rPr lang="en-US"/>
+                        <a:t>cross</a:t>
+                      </a:r>
+                    </a:p>
+                  </a:txBody>
+                  <a:tcPr anchor="ctr"/>
+                </a:tc>
+                <a:tc>
+                  <a:txBody>
+                    <a:bodyPr/>
+                    <a:lstStyle/>
+                    <a:p>
+                      <a:pPr algn="ctr"/>
+                      <a:r>
+                        <a:rPr lang="zh-TW" altLang="en-US"/>
+                        <a:t>不同 </a:t>
+                      </a:r>
+                      <a:r>
+                        <a:rPr lang="en-US"/>
+                        <a:t>coverpoint </a:t>
+                      </a:r>
+                      <a:r>
+                        <a:rPr lang="zh-TW" altLang="en-US"/>
+                        <a:t>的組合交叉覆蓋</a:t>
+                      </a:r>
+                    </a:p>
+                  </a:txBody>
+                  <a:tcPr anchor="ctr"/>
+                </a:tc>
+                <a:extLst>
+                  <a:ext uri="{0D108BD9-81ED-4DB2-BD59-A6C34878D82A}">
+                    <a16:rowId xmlns:a16="http://schemas.microsoft.com/office/drawing/2014/main" val="4041701248"/>
+                  </a:ext>
+                </a:extLst>
+              </a:tr>
+              <a:tr h="0">
+                <a:tc>
+                  <a:txBody>
+                    <a:bodyPr/>
+                    <a:lstStyle/>
+                    <a:p>
+                      <a:pPr algn="ctr"/>
+                      <a:r>
+                        <a:rPr lang="en-US"/>
+                        <a:t>option</a:t>
+                      </a:r>
+                    </a:p>
+                  </a:txBody>
+                  <a:tcPr anchor="ctr"/>
+                </a:tc>
+                <a:tc>
+                  <a:txBody>
+                    <a:bodyPr/>
+                    <a:lstStyle/>
+                    <a:p>
+                      <a:pPr algn="ctr"/>
+                      <a:r>
+                        <a:rPr lang="zh-TW" altLang="en-US" dirty="0"/>
+                        <a:t>可以設定 </a:t>
+                      </a:r>
+                      <a:r>
+                        <a:rPr lang="en-US" dirty="0"/>
+                        <a:t>coverage </a:t>
+                      </a:r>
+                      <a:r>
+                        <a:rPr lang="zh-TW" altLang="en-US" dirty="0"/>
+                        <a:t>目標，</a:t>
+                      </a:r>
+                      <a:endParaRPr lang="en-US" altLang="zh-TW" dirty="0"/>
+                    </a:p>
+                    <a:p>
+                      <a:pPr algn="ctr"/>
+                      <a:r>
+                        <a:rPr lang="zh-TW" altLang="en-US" dirty="0"/>
+                        <a:t>例如 </a:t>
+                      </a:r>
+                      <a:r>
+                        <a:rPr lang="en-US" dirty="0"/>
+                        <a:t>goal, weight, comment</a:t>
+                      </a:r>
+                    </a:p>
+                  </a:txBody>
+                  <a:tcPr anchor="ctr"/>
+                </a:tc>
+                <a:extLst>
+                  <a:ext uri="{0D108BD9-81ED-4DB2-BD59-A6C34878D82A}">
+                    <a16:rowId xmlns:a16="http://schemas.microsoft.com/office/drawing/2014/main" val="3559824325"/>
+                  </a:ext>
+                </a:extLst>
+              </a:tr>
+            </a:tbl>
+          </a:graphicData>
+        </a:graphic>
+      </p:graphicFrame>
+    </p:spTree>
+    <p:extLst>
+      <p:ext uri="{BB962C8B-B14F-4D97-AF65-F5344CB8AC3E}">
+        <p14:creationId xmlns:p14="http://schemas.microsoft.com/office/powerpoint/2010/main" val="4148959643"/>
+      </p:ext>
+    </p:extLst>
+  </p:cSld>
+  <p:clrMapOvr>
+    <a:masterClrMapping/>
+  </p:clrMapOvr>
+</p:sld>
+</file>
+
 <file path=ppt/slides/slide7.xml><?xml version="1.0" encoding="utf-8"?>
 <p:sld xmlns:a="http://schemas.openxmlformats.org/drawingml/2006/main" xmlns:r="http://schemas.openxmlformats.org/officeDocument/2006/relationships" xmlns:p="http://schemas.openxmlformats.org/presentationml/2006/main">
   <p:cSld>

</xml_diff>

<commit_message>
Modify: SystemVerilog_語法學習.pptx 1. Add: chapter 8 assertion
</commit_message>
<xml_diff>
--- a/systemverilog/SystemVerilog_語法學習.pptx
+++ b/systemverilog/SystemVerilog_語法學習.pptx
@@ -5,7 +5,7 @@
     <p:sldMasterId id="2147483648" r:id="rId1"/>
   </p:sldMasterIdLst>
   <p:notesMasterIdLst>
-    <p:notesMasterId r:id="rId68"/>
+    <p:notesMasterId r:id="rId73"/>
   </p:notesMasterIdLst>
   <p:sldIdLst>
     <p:sldId id="256" r:id="rId2"/>
@@ -74,6 +74,11 @@
     <p:sldId id="330" r:id="rId65"/>
     <p:sldId id="331" r:id="rId66"/>
     <p:sldId id="332" r:id="rId67"/>
+    <p:sldId id="333" r:id="rId68"/>
+    <p:sldId id="335" r:id="rId69"/>
+    <p:sldId id="336" r:id="rId70"/>
+    <p:sldId id="337" r:id="rId71"/>
+    <p:sldId id="338" r:id="rId72"/>
   </p:sldIdLst>
   <p:sldSz cx="12192000" cy="6858000"/>
   <p:notesSz cx="6858000" cy="9144000"/>
@@ -7466,6 +7471,19 @@
                 <a:hlinkClick r:id="rId8" action="ppaction://hlinksldjump"/>
               </a:rPr>
               <a:t>Functional Coverage</a:t>
+            </a:r>
+            <a:endParaRPr lang="en-US" altLang="zh-TW" dirty="0"/>
+          </a:p>
+          <a:p>
+            <a:pPr marL="514350" indent="-514350">
+              <a:buFont typeface="+mj-lt"/>
+              <a:buAutoNum type="arabicPeriod"/>
+            </a:pPr>
+            <a:r>
+              <a:rPr lang="en-US" altLang="zh-TW" dirty="0">
+                <a:hlinkClick r:id="rId9" action="ppaction://hlinksldjump"/>
+              </a:rPr>
+              <a:t>Assertions</a:t>
             </a:r>
             <a:endParaRPr lang="en-US" altLang="zh-TW" dirty="0"/>
           </a:p>
@@ -21114,6 +21132,1380 @@
 </p:sld>
 </file>
 
+<file path=ppt/slides/slide67.xml><?xml version="1.0" encoding="utf-8"?>
+<p:sld xmlns:a="http://schemas.openxmlformats.org/drawingml/2006/main" xmlns:r="http://schemas.openxmlformats.org/officeDocument/2006/relationships" xmlns:p="http://schemas.openxmlformats.org/presentationml/2006/main">
+  <p:cSld>
+    <p:spTree>
+      <p:nvGrpSpPr>
+        <p:cNvPr id="1" name="">
+          <a:extLst>
+            <a:ext uri="{FF2B5EF4-FFF2-40B4-BE49-F238E27FC236}">
+              <a16:creationId xmlns:a16="http://schemas.microsoft.com/office/drawing/2014/main" id="{BDE739D8-C9B0-60DA-7FC9-35557DD61AA2}"/>
+            </a:ext>
+          </a:extLst>
+        </p:cNvPr>
+        <p:cNvGrpSpPr/>
+        <p:nvPr/>
+      </p:nvGrpSpPr>
+      <p:grpSpPr>
+        <a:xfrm>
+          <a:off x="0" y="0"/>
+          <a:ext cx="0" cy="0"/>
+          <a:chOff x="0" y="0"/>
+          <a:chExt cx="0" cy="0"/>
+        </a:xfrm>
+      </p:grpSpPr>
+      <p:sp>
+        <p:nvSpPr>
+          <p:cNvPr id="2" name="標題 1">
+            <a:extLst>
+              <a:ext uri="{FF2B5EF4-FFF2-40B4-BE49-F238E27FC236}">
+                <a16:creationId xmlns:a16="http://schemas.microsoft.com/office/drawing/2014/main" id="{CF63C73A-57A5-50D1-0CD3-D25B0BFFF486}"/>
+              </a:ext>
+            </a:extLst>
+          </p:cNvPr>
+          <p:cNvSpPr>
+            <a:spLocks noGrp="1"/>
+          </p:cNvSpPr>
+          <p:nvPr>
+            <p:ph type="ctrTitle"/>
+          </p:nvPr>
+        </p:nvSpPr>
+        <p:spPr/>
+        <p:txBody>
+          <a:bodyPr/>
+          <a:lstStyle/>
+          <a:p>
+            <a:r>
+              <a:rPr lang="en-US" altLang="zh-TW" dirty="0"/>
+              <a:t>Chapter 8</a:t>
+            </a:r>
+            <a:endParaRPr lang="zh-TW" altLang="en-US" dirty="0"/>
+          </a:p>
+        </p:txBody>
+      </p:sp>
+      <p:sp>
+        <p:nvSpPr>
+          <p:cNvPr id="3" name="副標題 2">
+            <a:extLst>
+              <a:ext uri="{FF2B5EF4-FFF2-40B4-BE49-F238E27FC236}">
+                <a16:creationId xmlns:a16="http://schemas.microsoft.com/office/drawing/2014/main" id="{19A62D81-7C8D-E332-288E-DC7DFF9D0B98}"/>
+              </a:ext>
+            </a:extLst>
+          </p:cNvPr>
+          <p:cNvSpPr>
+            <a:spLocks noGrp="1"/>
+          </p:cNvSpPr>
+          <p:nvPr>
+            <p:ph type="subTitle" idx="1"/>
+          </p:nvPr>
+        </p:nvSpPr>
+        <p:spPr/>
+        <p:txBody>
+          <a:bodyPr>
+            <a:normAutofit/>
+          </a:bodyPr>
+          <a:lstStyle/>
+          <a:p>
+            <a:r>
+              <a:rPr lang="en-US" altLang="zh-TW" sz="4000" dirty="0"/>
+              <a:t>Assertions</a:t>
+            </a:r>
+          </a:p>
+        </p:txBody>
+      </p:sp>
+    </p:spTree>
+    <p:extLst>
+      <p:ext uri="{BB962C8B-B14F-4D97-AF65-F5344CB8AC3E}">
+        <p14:creationId xmlns:p14="http://schemas.microsoft.com/office/powerpoint/2010/main" val="3220124289"/>
+      </p:ext>
+    </p:extLst>
+  </p:cSld>
+  <p:clrMapOvr>
+    <a:masterClrMapping/>
+  </p:clrMapOvr>
+</p:sld>
+</file>
+
+<file path=ppt/slides/slide68.xml><?xml version="1.0" encoding="utf-8"?>
+<p:sld xmlns:a="http://schemas.openxmlformats.org/drawingml/2006/main" xmlns:r="http://schemas.openxmlformats.org/officeDocument/2006/relationships" xmlns:p="http://schemas.openxmlformats.org/presentationml/2006/main">
+  <p:cSld>
+    <p:spTree>
+      <p:nvGrpSpPr>
+        <p:cNvPr id="1" name="">
+          <a:extLst>
+            <a:ext uri="{FF2B5EF4-FFF2-40B4-BE49-F238E27FC236}">
+              <a16:creationId xmlns:a16="http://schemas.microsoft.com/office/drawing/2014/main" id="{EA00D658-268C-4899-F89B-F0B0684AFBD1}"/>
+            </a:ext>
+          </a:extLst>
+        </p:cNvPr>
+        <p:cNvGrpSpPr/>
+        <p:nvPr/>
+      </p:nvGrpSpPr>
+      <p:grpSpPr>
+        <a:xfrm>
+          <a:off x="0" y="0"/>
+          <a:ext cx="0" cy="0"/>
+          <a:chOff x="0" y="0"/>
+          <a:chExt cx="0" cy="0"/>
+        </a:xfrm>
+      </p:grpSpPr>
+      <p:sp>
+        <p:nvSpPr>
+          <p:cNvPr id="2" name="標題 1">
+            <a:extLst>
+              <a:ext uri="{FF2B5EF4-FFF2-40B4-BE49-F238E27FC236}">
+                <a16:creationId xmlns:a16="http://schemas.microsoft.com/office/drawing/2014/main" id="{44B978DF-BA7F-BB44-86B3-4E86709011F7}"/>
+              </a:ext>
+            </a:extLst>
+          </p:cNvPr>
+          <p:cNvSpPr>
+            <a:spLocks noGrp="1"/>
+          </p:cNvSpPr>
+          <p:nvPr>
+            <p:ph type="title"/>
+          </p:nvPr>
+        </p:nvSpPr>
+        <p:spPr/>
+        <p:txBody>
+          <a:bodyPr/>
+          <a:lstStyle/>
+          <a:p>
+            <a:r>
+              <a:rPr lang="en-US" altLang="zh-TW" dirty="0"/>
+              <a:t>Assertions (1/4)</a:t>
+            </a:r>
+            <a:endParaRPr lang="zh-TW" altLang="en-US" dirty="0"/>
+          </a:p>
+        </p:txBody>
+      </p:sp>
+      <p:sp>
+        <p:nvSpPr>
+          <p:cNvPr id="4" name="內容版面配置區 3">
+            <a:extLst>
+              <a:ext uri="{FF2B5EF4-FFF2-40B4-BE49-F238E27FC236}">
+                <a16:creationId xmlns:a16="http://schemas.microsoft.com/office/drawing/2014/main" id="{2D2A2188-45B4-F002-7B7F-A8FDC8393FB4}"/>
+              </a:ext>
+            </a:extLst>
+          </p:cNvPr>
+          <p:cNvSpPr>
+            <a:spLocks noGrp="1"/>
+          </p:cNvSpPr>
+          <p:nvPr>
+            <p:ph idx="1"/>
+          </p:nvPr>
+        </p:nvSpPr>
+        <p:spPr/>
+        <p:txBody>
+          <a:bodyPr/>
+          <a:lstStyle/>
+          <a:p>
+            <a:r>
+              <a:rPr lang="en-US" altLang="zh-TW" dirty="0"/>
+              <a:t>assert </a:t>
+            </a:r>
+            <a:r>
+              <a:rPr lang="zh-TW" altLang="en-US" dirty="0"/>
+              <a:t>分成</a:t>
+            </a:r>
+            <a:endParaRPr lang="en-US" altLang="zh-TW" dirty="0">
+              <a:solidFill>
+                <a:srgbClr val="FF0000"/>
+              </a:solidFill>
+            </a:endParaRPr>
+          </a:p>
+          <a:p>
+            <a:pPr marL="971550" lvl="1" indent="-514350">
+              <a:buFont typeface="+mj-lt"/>
+              <a:buAutoNum type="arabicPeriod"/>
+            </a:pPr>
+            <a:r>
+              <a:rPr lang="en-US" altLang="zh-TW" dirty="0"/>
+              <a:t>Sequence</a:t>
+            </a:r>
+          </a:p>
+          <a:p>
+            <a:pPr marL="971550" lvl="1" indent="-514350">
+              <a:buFont typeface="+mj-lt"/>
+              <a:buAutoNum type="arabicPeriod"/>
+            </a:pPr>
+            <a:r>
+              <a:rPr lang="en-US" altLang="zh-TW" dirty="0"/>
+              <a:t>Property</a:t>
+            </a:r>
+          </a:p>
+          <a:p>
+            <a:pPr marL="971550" lvl="1" indent="-514350">
+              <a:buFont typeface="+mj-lt"/>
+              <a:buAutoNum type="arabicPeriod"/>
+            </a:pPr>
+            <a:r>
+              <a:rPr lang="en-US" altLang="zh-TW" dirty="0"/>
+              <a:t>Immediate Assertions</a:t>
+            </a:r>
+          </a:p>
+          <a:p>
+            <a:pPr marL="971550" lvl="1" indent="-514350">
+              <a:buFont typeface="+mj-lt"/>
+              <a:buAutoNum type="arabicPeriod"/>
+            </a:pPr>
+            <a:r>
+              <a:rPr lang="en-US" altLang="zh-TW" dirty="0"/>
+              <a:t>Concurrent Assertions</a:t>
+            </a:r>
+          </a:p>
+          <a:p>
+            <a:pPr marL="971550" lvl="1" indent="-514350">
+              <a:buFont typeface="+mj-lt"/>
+              <a:buAutoNum type="arabicPeriod"/>
+            </a:pPr>
+            <a:endParaRPr lang="zh-TW" altLang="en-US" dirty="0"/>
+          </a:p>
+        </p:txBody>
+      </p:sp>
+    </p:spTree>
+    <p:extLst>
+      <p:ext uri="{BB962C8B-B14F-4D97-AF65-F5344CB8AC3E}">
+        <p14:creationId xmlns:p14="http://schemas.microsoft.com/office/powerpoint/2010/main" val="777201102"/>
+      </p:ext>
+    </p:extLst>
+  </p:cSld>
+  <p:clrMapOvr>
+    <a:masterClrMapping/>
+  </p:clrMapOvr>
+</p:sld>
+</file>
+
+<file path=ppt/slides/slide69.xml><?xml version="1.0" encoding="utf-8"?>
+<p:sld xmlns:a="http://schemas.openxmlformats.org/drawingml/2006/main" xmlns:r="http://schemas.openxmlformats.org/officeDocument/2006/relationships" xmlns:p="http://schemas.openxmlformats.org/presentationml/2006/main">
+  <p:cSld>
+    <p:spTree>
+      <p:nvGrpSpPr>
+        <p:cNvPr id="1" name="">
+          <a:extLst>
+            <a:ext uri="{FF2B5EF4-FFF2-40B4-BE49-F238E27FC236}">
+              <a16:creationId xmlns:a16="http://schemas.microsoft.com/office/drawing/2014/main" id="{B7C4D5E6-26D7-61E6-3B8E-9ED61DB7B815}"/>
+            </a:ext>
+          </a:extLst>
+        </p:cNvPr>
+        <p:cNvGrpSpPr/>
+        <p:nvPr/>
+      </p:nvGrpSpPr>
+      <p:grpSpPr>
+        <a:xfrm>
+          <a:off x="0" y="0"/>
+          <a:ext cx="0" cy="0"/>
+          <a:chOff x="0" y="0"/>
+          <a:chExt cx="0" cy="0"/>
+        </a:xfrm>
+      </p:grpSpPr>
+      <p:sp>
+        <p:nvSpPr>
+          <p:cNvPr id="2" name="標題 1">
+            <a:extLst>
+              <a:ext uri="{FF2B5EF4-FFF2-40B4-BE49-F238E27FC236}">
+                <a16:creationId xmlns:a16="http://schemas.microsoft.com/office/drawing/2014/main" id="{530B91AF-F96B-D767-4CFF-403829283A5B}"/>
+              </a:ext>
+            </a:extLst>
+          </p:cNvPr>
+          <p:cNvSpPr>
+            <a:spLocks noGrp="1"/>
+          </p:cNvSpPr>
+          <p:nvPr>
+            <p:ph type="title"/>
+          </p:nvPr>
+        </p:nvSpPr>
+        <p:spPr/>
+        <p:txBody>
+          <a:bodyPr/>
+          <a:lstStyle/>
+          <a:p>
+            <a:r>
+              <a:rPr lang="en-US" altLang="zh-TW" dirty="0"/>
+              <a:t>Assertions (2/4)</a:t>
+            </a:r>
+            <a:endParaRPr lang="zh-TW" altLang="en-US" dirty="0"/>
+          </a:p>
+        </p:txBody>
+      </p:sp>
+      <p:sp>
+        <p:nvSpPr>
+          <p:cNvPr id="4" name="內容版面配置區 3">
+            <a:extLst>
+              <a:ext uri="{FF2B5EF4-FFF2-40B4-BE49-F238E27FC236}">
+                <a16:creationId xmlns:a16="http://schemas.microsoft.com/office/drawing/2014/main" id="{4818E56B-3788-D8B1-5E33-E23474F0FB4B}"/>
+              </a:ext>
+            </a:extLst>
+          </p:cNvPr>
+          <p:cNvSpPr>
+            <a:spLocks noGrp="1"/>
+          </p:cNvSpPr>
+          <p:nvPr>
+            <p:ph idx="1"/>
+          </p:nvPr>
+        </p:nvSpPr>
+        <p:spPr/>
+        <p:txBody>
+          <a:bodyPr/>
+          <a:lstStyle/>
+          <a:p>
+            <a:pPr marL="514350" indent="-514350">
+              <a:buFont typeface="+mj-lt"/>
+              <a:buAutoNum type="arabicPeriod"/>
+            </a:pPr>
+            <a:r>
+              <a:rPr lang="en-US" altLang="zh-TW" dirty="0"/>
+              <a:t>Sequence &amp; Property Assertions</a:t>
+            </a:r>
+          </a:p>
+        </p:txBody>
+      </p:sp>
+      <p:sp>
+        <p:nvSpPr>
+          <p:cNvPr id="3" name="文字方塊 2">
+            <a:extLst>
+              <a:ext uri="{FF2B5EF4-FFF2-40B4-BE49-F238E27FC236}">
+                <a16:creationId xmlns:a16="http://schemas.microsoft.com/office/drawing/2014/main" id="{35137C73-8802-84D8-81B4-2BEA99F82AFD}"/>
+              </a:ext>
+            </a:extLst>
+          </p:cNvPr>
+          <p:cNvSpPr txBox="1"/>
+          <p:nvPr/>
+        </p:nvSpPr>
+        <p:spPr>
+          <a:xfrm>
+            <a:off x="389022" y="2380054"/>
+            <a:ext cx="5482389" cy="4324261"/>
+          </a:xfrm>
+          <a:prstGeom prst="rect">
+            <a:avLst/>
+          </a:prstGeom>
+          <a:noFill/>
+          <a:ln>
+            <a:solidFill>
+              <a:schemeClr val="tx1"/>
+            </a:solidFill>
+          </a:ln>
+        </p:spPr>
+        <p:txBody>
+          <a:bodyPr wrap="square" rtlCol="0">
+            <a:spAutoFit/>
+          </a:bodyPr>
+          <a:lstStyle/>
+          <a:p>
+            <a:r>
+              <a:rPr lang="en-US" altLang="zh-TW" sz="1100" dirty="0"/>
+              <a:t>module tb;</a:t>
+            </a:r>
+          </a:p>
+          <a:p>
+            <a:r>
+              <a:rPr lang="en-US" altLang="zh-TW" sz="1100" dirty="0"/>
+              <a:t>  bit a, b, c, d;</a:t>
+            </a:r>
+          </a:p>
+          <a:p>
+            <a:r>
+              <a:rPr lang="en-US" altLang="zh-TW" sz="1100" dirty="0"/>
+              <a:t>  bit </a:t>
+            </a:r>
+            <a:r>
+              <a:rPr lang="en-US" altLang="zh-TW" sz="1100" dirty="0" err="1"/>
+              <a:t>clk</a:t>
+            </a:r>
+            <a:r>
+              <a:rPr lang="en-US" altLang="zh-TW" sz="1100" dirty="0"/>
+              <a:t>;</a:t>
+            </a:r>
+          </a:p>
+          <a:p>
+            <a:br>
+              <a:rPr lang="en-US" altLang="zh-TW" sz="1100" dirty="0"/>
+            </a:br>
+            <a:r>
+              <a:rPr lang="en-US" altLang="zh-TW" sz="1100" dirty="0"/>
+              <a:t>  always #10 </a:t>
+            </a:r>
+            <a:r>
+              <a:rPr lang="en-US" altLang="zh-TW" sz="1100" dirty="0" err="1"/>
+              <a:t>clk</a:t>
+            </a:r>
+            <a:r>
+              <a:rPr lang="en-US" altLang="zh-TW" sz="1100" dirty="0"/>
+              <a:t> = ~</a:t>
+            </a:r>
+            <a:r>
+              <a:rPr lang="en-US" altLang="zh-TW" sz="1100" dirty="0" err="1"/>
+              <a:t>clk</a:t>
+            </a:r>
+            <a:r>
+              <a:rPr lang="en-US" altLang="zh-TW" sz="1100" dirty="0"/>
+              <a:t>;</a:t>
+            </a:r>
+          </a:p>
+          <a:p>
+            <a:br>
+              <a:rPr lang="en-US" altLang="zh-TW" sz="1100" dirty="0"/>
+            </a:br>
+            <a:r>
+              <a:rPr lang="en-US" altLang="zh-TW" sz="1100" dirty="0"/>
+              <a:t>  initial begin</a:t>
+            </a:r>
+          </a:p>
+          <a:p>
+            <a:r>
+              <a:rPr lang="en-US" altLang="zh-TW" sz="1100" dirty="0"/>
+              <a:t>    for (int </a:t>
+            </a:r>
+            <a:r>
+              <a:rPr lang="en-US" altLang="zh-TW" sz="1100" dirty="0" err="1"/>
+              <a:t>i</a:t>
+            </a:r>
+            <a:r>
+              <a:rPr lang="en-US" altLang="zh-TW" sz="1100" dirty="0"/>
+              <a:t> = 0; </a:t>
+            </a:r>
+            <a:r>
+              <a:rPr lang="en-US" altLang="zh-TW" sz="1100" dirty="0" err="1"/>
+              <a:t>i</a:t>
+            </a:r>
+            <a:r>
+              <a:rPr lang="en-US" altLang="zh-TW" sz="1100" dirty="0"/>
+              <a:t> &lt; 20; </a:t>
+            </a:r>
+            <a:r>
+              <a:rPr lang="en-US" altLang="zh-TW" sz="1100" dirty="0" err="1"/>
+              <a:t>i</a:t>
+            </a:r>
+            <a:r>
+              <a:rPr lang="en-US" altLang="zh-TW" sz="1100" dirty="0"/>
+              <a:t>++) begin</a:t>
+            </a:r>
+          </a:p>
+          <a:p>
+            <a:r>
+              <a:rPr lang="en-US" altLang="zh-TW" sz="1100" dirty="0"/>
+              <a:t>      {a, b, c, d} = $random;</a:t>
+            </a:r>
+          </a:p>
+          <a:p>
+            <a:r>
+              <a:rPr lang="en-US" altLang="zh-TW" sz="1100" dirty="0"/>
+              <a:t>      $display("%0t a=%0d b=%0d c=%0d d=%0d", $time, a, b, c, d);</a:t>
+            </a:r>
+          </a:p>
+          <a:p>
+            <a:r>
+              <a:rPr lang="en-US" altLang="zh-TW" sz="1100" dirty="0"/>
+              <a:t>      @(posedge </a:t>
+            </a:r>
+            <a:r>
+              <a:rPr lang="en-US" altLang="zh-TW" sz="1100" dirty="0" err="1"/>
+              <a:t>clk</a:t>
+            </a:r>
+            <a:r>
+              <a:rPr lang="en-US" altLang="zh-TW" sz="1100" dirty="0"/>
+              <a:t>);</a:t>
+            </a:r>
+          </a:p>
+          <a:p>
+            <a:r>
+              <a:rPr lang="en-US" altLang="zh-TW" sz="1100" dirty="0"/>
+              <a:t>    end</a:t>
+            </a:r>
+          </a:p>
+          <a:p>
+            <a:r>
+              <a:rPr lang="en-US" altLang="zh-TW" sz="1100" dirty="0"/>
+              <a:t>    #10 $finish;</a:t>
+            </a:r>
+          </a:p>
+          <a:p>
+            <a:r>
+              <a:rPr lang="en-US" altLang="zh-TW" sz="1100" dirty="0"/>
+              <a:t>  end</a:t>
+            </a:r>
+          </a:p>
+          <a:p>
+            <a:br>
+              <a:rPr lang="en-US" altLang="zh-TW" sz="1100" dirty="0"/>
+            </a:br>
+            <a:r>
+              <a:rPr lang="en-US" altLang="zh-TW" sz="1100" dirty="0">
+                <a:solidFill>
+                  <a:srgbClr val="FF0000"/>
+                </a:solidFill>
+              </a:rPr>
+              <a:t>  sequence </a:t>
+            </a:r>
+            <a:r>
+              <a:rPr lang="en-US" altLang="zh-TW" sz="1100" dirty="0" err="1">
+                <a:solidFill>
+                  <a:srgbClr val="FF0000"/>
+                </a:solidFill>
+              </a:rPr>
+              <a:t>s_ab</a:t>
+            </a:r>
+            <a:r>
+              <a:rPr lang="en-US" altLang="zh-TW" sz="1100" dirty="0">
+                <a:solidFill>
+                  <a:srgbClr val="FF0000"/>
+                </a:solidFill>
+              </a:rPr>
+              <a:t>;</a:t>
+            </a:r>
+          </a:p>
+          <a:p>
+            <a:r>
+              <a:rPr lang="en-US" altLang="zh-TW" sz="1100" dirty="0">
+                <a:solidFill>
+                  <a:srgbClr val="FF0000"/>
+                </a:solidFill>
+              </a:rPr>
+              <a:t>    a ##1 b;        // </a:t>
+            </a:r>
+            <a:r>
+              <a:rPr lang="zh-TW" altLang="en-US" sz="1100" dirty="0">
+                <a:solidFill>
+                  <a:srgbClr val="FF0000"/>
+                </a:solidFill>
+              </a:rPr>
+              <a:t>當 </a:t>
+            </a:r>
+            <a:r>
+              <a:rPr lang="en-US" altLang="zh-TW" sz="1100" dirty="0">
+                <a:solidFill>
+                  <a:srgbClr val="FF0000"/>
+                </a:solidFill>
+              </a:rPr>
+              <a:t>a </a:t>
+            </a:r>
+            <a:r>
+              <a:rPr lang="zh-TW" altLang="en-US" sz="1100" dirty="0">
+                <a:solidFill>
+                  <a:srgbClr val="FF0000"/>
+                </a:solidFill>
+              </a:rPr>
+              <a:t>為 </a:t>
+            </a:r>
+            <a:r>
+              <a:rPr lang="en-US" altLang="zh-TW" sz="1100" dirty="0">
+                <a:solidFill>
+                  <a:srgbClr val="FF0000"/>
+                </a:solidFill>
+              </a:rPr>
+              <a:t>true </a:t>
+            </a:r>
+            <a:r>
+              <a:rPr lang="zh-TW" altLang="en-US" sz="1100" dirty="0">
+                <a:solidFill>
+                  <a:srgbClr val="FF0000"/>
+                </a:solidFill>
+              </a:rPr>
+              <a:t>時，過 </a:t>
+            </a:r>
+            <a:r>
+              <a:rPr lang="en-US" altLang="zh-TW" sz="1100" dirty="0">
+                <a:solidFill>
+                  <a:srgbClr val="FF0000"/>
+                </a:solidFill>
+              </a:rPr>
+              <a:t>1 </a:t>
+            </a:r>
+            <a:r>
+              <a:rPr lang="zh-TW" altLang="en-US" sz="1100" dirty="0">
+                <a:solidFill>
+                  <a:srgbClr val="FF0000"/>
+                </a:solidFill>
+              </a:rPr>
+              <a:t>個週期後 </a:t>
+            </a:r>
+            <a:r>
+              <a:rPr lang="en-US" altLang="zh-TW" sz="1100" dirty="0">
+                <a:solidFill>
+                  <a:srgbClr val="FF0000"/>
+                </a:solidFill>
+              </a:rPr>
+              <a:t>b </a:t>
+            </a:r>
+            <a:r>
+              <a:rPr lang="zh-TW" altLang="en-US" sz="1100" dirty="0">
+                <a:solidFill>
+                  <a:srgbClr val="FF0000"/>
+                </a:solidFill>
+              </a:rPr>
+              <a:t>也要為 </a:t>
+            </a:r>
+            <a:r>
+              <a:rPr lang="en-US" altLang="zh-TW" sz="1100" dirty="0">
+                <a:solidFill>
+                  <a:srgbClr val="FF0000"/>
+                </a:solidFill>
+              </a:rPr>
+              <a:t>true</a:t>
+            </a:r>
+          </a:p>
+          <a:p>
+            <a:r>
+              <a:rPr lang="en-US" altLang="zh-TW" sz="1100" dirty="0">
+                <a:solidFill>
+                  <a:srgbClr val="FF0000"/>
+                </a:solidFill>
+              </a:rPr>
+              <a:t>  </a:t>
+            </a:r>
+            <a:r>
+              <a:rPr lang="en-US" altLang="zh-TW" sz="1100" dirty="0" err="1">
+                <a:solidFill>
+                  <a:srgbClr val="FF0000"/>
+                </a:solidFill>
+              </a:rPr>
+              <a:t>endsequence</a:t>
+            </a:r>
+            <a:endParaRPr lang="en-US" altLang="zh-TW" sz="1100" dirty="0">
+              <a:solidFill>
+                <a:srgbClr val="FF0000"/>
+              </a:solidFill>
+            </a:endParaRPr>
+          </a:p>
+          <a:p>
+            <a:br>
+              <a:rPr lang="en-US" altLang="zh-TW" sz="1100" dirty="0">
+                <a:solidFill>
+                  <a:srgbClr val="FF0000"/>
+                </a:solidFill>
+              </a:rPr>
+            </a:br>
+            <a:r>
+              <a:rPr lang="en-US" altLang="zh-TW" sz="1100" dirty="0">
+                <a:solidFill>
+                  <a:srgbClr val="FF0000"/>
+                </a:solidFill>
+              </a:rPr>
+              <a:t>  sequence </a:t>
+            </a:r>
+            <a:r>
+              <a:rPr lang="en-US" altLang="zh-TW" sz="1100" dirty="0" err="1">
+                <a:solidFill>
+                  <a:srgbClr val="FF0000"/>
+                </a:solidFill>
+              </a:rPr>
+              <a:t>s_cd</a:t>
+            </a:r>
+            <a:r>
+              <a:rPr lang="en-US" altLang="zh-TW" sz="1100" dirty="0">
+                <a:solidFill>
+                  <a:srgbClr val="FF0000"/>
+                </a:solidFill>
+              </a:rPr>
+              <a:t>;</a:t>
+            </a:r>
+          </a:p>
+          <a:p>
+            <a:r>
+              <a:rPr lang="en-US" altLang="zh-TW" sz="1100" dirty="0">
+                <a:solidFill>
+                  <a:srgbClr val="FF0000"/>
+                </a:solidFill>
+              </a:rPr>
+              <a:t>    c ##2 d;        // </a:t>
+            </a:r>
+            <a:r>
+              <a:rPr lang="zh-TW" altLang="en-US" sz="1100" dirty="0">
+                <a:solidFill>
+                  <a:srgbClr val="FF0000"/>
+                </a:solidFill>
+              </a:rPr>
+              <a:t>當 </a:t>
+            </a:r>
+            <a:r>
+              <a:rPr lang="en-US" altLang="zh-TW" sz="1100" dirty="0">
+                <a:solidFill>
+                  <a:srgbClr val="FF0000"/>
+                </a:solidFill>
+              </a:rPr>
+              <a:t>c </a:t>
+            </a:r>
+            <a:r>
+              <a:rPr lang="zh-TW" altLang="en-US" sz="1100" dirty="0">
+                <a:solidFill>
+                  <a:srgbClr val="FF0000"/>
+                </a:solidFill>
+              </a:rPr>
+              <a:t>為 </a:t>
+            </a:r>
+            <a:r>
+              <a:rPr lang="en-US" altLang="zh-TW" sz="1100" dirty="0">
+                <a:solidFill>
+                  <a:srgbClr val="FF0000"/>
+                </a:solidFill>
+              </a:rPr>
+              <a:t>true </a:t>
+            </a:r>
+            <a:r>
+              <a:rPr lang="zh-TW" altLang="en-US" sz="1100" dirty="0">
+                <a:solidFill>
+                  <a:srgbClr val="FF0000"/>
+                </a:solidFill>
+              </a:rPr>
+              <a:t>時，過 </a:t>
+            </a:r>
+            <a:r>
+              <a:rPr lang="en-US" altLang="zh-TW" sz="1100" dirty="0">
+                <a:solidFill>
+                  <a:srgbClr val="FF0000"/>
+                </a:solidFill>
+              </a:rPr>
+              <a:t>2 </a:t>
+            </a:r>
+            <a:r>
+              <a:rPr lang="zh-TW" altLang="en-US" sz="1100" dirty="0">
+                <a:solidFill>
+                  <a:srgbClr val="FF0000"/>
+                </a:solidFill>
+              </a:rPr>
+              <a:t>個週期後 </a:t>
+            </a:r>
+            <a:r>
+              <a:rPr lang="en-US" altLang="zh-TW" sz="1100" dirty="0">
+                <a:solidFill>
+                  <a:srgbClr val="FF0000"/>
+                </a:solidFill>
+              </a:rPr>
+              <a:t>d </a:t>
+            </a:r>
+            <a:r>
+              <a:rPr lang="zh-TW" altLang="en-US" sz="1100" dirty="0">
+                <a:solidFill>
+                  <a:srgbClr val="FF0000"/>
+                </a:solidFill>
+              </a:rPr>
+              <a:t>也要為 </a:t>
+            </a:r>
+            <a:r>
+              <a:rPr lang="en-US" altLang="zh-TW" sz="1100" dirty="0">
+                <a:solidFill>
+                  <a:srgbClr val="FF0000"/>
+                </a:solidFill>
+              </a:rPr>
+              <a:t>true</a:t>
+            </a:r>
+          </a:p>
+          <a:p>
+            <a:r>
+              <a:rPr lang="en-US" altLang="zh-TW" sz="1100" dirty="0">
+                <a:solidFill>
+                  <a:srgbClr val="FF0000"/>
+                </a:solidFill>
+              </a:rPr>
+              <a:t>  </a:t>
+            </a:r>
+            <a:r>
+              <a:rPr lang="en-US" altLang="zh-TW" sz="1100" dirty="0" err="1">
+                <a:solidFill>
+                  <a:srgbClr val="FF0000"/>
+                </a:solidFill>
+              </a:rPr>
+              <a:t>endsequence</a:t>
+            </a:r>
+            <a:endParaRPr lang="en-US" altLang="zh-TW" sz="1100" dirty="0">
+              <a:solidFill>
+                <a:srgbClr val="FF0000"/>
+              </a:solidFill>
+            </a:endParaRPr>
+          </a:p>
+          <a:p>
+            <a:r>
+              <a:rPr lang="en-US" altLang="zh-TW" sz="1100" dirty="0">
+                <a:solidFill>
+                  <a:srgbClr val="FF0000"/>
+                </a:solidFill>
+              </a:rPr>
+              <a:t>  </a:t>
+            </a:r>
+          </a:p>
+          <a:p>
+            <a:r>
+              <a:rPr lang="en-US" altLang="zh-TW" sz="1100" dirty="0">
+                <a:solidFill>
+                  <a:srgbClr val="FF0000"/>
+                </a:solidFill>
+              </a:rPr>
+              <a:t>  assert property (</a:t>
+            </a:r>
+            <a:r>
+              <a:rPr lang="en-US" altLang="zh-TW" sz="1100" dirty="0" err="1">
+                <a:solidFill>
+                  <a:srgbClr val="FF0000"/>
+                </a:solidFill>
+              </a:rPr>
+              <a:t>s_ab</a:t>
+            </a:r>
+            <a:r>
+              <a:rPr lang="en-US" altLang="zh-TW" sz="1100" dirty="0">
+                <a:solidFill>
+                  <a:srgbClr val="FF0000"/>
+                </a:solidFill>
+              </a:rPr>
+              <a:t>);</a:t>
+            </a:r>
+          </a:p>
+          <a:p>
+            <a:r>
+              <a:rPr lang="en-US" altLang="zh-TW" sz="1100" dirty="0" err="1"/>
+              <a:t>endmodule</a:t>
+            </a:r>
+            <a:endParaRPr lang="en-US" altLang="zh-TW" sz="1100" dirty="0"/>
+          </a:p>
+        </p:txBody>
+      </p:sp>
+      <p:sp>
+        <p:nvSpPr>
+          <p:cNvPr id="5" name="文字方塊 4">
+            <a:extLst>
+              <a:ext uri="{FF2B5EF4-FFF2-40B4-BE49-F238E27FC236}">
+                <a16:creationId xmlns:a16="http://schemas.microsoft.com/office/drawing/2014/main" id="{473F23CF-7CB9-A1D1-5677-E7F23F355BBE}"/>
+              </a:ext>
+            </a:extLst>
+          </p:cNvPr>
+          <p:cNvSpPr txBox="1"/>
+          <p:nvPr/>
+        </p:nvSpPr>
+        <p:spPr>
+          <a:xfrm>
+            <a:off x="6320589" y="2380054"/>
+            <a:ext cx="5482389" cy="4131900"/>
+          </a:xfrm>
+          <a:prstGeom prst="rect">
+            <a:avLst/>
+          </a:prstGeom>
+          <a:noFill/>
+          <a:ln>
+            <a:solidFill>
+              <a:schemeClr val="tx1"/>
+            </a:solidFill>
+          </a:ln>
+        </p:spPr>
+        <p:txBody>
+          <a:bodyPr wrap="square" rtlCol="0">
+            <a:spAutoFit/>
+          </a:bodyPr>
+          <a:lstStyle/>
+          <a:p>
+            <a:r>
+              <a:rPr lang="en-US" altLang="zh-TW" sz="1050" dirty="0"/>
+              <a:t>module tb;</a:t>
+            </a:r>
+          </a:p>
+          <a:p>
+            <a:r>
+              <a:rPr lang="en-US" altLang="zh-TW" sz="1050" dirty="0"/>
+              <a:t>  bit a, b, c, d;</a:t>
+            </a:r>
+          </a:p>
+          <a:p>
+            <a:r>
+              <a:rPr lang="en-US" altLang="zh-TW" sz="1050" dirty="0"/>
+              <a:t>  bit </a:t>
+            </a:r>
+            <a:r>
+              <a:rPr lang="en-US" altLang="zh-TW" sz="1050" dirty="0" err="1"/>
+              <a:t>clk</a:t>
+            </a:r>
+            <a:r>
+              <a:rPr lang="en-US" altLang="zh-TW" sz="1050" dirty="0"/>
+              <a:t>;</a:t>
+            </a:r>
+          </a:p>
+          <a:p>
+            <a:br>
+              <a:rPr lang="en-US" altLang="zh-TW" sz="1050" dirty="0"/>
+            </a:br>
+            <a:r>
+              <a:rPr lang="en-US" altLang="zh-TW" sz="1050" dirty="0"/>
+              <a:t>  always #10 </a:t>
+            </a:r>
+            <a:r>
+              <a:rPr lang="en-US" altLang="zh-TW" sz="1050" dirty="0" err="1"/>
+              <a:t>clk</a:t>
+            </a:r>
+            <a:r>
+              <a:rPr lang="en-US" altLang="zh-TW" sz="1050" dirty="0"/>
+              <a:t> = ~</a:t>
+            </a:r>
+            <a:r>
+              <a:rPr lang="en-US" altLang="zh-TW" sz="1050" dirty="0" err="1"/>
+              <a:t>clk</a:t>
+            </a:r>
+            <a:r>
+              <a:rPr lang="en-US" altLang="zh-TW" sz="1050" dirty="0"/>
+              <a:t>;</a:t>
+            </a:r>
+          </a:p>
+          <a:p>
+            <a:br>
+              <a:rPr lang="en-US" altLang="zh-TW" sz="1050" dirty="0"/>
+            </a:br>
+            <a:r>
+              <a:rPr lang="en-US" altLang="zh-TW" sz="1050" dirty="0"/>
+              <a:t>  initial begin</a:t>
+            </a:r>
+          </a:p>
+          <a:p>
+            <a:r>
+              <a:rPr lang="en-US" altLang="zh-TW" sz="1050" dirty="0"/>
+              <a:t>    for (int </a:t>
+            </a:r>
+            <a:r>
+              <a:rPr lang="en-US" altLang="zh-TW" sz="1050" dirty="0" err="1"/>
+              <a:t>i</a:t>
+            </a:r>
+            <a:r>
+              <a:rPr lang="en-US" altLang="zh-TW" sz="1050" dirty="0"/>
+              <a:t> = 0; </a:t>
+            </a:r>
+            <a:r>
+              <a:rPr lang="en-US" altLang="zh-TW" sz="1050" dirty="0" err="1"/>
+              <a:t>i</a:t>
+            </a:r>
+            <a:r>
+              <a:rPr lang="en-US" altLang="zh-TW" sz="1050" dirty="0"/>
+              <a:t> &lt; 20; </a:t>
+            </a:r>
+            <a:r>
+              <a:rPr lang="en-US" altLang="zh-TW" sz="1050" dirty="0" err="1"/>
+              <a:t>i</a:t>
+            </a:r>
+            <a:r>
+              <a:rPr lang="en-US" altLang="zh-TW" sz="1050" dirty="0"/>
+              <a:t>++) begin</a:t>
+            </a:r>
+          </a:p>
+          <a:p>
+            <a:r>
+              <a:rPr lang="en-US" altLang="zh-TW" sz="1050" dirty="0"/>
+              <a:t>      {a, b, c, d} = $random;</a:t>
+            </a:r>
+          </a:p>
+          <a:p>
+            <a:r>
+              <a:rPr lang="en-US" altLang="zh-TW" sz="1050" dirty="0"/>
+              <a:t>      $display("%0t a=%0d b=%0d c=%0d d=%0d", $time, a, b, c, d);</a:t>
+            </a:r>
+          </a:p>
+          <a:p>
+            <a:r>
+              <a:rPr lang="en-US" altLang="zh-TW" sz="1050" dirty="0"/>
+              <a:t>      @(posedge </a:t>
+            </a:r>
+            <a:r>
+              <a:rPr lang="en-US" altLang="zh-TW" sz="1050" dirty="0" err="1"/>
+              <a:t>clk</a:t>
+            </a:r>
+            <a:r>
+              <a:rPr lang="en-US" altLang="zh-TW" sz="1050" dirty="0"/>
+              <a:t>);</a:t>
+            </a:r>
+          </a:p>
+          <a:p>
+            <a:r>
+              <a:rPr lang="en-US" altLang="zh-TW" sz="1050" dirty="0"/>
+              <a:t>    end</a:t>
+            </a:r>
+          </a:p>
+          <a:p>
+            <a:r>
+              <a:rPr lang="en-US" altLang="zh-TW" sz="1050" dirty="0"/>
+              <a:t>    #10 $finish;</a:t>
+            </a:r>
+          </a:p>
+          <a:p>
+            <a:r>
+              <a:rPr lang="en-US" altLang="zh-TW" sz="1050" dirty="0"/>
+              <a:t>  end</a:t>
+            </a:r>
+          </a:p>
+          <a:p>
+            <a:br>
+              <a:rPr lang="en-US" altLang="zh-TW" sz="1050" dirty="0"/>
+            </a:br>
+            <a:r>
+              <a:rPr lang="en-US" altLang="zh-TW" sz="1050" dirty="0">
+                <a:solidFill>
+                  <a:srgbClr val="FF0000"/>
+                </a:solidFill>
+              </a:rPr>
+              <a:t>  property </a:t>
+            </a:r>
+            <a:r>
+              <a:rPr lang="en-US" altLang="zh-TW" sz="1050" dirty="0" err="1">
+                <a:solidFill>
+                  <a:srgbClr val="FF0000"/>
+                </a:solidFill>
+              </a:rPr>
+              <a:t>p_expr</a:t>
+            </a:r>
+            <a:r>
+              <a:rPr lang="en-US" altLang="zh-TW" sz="1050" dirty="0">
+                <a:solidFill>
+                  <a:srgbClr val="FF0000"/>
+                </a:solidFill>
+              </a:rPr>
+              <a:t>;</a:t>
+            </a:r>
+          </a:p>
+          <a:p>
+            <a:r>
+              <a:rPr lang="en-US" altLang="zh-TW" sz="1050" dirty="0">
+                <a:solidFill>
+                  <a:srgbClr val="FF0000"/>
+                </a:solidFill>
+              </a:rPr>
+              <a:t>    // a </a:t>
+            </a:r>
+            <a:r>
+              <a:rPr lang="zh-TW" altLang="en-US" sz="1050" dirty="0">
+                <a:solidFill>
+                  <a:srgbClr val="FF0000"/>
+                </a:solidFill>
+              </a:rPr>
+              <a:t>為 </a:t>
+            </a:r>
+            <a:r>
+              <a:rPr lang="en-US" altLang="zh-TW" sz="1050" dirty="0">
+                <a:solidFill>
+                  <a:srgbClr val="FF0000"/>
+                </a:solidFill>
+              </a:rPr>
+              <a:t>true</a:t>
+            </a:r>
+          </a:p>
+          <a:p>
+            <a:r>
+              <a:rPr lang="en-US" altLang="zh-TW" sz="1050" dirty="0">
+                <a:solidFill>
+                  <a:srgbClr val="FF0000"/>
+                </a:solidFill>
+              </a:rPr>
+              <a:t>    // ➜ </a:t>
+            </a:r>
+            <a:r>
+              <a:rPr lang="zh-TW" altLang="en-US" sz="1050" dirty="0">
+                <a:solidFill>
+                  <a:srgbClr val="FF0000"/>
+                </a:solidFill>
+              </a:rPr>
+              <a:t>下一個 </a:t>
+            </a:r>
+            <a:r>
+              <a:rPr lang="en-US" altLang="zh-TW" sz="1050" dirty="0">
+                <a:solidFill>
+                  <a:srgbClr val="FF0000"/>
+                </a:solidFill>
+              </a:rPr>
+              <a:t>clock</a:t>
+            </a:r>
+            <a:r>
+              <a:rPr lang="zh-TW" altLang="en-US" sz="1050" dirty="0">
+                <a:solidFill>
+                  <a:srgbClr val="FF0000"/>
+                </a:solidFill>
+              </a:rPr>
+              <a:t>：</a:t>
+            </a:r>
+            <a:r>
+              <a:rPr lang="en-US" altLang="zh-TW" sz="1050" dirty="0">
+                <a:solidFill>
+                  <a:srgbClr val="FF0000"/>
+                </a:solidFill>
+              </a:rPr>
+              <a:t>b </a:t>
+            </a:r>
+            <a:r>
+              <a:rPr lang="zh-TW" altLang="en-US" sz="1050" dirty="0">
+                <a:solidFill>
+                  <a:srgbClr val="FF0000"/>
+                </a:solidFill>
+              </a:rPr>
+              <a:t>為 </a:t>
+            </a:r>
+            <a:r>
+              <a:rPr lang="en-US" altLang="zh-TW" sz="1050" dirty="0">
+                <a:solidFill>
+                  <a:srgbClr val="FF0000"/>
+                </a:solidFill>
+              </a:rPr>
+              <a:t>true</a:t>
+            </a:r>
+          </a:p>
+          <a:p>
+            <a:r>
+              <a:rPr lang="en-US" altLang="zh-TW" sz="1050" dirty="0">
+                <a:solidFill>
+                  <a:srgbClr val="FF0000"/>
+                </a:solidFill>
+              </a:rPr>
+              <a:t>    // ➜ </a:t>
+            </a:r>
+            <a:r>
+              <a:rPr lang="zh-TW" altLang="en-US" sz="1050" dirty="0">
+                <a:solidFill>
+                  <a:srgbClr val="FF0000"/>
+                </a:solidFill>
+              </a:rPr>
+              <a:t>再下一個 </a:t>
+            </a:r>
+            <a:r>
+              <a:rPr lang="en-US" altLang="zh-TW" sz="1050" dirty="0">
+                <a:solidFill>
+                  <a:srgbClr val="FF0000"/>
+                </a:solidFill>
+              </a:rPr>
+              <a:t>clock</a:t>
+            </a:r>
+            <a:r>
+              <a:rPr lang="zh-TW" altLang="en-US" sz="1050" dirty="0">
+                <a:solidFill>
+                  <a:srgbClr val="FF0000"/>
+                </a:solidFill>
+              </a:rPr>
+              <a:t>（</a:t>
+            </a:r>
+            <a:r>
+              <a:rPr lang="en-US" altLang="zh-TW" sz="1050" dirty="0">
+                <a:solidFill>
+                  <a:srgbClr val="FF0000"/>
+                </a:solidFill>
+              </a:rPr>
+              <a:t>##1</a:t>
+            </a:r>
+            <a:r>
+              <a:rPr lang="zh-TW" altLang="en-US" sz="1050" dirty="0">
+                <a:solidFill>
+                  <a:srgbClr val="FF0000"/>
+                </a:solidFill>
+              </a:rPr>
+              <a:t>）：</a:t>
+            </a:r>
+            <a:r>
+              <a:rPr lang="en-US" altLang="zh-TW" sz="1050" dirty="0">
+                <a:solidFill>
+                  <a:srgbClr val="FF0000"/>
+                </a:solidFill>
+              </a:rPr>
+              <a:t>c </a:t>
+            </a:r>
+            <a:r>
+              <a:rPr lang="zh-TW" altLang="en-US" sz="1050" dirty="0">
+                <a:solidFill>
+                  <a:srgbClr val="FF0000"/>
+                </a:solidFill>
+              </a:rPr>
+              <a:t>為 </a:t>
+            </a:r>
+            <a:r>
+              <a:rPr lang="en-US" altLang="zh-TW" sz="1050" dirty="0">
+                <a:solidFill>
+                  <a:srgbClr val="FF0000"/>
+                </a:solidFill>
+              </a:rPr>
+              <a:t>true</a:t>
+            </a:r>
+          </a:p>
+          <a:p>
+            <a:r>
+              <a:rPr lang="en-US" altLang="zh-TW" sz="1050" dirty="0">
+                <a:solidFill>
+                  <a:srgbClr val="FF0000"/>
+                </a:solidFill>
+              </a:rPr>
+              <a:t>    // ➜ </a:t>
+            </a:r>
+            <a:r>
+              <a:rPr lang="zh-TW" altLang="en-US" sz="1050" dirty="0">
+                <a:solidFill>
+                  <a:srgbClr val="FF0000"/>
+                </a:solidFill>
+              </a:rPr>
+              <a:t>再兩個 </a:t>
+            </a:r>
+            <a:r>
+              <a:rPr lang="en-US" altLang="zh-TW" sz="1050" dirty="0">
+                <a:solidFill>
+                  <a:srgbClr val="FF0000"/>
+                </a:solidFill>
+              </a:rPr>
+              <a:t>clock</a:t>
+            </a:r>
+            <a:r>
+              <a:rPr lang="zh-TW" altLang="en-US" sz="1050" dirty="0">
+                <a:solidFill>
+                  <a:srgbClr val="FF0000"/>
+                </a:solidFill>
+              </a:rPr>
+              <a:t>：</a:t>
+            </a:r>
+            <a:r>
+              <a:rPr lang="en-US" altLang="zh-TW" sz="1050" dirty="0">
+                <a:solidFill>
+                  <a:srgbClr val="FF0000"/>
+                </a:solidFill>
+              </a:rPr>
+              <a:t>d </a:t>
+            </a:r>
+            <a:r>
+              <a:rPr lang="zh-TW" altLang="en-US" sz="1050" dirty="0">
+                <a:solidFill>
+                  <a:srgbClr val="FF0000"/>
+                </a:solidFill>
+              </a:rPr>
+              <a:t>為 </a:t>
+            </a:r>
+            <a:r>
+              <a:rPr lang="en-US" altLang="zh-TW" sz="1050" dirty="0">
+                <a:solidFill>
+                  <a:srgbClr val="FF0000"/>
+                </a:solidFill>
+              </a:rPr>
+              <a:t>true</a:t>
+            </a:r>
+          </a:p>
+          <a:p>
+            <a:r>
+              <a:rPr lang="en-US" altLang="zh-TW" sz="1050" dirty="0">
+                <a:solidFill>
+                  <a:srgbClr val="FF0000"/>
+                </a:solidFill>
+              </a:rPr>
+              <a:t>    @(posedge </a:t>
+            </a:r>
+            <a:r>
+              <a:rPr lang="en-US" altLang="zh-TW" sz="1050" dirty="0" err="1">
+                <a:solidFill>
+                  <a:srgbClr val="FF0000"/>
+                </a:solidFill>
+              </a:rPr>
+              <a:t>clk</a:t>
+            </a:r>
+            <a:r>
+              <a:rPr lang="en-US" altLang="zh-TW" sz="1050" dirty="0">
+                <a:solidFill>
+                  <a:srgbClr val="FF0000"/>
+                </a:solidFill>
+              </a:rPr>
+              <a:t>) </a:t>
+            </a:r>
+            <a:r>
+              <a:rPr lang="en-US" altLang="zh-TW" sz="1050" dirty="0" err="1">
+                <a:solidFill>
+                  <a:srgbClr val="FF0000"/>
+                </a:solidFill>
+              </a:rPr>
+              <a:t>s_ab</a:t>
+            </a:r>
+            <a:r>
+              <a:rPr lang="en-US" altLang="zh-TW" sz="1050" dirty="0">
+                <a:solidFill>
+                  <a:srgbClr val="FF0000"/>
+                </a:solidFill>
+              </a:rPr>
+              <a:t> ##1 </a:t>
+            </a:r>
+            <a:r>
+              <a:rPr lang="en-US" altLang="zh-TW" sz="1050" dirty="0" err="1">
+                <a:solidFill>
+                  <a:srgbClr val="FF0000"/>
+                </a:solidFill>
+              </a:rPr>
+              <a:t>s_cd</a:t>
+            </a:r>
+            <a:r>
+              <a:rPr lang="en-US" altLang="zh-TW" sz="1050" dirty="0">
+                <a:solidFill>
+                  <a:srgbClr val="FF0000"/>
+                </a:solidFill>
+              </a:rPr>
+              <a:t>; </a:t>
+            </a:r>
+          </a:p>
+          <a:p>
+            <a:r>
+              <a:rPr lang="en-US" altLang="zh-TW" sz="1050" dirty="0">
+                <a:solidFill>
+                  <a:srgbClr val="FF0000"/>
+                </a:solidFill>
+              </a:rPr>
+              <a:t>  </a:t>
+            </a:r>
+            <a:r>
+              <a:rPr lang="en-US" altLang="zh-TW" sz="1050" dirty="0" err="1">
+                <a:solidFill>
+                  <a:srgbClr val="FF0000"/>
+                </a:solidFill>
+              </a:rPr>
+              <a:t>endproperty</a:t>
+            </a:r>
+            <a:endParaRPr lang="en-US" altLang="zh-TW" sz="1050" dirty="0">
+              <a:solidFill>
+                <a:srgbClr val="FF0000"/>
+              </a:solidFill>
+            </a:endParaRPr>
+          </a:p>
+          <a:p>
+            <a:br>
+              <a:rPr lang="en-US" altLang="zh-TW" sz="1050" dirty="0">
+                <a:solidFill>
+                  <a:srgbClr val="FF0000"/>
+                </a:solidFill>
+              </a:rPr>
+            </a:br>
+            <a:r>
+              <a:rPr lang="en-US" altLang="zh-TW" sz="1050" dirty="0">
+                <a:solidFill>
+                  <a:srgbClr val="FF0000"/>
+                </a:solidFill>
+              </a:rPr>
+              <a:t>  assert property (</a:t>
+            </a:r>
+            <a:r>
+              <a:rPr lang="en-US" altLang="zh-TW" sz="1050" dirty="0" err="1">
+                <a:solidFill>
+                  <a:srgbClr val="FF0000"/>
+                </a:solidFill>
+              </a:rPr>
+              <a:t>p_expr</a:t>
+            </a:r>
+            <a:r>
+              <a:rPr lang="en-US" altLang="zh-TW" sz="1050" dirty="0">
+                <a:solidFill>
+                  <a:srgbClr val="FF0000"/>
+                </a:solidFill>
+              </a:rPr>
+              <a:t>);</a:t>
+            </a:r>
+          </a:p>
+          <a:p>
+            <a:r>
+              <a:rPr lang="en-US" altLang="zh-TW" sz="1050" dirty="0" err="1"/>
+              <a:t>endmodule</a:t>
+            </a:r>
+            <a:endParaRPr lang="en-US" altLang="zh-TW" sz="1050" dirty="0"/>
+          </a:p>
+        </p:txBody>
+      </p:sp>
+    </p:spTree>
+    <p:extLst>
+      <p:ext uri="{BB962C8B-B14F-4D97-AF65-F5344CB8AC3E}">
+        <p14:creationId xmlns:p14="http://schemas.microsoft.com/office/powerpoint/2010/main" val="2524485010"/>
+      </p:ext>
+    </p:extLst>
+  </p:cSld>
+  <p:clrMapOvr>
+    <a:masterClrMapping/>
+  </p:clrMapOvr>
+</p:sld>
+</file>
+
 <file path=ppt/slides/slide7.xml><?xml version="1.0" encoding="utf-8"?>
 <p:sld xmlns:a="http://schemas.openxmlformats.org/drawingml/2006/main" xmlns:r="http://schemas.openxmlformats.org/officeDocument/2006/relationships" xmlns:p="http://schemas.openxmlformats.org/presentationml/2006/main">
   <p:cSld>
@@ -21450,6 +22842,1433 @@
     <p:extLst>
       <p:ext uri="{BB962C8B-B14F-4D97-AF65-F5344CB8AC3E}">
         <p14:creationId xmlns:p14="http://schemas.microsoft.com/office/powerpoint/2010/main" val="1555446494"/>
+      </p:ext>
+    </p:extLst>
+  </p:cSld>
+  <p:clrMapOvr>
+    <a:masterClrMapping/>
+  </p:clrMapOvr>
+</p:sld>
+</file>
+
+<file path=ppt/slides/slide70.xml><?xml version="1.0" encoding="utf-8"?>
+<p:sld xmlns:a="http://schemas.openxmlformats.org/drawingml/2006/main" xmlns:r="http://schemas.openxmlformats.org/officeDocument/2006/relationships" xmlns:p="http://schemas.openxmlformats.org/presentationml/2006/main">
+  <p:cSld>
+    <p:spTree>
+      <p:nvGrpSpPr>
+        <p:cNvPr id="1" name="">
+          <a:extLst>
+            <a:ext uri="{FF2B5EF4-FFF2-40B4-BE49-F238E27FC236}">
+              <a16:creationId xmlns:a16="http://schemas.microsoft.com/office/drawing/2014/main" id="{D3CF157C-BF7D-C456-570F-2F1E54C45EDE}"/>
+            </a:ext>
+          </a:extLst>
+        </p:cNvPr>
+        <p:cNvGrpSpPr/>
+        <p:nvPr/>
+      </p:nvGrpSpPr>
+      <p:grpSpPr>
+        <a:xfrm>
+          <a:off x="0" y="0"/>
+          <a:ext cx="0" cy="0"/>
+          <a:chOff x="0" y="0"/>
+          <a:chExt cx="0" cy="0"/>
+        </a:xfrm>
+      </p:grpSpPr>
+      <p:sp>
+        <p:nvSpPr>
+          <p:cNvPr id="2" name="標題 1">
+            <a:extLst>
+              <a:ext uri="{FF2B5EF4-FFF2-40B4-BE49-F238E27FC236}">
+                <a16:creationId xmlns:a16="http://schemas.microsoft.com/office/drawing/2014/main" id="{BA020C1F-62A4-3E03-94A0-3C58F00DEB71}"/>
+              </a:ext>
+            </a:extLst>
+          </p:cNvPr>
+          <p:cNvSpPr>
+            <a:spLocks noGrp="1"/>
+          </p:cNvSpPr>
+          <p:nvPr>
+            <p:ph type="title"/>
+          </p:nvPr>
+        </p:nvSpPr>
+        <p:spPr/>
+        <p:txBody>
+          <a:bodyPr/>
+          <a:lstStyle/>
+          <a:p>
+            <a:r>
+              <a:rPr lang="en-US" altLang="zh-TW" dirty="0"/>
+              <a:t>Assertions (3/4)</a:t>
+            </a:r>
+            <a:endParaRPr lang="zh-TW" altLang="en-US" dirty="0"/>
+          </a:p>
+        </p:txBody>
+      </p:sp>
+      <p:sp>
+        <p:nvSpPr>
+          <p:cNvPr id="4" name="內容版面配置區 3">
+            <a:extLst>
+              <a:ext uri="{FF2B5EF4-FFF2-40B4-BE49-F238E27FC236}">
+                <a16:creationId xmlns:a16="http://schemas.microsoft.com/office/drawing/2014/main" id="{38B6D4CD-6158-13A6-A90F-8E27942791D9}"/>
+              </a:ext>
+            </a:extLst>
+          </p:cNvPr>
+          <p:cNvSpPr>
+            <a:spLocks noGrp="1"/>
+          </p:cNvSpPr>
+          <p:nvPr>
+            <p:ph idx="1"/>
+          </p:nvPr>
+        </p:nvSpPr>
+        <p:spPr/>
+        <p:txBody>
+          <a:bodyPr/>
+          <a:lstStyle/>
+          <a:p>
+            <a:pPr marL="514350" indent="-514350">
+              <a:buFont typeface="+mj-lt"/>
+              <a:buAutoNum type="arabicPeriod" startAt="2"/>
+            </a:pPr>
+            <a:r>
+              <a:rPr lang="en-US" altLang="zh-TW" dirty="0"/>
+              <a:t>Immediate Assertions</a:t>
+            </a:r>
+          </a:p>
+          <a:p>
+            <a:pPr lvl="1"/>
+            <a:r>
+              <a:rPr lang="zh-TW" altLang="en-US" sz="1800" dirty="0"/>
+              <a:t>立即執行</a:t>
+            </a:r>
+          </a:p>
+          <a:p>
+            <a:pPr lvl="1"/>
+            <a:r>
+              <a:rPr lang="zh-TW" altLang="en-US" sz="1800" dirty="0"/>
+              <a:t>驗證組合邏輯、立刻檢查結果</a:t>
+            </a:r>
+          </a:p>
+          <a:p>
+            <a:pPr lvl="1"/>
+            <a:r>
+              <a:rPr lang="en-US" altLang="zh-TW" sz="1800" dirty="0"/>
+              <a:t>assert(expr)</a:t>
+            </a:r>
+          </a:p>
+          <a:p>
+            <a:pPr lvl="1"/>
+            <a:endParaRPr lang="en-US" altLang="zh-TW" sz="1800" dirty="0"/>
+          </a:p>
+          <a:p>
+            <a:pPr lvl="1"/>
+            <a:r>
+              <a:rPr lang="zh-TW" altLang="en-US" sz="1800" dirty="0"/>
+              <a:t>最常用於 </a:t>
+            </a:r>
+            <a:r>
+              <a:rPr lang="en-US" altLang="zh-TW" sz="1800" dirty="0"/>
+              <a:t>initial, always, task, function </a:t>
+            </a:r>
+            <a:r>
+              <a:rPr lang="zh-TW" altLang="en-US" sz="1800" dirty="0"/>
+              <a:t>等語法區塊中。</a:t>
+            </a:r>
+          </a:p>
+          <a:p>
+            <a:pPr lvl="1"/>
+            <a:r>
+              <a:rPr lang="zh-TW" altLang="en-US" sz="1800" dirty="0"/>
+              <a:t>配合 </a:t>
+            </a:r>
+            <a:r>
+              <a:rPr lang="en-US" altLang="zh-TW" sz="1800" dirty="0"/>
+              <a:t>$error, $warning, $fatal </a:t>
+            </a:r>
+            <a:r>
+              <a:rPr lang="zh-TW" altLang="en-US" sz="1800" dirty="0"/>
+              <a:t>可以控制模擬行為：</a:t>
+            </a:r>
+          </a:p>
+          <a:p>
+            <a:pPr lvl="1"/>
+            <a:r>
+              <a:rPr lang="en-US" altLang="zh-TW" sz="1800" dirty="0"/>
+              <a:t>$error</a:t>
+            </a:r>
+            <a:r>
+              <a:rPr lang="zh-TW" altLang="en-US" sz="1800" dirty="0"/>
+              <a:t>：印錯誤，但不終止模擬</a:t>
+            </a:r>
+          </a:p>
+          <a:p>
+            <a:pPr lvl="1"/>
+            <a:r>
+              <a:rPr lang="en-US" altLang="zh-TW" sz="1800" dirty="0"/>
+              <a:t>$fatal</a:t>
+            </a:r>
+            <a:r>
+              <a:rPr lang="zh-TW" altLang="en-US" sz="1800" dirty="0"/>
+              <a:t>：印錯誤並停止模擬</a:t>
+            </a:r>
+            <a:endParaRPr lang="en-US" altLang="zh-TW" dirty="0"/>
+          </a:p>
+        </p:txBody>
+      </p:sp>
+      <p:sp>
+        <p:nvSpPr>
+          <p:cNvPr id="3" name="文字方塊 2">
+            <a:extLst>
+              <a:ext uri="{FF2B5EF4-FFF2-40B4-BE49-F238E27FC236}">
+                <a16:creationId xmlns:a16="http://schemas.microsoft.com/office/drawing/2014/main" id="{83A3AD56-7FED-2B3A-E391-D058E98E013C}"/>
+              </a:ext>
+            </a:extLst>
+          </p:cNvPr>
+          <p:cNvSpPr txBox="1"/>
+          <p:nvPr/>
+        </p:nvSpPr>
+        <p:spPr>
+          <a:xfrm>
+            <a:off x="7327537" y="1825625"/>
+            <a:ext cx="4645927" cy="1754326"/>
+          </a:xfrm>
+          <a:prstGeom prst="rect">
+            <a:avLst/>
+          </a:prstGeom>
+          <a:noFill/>
+          <a:ln>
+            <a:solidFill>
+              <a:schemeClr val="tx1"/>
+            </a:solidFill>
+          </a:ln>
+        </p:spPr>
+        <p:txBody>
+          <a:bodyPr wrap="square" rtlCol="0">
+            <a:spAutoFit/>
+          </a:bodyPr>
+          <a:lstStyle/>
+          <a:p>
+            <a:r>
+              <a:rPr lang="en-US" altLang="zh-TW" sz="1200" dirty="0"/>
+              <a:t>module test;</a:t>
+            </a:r>
+          </a:p>
+          <a:p>
+            <a:r>
+              <a:rPr lang="en-US" altLang="zh-TW" sz="1200" dirty="0"/>
+              <a:t>  int a = 3, b = 4, sum = 8;</a:t>
+            </a:r>
+          </a:p>
+          <a:p>
+            <a:br>
+              <a:rPr lang="en-US" altLang="zh-TW" sz="1200" dirty="0"/>
+            </a:br>
+            <a:r>
+              <a:rPr lang="en-US" altLang="zh-TW" sz="1200" dirty="0"/>
+              <a:t>  initial begin</a:t>
+            </a:r>
+          </a:p>
+          <a:p>
+            <a:r>
+              <a:rPr lang="en-US" altLang="zh-TW" sz="1200" dirty="0"/>
+              <a:t>    // </a:t>
+            </a:r>
+            <a:r>
+              <a:rPr lang="zh-TW" altLang="en-US" sz="1200" dirty="0"/>
+              <a:t>如果 </a:t>
+            </a:r>
+            <a:r>
+              <a:rPr lang="en-US" altLang="zh-TW" sz="1200" dirty="0"/>
+              <a:t>sum != a + b</a:t>
+            </a:r>
+            <a:r>
+              <a:rPr lang="zh-TW" altLang="en-US" sz="1200" dirty="0"/>
+              <a:t>，就印出錯誤訊息。</a:t>
+            </a:r>
+          </a:p>
+          <a:p>
+            <a:r>
+              <a:rPr lang="zh-TW" altLang="en-US" sz="1200" dirty="0"/>
+              <a:t>    </a:t>
+            </a:r>
+            <a:r>
+              <a:rPr lang="en-US" altLang="zh-TW" sz="1200" dirty="0"/>
+              <a:t>assert (sum == a + b)  </a:t>
+            </a:r>
+          </a:p>
+          <a:p>
+            <a:r>
+              <a:rPr lang="en-US" altLang="zh-TW" sz="1200" dirty="0"/>
+              <a:t>      else $error("Sum is incorrect: %0d != %0d + %0d", sum, a, b);</a:t>
+            </a:r>
+          </a:p>
+          <a:p>
+            <a:r>
+              <a:rPr lang="en-US" altLang="zh-TW" sz="1200" dirty="0"/>
+              <a:t>  end</a:t>
+            </a:r>
+          </a:p>
+          <a:p>
+            <a:r>
+              <a:rPr lang="en-US" altLang="zh-TW" sz="1200" dirty="0" err="1"/>
+              <a:t>endmodule</a:t>
+            </a:r>
+            <a:endParaRPr lang="en-US" altLang="zh-TW" sz="1200" dirty="0"/>
+          </a:p>
+        </p:txBody>
+      </p:sp>
+    </p:spTree>
+    <p:extLst>
+      <p:ext uri="{BB962C8B-B14F-4D97-AF65-F5344CB8AC3E}">
+        <p14:creationId xmlns:p14="http://schemas.microsoft.com/office/powerpoint/2010/main" val="2051381544"/>
+      </p:ext>
+    </p:extLst>
+  </p:cSld>
+  <p:clrMapOvr>
+    <a:masterClrMapping/>
+  </p:clrMapOvr>
+</p:sld>
+</file>
+
+<file path=ppt/slides/slide71.xml><?xml version="1.0" encoding="utf-8"?>
+<p:sld xmlns:a="http://schemas.openxmlformats.org/drawingml/2006/main" xmlns:r="http://schemas.openxmlformats.org/officeDocument/2006/relationships" xmlns:p="http://schemas.openxmlformats.org/presentationml/2006/main">
+  <p:cSld>
+    <p:spTree>
+      <p:nvGrpSpPr>
+        <p:cNvPr id="1" name="">
+          <a:extLst>
+            <a:ext uri="{FF2B5EF4-FFF2-40B4-BE49-F238E27FC236}">
+              <a16:creationId xmlns:a16="http://schemas.microsoft.com/office/drawing/2014/main" id="{813A0D9A-9DCE-A1BF-AF29-B23BB04DBE2C}"/>
+            </a:ext>
+          </a:extLst>
+        </p:cNvPr>
+        <p:cNvGrpSpPr/>
+        <p:nvPr/>
+      </p:nvGrpSpPr>
+      <p:grpSpPr>
+        <a:xfrm>
+          <a:off x="0" y="0"/>
+          <a:ext cx="0" cy="0"/>
+          <a:chOff x="0" y="0"/>
+          <a:chExt cx="0" cy="0"/>
+        </a:xfrm>
+      </p:grpSpPr>
+      <p:sp>
+        <p:nvSpPr>
+          <p:cNvPr id="2" name="標題 1">
+            <a:extLst>
+              <a:ext uri="{FF2B5EF4-FFF2-40B4-BE49-F238E27FC236}">
+                <a16:creationId xmlns:a16="http://schemas.microsoft.com/office/drawing/2014/main" id="{6EE494C7-3F3C-1161-4954-77D62189C63E}"/>
+              </a:ext>
+            </a:extLst>
+          </p:cNvPr>
+          <p:cNvSpPr>
+            <a:spLocks noGrp="1"/>
+          </p:cNvSpPr>
+          <p:nvPr>
+            <p:ph type="title"/>
+          </p:nvPr>
+        </p:nvSpPr>
+        <p:spPr/>
+        <p:txBody>
+          <a:bodyPr/>
+          <a:lstStyle/>
+          <a:p>
+            <a:r>
+              <a:rPr lang="en-US" altLang="zh-TW" dirty="0"/>
+              <a:t>Assertions (4/4)</a:t>
+            </a:r>
+            <a:endParaRPr lang="zh-TW" altLang="en-US" dirty="0"/>
+          </a:p>
+        </p:txBody>
+      </p:sp>
+      <p:sp>
+        <p:nvSpPr>
+          <p:cNvPr id="4" name="內容版面配置區 3">
+            <a:extLst>
+              <a:ext uri="{FF2B5EF4-FFF2-40B4-BE49-F238E27FC236}">
+                <a16:creationId xmlns:a16="http://schemas.microsoft.com/office/drawing/2014/main" id="{AA35594A-3E42-2FE7-D8C2-278140B614CE}"/>
+              </a:ext>
+            </a:extLst>
+          </p:cNvPr>
+          <p:cNvSpPr>
+            <a:spLocks noGrp="1"/>
+          </p:cNvSpPr>
+          <p:nvPr>
+            <p:ph idx="1"/>
+          </p:nvPr>
+        </p:nvSpPr>
+        <p:spPr/>
+        <p:txBody>
+          <a:bodyPr/>
+          <a:lstStyle/>
+          <a:p>
+            <a:pPr marL="514350" indent="-514350">
+              <a:buFont typeface="+mj-lt"/>
+              <a:buAutoNum type="arabicPeriod" startAt="3"/>
+            </a:pPr>
+            <a:r>
+              <a:rPr lang="en-US" altLang="zh-TW" dirty="0"/>
+              <a:t>Concurrent Assertions</a:t>
+            </a:r>
+          </a:p>
+          <a:p>
+            <a:pPr lvl="1"/>
+            <a:r>
+              <a:rPr lang="zh-TW" altLang="en-US" sz="1800" dirty="0"/>
+              <a:t>跨時間檢查</a:t>
+            </a:r>
+          </a:p>
+          <a:p>
+            <a:pPr lvl="1"/>
+            <a:r>
+              <a:rPr lang="zh-TW" altLang="en-US" sz="1800" dirty="0"/>
+              <a:t>驗證時序行為、事件序列</a:t>
+            </a:r>
+            <a:endParaRPr lang="en-US" altLang="zh-TW" sz="1800" dirty="0"/>
+          </a:p>
+          <a:p>
+            <a:pPr lvl="1"/>
+            <a:endParaRPr lang="en-US" altLang="zh-TW" sz="1800" dirty="0"/>
+          </a:p>
+          <a:p>
+            <a:pPr lvl="1"/>
+            <a:endParaRPr lang="en-US" altLang="zh-TW" sz="1800" dirty="0"/>
+          </a:p>
+        </p:txBody>
+      </p:sp>
+      <p:graphicFrame>
+        <p:nvGraphicFramePr>
+          <p:cNvPr id="6" name="表格 5">
+            <a:extLst>
+              <a:ext uri="{FF2B5EF4-FFF2-40B4-BE49-F238E27FC236}">
+                <a16:creationId xmlns:a16="http://schemas.microsoft.com/office/drawing/2014/main" id="{60740CCC-9929-75BE-5C48-3C26565B48F5}"/>
+              </a:ext>
+            </a:extLst>
+          </p:cNvPr>
+          <p:cNvGraphicFramePr>
+            <a:graphicFrameLocks noGrp="1"/>
+          </p:cNvGraphicFramePr>
+          <p:nvPr>
+            <p:extLst>
+              <p:ext uri="{D42A27DB-BD31-4B8C-83A1-F6EECF244321}">
+                <p14:modId xmlns:p14="http://schemas.microsoft.com/office/powerpoint/2010/main" val="1911651462"/>
+              </p:ext>
+            </p:extLst>
+          </p:nvPr>
+        </p:nvGraphicFramePr>
+        <p:xfrm>
+          <a:off x="1470324" y="3429000"/>
+          <a:ext cx="9251351" cy="2595880"/>
+        </p:xfrm>
+        <a:graphic>
+          <a:graphicData uri="http://schemas.openxmlformats.org/drawingml/2006/table">
+            <a:tbl>
+              <a:tblPr firstRow="1" bandRow="1">
+                <a:tableStyleId>{5C22544A-7EE6-4342-B048-85BDC9FD1C3A}</a:tableStyleId>
+              </a:tblPr>
+              <a:tblGrid>
+                <a:gridCol w="2709333">
+                  <a:extLst>
+                    <a:ext uri="{9D8B030D-6E8A-4147-A177-3AD203B41FA5}">
+                      <a16:colId xmlns:a16="http://schemas.microsoft.com/office/drawing/2014/main" val="3649765168"/>
+                    </a:ext>
+                  </a:extLst>
+                </a:gridCol>
+                <a:gridCol w="2974920">
+                  <a:extLst>
+                    <a:ext uri="{9D8B030D-6E8A-4147-A177-3AD203B41FA5}">
+                      <a16:colId xmlns:a16="http://schemas.microsoft.com/office/drawing/2014/main" val="549851236"/>
+                    </a:ext>
+                  </a:extLst>
+                </a:gridCol>
+                <a:gridCol w="3567098">
+                  <a:extLst>
+                    <a:ext uri="{9D8B030D-6E8A-4147-A177-3AD203B41FA5}">
+                      <a16:colId xmlns:a16="http://schemas.microsoft.com/office/drawing/2014/main" val="3479125062"/>
+                    </a:ext>
+                  </a:extLst>
+                </a:gridCol>
+              </a:tblGrid>
+              <a:tr h="370840">
+                <a:tc>
+                  <a:txBody>
+                    <a:bodyPr/>
+                    <a:lstStyle/>
+                    <a:p>
+                      <a:pPr marL="0" marR="0" lvl="0" indent="0" algn="ctr" defTabSz="914400" rtl="0" eaLnBrk="1" fontAlgn="auto" latinLnBrk="0" hangingPunct="1">
+                        <a:lnSpc>
+                          <a:spcPct val="100000"/>
+                        </a:lnSpc>
+                        <a:spcBef>
+                          <a:spcPts val="0"/>
+                        </a:spcBef>
+                        <a:spcAft>
+                          <a:spcPts val="0"/>
+                        </a:spcAft>
+                        <a:buClrTx/>
+                        <a:buSzTx/>
+                        <a:buFontTx/>
+                        <a:buNone/>
+                        <a:tabLst/>
+                        <a:defRPr/>
+                      </a:pPr>
+                      <a:r>
+                        <a:rPr lang="zh-TW" altLang="en-US" sz="1800" b="0" kern="1200" dirty="0">
+                          <a:solidFill>
+                            <a:schemeClr val="lt1"/>
+                          </a:solidFill>
+                          <a:effectLst/>
+                          <a:latin typeface="+mn-lt"/>
+                          <a:ea typeface="+mn-ea"/>
+                          <a:cs typeface="+mn-cs"/>
+                        </a:rPr>
+                        <a:t>運算子</a:t>
+                      </a:r>
+                      <a:endParaRPr lang="en-US" altLang="zh-TW" sz="1800" b="0" kern="1200" dirty="0">
+                        <a:solidFill>
+                          <a:schemeClr val="lt1"/>
+                        </a:solidFill>
+                        <a:effectLst/>
+                        <a:latin typeface="+mn-lt"/>
+                        <a:ea typeface="+mn-ea"/>
+                        <a:cs typeface="+mn-cs"/>
+                      </a:endParaRPr>
+                    </a:p>
+                  </a:txBody>
+                  <a:tcPr/>
+                </a:tc>
+                <a:tc>
+                  <a:txBody>
+                    <a:bodyPr/>
+                    <a:lstStyle/>
+                    <a:p>
+                      <a:pPr algn="ctr"/>
+                      <a:r>
+                        <a:rPr lang="zh-TW" altLang="en-US" sz="1800" b="0" kern="1200" dirty="0">
+                          <a:solidFill>
+                            <a:schemeClr val="lt1"/>
+                          </a:solidFill>
+                          <a:effectLst/>
+                          <a:latin typeface="+mn-lt"/>
+                          <a:ea typeface="+mn-ea"/>
+                          <a:cs typeface="+mn-cs"/>
+                        </a:rPr>
+                        <a:t>介紹</a:t>
+                      </a:r>
+                      <a:endParaRPr lang="zh-TW" altLang="en-US" dirty="0"/>
+                    </a:p>
+                  </a:txBody>
+                  <a:tcPr/>
+                </a:tc>
+                <a:tc>
+                  <a:txBody>
+                    <a:bodyPr/>
+                    <a:lstStyle/>
+                    <a:p>
+                      <a:pPr algn="ctr"/>
+                      <a:r>
+                        <a:rPr lang="en-US" altLang="zh-TW" sz="1800" b="0" kern="1200" dirty="0">
+                          <a:solidFill>
+                            <a:schemeClr val="lt1"/>
+                          </a:solidFill>
+                          <a:effectLst/>
+                          <a:latin typeface="+mn-lt"/>
+                          <a:ea typeface="+mn-ea"/>
+                          <a:cs typeface="+mn-cs"/>
+                        </a:rPr>
+                        <a:t>Example</a:t>
+                      </a:r>
+                      <a:endParaRPr lang="zh-TW" altLang="en-US" dirty="0"/>
+                    </a:p>
+                  </a:txBody>
+                  <a:tcPr/>
+                </a:tc>
+                <a:extLst>
+                  <a:ext uri="{0D108BD9-81ED-4DB2-BD59-A6C34878D82A}">
+                    <a16:rowId xmlns:a16="http://schemas.microsoft.com/office/drawing/2014/main" val="2942912344"/>
+                  </a:ext>
+                </a:extLst>
+              </a:tr>
+              <a:tr h="370840">
+                <a:tc>
+                  <a:txBody>
+                    <a:bodyPr/>
+                    <a:lstStyle/>
+                    <a:p>
+                      <a:pPr marL="0" marR="0" lvl="0" indent="0" algn="ctr" defTabSz="914400" rtl="0" eaLnBrk="1" fontAlgn="auto" latinLnBrk="0" hangingPunct="1">
+                        <a:lnSpc>
+                          <a:spcPct val="100000"/>
+                        </a:lnSpc>
+                        <a:spcBef>
+                          <a:spcPts val="0"/>
+                        </a:spcBef>
+                        <a:spcAft>
+                          <a:spcPts val="0"/>
+                        </a:spcAft>
+                        <a:buClrTx/>
+                        <a:buSzTx/>
+                        <a:buFontTx/>
+                        <a:buNone/>
+                        <a:tabLst/>
+                        <a:defRPr/>
+                      </a:pPr>
+                      <a:r>
+                        <a:rPr lang="en-US" altLang="zh-TW" sz="1800" b="0" kern="1200" dirty="0">
+                          <a:solidFill>
+                            <a:schemeClr val="dk1"/>
+                          </a:solidFill>
+                          <a:effectLst/>
+                          <a:latin typeface="+mn-lt"/>
+                          <a:ea typeface="+mn-ea"/>
+                          <a:cs typeface="+mn-cs"/>
+                        </a:rPr>
+                        <a:t>##N</a:t>
+                      </a:r>
+                    </a:p>
+                  </a:txBody>
+                  <a:tcPr/>
+                </a:tc>
+                <a:tc>
+                  <a:txBody>
+                    <a:bodyPr/>
+                    <a:lstStyle/>
+                    <a:p>
+                      <a:pPr marL="0" marR="0" lvl="0" indent="0" algn="ctr" defTabSz="914400" rtl="0" eaLnBrk="1" fontAlgn="auto" latinLnBrk="0" hangingPunct="1">
+                        <a:lnSpc>
+                          <a:spcPct val="100000"/>
+                        </a:lnSpc>
+                        <a:spcBef>
+                          <a:spcPts val="0"/>
+                        </a:spcBef>
+                        <a:spcAft>
+                          <a:spcPts val="0"/>
+                        </a:spcAft>
+                        <a:buClrTx/>
+                        <a:buSzTx/>
+                        <a:buFontTx/>
+                        <a:buNone/>
+                        <a:tabLst/>
+                        <a:defRPr/>
+                      </a:pPr>
+                      <a:r>
+                        <a:rPr lang="zh-TW" altLang="en-US" sz="1800" b="0" kern="1200" dirty="0">
+                          <a:solidFill>
+                            <a:schemeClr val="dk1"/>
+                          </a:solidFill>
+                          <a:effectLst/>
+                          <a:latin typeface="+mn-lt"/>
+                          <a:ea typeface="+mn-ea"/>
+                          <a:cs typeface="+mn-cs"/>
+                        </a:rPr>
+                        <a:t>等待 </a:t>
+                      </a:r>
+                      <a:r>
+                        <a:rPr lang="en-US" altLang="zh-TW" sz="1800" b="0" kern="1200" dirty="0">
+                          <a:solidFill>
+                            <a:schemeClr val="dk1"/>
+                          </a:solidFill>
+                          <a:effectLst/>
+                          <a:latin typeface="+mn-lt"/>
+                          <a:ea typeface="+mn-ea"/>
+                          <a:cs typeface="+mn-cs"/>
+                        </a:rPr>
+                        <a:t>N </a:t>
+                      </a:r>
+                      <a:r>
+                        <a:rPr lang="zh-TW" altLang="en-US" sz="1800" b="0" kern="1200" dirty="0">
+                          <a:solidFill>
+                            <a:schemeClr val="dk1"/>
+                          </a:solidFill>
+                          <a:effectLst/>
+                          <a:latin typeface="+mn-lt"/>
+                          <a:ea typeface="+mn-ea"/>
+                          <a:cs typeface="+mn-cs"/>
+                        </a:rPr>
+                        <a:t>個時鐘週期</a:t>
+                      </a:r>
+                    </a:p>
+                  </a:txBody>
+                  <a:tcPr/>
+                </a:tc>
+                <a:tc>
+                  <a:txBody>
+                    <a:bodyPr/>
+                    <a:lstStyle/>
+                    <a:p>
+                      <a:pPr marL="0" marR="0" lvl="0" indent="0" algn="ctr" defTabSz="914400" rtl="0" eaLnBrk="1" fontAlgn="auto" latinLnBrk="0" hangingPunct="1">
+                        <a:lnSpc>
+                          <a:spcPct val="100000"/>
+                        </a:lnSpc>
+                        <a:spcBef>
+                          <a:spcPts val="0"/>
+                        </a:spcBef>
+                        <a:spcAft>
+                          <a:spcPts val="0"/>
+                        </a:spcAft>
+                        <a:buClrTx/>
+                        <a:buSzTx/>
+                        <a:buFontTx/>
+                        <a:buNone/>
+                        <a:tabLst/>
+                        <a:defRPr/>
+                      </a:pPr>
+                      <a:r>
+                        <a:rPr lang="en-US" altLang="zh-TW" sz="1800" b="0" kern="1200" dirty="0">
+                          <a:solidFill>
+                            <a:schemeClr val="dk1"/>
+                          </a:solidFill>
+                          <a:effectLst/>
+                          <a:latin typeface="+mn-lt"/>
+                          <a:ea typeface="+mn-ea"/>
+                          <a:cs typeface="+mn-cs"/>
+                        </a:rPr>
+                        <a:t>a ##2 b</a:t>
+                      </a:r>
+                    </a:p>
+                  </a:txBody>
+                  <a:tcPr/>
+                </a:tc>
+                <a:extLst>
+                  <a:ext uri="{0D108BD9-81ED-4DB2-BD59-A6C34878D82A}">
+                    <a16:rowId xmlns:a16="http://schemas.microsoft.com/office/drawing/2014/main" val="3823854218"/>
+                  </a:ext>
+                </a:extLst>
+              </a:tr>
+              <a:tr h="370840">
+                <a:tc>
+                  <a:txBody>
+                    <a:bodyPr/>
+                    <a:lstStyle/>
+                    <a:p>
+                      <a:pPr marL="0" marR="0" lvl="0" indent="0" algn="ctr" defTabSz="914400" rtl="0" eaLnBrk="1" fontAlgn="auto" latinLnBrk="0" hangingPunct="1">
+                        <a:lnSpc>
+                          <a:spcPct val="100000"/>
+                        </a:lnSpc>
+                        <a:spcBef>
+                          <a:spcPts val="0"/>
+                        </a:spcBef>
+                        <a:spcAft>
+                          <a:spcPts val="0"/>
+                        </a:spcAft>
+                        <a:buClrTx/>
+                        <a:buSzTx/>
+                        <a:buFontTx/>
+                        <a:buNone/>
+                        <a:tabLst/>
+                        <a:defRPr/>
+                      </a:pPr>
+                      <a:r>
+                        <a:rPr lang="en-US" altLang="zh-TW" sz="1800" b="0" kern="1200" dirty="0">
+                          <a:solidFill>
+                            <a:schemeClr val="dk1"/>
+                          </a:solidFill>
+                          <a:effectLst/>
+                          <a:latin typeface="+mn-lt"/>
+                          <a:ea typeface="+mn-ea"/>
+                          <a:cs typeface="+mn-cs"/>
+                        </a:rPr>
+                        <a:t>[*N]</a:t>
+                      </a:r>
+                    </a:p>
+                  </a:txBody>
+                  <a:tcPr/>
+                </a:tc>
+                <a:tc>
+                  <a:txBody>
+                    <a:bodyPr/>
+                    <a:lstStyle/>
+                    <a:p>
+                      <a:pPr marL="0" marR="0" lvl="0" indent="0" algn="ctr" defTabSz="914400" rtl="0" eaLnBrk="1" fontAlgn="auto" latinLnBrk="0" hangingPunct="1">
+                        <a:lnSpc>
+                          <a:spcPct val="100000"/>
+                        </a:lnSpc>
+                        <a:spcBef>
+                          <a:spcPts val="0"/>
+                        </a:spcBef>
+                        <a:spcAft>
+                          <a:spcPts val="0"/>
+                        </a:spcAft>
+                        <a:buClrTx/>
+                        <a:buSzTx/>
+                        <a:buFontTx/>
+                        <a:buNone/>
+                        <a:tabLst/>
+                        <a:defRPr/>
+                      </a:pPr>
+                      <a:r>
+                        <a:rPr lang="zh-TW" altLang="en-US" sz="1800" b="0" kern="1200" dirty="0">
+                          <a:solidFill>
+                            <a:schemeClr val="dk1"/>
+                          </a:solidFill>
+                          <a:effectLst/>
+                          <a:latin typeface="+mn-lt"/>
+                          <a:ea typeface="+mn-ea"/>
+                          <a:cs typeface="+mn-cs"/>
+                        </a:rPr>
+                        <a:t>某事件持續 </a:t>
+                      </a:r>
+                      <a:r>
+                        <a:rPr lang="en-US" altLang="zh-TW" sz="1800" b="0" kern="1200" dirty="0">
+                          <a:solidFill>
+                            <a:schemeClr val="dk1"/>
+                          </a:solidFill>
+                          <a:effectLst/>
+                          <a:latin typeface="+mn-lt"/>
+                          <a:ea typeface="+mn-ea"/>
+                          <a:cs typeface="+mn-cs"/>
+                        </a:rPr>
+                        <a:t>N </a:t>
+                      </a:r>
+                      <a:r>
+                        <a:rPr lang="zh-TW" altLang="en-US" sz="1800" b="0" kern="1200" dirty="0">
+                          <a:solidFill>
+                            <a:schemeClr val="dk1"/>
+                          </a:solidFill>
+                          <a:effectLst/>
+                          <a:latin typeface="+mn-lt"/>
+                          <a:ea typeface="+mn-ea"/>
+                          <a:cs typeface="+mn-cs"/>
+                        </a:rPr>
+                        <a:t>次</a:t>
+                      </a:r>
+                    </a:p>
+                  </a:txBody>
+                  <a:tcPr/>
+                </a:tc>
+                <a:tc>
+                  <a:txBody>
+                    <a:bodyPr/>
+                    <a:lstStyle/>
+                    <a:p>
+                      <a:pPr marL="0" marR="0" lvl="0" indent="0" algn="ctr" defTabSz="914400" rtl="0" eaLnBrk="1" fontAlgn="auto" latinLnBrk="0" hangingPunct="1">
+                        <a:lnSpc>
+                          <a:spcPct val="100000"/>
+                        </a:lnSpc>
+                        <a:spcBef>
+                          <a:spcPts val="0"/>
+                        </a:spcBef>
+                        <a:spcAft>
+                          <a:spcPts val="0"/>
+                        </a:spcAft>
+                        <a:buClrTx/>
+                        <a:buSzTx/>
+                        <a:buFontTx/>
+                        <a:buNone/>
+                        <a:tabLst/>
+                        <a:defRPr/>
+                      </a:pPr>
+                      <a:r>
+                        <a:rPr lang="en-US" altLang="zh-TW" sz="1800" b="0" kern="1200" dirty="0">
+                          <a:solidFill>
+                            <a:schemeClr val="dk1"/>
+                          </a:solidFill>
+                          <a:effectLst/>
+                          <a:latin typeface="+mn-lt"/>
+                          <a:ea typeface="+mn-ea"/>
+                          <a:cs typeface="+mn-cs"/>
+                        </a:rPr>
+                        <a:t>a[*3]</a:t>
+                      </a:r>
+                    </a:p>
+                  </a:txBody>
+                  <a:tcPr/>
+                </a:tc>
+                <a:extLst>
+                  <a:ext uri="{0D108BD9-81ED-4DB2-BD59-A6C34878D82A}">
+                    <a16:rowId xmlns:a16="http://schemas.microsoft.com/office/drawing/2014/main" val="1446062254"/>
+                  </a:ext>
+                </a:extLst>
+              </a:tr>
+              <a:tr h="370840">
+                <a:tc>
+                  <a:txBody>
+                    <a:bodyPr/>
+                    <a:lstStyle/>
+                    <a:p>
+                      <a:pPr marL="0" marR="0" lvl="0" indent="0" algn="ctr" defTabSz="914400" rtl="0" eaLnBrk="1" fontAlgn="auto" latinLnBrk="0" hangingPunct="1">
+                        <a:lnSpc>
+                          <a:spcPct val="100000"/>
+                        </a:lnSpc>
+                        <a:spcBef>
+                          <a:spcPts val="0"/>
+                        </a:spcBef>
+                        <a:spcAft>
+                          <a:spcPts val="0"/>
+                        </a:spcAft>
+                        <a:buClrTx/>
+                        <a:buSzTx/>
+                        <a:buFontTx/>
+                        <a:buNone/>
+                        <a:tabLst/>
+                        <a:defRPr/>
+                      </a:pPr>
+                      <a:r>
+                        <a:rPr lang="en-US" altLang="zh-TW" sz="1800" b="0" kern="1200" dirty="0">
+                          <a:solidFill>
+                            <a:schemeClr val="dk1"/>
+                          </a:solidFill>
+                          <a:effectLst/>
+                          <a:latin typeface="+mn-lt"/>
+                          <a:ea typeface="+mn-ea"/>
+                          <a:cs typeface="+mn-cs"/>
+                        </a:rPr>
+                        <a:t>[#]</a:t>
+                      </a:r>
+                      <a:endParaRPr lang="zh-TW" altLang="en-US" sz="1800" b="0" kern="1200" dirty="0">
+                        <a:solidFill>
+                          <a:schemeClr val="dk1"/>
+                        </a:solidFill>
+                        <a:effectLst/>
+                        <a:latin typeface="+mn-lt"/>
+                        <a:ea typeface="+mn-ea"/>
+                        <a:cs typeface="+mn-cs"/>
+                      </a:endParaRPr>
+                    </a:p>
+                  </a:txBody>
+                  <a:tcPr/>
+                </a:tc>
+                <a:tc>
+                  <a:txBody>
+                    <a:bodyPr/>
+                    <a:lstStyle/>
+                    <a:p>
+                      <a:pPr marL="0" marR="0" lvl="0" indent="0" algn="ctr" defTabSz="914400" rtl="0" eaLnBrk="1" fontAlgn="auto" latinLnBrk="0" hangingPunct="1">
+                        <a:lnSpc>
+                          <a:spcPct val="100000"/>
+                        </a:lnSpc>
+                        <a:spcBef>
+                          <a:spcPts val="0"/>
+                        </a:spcBef>
+                        <a:spcAft>
+                          <a:spcPts val="0"/>
+                        </a:spcAft>
+                        <a:buClrTx/>
+                        <a:buSzTx/>
+                        <a:buFontTx/>
+                        <a:buNone/>
+                        <a:tabLst/>
+                        <a:defRPr/>
+                      </a:pPr>
+                      <a:r>
+                        <a:rPr lang="zh-TW" altLang="en-US" sz="1800" b="0" kern="1200" dirty="0">
+                          <a:solidFill>
+                            <a:schemeClr val="dk1"/>
+                          </a:solidFill>
+                          <a:effectLst/>
+                          <a:latin typeface="+mn-lt"/>
+                          <a:ea typeface="+mn-ea"/>
+                          <a:cs typeface="+mn-cs"/>
+                        </a:rPr>
+                        <a:t>任意非零時間延遲</a:t>
+                      </a:r>
+                    </a:p>
+                  </a:txBody>
+                  <a:tcPr/>
+                </a:tc>
+                <a:tc>
+                  <a:txBody>
+                    <a:bodyPr/>
+                    <a:lstStyle/>
+                    <a:p>
+                      <a:pPr algn="ctr"/>
+                      <a:endParaRPr lang="zh-TW" altLang="en-US" dirty="0"/>
+                    </a:p>
+                  </a:txBody>
+                  <a:tcPr/>
+                </a:tc>
+                <a:extLst>
+                  <a:ext uri="{0D108BD9-81ED-4DB2-BD59-A6C34878D82A}">
+                    <a16:rowId xmlns:a16="http://schemas.microsoft.com/office/drawing/2014/main" val="658162700"/>
+                  </a:ext>
+                </a:extLst>
+              </a:tr>
+              <a:tr h="370840">
+                <a:tc>
+                  <a:txBody>
+                    <a:bodyPr/>
+                    <a:lstStyle/>
+                    <a:p>
+                      <a:pPr marL="0" marR="0" lvl="0" indent="0" algn="ctr" defTabSz="914400" rtl="0" eaLnBrk="1" fontAlgn="auto" latinLnBrk="0" hangingPunct="1">
+                        <a:lnSpc>
+                          <a:spcPct val="100000"/>
+                        </a:lnSpc>
+                        <a:spcBef>
+                          <a:spcPts val="0"/>
+                        </a:spcBef>
+                        <a:spcAft>
+                          <a:spcPts val="0"/>
+                        </a:spcAft>
+                        <a:buClrTx/>
+                        <a:buSzTx/>
+                        <a:buFontTx/>
+                        <a:buNone/>
+                        <a:tabLst/>
+                        <a:defRPr/>
+                      </a:pPr>
+                      <a:r>
+                        <a:rPr lang="en-US" altLang="zh-TW" sz="1800" b="0" kern="1200" dirty="0">
+                          <a:solidFill>
+                            <a:schemeClr val="dk1"/>
+                          </a:solidFill>
+                          <a:effectLst/>
+                          <a:latin typeface="+mn-lt"/>
+                          <a:ea typeface="+mn-ea"/>
+                          <a:cs typeface="+mn-cs"/>
+                        </a:rPr>
+                        <a:t>##[M:N]</a:t>
+                      </a:r>
+                    </a:p>
+                  </a:txBody>
+                  <a:tcPr/>
+                </a:tc>
+                <a:tc>
+                  <a:txBody>
+                    <a:bodyPr/>
+                    <a:lstStyle/>
+                    <a:p>
+                      <a:pPr marL="0" marR="0" lvl="0" indent="0" algn="ctr" defTabSz="914400" rtl="0" eaLnBrk="1" fontAlgn="auto" latinLnBrk="0" hangingPunct="1">
+                        <a:lnSpc>
+                          <a:spcPct val="100000"/>
+                        </a:lnSpc>
+                        <a:spcBef>
+                          <a:spcPts val="0"/>
+                        </a:spcBef>
+                        <a:spcAft>
+                          <a:spcPts val="0"/>
+                        </a:spcAft>
+                        <a:buClrTx/>
+                        <a:buSzTx/>
+                        <a:buFontTx/>
+                        <a:buNone/>
+                        <a:tabLst/>
+                        <a:defRPr/>
+                      </a:pPr>
+                      <a:r>
+                        <a:rPr lang="zh-TW" altLang="en-US" sz="1800" b="0" kern="1200" dirty="0">
+                          <a:solidFill>
+                            <a:schemeClr val="dk1"/>
+                          </a:solidFill>
+                          <a:effectLst/>
+                          <a:latin typeface="+mn-lt"/>
+                          <a:ea typeface="+mn-ea"/>
+                          <a:cs typeface="+mn-cs"/>
+                        </a:rPr>
+                        <a:t>延遲 </a:t>
+                      </a:r>
+                      <a:r>
+                        <a:rPr lang="en-US" altLang="zh-TW" sz="1800" b="0" kern="1200" dirty="0">
+                          <a:solidFill>
+                            <a:schemeClr val="dk1"/>
+                          </a:solidFill>
+                          <a:effectLst/>
+                          <a:latin typeface="+mn-lt"/>
+                          <a:ea typeface="+mn-ea"/>
+                          <a:cs typeface="+mn-cs"/>
+                        </a:rPr>
+                        <a:t>M </a:t>
+                      </a:r>
+                      <a:r>
+                        <a:rPr lang="zh-TW" altLang="en-US" sz="1800" b="0" kern="1200" dirty="0">
+                          <a:solidFill>
+                            <a:schemeClr val="dk1"/>
+                          </a:solidFill>
+                          <a:effectLst/>
+                          <a:latin typeface="+mn-lt"/>
+                          <a:ea typeface="+mn-ea"/>
+                          <a:cs typeface="+mn-cs"/>
+                        </a:rPr>
+                        <a:t>到 </a:t>
+                      </a:r>
+                      <a:r>
+                        <a:rPr lang="en-US" altLang="zh-TW" sz="1800" b="0" kern="1200" dirty="0">
+                          <a:solidFill>
+                            <a:schemeClr val="dk1"/>
+                          </a:solidFill>
+                          <a:effectLst/>
+                          <a:latin typeface="+mn-lt"/>
+                          <a:ea typeface="+mn-ea"/>
+                          <a:cs typeface="+mn-cs"/>
+                        </a:rPr>
+                        <a:t>N </a:t>
+                      </a:r>
+                      <a:r>
+                        <a:rPr lang="zh-TW" altLang="en-US" sz="1800" b="0" kern="1200" dirty="0">
+                          <a:solidFill>
+                            <a:schemeClr val="dk1"/>
+                          </a:solidFill>
+                          <a:effectLst/>
+                          <a:latin typeface="+mn-lt"/>
+                          <a:ea typeface="+mn-ea"/>
+                          <a:cs typeface="+mn-cs"/>
+                        </a:rPr>
+                        <a:t>個週期</a:t>
+                      </a:r>
+                    </a:p>
+                  </a:txBody>
+                  <a:tcPr/>
+                </a:tc>
+                <a:tc>
+                  <a:txBody>
+                    <a:bodyPr/>
+                    <a:lstStyle/>
+                    <a:p>
+                      <a:pPr marL="0" marR="0" lvl="0" indent="0" algn="ctr" defTabSz="914400" rtl="0" eaLnBrk="1" fontAlgn="auto" latinLnBrk="0" hangingPunct="1">
+                        <a:lnSpc>
+                          <a:spcPct val="100000"/>
+                        </a:lnSpc>
+                        <a:spcBef>
+                          <a:spcPts val="0"/>
+                        </a:spcBef>
+                        <a:spcAft>
+                          <a:spcPts val="0"/>
+                        </a:spcAft>
+                        <a:buClrTx/>
+                        <a:buSzTx/>
+                        <a:buFontTx/>
+                        <a:buNone/>
+                        <a:tabLst/>
+                        <a:defRPr/>
+                      </a:pPr>
+                      <a:r>
+                        <a:rPr lang="en-US" altLang="zh-TW" sz="1800" b="0" kern="1200" dirty="0">
+                          <a:solidFill>
+                            <a:schemeClr val="dk1"/>
+                          </a:solidFill>
+                          <a:effectLst/>
+                          <a:latin typeface="+mn-lt"/>
+                          <a:ea typeface="+mn-ea"/>
+                          <a:cs typeface="+mn-cs"/>
+                        </a:rPr>
+                        <a:t>a ##[1:3] b</a:t>
+                      </a:r>
+                    </a:p>
+                  </a:txBody>
+                  <a:tcPr/>
+                </a:tc>
+                <a:extLst>
+                  <a:ext uri="{0D108BD9-81ED-4DB2-BD59-A6C34878D82A}">
+                    <a16:rowId xmlns:a16="http://schemas.microsoft.com/office/drawing/2014/main" val="3920430533"/>
+                  </a:ext>
+                </a:extLst>
+              </a:tr>
+              <a:tr h="370840">
+                <a:tc>
+                  <a:txBody>
+                    <a:bodyPr/>
+                    <a:lstStyle/>
+                    <a:p>
+                      <a:pPr marL="0" marR="0" lvl="0" indent="0" algn="ctr" defTabSz="914400" rtl="0" eaLnBrk="1" fontAlgn="auto" latinLnBrk="0" hangingPunct="1">
+                        <a:lnSpc>
+                          <a:spcPct val="100000"/>
+                        </a:lnSpc>
+                        <a:spcBef>
+                          <a:spcPts val="0"/>
+                        </a:spcBef>
+                        <a:spcAft>
+                          <a:spcPts val="0"/>
+                        </a:spcAft>
+                        <a:buClrTx/>
+                        <a:buSzTx/>
+                        <a:buFontTx/>
+                        <a:buNone/>
+                        <a:tabLst/>
+                        <a:defRPr/>
+                      </a:pPr>
+                      <a:r>
+                        <a:rPr lang="en-US" altLang="zh-TW" sz="1800" b="0" kern="1200" dirty="0">
+                          <a:solidFill>
+                            <a:schemeClr val="dk1"/>
+                          </a:solidFill>
+                          <a:effectLst/>
+                          <a:latin typeface="+mn-lt"/>
+                          <a:ea typeface="+mn-ea"/>
+                          <a:cs typeface="+mn-cs"/>
+                        </a:rPr>
+                        <a:t>within</a:t>
+                      </a:r>
+                    </a:p>
+                  </a:txBody>
+                  <a:tcPr/>
+                </a:tc>
+                <a:tc>
+                  <a:txBody>
+                    <a:bodyPr/>
+                    <a:lstStyle/>
+                    <a:p>
+                      <a:pPr marL="0" marR="0" lvl="0" indent="0" algn="ctr" defTabSz="914400" rtl="0" eaLnBrk="1" fontAlgn="auto" latinLnBrk="0" hangingPunct="1">
+                        <a:lnSpc>
+                          <a:spcPct val="100000"/>
+                        </a:lnSpc>
+                        <a:spcBef>
+                          <a:spcPts val="0"/>
+                        </a:spcBef>
+                        <a:spcAft>
+                          <a:spcPts val="0"/>
+                        </a:spcAft>
+                        <a:buClrTx/>
+                        <a:buSzTx/>
+                        <a:buFontTx/>
+                        <a:buNone/>
+                        <a:tabLst/>
+                        <a:defRPr/>
+                      </a:pPr>
+                      <a:r>
+                        <a:rPr lang="zh-TW" altLang="en-US" sz="1800" b="0" kern="1200" dirty="0">
+                          <a:solidFill>
+                            <a:schemeClr val="dk1"/>
+                          </a:solidFill>
+                          <a:effectLst/>
+                          <a:latin typeface="+mn-lt"/>
+                          <a:ea typeface="+mn-ea"/>
+                          <a:cs typeface="+mn-cs"/>
+                        </a:rPr>
+                        <a:t>限制事件序列在另一事件內</a:t>
+                      </a:r>
+                    </a:p>
+                  </a:txBody>
+                  <a:tcPr/>
+                </a:tc>
+                <a:tc>
+                  <a:txBody>
+                    <a:bodyPr/>
+                    <a:lstStyle/>
+                    <a:p>
+                      <a:pPr marL="0" marR="0" lvl="0" indent="0" algn="ctr" defTabSz="914400" rtl="0" eaLnBrk="1" fontAlgn="auto" latinLnBrk="0" hangingPunct="1">
+                        <a:lnSpc>
+                          <a:spcPct val="100000"/>
+                        </a:lnSpc>
+                        <a:spcBef>
+                          <a:spcPts val="0"/>
+                        </a:spcBef>
+                        <a:spcAft>
+                          <a:spcPts val="0"/>
+                        </a:spcAft>
+                        <a:buClrTx/>
+                        <a:buSzTx/>
+                        <a:buFontTx/>
+                        <a:buNone/>
+                        <a:tabLst/>
+                        <a:defRPr/>
+                      </a:pPr>
+                      <a:r>
+                        <a:rPr lang="en-US" altLang="zh-TW" sz="1800" b="0" kern="1200" dirty="0">
+                          <a:solidFill>
+                            <a:schemeClr val="dk1"/>
+                          </a:solidFill>
+                          <a:effectLst/>
+                          <a:latin typeface="+mn-lt"/>
+                          <a:ea typeface="+mn-ea"/>
+                          <a:cs typeface="+mn-cs"/>
+                        </a:rPr>
+                        <a:t>s1 within s2</a:t>
+                      </a:r>
+                    </a:p>
+                  </a:txBody>
+                  <a:tcPr/>
+                </a:tc>
+                <a:extLst>
+                  <a:ext uri="{0D108BD9-81ED-4DB2-BD59-A6C34878D82A}">
+                    <a16:rowId xmlns:a16="http://schemas.microsoft.com/office/drawing/2014/main" val="2356372053"/>
+                  </a:ext>
+                </a:extLst>
+              </a:tr>
+              <a:tr h="370840">
+                <a:tc>
+                  <a:txBody>
+                    <a:bodyPr/>
+                    <a:lstStyle/>
+                    <a:p>
+                      <a:pPr marL="0" marR="0" lvl="0" indent="0" algn="ctr" defTabSz="914400" rtl="0" eaLnBrk="1" fontAlgn="auto" latinLnBrk="0" hangingPunct="1">
+                        <a:lnSpc>
+                          <a:spcPct val="100000"/>
+                        </a:lnSpc>
+                        <a:spcBef>
+                          <a:spcPts val="0"/>
+                        </a:spcBef>
+                        <a:spcAft>
+                          <a:spcPts val="0"/>
+                        </a:spcAft>
+                        <a:buClrTx/>
+                        <a:buSzTx/>
+                        <a:buFontTx/>
+                        <a:buNone/>
+                        <a:tabLst/>
+                        <a:defRPr/>
+                      </a:pPr>
+                      <a:r>
+                        <a:rPr lang="en-US" altLang="zh-TW" sz="1800" b="0" kern="1200" dirty="0">
+                          <a:solidFill>
+                            <a:schemeClr val="dk1"/>
+                          </a:solidFill>
+                          <a:effectLst/>
+                          <a:latin typeface="+mn-lt"/>
+                          <a:ea typeface="+mn-ea"/>
+                          <a:cs typeface="+mn-cs"/>
+                        </a:rPr>
+                        <a:t>disable </a:t>
+                      </a:r>
+                      <a:r>
+                        <a:rPr lang="en-US" altLang="zh-TW" sz="1800" b="0" kern="1200" dirty="0" err="1">
+                          <a:solidFill>
+                            <a:schemeClr val="dk1"/>
+                          </a:solidFill>
+                          <a:effectLst/>
+                          <a:latin typeface="+mn-lt"/>
+                          <a:ea typeface="+mn-ea"/>
+                          <a:cs typeface="+mn-cs"/>
+                        </a:rPr>
+                        <a:t>iff</a:t>
+                      </a:r>
+                      <a:endParaRPr lang="en-US" altLang="zh-TW" sz="1800" b="0" kern="1200" dirty="0">
+                        <a:solidFill>
+                          <a:schemeClr val="dk1"/>
+                        </a:solidFill>
+                        <a:effectLst/>
+                        <a:latin typeface="+mn-lt"/>
+                        <a:ea typeface="+mn-ea"/>
+                        <a:cs typeface="+mn-cs"/>
+                      </a:endParaRPr>
+                    </a:p>
+                  </a:txBody>
+                  <a:tcPr/>
+                </a:tc>
+                <a:tc>
+                  <a:txBody>
+                    <a:bodyPr/>
+                    <a:lstStyle/>
+                    <a:p>
+                      <a:pPr marL="0" marR="0" lvl="0" indent="0" algn="ctr" defTabSz="914400" rtl="0" eaLnBrk="1" fontAlgn="auto" latinLnBrk="0" hangingPunct="1">
+                        <a:lnSpc>
+                          <a:spcPct val="100000"/>
+                        </a:lnSpc>
+                        <a:spcBef>
+                          <a:spcPts val="0"/>
+                        </a:spcBef>
+                        <a:spcAft>
+                          <a:spcPts val="0"/>
+                        </a:spcAft>
+                        <a:buClrTx/>
+                        <a:buSzTx/>
+                        <a:buFontTx/>
+                        <a:buNone/>
+                        <a:tabLst/>
+                        <a:defRPr/>
+                      </a:pPr>
+                      <a:r>
+                        <a:rPr lang="zh-TW" altLang="en-US" sz="1800" b="0" kern="1200" dirty="0">
+                          <a:solidFill>
+                            <a:schemeClr val="dk1"/>
+                          </a:solidFill>
+                          <a:effectLst/>
+                          <a:latin typeface="+mn-lt"/>
+                          <a:ea typeface="+mn-ea"/>
+                          <a:cs typeface="+mn-cs"/>
+                        </a:rPr>
+                        <a:t>在某條件下禁用斷言</a:t>
+                      </a:r>
+                    </a:p>
+                  </a:txBody>
+                  <a:tcPr/>
+                </a:tc>
+                <a:tc>
+                  <a:txBody>
+                    <a:bodyPr/>
+                    <a:lstStyle/>
+                    <a:p>
+                      <a:pPr marL="0" marR="0" lvl="0" indent="0" algn="ctr" defTabSz="914400" rtl="0" eaLnBrk="1" fontAlgn="auto" latinLnBrk="0" hangingPunct="1">
+                        <a:lnSpc>
+                          <a:spcPct val="100000"/>
+                        </a:lnSpc>
+                        <a:spcBef>
+                          <a:spcPts val="0"/>
+                        </a:spcBef>
+                        <a:spcAft>
+                          <a:spcPts val="0"/>
+                        </a:spcAft>
+                        <a:buClrTx/>
+                        <a:buSzTx/>
+                        <a:buFontTx/>
+                        <a:buNone/>
+                        <a:tabLst/>
+                        <a:defRPr/>
+                      </a:pPr>
+                      <a:r>
+                        <a:rPr lang="en-US" altLang="zh-TW" sz="1800" b="0" kern="1200" dirty="0">
+                          <a:solidFill>
+                            <a:schemeClr val="dk1"/>
+                          </a:solidFill>
+                          <a:effectLst/>
+                          <a:latin typeface="+mn-lt"/>
+                          <a:ea typeface="+mn-ea"/>
+                          <a:cs typeface="+mn-cs"/>
+                        </a:rPr>
+                        <a:t>@(posedge </a:t>
+                      </a:r>
+                      <a:r>
+                        <a:rPr lang="en-US" altLang="zh-TW" sz="1800" b="0" kern="1200" dirty="0" err="1">
+                          <a:solidFill>
+                            <a:schemeClr val="dk1"/>
+                          </a:solidFill>
+                          <a:effectLst/>
+                          <a:latin typeface="+mn-lt"/>
+                          <a:ea typeface="+mn-ea"/>
+                          <a:cs typeface="+mn-cs"/>
+                        </a:rPr>
+                        <a:t>clk</a:t>
+                      </a:r>
+                      <a:r>
+                        <a:rPr lang="en-US" altLang="zh-TW" sz="1800" b="0" kern="1200" dirty="0">
+                          <a:solidFill>
+                            <a:schemeClr val="dk1"/>
+                          </a:solidFill>
+                          <a:effectLst/>
+                          <a:latin typeface="+mn-lt"/>
+                          <a:ea typeface="+mn-ea"/>
+                          <a:cs typeface="+mn-cs"/>
+                        </a:rPr>
+                        <a:t>) disable </a:t>
+                      </a:r>
+                      <a:r>
+                        <a:rPr lang="en-US" altLang="zh-TW" sz="1800" b="0" kern="1200" dirty="0" err="1">
+                          <a:solidFill>
+                            <a:schemeClr val="dk1"/>
+                          </a:solidFill>
+                          <a:effectLst/>
+                          <a:latin typeface="+mn-lt"/>
+                          <a:ea typeface="+mn-ea"/>
+                          <a:cs typeface="+mn-cs"/>
+                        </a:rPr>
+                        <a:t>iff</a:t>
+                      </a:r>
+                      <a:r>
+                        <a:rPr lang="en-US" altLang="zh-TW" sz="1800" b="0" kern="1200" dirty="0">
+                          <a:solidFill>
+                            <a:schemeClr val="dk1"/>
+                          </a:solidFill>
+                          <a:effectLst/>
+                          <a:latin typeface="+mn-lt"/>
+                          <a:ea typeface="+mn-ea"/>
+                          <a:cs typeface="+mn-cs"/>
+                        </a:rPr>
+                        <a:t> (reset)</a:t>
+                      </a:r>
+                    </a:p>
+                  </a:txBody>
+                  <a:tcPr/>
+                </a:tc>
+                <a:extLst>
+                  <a:ext uri="{0D108BD9-81ED-4DB2-BD59-A6C34878D82A}">
+                    <a16:rowId xmlns:a16="http://schemas.microsoft.com/office/drawing/2014/main" val="1665965528"/>
+                  </a:ext>
+                </a:extLst>
+              </a:tr>
+            </a:tbl>
+          </a:graphicData>
+        </a:graphic>
+      </p:graphicFrame>
+    </p:spTree>
+    <p:extLst>
+      <p:ext uri="{BB962C8B-B14F-4D97-AF65-F5344CB8AC3E}">
+        <p14:creationId xmlns:p14="http://schemas.microsoft.com/office/powerpoint/2010/main" val="3323820164"/>
       </p:ext>
     </p:extLst>
   </p:cSld>

</xml_diff>